<commit_message>
Add linear mixed model for hypothesis 2
</commit_message>
<xml_diff>
--- a/figs/networks.pptx
+++ b/figs/networks.pptx
@@ -2,18 +2,18 @@
 <file path=ppt/presentation.xml><?xml version="1.0" encoding="utf-8"?>
 <p:presentation xmlns:a="http://schemas.openxmlformats.org/drawingml/2006/main" xmlns:r="http://schemas.openxmlformats.org/officeDocument/2006/relationships" xmlns:p="http://schemas.openxmlformats.org/presentationml/2006/main" saveSubsetFonts="1">
   <p:sldMasterIdLst>
-    <p:sldMasterId id="2147483648" r:id="rId1"/>
+    <p:sldMasterId id="2147483660" r:id="rId1"/>
   </p:sldMasterIdLst>
   <p:sldIdLst>
     <p:sldId id="256" r:id="rId2"/>
   </p:sldIdLst>
-  <p:sldSz cx="12192000" cy="6858000"/>
+  <p:sldSz cx="13716000" cy="13716000"/>
   <p:notesSz cx="6858000" cy="9144000"/>
   <p:defaultTextStyle>
     <a:defPPr>
       <a:defRPr lang="en-US"/>
     </a:defPPr>
-    <a:lvl1pPr marL="0" algn="l" defTabSz="914400" rtl="0" eaLnBrk="1" latinLnBrk="0" hangingPunct="1">
+    <a:lvl1pPr marL="0" algn="l" defTabSz="457200" rtl="0" eaLnBrk="1" latinLnBrk="0" hangingPunct="1">
       <a:defRPr sz="1800" kern="1200">
         <a:solidFill>
           <a:schemeClr val="tx1"/>
@@ -23,7 +23,7 @@
         <a:cs typeface="+mn-cs"/>
       </a:defRPr>
     </a:lvl1pPr>
-    <a:lvl2pPr marL="457200" algn="l" defTabSz="914400" rtl="0" eaLnBrk="1" latinLnBrk="0" hangingPunct="1">
+    <a:lvl2pPr marL="457200" algn="l" defTabSz="457200" rtl="0" eaLnBrk="1" latinLnBrk="0" hangingPunct="1">
       <a:defRPr sz="1800" kern="1200">
         <a:solidFill>
           <a:schemeClr val="tx1"/>
@@ -33,7 +33,7 @@
         <a:cs typeface="+mn-cs"/>
       </a:defRPr>
     </a:lvl2pPr>
-    <a:lvl3pPr marL="914400" algn="l" defTabSz="914400" rtl="0" eaLnBrk="1" latinLnBrk="0" hangingPunct="1">
+    <a:lvl3pPr marL="914400" algn="l" defTabSz="457200" rtl="0" eaLnBrk="1" latinLnBrk="0" hangingPunct="1">
       <a:defRPr sz="1800" kern="1200">
         <a:solidFill>
           <a:schemeClr val="tx1"/>
@@ -43,7 +43,7 @@
         <a:cs typeface="+mn-cs"/>
       </a:defRPr>
     </a:lvl3pPr>
-    <a:lvl4pPr marL="1371600" algn="l" defTabSz="914400" rtl="0" eaLnBrk="1" latinLnBrk="0" hangingPunct="1">
+    <a:lvl4pPr marL="1371600" algn="l" defTabSz="457200" rtl="0" eaLnBrk="1" latinLnBrk="0" hangingPunct="1">
       <a:defRPr sz="1800" kern="1200">
         <a:solidFill>
           <a:schemeClr val="tx1"/>
@@ -53,7 +53,7 @@
         <a:cs typeface="+mn-cs"/>
       </a:defRPr>
     </a:lvl4pPr>
-    <a:lvl5pPr marL="1828800" algn="l" defTabSz="914400" rtl="0" eaLnBrk="1" latinLnBrk="0" hangingPunct="1">
+    <a:lvl5pPr marL="1828800" algn="l" defTabSz="457200" rtl="0" eaLnBrk="1" latinLnBrk="0" hangingPunct="1">
       <a:defRPr sz="1800" kern="1200">
         <a:solidFill>
           <a:schemeClr val="tx1"/>
@@ -63,7 +63,7 @@
         <a:cs typeface="+mn-cs"/>
       </a:defRPr>
     </a:lvl5pPr>
-    <a:lvl6pPr marL="2286000" algn="l" defTabSz="914400" rtl="0" eaLnBrk="1" latinLnBrk="0" hangingPunct="1">
+    <a:lvl6pPr marL="2286000" algn="l" defTabSz="457200" rtl="0" eaLnBrk="1" latinLnBrk="0" hangingPunct="1">
       <a:defRPr sz="1800" kern="1200">
         <a:solidFill>
           <a:schemeClr val="tx1"/>
@@ -73,7 +73,7 @@
         <a:cs typeface="+mn-cs"/>
       </a:defRPr>
     </a:lvl6pPr>
-    <a:lvl7pPr marL="2743200" algn="l" defTabSz="914400" rtl="0" eaLnBrk="1" latinLnBrk="0" hangingPunct="1">
+    <a:lvl7pPr marL="2743200" algn="l" defTabSz="457200" rtl="0" eaLnBrk="1" latinLnBrk="0" hangingPunct="1">
       <a:defRPr sz="1800" kern="1200">
         <a:solidFill>
           <a:schemeClr val="tx1"/>
@@ -83,7 +83,7 @@
         <a:cs typeface="+mn-cs"/>
       </a:defRPr>
     </a:lvl7pPr>
-    <a:lvl8pPr marL="3200400" algn="l" defTabSz="914400" rtl="0" eaLnBrk="1" latinLnBrk="0" hangingPunct="1">
+    <a:lvl8pPr marL="3200400" algn="l" defTabSz="457200" rtl="0" eaLnBrk="1" latinLnBrk="0" hangingPunct="1">
       <a:defRPr sz="1800" kern="1200">
         <a:solidFill>
           <a:schemeClr val="tx1"/>
@@ -93,7 +93,7 @@
         <a:cs typeface="+mn-cs"/>
       </a:defRPr>
     </a:lvl8pPr>
-    <a:lvl9pPr marL="3657600" algn="l" defTabSz="914400" rtl="0" eaLnBrk="1" latinLnBrk="0" hangingPunct="1">
+    <a:lvl9pPr marL="3657600" algn="l" defTabSz="457200" rtl="0" eaLnBrk="1" latinLnBrk="0" hangingPunct="1">
       <a:defRPr sz="1800" kern="1200">
         <a:solidFill>
           <a:schemeClr val="tx1"/>
@@ -131,13 +131,7 @@
       </p:grpSpPr>
       <p:sp>
         <p:nvSpPr>
-          <p:cNvPr id="2" name="Title 1">
-            <a:extLst>
-              <a:ext uri="{FF2B5EF4-FFF2-40B4-BE49-F238E27FC236}">
-                <a16:creationId xmlns:a16="http://schemas.microsoft.com/office/drawing/2014/main" id="{581FADB0-1F81-D91A-2E74-259034344725}"/>
-              </a:ext>
-            </a:extLst>
-          </p:cNvPr>
+          <p:cNvPr id="2" name="Title 1"/>
           <p:cNvSpPr>
             <a:spLocks noGrp="1"/>
           </p:cNvSpPr>
@@ -147,15 +141,15 @@
         </p:nvSpPr>
         <p:spPr>
           <a:xfrm>
-            <a:off x="1524000" y="1122363"/>
-            <a:ext cx="9144000" cy="2387600"/>
+            <a:off x="1028700" y="2244726"/>
+            <a:ext cx="11658600" cy="4775200"/>
           </a:xfrm>
         </p:spPr>
         <p:txBody>
           <a:bodyPr anchor="b"/>
           <a:lstStyle>
             <a:lvl1pPr algn="ctr">
-              <a:defRPr sz="6000"/>
+              <a:defRPr sz="9000"/>
             </a:lvl1pPr>
           </a:lstStyle>
           <a:p>
@@ -163,18 +157,13 @@
               <a:rPr lang="en-US"/>
               <a:t>Click to edit Master title style</a:t>
             </a:r>
-          </a:p>
-        </p:txBody>
-      </p:sp>
-      <p:sp>
-        <p:nvSpPr>
-          <p:cNvPr id="3" name="Subtitle 2">
-            <a:extLst>
-              <a:ext uri="{FF2B5EF4-FFF2-40B4-BE49-F238E27FC236}">
-                <a16:creationId xmlns:a16="http://schemas.microsoft.com/office/drawing/2014/main" id="{9AD10A35-8E68-6F13-5A5B-8F4CB3E67DFF}"/>
-              </a:ext>
-            </a:extLst>
-          </p:cNvPr>
+            <a:endParaRPr lang="en-US" dirty="0"/>
+          </a:p>
+        </p:txBody>
+      </p:sp>
+      <p:sp>
+        <p:nvSpPr>
+          <p:cNvPr id="3" name="Subtitle 2"/>
           <p:cNvSpPr>
             <a:spLocks noGrp="1"/>
           </p:cNvSpPr>
@@ -184,8 +173,8 @@
         </p:nvSpPr>
         <p:spPr>
           <a:xfrm>
-            <a:off x="1524000" y="3602038"/>
-            <a:ext cx="9144000" cy="1655762"/>
+            <a:off x="1714500" y="7204076"/>
+            <a:ext cx="10287000" cy="3311524"/>
           </a:xfrm>
         </p:spPr>
         <p:txBody>
@@ -193,39 +182,39 @@
           <a:lstStyle>
             <a:lvl1pPr marL="0" indent="0" algn="ctr">
               <a:buNone/>
+              <a:defRPr sz="3600"/>
+            </a:lvl1pPr>
+            <a:lvl2pPr marL="685800" indent="0" algn="ctr">
+              <a:buNone/>
+              <a:defRPr sz="3000"/>
+            </a:lvl2pPr>
+            <a:lvl3pPr marL="1371600" indent="0" algn="ctr">
+              <a:buNone/>
+              <a:defRPr sz="2700"/>
+            </a:lvl3pPr>
+            <a:lvl4pPr marL="2057400" indent="0" algn="ctr">
+              <a:buNone/>
               <a:defRPr sz="2400"/>
-            </a:lvl1pPr>
-            <a:lvl2pPr marL="457200" indent="0" algn="ctr">
-              <a:buNone/>
-              <a:defRPr sz="2000"/>
-            </a:lvl2pPr>
-            <a:lvl3pPr marL="914400" indent="0" algn="ctr">
-              <a:buNone/>
-              <a:defRPr sz="1800"/>
-            </a:lvl3pPr>
-            <a:lvl4pPr marL="1371600" indent="0" algn="ctr">
-              <a:buNone/>
-              <a:defRPr sz="1600"/>
             </a:lvl4pPr>
-            <a:lvl5pPr marL="1828800" indent="0" algn="ctr">
-              <a:buNone/>
-              <a:defRPr sz="1600"/>
+            <a:lvl5pPr marL="2743200" indent="0" algn="ctr">
+              <a:buNone/>
+              <a:defRPr sz="2400"/>
             </a:lvl5pPr>
-            <a:lvl6pPr marL="2286000" indent="0" algn="ctr">
-              <a:buNone/>
-              <a:defRPr sz="1600"/>
+            <a:lvl6pPr marL="3429000" indent="0" algn="ctr">
+              <a:buNone/>
+              <a:defRPr sz="2400"/>
             </a:lvl6pPr>
-            <a:lvl7pPr marL="2743200" indent="0" algn="ctr">
-              <a:buNone/>
-              <a:defRPr sz="1600"/>
+            <a:lvl7pPr marL="4114800" indent="0" algn="ctr">
+              <a:buNone/>
+              <a:defRPr sz="2400"/>
             </a:lvl7pPr>
-            <a:lvl8pPr marL="3200400" indent="0" algn="ctr">
-              <a:buNone/>
-              <a:defRPr sz="1600"/>
+            <a:lvl8pPr marL="4800600" indent="0" algn="ctr">
+              <a:buNone/>
+              <a:defRPr sz="2400"/>
             </a:lvl8pPr>
-            <a:lvl9pPr marL="3657600" indent="0" algn="ctr">
-              <a:buNone/>
-              <a:defRPr sz="1600"/>
+            <a:lvl9pPr marL="5486400" indent="0" algn="ctr">
+              <a:buNone/>
+              <a:defRPr sz="2400"/>
             </a:lvl9pPr>
           </a:lstStyle>
           <a:p>
@@ -233,18 +222,13 @@
               <a:rPr lang="en-US"/>
               <a:t>Click to edit Master subtitle style</a:t>
             </a:r>
-          </a:p>
-        </p:txBody>
-      </p:sp>
-      <p:sp>
-        <p:nvSpPr>
-          <p:cNvPr id="4" name="Date Placeholder 3">
-            <a:extLst>
-              <a:ext uri="{FF2B5EF4-FFF2-40B4-BE49-F238E27FC236}">
-                <a16:creationId xmlns:a16="http://schemas.microsoft.com/office/drawing/2014/main" id="{9F749228-DBB6-2435-B4ED-8853568F8251}"/>
-              </a:ext>
-            </a:extLst>
-          </p:cNvPr>
+            <a:endParaRPr lang="en-US" dirty="0"/>
+          </a:p>
+        </p:txBody>
+      </p:sp>
+      <p:sp>
+        <p:nvSpPr>
+          <p:cNvPr id="4" name="Date Placeholder 3"/>
           <p:cNvSpPr>
             <a:spLocks noGrp="1"/>
           </p:cNvSpPr>
@@ -259,7 +243,7 @@
           <a:p>
             <a:fld id="{85B3B054-712A-47A7-A562-EFC3154E7950}" type="datetimeFigureOut">
               <a:rPr lang="en-US" smtClean="0"/>
-              <a:t>2/8/2024</a:t>
+              <a:t>2/14/2024</a:t>
             </a:fld>
             <a:endParaRPr lang="en-US"/>
           </a:p>
@@ -267,13 +251,7 @@
       </p:sp>
       <p:sp>
         <p:nvSpPr>
-          <p:cNvPr id="5" name="Footer Placeholder 4">
-            <a:extLst>
-              <a:ext uri="{FF2B5EF4-FFF2-40B4-BE49-F238E27FC236}">
-                <a16:creationId xmlns:a16="http://schemas.microsoft.com/office/drawing/2014/main" id="{A67A7B4B-67F6-8A62-6A00-9840145727F6}"/>
-              </a:ext>
-            </a:extLst>
-          </p:cNvPr>
+          <p:cNvPr id="5" name="Footer Placeholder 4"/>
           <p:cNvSpPr>
             <a:spLocks noGrp="1"/>
           </p:cNvSpPr>
@@ -292,13 +270,7 @@
       </p:sp>
       <p:sp>
         <p:nvSpPr>
-          <p:cNvPr id="6" name="Slide Number Placeholder 5">
-            <a:extLst>
-              <a:ext uri="{FF2B5EF4-FFF2-40B4-BE49-F238E27FC236}">
-                <a16:creationId xmlns:a16="http://schemas.microsoft.com/office/drawing/2014/main" id="{A7EF6D11-CD52-1FCF-3E3C-18F796EC9C96}"/>
-              </a:ext>
-            </a:extLst>
-          </p:cNvPr>
+          <p:cNvPr id="6" name="Slide Number Placeholder 5"/>
           <p:cNvSpPr>
             <a:spLocks noGrp="1"/>
           </p:cNvSpPr>
@@ -322,7 +294,7 @@
     </p:spTree>
     <p:extLst>
       <p:ext uri="{BB962C8B-B14F-4D97-AF65-F5344CB8AC3E}">
-        <p14:creationId xmlns:p14="http://schemas.microsoft.com/office/powerpoint/2010/main" val="3971402711"/>
+        <p14:creationId xmlns:p14="http://schemas.microsoft.com/office/powerpoint/2010/main" val="2954178068"/>
       </p:ext>
     </p:extLst>
   </p:cSld>
@@ -351,13 +323,7 @@
       </p:grpSpPr>
       <p:sp>
         <p:nvSpPr>
-          <p:cNvPr id="2" name="Title 1">
-            <a:extLst>
-              <a:ext uri="{FF2B5EF4-FFF2-40B4-BE49-F238E27FC236}">
-                <a16:creationId xmlns:a16="http://schemas.microsoft.com/office/drawing/2014/main" id="{B1CFCF97-7EA3-CA74-58C1-39D9A1DA636C}"/>
-              </a:ext>
-            </a:extLst>
-          </p:cNvPr>
+          <p:cNvPr id="2" name="Title 1"/>
           <p:cNvSpPr>
             <a:spLocks noGrp="1"/>
           </p:cNvSpPr>
@@ -374,18 +340,13 @@
               <a:rPr lang="en-US"/>
               <a:t>Click to edit Master title style</a:t>
             </a:r>
-          </a:p>
-        </p:txBody>
-      </p:sp>
-      <p:sp>
-        <p:nvSpPr>
-          <p:cNvPr id="3" name="Vertical Text Placeholder 2">
-            <a:extLst>
-              <a:ext uri="{FF2B5EF4-FFF2-40B4-BE49-F238E27FC236}">
-                <a16:creationId xmlns:a16="http://schemas.microsoft.com/office/drawing/2014/main" id="{38AAF39A-A911-16CC-72BF-F917272FC5DD}"/>
-              </a:ext>
-            </a:extLst>
-          </p:cNvPr>
+            <a:endParaRPr lang="en-US" dirty="0"/>
+          </a:p>
+        </p:txBody>
+      </p:sp>
+      <p:sp>
+        <p:nvSpPr>
+          <p:cNvPr id="3" name="Vertical Text Placeholder 2"/>
           <p:cNvSpPr>
             <a:spLocks noGrp="1"/>
           </p:cNvSpPr>
@@ -431,18 +392,13 @@
               <a:rPr lang="en-US"/>
               <a:t>Fifth level</a:t>
             </a:r>
-          </a:p>
-        </p:txBody>
-      </p:sp>
-      <p:sp>
-        <p:nvSpPr>
-          <p:cNvPr id="4" name="Date Placeholder 3">
-            <a:extLst>
-              <a:ext uri="{FF2B5EF4-FFF2-40B4-BE49-F238E27FC236}">
-                <a16:creationId xmlns:a16="http://schemas.microsoft.com/office/drawing/2014/main" id="{D44ABC9A-BE43-A2C8-870C-764CD8E62699}"/>
-              </a:ext>
-            </a:extLst>
-          </p:cNvPr>
+            <a:endParaRPr lang="en-US" dirty="0"/>
+          </a:p>
+        </p:txBody>
+      </p:sp>
+      <p:sp>
+        <p:nvSpPr>
+          <p:cNvPr id="4" name="Date Placeholder 3"/>
           <p:cNvSpPr>
             <a:spLocks noGrp="1"/>
           </p:cNvSpPr>
@@ -457,7 +413,7 @@
           <a:p>
             <a:fld id="{85B3B054-712A-47A7-A562-EFC3154E7950}" type="datetimeFigureOut">
               <a:rPr lang="en-US" smtClean="0"/>
-              <a:t>2/8/2024</a:t>
+              <a:t>2/14/2024</a:t>
             </a:fld>
             <a:endParaRPr lang="en-US"/>
           </a:p>
@@ -465,13 +421,7 @@
       </p:sp>
       <p:sp>
         <p:nvSpPr>
-          <p:cNvPr id="5" name="Footer Placeholder 4">
-            <a:extLst>
-              <a:ext uri="{FF2B5EF4-FFF2-40B4-BE49-F238E27FC236}">
-                <a16:creationId xmlns:a16="http://schemas.microsoft.com/office/drawing/2014/main" id="{223B7BAE-1EB8-8FA4-6C04-4740CA1294DE}"/>
-              </a:ext>
-            </a:extLst>
-          </p:cNvPr>
+          <p:cNvPr id="5" name="Footer Placeholder 4"/>
           <p:cNvSpPr>
             <a:spLocks noGrp="1"/>
           </p:cNvSpPr>
@@ -490,13 +440,7 @@
       </p:sp>
       <p:sp>
         <p:nvSpPr>
-          <p:cNvPr id="6" name="Slide Number Placeholder 5">
-            <a:extLst>
-              <a:ext uri="{FF2B5EF4-FFF2-40B4-BE49-F238E27FC236}">
-                <a16:creationId xmlns:a16="http://schemas.microsoft.com/office/drawing/2014/main" id="{DE60E0AF-2D56-CC36-DE75-BB40F084BCF3}"/>
-              </a:ext>
-            </a:extLst>
-          </p:cNvPr>
+          <p:cNvPr id="6" name="Slide Number Placeholder 5"/>
           <p:cNvSpPr>
             <a:spLocks noGrp="1"/>
           </p:cNvSpPr>
@@ -520,7 +464,7 @@
     </p:spTree>
     <p:extLst>
       <p:ext uri="{BB962C8B-B14F-4D97-AF65-F5344CB8AC3E}">
-        <p14:creationId xmlns:p14="http://schemas.microsoft.com/office/powerpoint/2010/main" val="286491231"/>
+        <p14:creationId xmlns:p14="http://schemas.microsoft.com/office/powerpoint/2010/main" val="2205099546"/>
       </p:ext>
     </p:extLst>
   </p:cSld>
@@ -549,13 +493,7 @@
       </p:grpSpPr>
       <p:sp>
         <p:nvSpPr>
-          <p:cNvPr id="2" name="Vertical Title 1">
-            <a:extLst>
-              <a:ext uri="{FF2B5EF4-FFF2-40B4-BE49-F238E27FC236}">
-                <a16:creationId xmlns:a16="http://schemas.microsoft.com/office/drawing/2014/main" id="{2C18FCBC-4A21-777E-BDC0-FF03858A4CB2}"/>
-              </a:ext>
-            </a:extLst>
-          </p:cNvPr>
+          <p:cNvPr id="2" name="Vertical Title 1"/>
           <p:cNvSpPr>
             <a:spLocks noGrp="1"/>
           </p:cNvSpPr>
@@ -565,8 +503,8 @@
         </p:nvSpPr>
         <p:spPr>
           <a:xfrm>
-            <a:off x="8724900" y="365125"/>
-            <a:ext cx="2628900" cy="5811838"/>
+            <a:off x="9815513" y="730250"/>
+            <a:ext cx="2957513" cy="11623676"/>
           </a:xfrm>
         </p:spPr>
         <p:txBody>
@@ -577,18 +515,13 @@
               <a:rPr lang="en-US"/>
               <a:t>Click to edit Master title style</a:t>
             </a:r>
-          </a:p>
-        </p:txBody>
-      </p:sp>
-      <p:sp>
-        <p:nvSpPr>
-          <p:cNvPr id="3" name="Vertical Text Placeholder 2">
-            <a:extLst>
-              <a:ext uri="{FF2B5EF4-FFF2-40B4-BE49-F238E27FC236}">
-                <a16:creationId xmlns:a16="http://schemas.microsoft.com/office/drawing/2014/main" id="{44114007-EDA8-D457-F693-BD55079BA693}"/>
-              </a:ext>
-            </a:extLst>
-          </p:cNvPr>
+            <a:endParaRPr lang="en-US" dirty="0"/>
+          </a:p>
+        </p:txBody>
+      </p:sp>
+      <p:sp>
+        <p:nvSpPr>
+          <p:cNvPr id="3" name="Vertical Text Placeholder 2"/>
           <p:cNvSpPr>
             <a:spLocks noGrp="1"/>
           </p:cNvSpPr>
@@ -598,8 +531,8 @@
         </p:nvSpPr>
         <p:spPr>
           <a:xfrm>
-            <a:off x="838200" y="365125"/>
-            <a:ext cx="7734300" cy="5811838"/>
+            <a:off x="942976" y="730250"/>
+            <a:ext cx="8701088" cy="11623676"/>
           </a:xfrm>
         </p:spPr>
         <p:txBody>
@@ -639,18 +572,13 @@
               <a:rPr lang="en-US"/>
               <a:t>Fifth level</a:t>
             </a:r>
-          </a:p>
-        </p:txBody>
-      </p:sp>
-      <p:sp>
-        <p:nvSpPr>
-          <p:cNvPr id="4" name="Date Placeholder 3">
-            <a:extLst>
-              <a:ext uri="{FF2B5EF4-FFF2-40B4-BE49-F238E27FC236}">
-                <a16:creationId xmlns:a16="http://schemas.microsoft.com/office/drawing/2014/main" id="{F6563DE2-83B6-FD73-9061-04E8F67071B6}"/>
-              </a:ext>
-            </a:extLst>
-          </p:cNvPr>
+            <a:endParaRPr lang="en-US" dirty="0"/>
+          </a:p>
+        </p:txBody>
+      </p:sp>
+      <p:sp>
+        <p:nvSpPr>
+          <p:cNvPr id="4" name="Date Placeholder 3"/>
           <p:cNvSpPr>
             <a:spLocks noGrp="1"/>
           </p:cNvSpPr>
@@ -665,7 +593,7 @@
           <a:p>
             <a:fld id="{85B3B054-712A-47A7-A562-EFC3154E7950}" type="datetimeFigureOut">
               <a:rPr lang="en-US" smtClean="0"/>
-              <a:t>2/8/2024</a:t>
+              <a:t>2/14/2024</a:t>
             </a:fld>
             <a:endParaRPr lang="en-US"/>
           </a:p>
@@ -673,13 +601,7 @@
       </p:sp>
       <p:sp>
         <p:nvSpPr>
-          <p:cNvPr id="5" name="Footer Placeholder 4">
-            <a:extLst>
-              <a:ext uri="{FF2B5EF4-FFF2-40B4-BE49-F238E27FC236}">
-                <a16:creationId xmlns:a16="http://schemas.microsoft.com/office/drawing/2014/main" id="{AC2FE802-F27F-AD4C-7693-B6776F040A61}"/>
-              </a:ext>
-            </a:extLst>
-          </p:cNvPr>
+          <p:cNvPr id="5" name="Footer Placeholder 4"/>
           <p:cNvSpPr>
             <a:spLocks noGrp="1"/>
           </p:cNvSpPr>
@@ -698,13 +620,7 @@
       </p:sp>
       <p:sp>
         <p:nvSpPr>
-          <p:cNvPr id="6" name="Slide Number Placeholder 5">
-            <a:extLst>
-              <a:ext uri="{FF2B5EF4-FFF2-40B4-BE49-F238E27FC236}">
-                <a16:creationId xmlns:a16="http://schemas.microsoft.com/office/drawing/2014/main" id="{646C7EFC-8307-9A7F-E232-448022CB2DC8}"/>
-              </a:ext>
-            </a:extLst>
-          </p:cNvPr>
+          <p:cNvPr id="6" name="Slide Number Placeholder 5"/>
           <p:cNvSpPr>
             <a:spLocks noGrp="1"/>
           </p:cNvSpPr>
@@ -728,7 +644,7 @@
     </p:spTree>
     <p:extLst>
       <p:ext uri="{BB962C8B-B14F-4D97-AF65-F5344CB8AC3E}">
-        <p14:creationId xmlns:p14="http://schemas.microsoft.com/office/powerpoint/2010/main" val="2755253224"/>
+        <p14:creationId xmlns:p14="http://schemas.microsoft.com/office/powerpoint/2010/main" val="2134154778"/>
       </p:ext>
     </p:extLst>
   </p:cSld>
@@ -757,13 +673,7 @@
       </p:grpSpPr>
       <p:sp>
         <p:nvSpPr>
-          <p:cNvPr id="2" name="Title 1">
-            <a:extLst>
-              <a:ext uri="{FF2B5EF4-FFF2-40B4-BE49-F238E27FC236}">
-                <a16:creationId xmlns:a16="http://schemas.microsoft.com/office/drawing/2014/main" id="{3FCF43CD-397E-32AA-86C0-3389454F6070}"/>
-              </a:ext>
-            </a:extLst>
-          </p:cNvPr>
+          <p:cNvPr id="2" name="Title 1"/>
           <p:cNvSpPr>
             <a:spLocks noGrp="1"/>
           </p:cNvSpPr>
@@ -780,18 +690,13 @@
               <a:rPr lang="en-US"/>
               <a:t>Click to edit Master title style</a:t>
             </a:r>
-          </a:p>
-        </p:txBody>
-      </p:sp>
-      <p:sp>
-        <p:nvSpPr>
-          <p:cNvPr id="3" name="Content Placeholder 2">
-            <a:extLst>
-              <a:ext uri="{FF2B5EF4-FFF2-40B4-BE49-F238E27FC236}">
-                <a16:creationId xmlns:a16="http://schemas.microsoft.com/office/drawing/2014/main" id="{ED9F21ED-8B47-EAE7-C42C-88BF4DDFED63}"/>
-              </a:ext>
-            </a:extLst>
-          </p:cNvPr>
+            <a:endParaRPr lang="en-US" dirty="0"/>
+          </a:p>
+        </p:txBody>
+      </p:sp>
+      <p:sp>
+        <p:nvSpPr>
+          <p:cNvPr id="3" name="Content Placeholder 2"/>
           <p:cNvSpPr>
             <a:spLocks noGrp="1"/>
           </p:cNvSpPr>
@@ -837,18 +742,13 @@
               <a:rPr lang="en-US"/>
               <a:t>Fifth level</a:t>
             </a:r>
-          </a:p>
-        </p:txBody>
-      </p:sp>
-      <p:sp>
-        <p:nvSpPr>
-          <p:cNvPr id="4" name="Date Placeholder 3">
-            <a:extLst>
-              <a:ext uri="{FF2B5EF4-FFF2-40B4-BE49-F238E27FC236}">
-                <a16:creationId xmlns:a16="http://schemas.microsoft.com/office/drawing/2014/main" id="{AC5BAF89-78EB-D6A1-B154-C6452B6D1F86}"/>
-              </a:ext>
-            </a:extLst>
-          </p:cNvPr>
+            <a:endParaRPr lang="en-US" dirty="0"/>
+          </a:p>
+        </p:txBody>
+      </p:sp>
+      <p:sp>
+        <p:nvSpPr>
+          <p:cNvPr id="4" name="Date Placeholder 3"/>
           <p:cNvSpPr>
             <a:spLocks noGrp="1"/>
           </p:cNvSpPr>
@@ -863,7 +763,7 @@
           <a:p>
             <a:fld id="{85B3B054-712A-47A7-A562-EFC3154E7950}" type="datetimeFigureOut">
               <a:rPr lang="en-US" smtClean="0"/>
-              <a:t>2/8/2024</a:t>
+              <a:t>2/14/2024</a:t>
             </a:fld>
             <a:endParaRPr lang="en-US"/>
           </a:p>
@@ -871,13 +771,7 @@
       </p:sp>
       <p:sp>
         <p:nvSpPr>
-          <p:cNvPr id="5" name="Footer Placeholder 4">
-            <a:extLst>
-              <a:ext uri="{FF2B5EF4-FFF2-40B4-BE49-F238E27FC236}">
-                <a16:creationId xmlns:a16="http://schemas.microsoft.com/office/drawing/2014/main" id="{0E23694A-7204-88C1-CED1-74ECD3BCC767}"/>
-              </a:ext>
-            </a:extLst>
-          </p:cNvPr>
+          <p:cNvPr id="5" name="Footer Placeholder 4"/>
           <p:cNvSpPr>
             <a:spLocks noGrp="1"/>
           </p:cNvSpPr>
@@ -896,13 +790,7 @@
       </p:sp>
       <p:sp>
         <p:nvSpPr>
-          <p:cNvPr id="6" name="Slide Number Placeholder 5">
-            <a:extLst>
-              <a:ext uri="{FF2B5EF4-FFF2-40B4-BE49-F238E27FC236}">
-                <a16:creationId xmlns:a16="http://schemas.microsoft.com/office/drawing/2014/main" id="{C7D1BD3A-68DC-FC7C-EC03-90FDCBD89058}"/>
-              </a:ext>
-            </a:extLst>
-          </p:cNvPr>
+          <p:cNvPr id="6" name="Slide Number Placeholder 5"/>
           <p:cNvSpPr>
             <a:spLocks noGrp="1"/>
           </p:cNvSpPr>
@@ -926,7 +814,7 @@
     </p:spTree>
     <p:extLst>
       <p:ext uri="{BB962C8B-B14F-4D97-AF65-F5344CB8AC3E}">
-        <p14:creationId xmlns:p14="http://schemas.microsoft.com/office/powerpoint/2010/main" val="2403947623"/>
+        <p14:creationId xmlns:p14="http://schemas.microsoft.com/office/powerpoint/2010/main" val="1952935871"/>
       </p:ext>
     </p:extLst>
   </p:cSld>
@@ -955,13 +843,7 @@
       </p:grpSpPr>
       <p:sp>
         <p:nvSpPr>
-          <p:cNvPr id="2" name="Title 1">
-            <a:extLst>
-              <a:ext uri="{FF2B5EF4-FFF2-40B4-BE49-F238E27FC236}">
-                <a16:creationId xmlns:a16="http://schemas.microsoft.com/office/drawing/2014/main" id="{0179C93B-F4DD-F0A3-DD5C-6672E8DEBD3A}"/>
-              </a:ext>
-            </a:extLst>
-          </p:cNvPr>
+          <p:cNvPr id="2" name="Title 1"/>
           <p:cNvSpPr>
             <a:spLocks noGrp="1"/>
           </p:cNvSpPr>
@@ -971,15 +853,15 @@
         </p:nvSpPr>
         <p:spPr>
           <a:xfrm>
-            <a:off x="831850" y="1709738"/>
-            <a:ext cx="10515600" cy="2852737"/>
+            <a:off x="935832" y="3419479"/>
+            <a:ext cx="11830050" cy="5705474"/>
           </a:xfrm>
         </p:spPr>
         <p:txBody>
           <a:bodyPr anchor="b"/>
           <a:lstStyle>
             <a:lvl1pPr>
-              <a:defRPr sz="6000"/>
+              <a:defRPr sz="9000"/>
             </a:lvl1pPr>
           </a:lstStyle>
           <a:p>
@@ -987,18 +869,13 @@
               <a:rPr lang="en-US"/>
               <a:t>Click to edit Master title style</a:t>
             </a:r>
-          </a:p>
-        </p:txBody>
-      </p:sp>
-      <p:sp>
-        <p:nvSpPr>
-          <p:cNvPr id="3" name="Text Placeholder 2">
-            <a:extLst>
-              <a:ext uri="{FF2B5EF4-FFF2-40B4-BE49-F238E27FC236}">
-                <a16:creationId xmlns:a16="http://schemas.microsoft.com/office/drawing/2014/main" id="{155F52DB-F4F8-CA70-D1BC-E5953495CEBF}"/>
-              </a:ext>
-            </a:extLst>
-          </p:cNvPr>
+            <a:endParaRPr lang="en-US" dirty="0"/>
+          </a:p>
+        </p:txBody>
+      </p:sp>
+      <p:sp>
+        <p:nvSpPr>
+          <p:cNvPr id="3" name="Text Placeholder 2"/>
           <p:cNvSpPr>
             <a:spLocks noGrp="1"/>
           </p:cNvSpPr>
@@ -1008,14 +885,42 @@
         </p:nvSpPr>
         <p:spPr>
           <a:xfrm>
-            <a:off x="831850" y="4589463"/>
-            <a:ext cx="10515600" cy="1500187"/>
+            <a:off x="935832" y="9178929"/>
+            <a:ext cx="11830050" cy="3000374"/>
           </a:xfrm>
         </p:spPr>
         <p:txBody>
           <a:bodyPr/>
           <a:lstStyle>
             <a:lvl1pPr marL="0" indent="0">
+              <a:buNone/>
+              <a:defRPr sz="3600">
+                <a:solidFill>
+                  <a:schemeClr val="tx1"/>
+                </a:solidFill>
+              </a:defRPr>
+            </a:lvl1pPr>
+            <a:lvl2pPr marL="685800" indent="0">
+              <a:buNone/>
+              <a:defRPr sz="3000">
+                <a:solidFill>
+                  <a:schemeClr val="tx1">
+                    <a:tint val="75000"/>
+                  </a:schemeClr>
+                </a:solidFill>
+              </a:defRPr>
+            </a:lvl2pPr>
+            <a:lvl3pPr marL="1371600" indent="0">
+              <a:buNone/>
+              <a:defRPr sz="2700">
+                <a:solidFill>
+                  <a:schemeClr val="tx1">
+                    <a:tint val="75000"/>
+                  </a:schemeClr>
+                </a:solidFill>
+              </a:defRPr>
+            </a:lvl3pPr>
+            <a:lvl4pPr marL="2057400" indent="0">
               <a:buNone/>
               <a:defRPr sz="2400">
                 <a:solidFill>
@@ -1024,40 +929,10 @@
                   </a:schemeClr>
                 </a:solidFill>
               </a:defRPr>
-            </a:lvl1pPr>
-            <a:lvl2pPr marL="457200" indent="0">
-              <a:buNone/>
-              <a:defRPr sz="2000">
-                <a:solidFill>
-                  <a:schemeClr val="tx1">
-                    <a:tint val="75000"/>
-                  </a:schemeClr>
-                </a:solidFill>
-              </a:defRPr>
-            </a:lvl2pPr>
-            <a:lvl3pPr marL="914400" indent="0">
-              <a:buNone/>
-              <a:defRPr sz="1800">
-                <a:solidFill>
-                  <a:schemeClr val="tx1">
-                    <a:tint val="75000"/>
-                  </a:schemeClr>
-                </a:solidFill>
-              </a:defRPr>
-            </a:lvl3pPr>
-            <a:lvl4pPr marL="1371600" indent="0">
-              <a:buNone/>
-              <a:defRPr sz="1600">
-                <a:solidFill>
-                  <a:schemeClr val="tx1">
-                    <a:tint val="75000"/>
-                  </a:schemeClr>
-                </a:solidFill>
-              </a:defRPr>
             </a:lvl4pPr>
-            <a:lvl5pPr marL="1828800" indent="0">
-              <a:buNone/>
-              <a:defRPr sz="1600">
+            <a:lvl5pPr marL="2743200" indent="0">
+              <a:buNone/>
+              <a:defRPr sz="2400">
                 <a:solidFill>
                   <a:schemeClr val="tx1">
                     <a:tint val="75000"/>
@@ -1065,9 +940,9 @@
                 </a:solidFill>
               </a:defRPr>
             </a:lvl5pPr>
-            <a:lvl6pPr marL="2286000" indent="0">
-              <a:buNone/>
-              <a:defRPr sz="1600">
+            <a:lvl6pPr marL="3429000" indent="0">
+              <a:buNone/>
+              <a:defRPr sz="2400">
                 <a:solidFill>
                   <a:schemeClr val="tx1">
                     <a:tint val="75000"/>
@@ -1075,9 +950,9 @@
                 </a:solidFill>
               </a:defRPr>
             </a:lvl6pPr>
-            <a:lvl7pPr marL="2743200" indent="0">
-              <a:buNone/>
-              <a:defRPr sz="1600">
+            <a:lvl7pPr marL="4114800" indent="0">
+              <a:buNone/>
+              <a:defRPr sz="2400">
                 <a:solidFill>
                   <a:schemeClr val="tx1">
                     <a:tint val="75000"/>
@@ -1085,9 +960,9 @@
                 </a:solidFill>
               </a:defRPr>
             </a:lvl7pPr>
-            <a:lvl8pPr marL="3200400" indent="0">
-              <a:buNone/>
-              <a:defRPr sz="1600">
+            <a:lvl8pPr marL="4800600" indent="0">
+              <a:buNone/>
+              <a:defRPr sz="2400">
                 <a:solidFill>
                   <a:schemeClr val="tx1">
                     <a:tint val="75000"/>
@@ -1095,9 +970,9 @@
                 </a:solidFill>
               </a:defRPr>
             </a:lvl8pPr>
-            <a:lvl9pPr marL="3657600" indent="0">
-              <a:buNone/>
-              <a:defRPr sz="1600">
+            <a:lvl9pPr marL="5486400" indent="0">
+              <a:buNone/>
+              <a:defRPr sz="2400">
                 <a:solidFill>
                   <a:schemeClr val="tx1">
                     <a:tint val="75000"/>
@@ -1117,13 +992,7 @@
       </p:sp>
       <p:sp>
         <p:nvSpPr>
-          <p:cNvPr id="4" name="Date Placeholder 3">
-            <a:extLst>
-              <a:ext uri="{FF2B5EF4-FFF2-40B4-BE49-F238E27FC236}">
-                <a16:creationId xmlns:a16="http://schemas.microsoft.com/office/drawing/2014/main" id="{5B619D79-81C9-AE4D-24FD-595E2A3814EB}"/>
-              </a:ext>
-            </a:extLst>
-          </p:cNvPr>
+          <p:cNvPr id="4" name="Date Placeholder 3"/>
           <p:cNvSpPr>
             <a:spLocks noGrp="1"/>
           </p:cNvSpPr>
@@ -1138,7 +1007,7 @@
           <a:p>
             <a:fld id="{85B3B054-712A-47A7-A562-EFC3154E7950}" type="datetimeFigureOut">
               <a:rPr lang="en-US" smtClean="0"/>
-              <a:t>2/8/2024</a:t>
+              <a:t>2/14/2024</a:t>
             </a:fld>
             <a:endParaRPr lang="en-US"/>
           </a:p>
@@ -1146,13 +1015,7 @@
       </p:sp>
       <p:sp>
         <p:nvSpPr>
-          <p:cNvPr id="5" name="Footer Placeholder 4">
-            <a:extLst>
-              <a:ext uri="{FF2B5EF4-FFF2-40B4-BE49-F238E27FC236}">
-                <a16:creationId xmlns:a16="http://schemas.microsoft.com/office/drawing/2014/main" id="{50C486AC-53FE-46B6-30A0-93DB66DD7F0F}"/>
-              </a:ext>
-            </a:extLst>
-          </p:cNvPr>
+          <p:cNvPr id="5" name="Footer Placeholder 4"/>
           <p:cNvSpPr>
             <a:spLocks noGrp="1"/>
           </p:cNvSpPr>
@@ -1171,13 +1034,7 @@
       </p:sp>
       <p:sp>
         <p:nvSpPr>
-          <p:cNvPr id="6" name="Slide Number Placeholder 5">
-            <a:extLst>
-              <a:ext uri="{FF2B5EF4-FFF2-40B4-BE49-F238E27FC236}">
-                <a16:creationId xmlns:a16="http://schemas.microsoft.com/office/drawing/2014/main" id="{328FA019-6620-4A4C-C6D1-227E69369F45}"/>
-              </a:ext>
-            </a:extLst>
-          </p:cNvPr>
+          <p:cNvPr id="6" name="Slide Number Placeholder 5"/>
           <p:cNvSpPr>
             <a:spLocks noGrp="1"/>
           </p:cNvSpPr>
@@ -1201,7 +1058,7 @@
     </p:spTree>
     <p:extLst>
       <p:ext uri="{BB962C8B-B14F-4D97-AF65-F5344CB8AC3E}">
-        <p14:creationId xmlns:p14="http://schemas.microsoft.com/office/powerpoint/2010/main" val="3595419804"/>
+        <p14:creationId xmlns:p14="http://schemas.microsoft.com/office/powerpoint/2010/main" val="552679001"/>
       </p:ext>
     </p:extLst>
   </p:cSld>
@@ -1230,13 +1087,7 @@
       </p:grpSpPr>
       <p:sp>
         <p:nvSpPr>
-          <p:cNvPr id="2" name="Title 1">
-            <a:extLst>
-              <a:ext uri="{FF2B5EF4-FFF2-40B4-BE49-F238E27FC236}">
-                <a16:creationId xmlns:a16="http://schemas.microsoft.com/office/drawing/2014/main" id="{8A14FB8A-CB9B-6DCC-88C4-B1B8FE5FA22D}"/>
-              </a:ext>
-            </a:extLst>
-          </p:cNvPr>
+          <p:cNvPr id="2" name="Title 1"/>
           <p:cNvSpPr>
             <a:spLocks noGrp="1"/>
           </p:cNvSpPr>
@@ -1253,18 +1104,13 @@
               <a:rPr lang="en-US"/>
               <a:t>Click to edit Master title style</a:t>
             </a:r>
-          </a:p>
-        </p:txBody>
-      </p:sp>
-      <p:sp>
-        <p:nvSpPr>
-          <p:cNvPr id="3" name="Content Placeholder 2">
-            <a:extLst>
-              <a:ext uri="{FF2B5EF4-FFF2-40B4-BE49-F238E27FC236}">
-                <a16:creationId xmlns:a16="http://schemas.microsoft.com/office/drawing/2014/main" id="{B9C85B50-7C71-04C4-4D0F-892B88038ADD}"/>
-              </a:ext>
-            </a:extLst>
-          </p:cNvPr>
+            <a:endParaRPr lang="en-US" dirty="0"/>
+          </a:p>
+        </p:txBody>
+      </p:sp>
+      <p:sp>
+        <p:nvSpPr>
+          <p:cNvPr id="3" name="Content Placeholder 2"/>
           <p:cNvSpPr>
             <a:spLocks noGrp="1"/>
           </p:cNvSpPr>
@@ -1274,8 +1120,8 @@
         </p:nvSpPr>
         <p:spPr>
           <a:xfrm>
-            <a:off x="838200" y="1825625"/>
-            <a:ext cx="5181600" cy="4351338"/>
+            <a:off x="942975" y="3651250"/>
+            <a:ext cx="5829300" cy="8702676"/>
           </a:xfrm>
         </p:spPr>
         <p:txBody>
@@ -1315,18 +1161,13 @@
               <a:rPr lang="en-US"/>
               <a:t>Fifth level</a:t>
             </a:r>
-          </a:p>
-        </p:txBody>
-      </p:sp>
-      <p:sp>
-        <p:nvSpPr>
-          <p:cNvPr id="4" name="Content Placeholder 3">
-            <a:extLst>
-              <a:ext uri="{FF2B5EF4-FFF2-40B4-BE49-F238E27FC236}">
-                <a16:creationId xmlns:a16="http://schemas.microsoft.com/office/drawing/2014/main" id="{6B1BB1ED-8035-091F-5F1B-55412ED9156F}"/>
-              </a:ext>
-            </a:extLst>
-          </p:cNvPr>
+            <a:endParaRPr lang="en-US" dirty="0"/>
+          </a:p>
+        </p:txBody>
+      </p:sp>
+      <p:sp>
+        <p:nvSpPr>
+          <p:cNvPr id="4" name="Content Placeholder 3"/>
           <p:cNvSpPr>
             <a:spLocks noGrp="1"/>
           </p:cNvSpPr>
@@ -1336,8 +1177,8 @@
         </p:nvSpPr>
         <p:spPr>
           <a:xfrm>
-            <a:off x="6172200" y="1825625"/>
-            <a:ext cx="5181600" cy="4351338"/>
+            <a:off x="6943725" y="3651250"/>
+            <a:ext cx="5829300" cy="8702676"/>
           </a:xfrm>
         </p:spPr>
         <p:txBody>
@@ -1377,18 +1218,13 @@
               <a:rPr lang="en-US"/>
               <a:t>Fifth level</a:t>
             </a:r>
-          </a:p>
-        </p:txBody>
-      </p:sp>
-      <p:sp>
-        <p:nvSpPr>
-          <p:cNvPr id="5" name="Date Placeholder 4">
-            <a:extLst>
-              <a:ext uri="{FF2B5EF4-FFF2-40B4-BE49-F238E27FC236}">
-                <a16:creationId xmlns:a16="http://schemas.microsoft.com/office/drawing/2014/main" id="{7D1E1273-8468-0316-349D-C61B5E644F5C}"/>
-              </a:ext>
-            </a:extLst>
-          </p:cNvPr>
+            <a:endParaRPr lang="en-US" dirty="0"/>
+          </a:p>
+        </p:txBody>
+      </p:sp>
+      <p:sp>
+        <p:nvSpPr>
+          <p:cNvPr id="5" name="Date Placeholder 4"/>
           <p:cNvSpPr>
             <a:spLocks noGrp="1"/>
           </p:cNvSpPr>
@@ -1403,7 +1239,7 @@
           <a:p>
             <a:fld id="{85B3B054-712A-47A7-A562-EFC3154E7950}" type="datetimeFigureOut">
               <a:rPr lang="en-US" smtClean="0"/>
-              <a:t>2/8/2024</a:t>
+              <a:t>2/14/2024</a:t>
             </a:fld>
             <a:endParaRPr lang="en-US"/>
           </a:p>
@@ -1411,13 +1247,7 @@
       </p:sp>
       <p:sp>
         <p:nvSpPr>
-          <p:cNvPr id="6" name="Footer Placeholder 5">
-            <a:extLst>
-              <a:ext uri="{FF2B5EF4-FFF2-40B4-BE49-F238E27FC236}">
-                <a16:creationId xmlns:a16="http://schemas.microsoft.com/office/drawing/2014/main" id="{B80B4A45-F40A-4C19-05C9-BFD16EC31997}"/>
-              </a:ext>
-            </a:extLst>
-          </p:cNvPr>
+          <p:cNvPr id="6" name="Footer Placeholder 5"/>
           <p:cNvSpPr>
             <a:spLocks noGrp="1"/>
           </p:cNvSpPr>
@@ -1436,13 +1266,7 @@
       </p:sp>
       <p:sp>
         <p:nvSpPr>
-          <p:cNvPr id="7" name="Slide Number Placeholder 6">
-            <a:extLst>
-              <a:ext uri="{FF2B5EF4-FFF2-40B4-BE49-F238E27FC236}">
-                <a16:creationId xmlns:a16="http://schemas.microsoft.com/office/drawing/2014/main" id="{5B72B814-7D95-8B4D-81D5-57730B155217}"/>
-              </a:ext>
-            </a:extLst>
-          </p:cNvPr>
+          <p:cNvPr id="7" name="Slide Number Placeholder 6"/>
           <p:cNvSpPr>
             <a:spLocks noGrp="1"/>
           </p:cNvSpPr>
@@ -1466,7 +1290,7 @@
     </p:spTree>
     <p:extLst>
       <p:ext uri="{BB962C8B-B14F-4D97-AF65-F5344CB8AC3E}">
-        <p14:creationId xmlns:p14="http://schemas.microsoft.com/office/powerpoint/2010/main" val="2279016797"/>
+        <p14:creationId xmlns:p14="http://schemas.microsoft.com/office/powerpoint/2010/main" val="944416142"/>
       </p:ext>
     </p:extLst>
   </p:cSld>
@@ -1495,13 +1319,7 @@
       </p:grpSpPr>
       <p:sp>
         <p:nvSpPr>
-          <p:cNvPr id="2" name="Title 1">
-            <a:extLst>
-              <a:ext uri="{FF2B5EF4-FFF2-40B4-BE49-F238E27FC236}">
-                <a16:creationId xmlns:a16="http://schemas.microsoft.com/office/drawing/2014/main" id="{AB4DAEA0-50DE-1601-B8E6-8120B9D8F9F0}"/>
-              </a:ext>
-            </a:extLst>
-          </p:cNvPr>
+          <p:cNvPr id="2" name="Title 1"/>
           <p:cNvSpPr>
             <a:spLocks noGrp="1"/>
           </p:cNvSpPr>
@@ -1511,8 +1329,8 @@
         </p:nvSpPr>
         <p:spPr>
           <a:xfrm>
-            <a:off x="839788" y="365125"/>
-            <a:ext cx="10515600" cy="1325563"/>
+            <a:off x="944762" y="730253"/>
+            <a:ext cx="11830050" cy="2651126"/>
           </a:xfrm>
         </p:spPr>
         <p:txBody>
@@ -1523,18 +1341,13 @@
               <a:rPr lang="en-US"/>
               <a:t>Click to edit Master title style</a:t>
             </a:r>
-          </a:p>
-        </p:txBody>
-      </p:sp>
-      <p:sp>
-        <p:nvSpPr>
-          <p:cNvPr id="3" name="Text Placeholder 2">
-            <a:extLst>
-              <a:ext uri="{FF2B5EF4-FFF2-40B4-BE49-F238E27FC236}">
-                <a16:creationId xmlns:a16="http://schemas.microsoft.com/office/drawing/2014/main" id="{AFA25334-764E-1DFB-8F4E-CD0993811A78}"/>
-              </a:ext>
-            </a:extLst>
-          </p:cNvPr>
+            <a:endParaRPr lang="en-US" dirty="0"/>
+          </a:p>
+        </p:txBody>
+      </p:sp>
+      <p:sp>
+        <p:nvSpPr>
+          <p:cNvPr id="3" name="Text Placeholder 2"/>
           <p:cNvSpPr>
             <a:spLocks noGrp="1"/>
           </p:cNvSpPr>
@@ -1544,8 +1357,8 @@
         </p:nvSpPr>
         <p:spPr>
           <a:xfrm>
-            <a:off x="839788" y="1681163"/>
-            <a:ext cx="5157787" cy="823912"/>
+            <a:off x="944763" y="3362326"/>
+            <a:ext cx="5802510" cy="1647824"/>
           </a:xfrm>
         </p:spPr>
         <p:txBody>
@@ -1553,39 +1366,39 @@
           <a:lstStyle>
             <a:lvl1pPr marL="0" indent="0">
               <a:buNone/>
+              <a:defRPr sz="3600" b="1"/>
+            </a:lvl1pPr>
+            <a:lvl2pPr marL="685800" indent="0">
+              <a:buNone/>
+              <a:defRPr sz="3000" b="1"/>
+            </a:lvl2pPr>
+            <a:lvl3pPr marL="1371600" indent="0">
+              <a:buNone/>
+              <a:defRPr sz="2700" b="1"/>
+            </a:lvl3pPr>
+            <a:lvl4pPr marL="2057400" indent="0">
+              <a:buNone/>
               <a:defRPr sz="2400" b="1"/>
-            </a:lvl1pPr>
-            <a:lvl2pPr marL="457200" indent="0">
-              <a:buNone/>
-              <a:defRPr sz="2000" b="1"/>
-            </a:lvl2pPr>
-            <a:lvl3pPr marL="914400" indent="0">
-              <a:buNone/>
-              <a:defRPr sz="1800" b="1"/>
-            </a:lvl3pPr>
-            <a:lvl4pPr marL="1371600" indent="0">
-              <a:buNone/>
-              <a:defRPr sz="1600" b="1"/>
             </a:lvl4pPr>
-            <a:lvl5pPr marL="1828800" indent="0">
-              <a:buNone/>
-              <a:defRPr sz="1600" b="1"/>
+            <a:lvl5pPr marL="2743200" indent="0">
+              <a:buNone/>
+              <a:defRPr sz="2400" b="1"/>
             </a:lvl5pPr>
-            <a:lvl6pPr marL="2286000" indent="0">
-              <a:buNone/>
-              <a:defRPr sz="1600" b="1"/>
+            <a:lvl6pPr marL="3429000" indent="0">
+              <a:buNone/>
+              <a:defRPr sz="2400" b="1"/>
             </a:lvl6pPr>
-            <a:lvl7pPr marL="2743200" indent="0">
-              <a:buNone/>
-              <a:defRPr sz="1600" b="1"/>
+            <a:lvl7pPr marL="4114800" indent="0">
+              <a:buNone/>
+              <a:defRPr sz="2400" b="1"/>
             </a:lvl7pPr>
-            <a:lvl8pPr marL="3200400" indent="0">
-              <a:buNone/>
-              <a:defRPr sz="1600" b="1"/>
+            <a:lvl8pPr marL="4800600" indent="0">
+              <a:buNone/>
+              <a:defRPr sz="2400" b="1"/>
             </a:lvl8pPr>
-            <a:lvl9pPr marL="3657600" indent="0">
-              <a:buNone/>
-              <a:defRPr sz="1600" b="1"/>
+            <a:lvl9pPr marL="5486400" indent="0">
+              <a:buNone/>
+              <a:defRPr sz="2400" b="1"/>
             </a:lvl9pPr>
           </a:lstStyle>
           <a:p>
@@ -1599,13 +1412,7 @@
       </p:sp>
       <p:sp>
         <p:nvSpPr>
-          <p:cNvPr id="4" name="Content Placeholder 3">
-            <a:extLst>
-              <a:ext uri="{FF2B5EF4-FFF2-40B4-BE49-F238E27FC236}">
-                <a16:creationId xmlns:a16="http://schemas.microsoft.com/office/drawing/2014/main" id="{00683DE2-0283-1CFB-61EA-AB0B70D5F408}"/>
-              </a:ext>
-            </a:extLst>
-          </p:cNvPr>
+          <p:cNvPr id="4" name="Content Placeholder 3"/>
           <p:cNvSpPr>
             <a:spLocks noGrp="1"/>
           </p:cNvSpPr>
@@ -1615,8 +1422,8 @@
         </p:nvSpPr>
         <p:spPr>
           <a:xfrm>
-            <a:off x="839788" y="2505075"/>
-            <a:ext cx="5157787" cy="3684588"/>
+            <a:off x="944763" y="5010150"/>
+            <a:ext cx="5802510" cy="7369176"/>
           </a:xfrm>
         </p:spPr>
         <p:txBody>
@@ -1656,18 +1463,13 @@
               <a:rPr lang="en-US"/>
               <a:t>Fifth level</a:t>
             </a:r>
-          </a:p>
-        </p:txBody>
-      </p:sp>
-      <p:sp>
-        <p:nvSpPr>
-          <p:cNvPr id="5" name="Text Placeholder 4">
-            <a:extLst>
-              <a:ext uri="{FF2B5EF4-FFF2-40B4-BE49-F238E27FC236}">
-                <a16:creationId xmlns:a16="http://schemas.microsoft.com/office/drawing/2014/main" id="{4E457E06-E24E-4D47-EFC3-7D1761F9AAED}"/>
-              </a:ext>
-            </a:extLst>
-          </p:cNvPr>
+            <a:endParaRPr lang="en-US" dirty="0"/>
+          </a:p>
+        </p:txBody>
+      </p:sp>
+      <p:sp>
+        <p:nvSpPr>
+          <p:cNvPr id="5" name="Text Placeholder 4"/>
           <p:cNvSpPr>
             <a:spLocks noGrp="1"/>
           </p:cNvSpPr>
@@ -1677,8 +1479,8 @@
         </p:nvSpPr>
         <p:spPr>
           <a:xfrm>
-            <a:off x="6172200" y="1681163"/>
-            <a:ext cx="5183188" cy="823912"/>
+            <a:off x="6943726" y="3362326"/>
+            <a:ext cx="5831087" cy="1647824"/>
           </a:xfrm>
         </p:spPr>
         <p:txBody>
@@ -1686,39 +1488,39 @@
           <a:lstStyle>
             <a:lvl1pPr marL="0" indent="0">
               <a:buNone/>
+              <a:defRPr sz="3600" b="1"/>
+            </a:lvl1pPr>
+            <a:lvl2pPr marL="685800" indent="0">
+              <a:buNone/>
+              <a:defRPr sz="3000" b="1"/>
+            </a:lvl2pPr>
+            <a:lvl3pPr marL="1371600" indent="0">
+              <a:buNone/>
+              <a:defRPr sz="2700" b="1"/>
+            </a:lvl3pPr>
+            <a:lvl4pPr marL="2057400" indent="0">
+              <a:buNone/>
               <a:defRPr sz="2400" b="1"/>
-            </a:lvl1pPr>
-            <a:lvl2pPr marL="457200" indent="0">
-              <a:buNone/>
-              <a:defRPr sz="2000" b="1"/>
-            </a:lvl2pPr>
-            <a:lvl3pPr marL="914400" indent="0">
-              <a:buNone/>
-              <a:defRPr sz="1800" b="1"/>
-            </a:lvl3pPr>
-            <a:lvl4pPr marL="1371600" indent="0">
-              <a:buNone/>
-              <a:defRPr sz="1600" b="1"/>
             </a:lvl4pPr>
-            <a:lvl5pPr marL="1828800" indent="0">
-              <a:buNone/>
-              <a:defRPr sz="1600" b="1"/>
+            <a:lvl5pPr marL="2743200" indent="0">
+              <a:buNone/>
+              <a:defRPr sz="2400" b="1"/>
             </a:lvl5pPr>
-            <a:lvl6pPr marL="2286000" indent="0">
-              <a:buNone/>
-              <a:defRPr sz="1600" b="1"/>
+            <a:lvl6pPr marL="3429000" indent="0">
+              <a:buNone/>
+              <a:defRPr sz="2400" b="1"/>
             </a:lvl6pPr>
-            <a:lvl7pPr marL="2743200" indent="0">
-              <a:buNone/>
-              <a:defRPr sz="1600" b="1"/>
+            <a:lvl7pPr marL="4114800" indent="0">
+              <a:buNone/>
+              <a:defRPr sz="2400" b="1"/>
             </a:lvl7pPr>
-            <a:lvl8pPr marL="3200400" indent="0">
-              <a:buNone/>
-              <a:defRPr sz="1600" b="1"/>
+            <a:lvl8pPr marL="4800600" indent="0">
+              <a:buNone/>
+              <a:defRPr sz="2400" b="1"/>
             </a:lvl8pPr>
-            <a:lvl9pPr marL="3657600" indent="0">
-              <a:buNone/>
-              <a:defRPr sz="1600" b="1"/>
+            <a:lvl9pPr marL="5486400" indent="0">
+              <a:buNone/>
+              <a:defRPr sz="2400" b="1"/>
             </a:lvl9pPr>
           </a:lstStyle>
           <a:p>
@@ -1732,13 +1534,7 @@
       </p:sp>
       <p:sp>
         <p:nvSpPr>
-          <p:cNvPr id="6" name="Content Placeholder 5">
-            <a:extLst>
-              <a:ext uri="{FF2B5EF4-FFF2-40B4-BE49-F238E27FC236}">
-                <a16:creationId xmlns:a16="http://schemas.microsoft.com/office/drawing/2014/main" id="{C513D11F-4EB0-D915-6A6C-108D96798A69}"/>
-              </a:ext>
-            </a:extLst>
-          </p:cNvPr>
+          <p:cNvPr id="6" name="Content Placeholder 5"/>
           <p:cNvSpPr>
             <a:spLocks noGrp="1"/>
           </p:cNvSpPr>
@@ -1748,8 +1544,8 @@
         </p:nvSpPr>
         <p:spPr>
           <a:xfrm>
-            <a:off x="6172200" y="2505075"/>
-            <a:ext cx="5183188" cy="3684588"/>
+            <a:off x="6943726" y="5010150"/>
+            <a:ext cx="5831087" cy="7369176"/>
           </a:xfrm>
         </p:spPr>
         <p:txBody>
@@ -1789,18 +1585,13 @@
               <a:rPr lang="en-US"/>
               <a:t>Fifth level</a:t>
             </a:r>
-          </a:p>
-        </p:txBody>
-      </p:sp>
-      <p:sp>
-        <p:nvSpPr>
-          <p:cNvPr id="7" name="Date Placeholder 6">
-            <a:extLst>
-              <a:ext uri="{FF2B5EF4-FFF2-40B4-BE49-F238E27FC236}">
-                <a16:creationId xmlns:a16="http://schemas.microsoft.com/office/drawing/2014/main" id="{1EEA8257-BA47-1FB9-FE16-174D71F6AF7F}"/>
-              </a:ext>
-            </a:extLst>
-          </p:cNvPr>
+            <a:endParaRPr lang="en-US" dirty="0"/>
+          </a:p>
+        </p:txBody>
+      </p:sp>
+      <p:sp>
+        <p:nvSpPr>
+          <p:cNvPr id="7" name="Date Placeholder 6"/>
           <p:cNvSpPr>
             <a:spLocks noGrp="1"/>
           </p:cNvSpPr>
@@ -1815,7 +1606,7 @@
           <a:p>
             <a:fld id="{85B3B054-712A-47A7-A562-EFC3154E7950}" type="datetimeFigureOut">
               <a:rPr lang="en-US" smtClean="0"/>
-              <a:t>2/8/2024</a:t>
+              <a:t>2/14/2024</a:t>
             </a:fld>
             <a:endParaRPr lang="en-US"/>
           </a:p>
@@ -1823,13 +1614,7 @@
       </p:sp>
       <p:sp>
         <p:nvSpPr>
-          <p:cNvPr id="8" name="Footer Placeholder 7">
-            <a:extLst>
-              <a:ext uri="{FF2B5EF4-FFF2-40B4-BE49-F238E27FC236}">
-                <a16:creationId xmlns:a16="http://schemas.microsoft.com/office/drawing/2014/main" id="{B3C71453-3178-E857-516F-B650E82DC46C}"/>
-              </a:ext>
-            </a:extLst>
-          </p:cNvPr>
+          <p:cNvPr id="8" name="Footer Placeholder 7"/>
           <p:cNvSpPr>
             <a:spLocks noGrp="1"/>
           </p:cNvSpPr>
@@ -1848,13 +1633,7 @@
       </p:sp>
       <p:sp>
         <p:nvSpPr>
-          <p:cNvPr id="9" name="Slide Number Placeholder 8">
-            <a:extLst>
-              <a:ext uri="{FF2B5EF4-FFF2-40B4-BE49-F238E27FC236}">
-                <a16:creationId xmlns:a16="http://schemas.microsoft.com/office/drawing/2014/main" id="{F02B21AC-AD1F-0377-4009-687B9032B27E}"/>
-              </a:ext>
-            </a:extLst>
-          </p:cNvPr>
+          <p:cNvPr id="9" name="Slide Number Placeholder 8"/>
           <p:cNvSpPr>
             <a:spLocks noGrp="1"/>
           </p:cNvSpPr>
@@ -1878,7 +1657,7 @@
     </p:spTree>
     <p:extLst>
       <p:ext uri="{BB962C8B-B14F-4D97-AF65-F5344CB8AC3E}">
-        <p14:creationId xmlns:p14="http://schemas.microsoft.com/office/powerpoint/2010/main" val="271454512"/>
+        <p14:creationId xmlns:p14="http://schemas.microsoft.com/office/powerpoint/2010/main" val="2368730363"/>
       </p:ext>
     </p:extLst>
   </p:cSld>
@@ -1907,13 +1686,7 @@
       </p:grpSpPr>
       <p:sp>
         <p:nvSpPr>
-          <p:cNvPr id="2" name="Title 1">
-            <a:extLst>
-              <a:ext uri="{FF2B5EF4-FFF2-40B4-BE49-F238E27FC236}">
-                <a16:creationId xmlns:a16="http://schemas.microsoft.com/office/drawing/2014/main" id="{64C1C713-BECA-5538-3395-398E7ABF852C}"/>
-              </a:ext>
-            </a:extLst>
-          </p:cNvPr>
+          <p:cNvPr id="2" name="Title 1"/>
           <p:cNvSpPr>
             <a:spLocks noGrp="1"/>
           </p:cNvSpPr>
@@ -1930,18 +1703,13 @@
               <a:rPr lang="en-US"/>
               <a:t>Click to edit Master title style</a:t>
             </a:r>
-          </a:p>
-        </p:txBody>
-      </p:sp>
-      <p:sp>
-        <p:nvSpPr>
-          <p:cNvPr id="3" name="Date Placeholder 2">
-            <a:extLst>
-              <a:ext uri="{FF2B5EF4-FFF2-40B4-BE49-F238E27FC236}">
-                <a16:creationId xmlns:a16="http://schemas.microsoft.com/office/drawing/2014/main" id="{3E7D810A-B6F8-76DB-FC9A-61C1DF38FE62}"/>
-              </a:ext>
-            </a:extLst>
-          </p:cNvPr>
+            <a:endParaRPr lang="en-US" dirty="0"/>
+          </a:p>
+        </p:txBody>
+      </p:sp>
+      <p:sp>
+        <p:nvSpPr>
+          <p:cNvPr id="3" name="Date Placeholder 2"/>
           <p:cNvSpPr>
             <a:spLocks noGrp="1"/>
           </p:cNvSpPr>
@@ -1956,7 +1724,7 @@
           <a:p>
             <a:fld id="{85B3B054-712A-47A7-A562-EFC3154E7950}" type="datetimeFigureOut">
               <a:rPr lang="en-US" smtClean="0"/>
-              <a:t>2/8/2024</a:t>
+              <a:t>2/14/2024</a:t>
             </a:fld>
             <a:endParaRPr lang="en-US"/>
           </a:p>
@@ -1964,13 +1732,7 @@
       </p:sp>
       <p:sp>
         <p:nvSpPr>
-          <p:cNvPr id="4" name="Footer Placeholder 3">
-            <a:extLst>
-              <a:ext uri="{FF2B5EF4-FFF2-40B4-BE49-F238E27FC236}">
-                <a16:creationId xmlns:a16="http://schemas.microsoft.com/office/drawing/2014/main" id="{2A6B57D5-E13D-8D4E-1287-477C0004C2A6}"/>
-              </a:ext>
-            </a:extLst>
-          </p:cNvPr>
+          <p:cNvPr id="4" name="Footer Placeholder 3"/>
           <p:cNvSpPr>
             <a:spLocks noGrp="1"/>
           </p:cNvSpPr>
@@ -1989,13 +1751,7 @@
       </p:sp>
       <p:sp>
         <p:nvSpPr>
-          <p:cNvPr id="5" name="Slide Number Placeholder 4">
-            <a:extLst>
-              <a:ext uri="{FF2B5EF4-FFF2-40B4-BE49-F238E27FC236}">
-                <a16:creationId xmlns:a16="http://schemas.microsoft.com/office/drawing/2014/main" id="{2FCBD187-CCE4-12F5-86CE-15EEDCD8ED3A}"/>
-              </a:ext>
-            </a:extLst>
-          </p:cNvPr>
+          <p:cNvPr id="5" name="Slide Number Placeholder 4"/>
           <p:cNvSpPr>
             <a:spLocks noGrp="1"/>
           </p:cNvSpPr>
@@ -2019,7 +1775,7 @@
     </p:spTree>
     <p:extLst>
       <p:ext uri="{BB962C8B-B14F-4D97-AF65-F5344CB8AC3E}">
-        <p14:creationId xmlns:p14="http://schemas.microsoft.com/office/powerpoint/2010/main" val="4197209662"/>
+        <p14:creationId xmlns:p14="http://schemas.microsoft.com/office/powerpoint/2010/main" val="4262531910"/>
       </p:ext>
     </p:extLst>
   </p:cSld>
@@ -2048,13 +1804,7 @@
       </p:grpSpPr>
       <p:sp>
         <p:nvSpPr>
-          <p:cNvPr id="2" name="Date Placeholder 1">
-            <a:extLst>
-              <a:ext uri="{FF2B5EF4-FFF2-40B4-BE49-F238E27FC236}">
-                <a16:creationId xmlns:a16="http://schemas.microsoft.com/office/drawing/2014/main" id="{A39CDA20-2A45-E6C1-3B90-77067EB8D2C7}"/>
-              </a:ext>
-            </a:extLst>
-          </p:cNvPr>
+          <p:cNvPr id="2" name="Date Placeholder 1"/>
           <p:cNvSpPr>
             <a:spLocks noGrp="1"/>
           </p:cNvSpPr>
@@ -2069,7 +1819,7 @@
           <a:p>
             <a:fld id="{85B3B054-712A-47A7-A562-EFC3154E7950}" type="datetimeFigureOut">
               <a:rPr lang="en-US" smtClean="0"/>
-              <a:t>2/8/2024</a:t>
+              <a:t>2/14/2024</a:t>
             </a:fld>
             <a:endParaRPr lang="en-US"/>
           </a:p>
@@ -2077,13 +1827,7 @@
       </p:sp>
       <p:sp>
         <p:nvSpPr>
-          <p:cNvPr id="3" name="Footer Placeholder 2">
-            <a:extLst>
-              <a:ext uri="{FF2B5EF4-FFF2-40B4-BE49-F238E27FC236}">
-                <a16:creationId xmlns:a16="http://schemas.microsoft.com/office/drawing/2014/main" id="{4E93FC88-D684-5AB3-8829-A1F0FB6B5EDD}"/>
-              </a:ext>
-            </a:extLst>
-          </p:cNvPr>
+          <p:cNvPr id="3" name="Footer Placeholder 2"/>
           <p:cNvSpPr>
             <a:spLocks noGrp="1"/>
           </p:cNvSpPr>
@@ -2102,13 +1846,7 @@
       </p:sp>
       <p:sp>
         <p:nvSpPr>
-          <p:cNvPr id="4" name="Slide Number Placeholder 3">
-            <a:extLst>
-              <a:ext uri="{FF2B5EF4-FFF2-40B4-BE49-F238E27FC236}">
-                <a16:creationId xmlns:a16="http://schemas.microsoft.com/office/drawing/2014/main" id="{E5C26FE2-1603-7A27-546E-58D53D348154}"/>
-              </a:ext>
-            </a:extLst>
-          </p:cNvPr>
+          <p:cNvPr id="4" name="Slide Number Placeholder 3"/>
           <p:cNvSpPr>
             <a:spLocks noGrp="1"/>
           </p:cNvSpPr>
@@ -2132,7 +1870,7 @@
     </p:spTree>
     <p:extLst>
       <p:ext uri="{BB962C8B-B14F-4D97-AF65-F5344CB8AC3E}">
-        <p14:creationId xmlns:p14="http://schemas.microsoft.com/office/powerpoint/2010/main" val="2927669179"/>
+        <p14:creationId xmlns:p14="http://schemas.microsoft.com/office/powerpoint/2010/main" val="4133001398"/>
       </p:ext>
     </p:extLst>
   </p:cSld>
@@ -2161,13 +1899,7 @@
       </p:grpSpPr>
       <p:sp>
         <p:nvSpPr>
-          <p:cNvPr id="2" name="Title 1">
-            <a:extLst>
-              <a:ext uri="{FF2B5EF4-FFF2-40B4-BE49-F238E27FC236}">
-                <a16:creationId xmlns:a16="http://schemas.microsoft.com/office/drawing/2014/main" id="{DE4C5F5B-28F8-0D16-3AEE-CCD380D4DF4A}"/>
-              </a:ext>
-            </a:extLst>
-          </p:cNvPr>
+          <p:cNvPr id="2" name="Title 1"/>
           <p:cNvSpPr>
             <a:spLocks noGrp="1"/>
           </p:cNvSpPr>
@@ -2177,15 +1909,15 @@
         </p:nvSpPr>
         <p:spPr>
           <a:xfrm>
-            <a:off x="839788" y="457200"/>
-            <a:ext cx="3932237" cy="1600200"/>
+            <a:off x="944762" y="914400"/>
+            <a:ext cx="4423767" cy="3200400"/>
           </a:xfrm>
         </p:spPr>
         <p:txBody>
           <a:bodyPr anchor="b"/>
           <a:lstStyle>
             <a:lvl1pPr>
-              <a:defRPr sz="3200"/>
+              <a:defRPr sz="4800"/>
             </a:lvl1pPr>
           </a:lstStyle>
           <a:p>
@@ -2193,18 +1925,13 @@
               <a:rPr lang="en-US"/>
               <a:t>Click to edit Master title style</a:t>
             </a:r>
-          </a:p>
-        </p:txBody>
-      </p:sp>
-      <p:sp>
-        <p:nvSpPr>
-          <p:cNvPr id="3" name="Content Placeholder 2">
-            <a:extLst>
-              <a:ext uri="{FF2B5EF4-FFF2-40B4-BE49-F238E27FC236}">
-                <a16:creationId xmlns:a16="http://schemas.microsoft.com/office/drawing/2014/main" id="{944FB825-3A4D-2568-92D8-A1A4C757849C}"/>
-              </a:ext>
-            </a:extLst>
-          </p:cNvPr>
+            <a:endParaRPr lang="en-US" dirty="0"/>
+          </a:p>
+        </p:txBody>
+      </p:sp>
+      <p:sp>
+        <p:nvSpPr>
+          <p:cNvPr id="3" name="Content Placeholder 2"/>
           <p:cNvSpPr>
             <a:spLocks noGrp="1"/>
           </p:cNvSpPr>
@@ -2214,39 +1941,39 @@
         </p:nvSpPr>
         <p:spPr>
           <a:xfrm>
-            <a:off x="5183188" y="987425"/>
-            <a:ext cx="6172200" cy="4873625"/>
+            <a:off x="5831087" y="1974853"/>
+            <a:ext cx="6943725" cy="9747250"/>
           </a:xfrm>
         </p:spPr>
         <p:txBody>
           <a:bodyPr/>
           <a:lstStyle>
             <a:lvl1pPr>
-              <a:defRPr sz="3200"/>
+              <a:defRPr sz="4800"/>
             </a:lvl1pPr>
             <a:lvl2pPr>
-              <a:defRPr sz="2800"/>
+              <a:defRPr sz="4200"/>
             </a:lvl2pPr>
             <a:lvl3pPr>
-              <a:defRPr sz="2400"/>
+              <a:defRPr sz="3600"/>
             </a:lvl3pPr>
             <a:lvl4pPr>
-              <a:defRPr sz="2000"/>
+              <a:defRPr sz="3000"/>
             </a:lvl4pPr>
             <a:lvl5pPr>
-              <a:defRPr sz="2000"/>
+              <a:defRPr sz="3000"/>
             </a:lvl5pPr>
             <a:lvl6pPr>
-              <a:defRPr sz="2000"/>
+              <a:defRPr sz="3000"/>
             </a:lvl6pPr>
             <a:lvl7pPr>
-              <a:defRPr sz="2000"/>
+              <a:defRPr sz="3000"/>
             </a:lvl7pPr>
             <a:lvl8pPr>
-              <a:defRPr sz="2000"/>
+              <a:defRPr sz="3000"/>
             </a:lvl8pPr>
             <a:lvl9pPr>
-              <a:defRPr sz="2000"/>
+              <a:defRPr sz="3000"/>
             </a:lvl9pPr>
           </a:lstStyle>
           <a:p>
@@ -2283,18 +2010,13 @@
               <a:rPr lang="en-US"/>
               <a:t>Fifth level</a:t>
             </a:r>
-          </a:p>
-        </p:txBody>
-      </p:sp>
-      <p:sp>
-        <p:nvSpPr>
-          <p:cNvPr id="4" name="Text Placeholder 3">
-            <a:extLst>
-              <a:ext uri="{FF2B5EF4-FFF2-40B4-BE49-F238E27FC236}">
-                <a16:creationId xmlns:a16="http://schemas.microsoft.com/office/drawing/2014/main" id="{8FE7C4FF-E74A-E8CA-A1DE-E934F3A3736F}"/>
-              </a:ext>
-            </a:extLst>
-          </p:cNvPr>
+            <a:endParaRPr lang="en-US" dirty="0"/>
+          </a:p>
+        </p:txBody>
+      </p:sp>
+      <p:sp>
+        <p:nvSpPr>
+          <p:cNvPr id="4" name="Text Placeholder 3"/>
           <p:cNvSpPr>
             <a:spLocks noGrp="1"/>
           </p:cNvSpPr>
@@ -2304,8 +2026,8 @@
         </p:nvSpPr>
         <p:spPr>
           <a:xfrm>
-            <a:off x="839788" y="2057400"/>
-            <a:ext cx="3932237" cy="3811588"/>
+            <a:off x="944762" y="4114800"/>
+            <a:ext cx="4423767" cy="7623176"/>
           </a:xfrm>
         </p:spPr>
         <p:txBody>
@@ -2313,39 +2035,39 @@
           <a:lstStyle>
             <a:lvl1pPr marL="0" indent="0">
               <a:buNone/>
-              <a:defRPr sz="1600"/>
+              <a:defRPr sz="2400"/>
             </a:lvl1pPr>
-            <a:lvl2pPr marL="457200" indent="0">
-              <a:buNone/>
-              <a:defRPr sz="1400"/>
+            <a:lvl2pPr marL="685800" indent="0">
+              <a:buNone/>
+              <a:defRPr sz="2100"/>
             </a:lvl2pPr>
-            <a:lvl3pPr marL="914400" indent="0">
-              <a:buNone/>
-              <a:defRPr sz="1200"/>
+            <a:lvl3pPr marL="1371600" indent="0">
+              <a:buNone/>
+              <a:defRPr sz="1800"/>
             </a:lvl3pPr>
-            <a:lvl4pPr marL="1371600" indent="0">
-              <a:buNone/>
-              <a:defRPr sz="1000"/>
+            <a:lvl4pPr marL="2057400" indent="0">
+              <a:buNone/>
+              <a:defRPr sz="1500"/>
             </a:lvl4pPr>
-            <a:lvl5pPr marL="1828800" indent="0">
-              <a:buNone/>
-              <a:defRPr sz="1000"/>
+            <a:lvl5pPr marL="2743200" indent="0">
+              <a:buNone/>
+              <a:defRPr sz="1500"/>
             </a:lvl5pPr>
-            <a:lvl6pPr marL="2286000" indent="0">
-              <a:buNone/>
-              <a:defRPr sz="1000"/>
+            <a:lvl6pPr marL="3429000" indent="0">
+              <a:buNone/>
+              <a:defRPr sz="1500"/>
             </a:lvl6pPr>
-            <a:lvl7pPr marL="2743200" indent="0">
-              <a:buNone/>
-              <a:defRPr sz="1000"/>
+            <a:lvl7pPr marL="4114800" indent="0">
+              <a:buNone/>
+              <a:defRPr sz="1500"/>
             </a:lvl7pPr>
-            <a:lvl8pPr marL="3200400" indent="0">
-              <a:buNone/>
-              <a:defRPr sz="1000"/>
+            <a:lvl8pPr marL="4800600" indent="0">
+              <a:buNone/>
+              <a:defRPr sz="1500"/>
             </a:lvl8pPr>
-            <a:lvl9pPr marL="3657600" indent="0">
-              <a:buNone/>
-              <a:defRPr sz="1000"/>
+            <a:lvl9pPr marL="5486400" indent="0">
+              <a:buNone/>
+              <a:defRPr sz="1500"/>
             </a:lvl9pPr>
           </a:lstStyle>
           <a:p>
@@ -2359,13 +2081,7 @@
       </p:sp>
       <p:sp>
         <p:nvSpPr>
-          <p:cNvPr id="5" name="Date Placeholder 4">
-            <a:extLst>
-              <a:ext uri="{FF2B5EF4-FFF2-40B4-BE49-F238E27FC236}">
-                <a16:creationId xmlns:a16="http://schemas.microsoft.com/office/drawing/2014/main" id="{9B0D1CFE-4451-E906-A920-A8018BBA156A}"/>
-              </a:ext>
-            </a:extLst>
-          </p:cNvPr>
+          <p:cNvPr id="5" name="Date Placeholder 4"/>
           <p:cNvSpPr>
             <a:spLocks noGrp="1"/>
           </p:cNvSpPr>
@@ -2380,7 +2096,7 @@
           <a:p>
             <a:fld id="{85B3B054-712A-47A7-A562-EFC3154E7950}" type="datetimeFigureOut">
               <a:rPr lang="en-US" smtClean="0"/>
-              <a:t>2/8/2024</a:t>
+              <a:t>2/14/2024</a:t>
             </a:fld>
             <a:endParaRPr lang="en-US"/>
           </a:p>
@@ -2388,13 +2104,7 @@
       </p:sp>
       <p:sp>
         <p:nvSpPr>
-          <p:cNvPr id="6" name="Footer Placeholder 5">
-            <a:extLst>
-              <a:ext uri="{FF2B5EF4-FFF2-40B4-BE49-F238E27FC236}">
-                <a16:creationId xmlns:a16="http://schemas.microsoft.com/office/drawing/2014/main" id="{10DAED14-5AE6-D374-9046-6C54020F6E34}"/>
-              </a:ext>
-            </a:extLst>
-          </p:cNvPr>
+          <p:cNvPr id="6" name="Footer Placeholder 5"/>
           <p:cNvSpPr>
             <a:spLocks noGrp="1"/>
           </p:cNvSpPr>
@@ -2413,13 +2123,7 @@
       </p:sp>
       <p:sp>
         <p:nvSpPr>
-          <p:cNvPr id="7" name="Slide Number Placeholder 6">
-            <a:extLst>
-              <a:ext uri="{FF2B5EF4-FFF2-40B4-BE49-F238E27FC236}">
-                <a16:creationId xmlns:a16="http://schemas.microsoft.com/office/drawing/2014/main" id="{AFFDFEAE-779F-18B1-09E5-1FBA3AF225E5}"/>
-              </a:ext>
-            </a:extLst>
-          </p:cNvPr>
+          <p:cNvPr id="7" name="Slide Number Placeholder 6"/>
           <p:cNvSpPr>
             <a:spLocks noGrp="1"/>
           </p:cNvSpPr>
@@ -2443,7 +2147,7 @@
     </p:spTree>
     <p:extLst>
       <p:ext uri="{BB962C8B-B14F-4D97-AF65-F5344CB8AC3E}">
-        <p14:creationId xmlns:p14="http://schemas.microsoft.com/office/powerpoint/2010/main" val="3616457405"/>
+        <p14:creationId xmlns:p14="http://schemas.microsoft.com/office/powerpoint/2010/main" val="1514202452"/>
       </p:ext>
     </p:extLst>
   </p:cSld>
@@ -2472,13 +2176,7 @@
       </p:grpSpPr>
       <p:sp>
         <p:nvSpPr>
-          <p:cNvPr id="2" name="Title 1">
-            <a:extLst>
-              <a:ext uri="{FF2B5EF4-FFF2-40B4-BE49-F238E27FC236}">
-                <a16:creationId xmlns:a16="http://schemas.microsoft.com/office/drawing/2014/main" id="{F4B87E66-036D-5748-132E-0F21C647E014}"/>
-              </a:ext>
-            </a:extLst>
-          </p:cNvPr>
+          <p:cNvPr id="2" name="Title 1"/>
           <p:cNvSpPr>
             <a:spLocks noGrp="1"/>
           </p:cNvSpPr>
@@ -2488,15 +2186,15 @@
         </p:nvSpPr>
         <p:spPr>
           <a:xfrm>
-            <a:off x="839788" y="457200"/>
-            <a:ext cx="3932237" cy="1600200"/>
+            <a:off x="944762" y="914400"/>
+            <a:ext cx="4423767" cy="3200400"/>
           </a:xfrm>
         </p:spPr>
         <p:txBody>
           <a:bodyPr anchor="b"/>
           <a:lstStyle>
             <a:lvl1pPr>
-              <a:defRPr sz="3200"/>
+              <a:defRPr sz="4800"/>
             </a:lvl1pPr>
           </a:lstStyle>
           <a:p>
@@ -2504,20 +2202,15 @@
               <a:rPr lang="en-US"/>
               <a:t>Click to edit Master title style</a:t>
             </a:r>
-          </a:p>
-        </p:txBody>
-      </p:sp>
-      <p:sp>
-        <p:nvSpPr>
-          <p:cNvPr id="3" name="Picture Placeholder 2">
-            <a:extLst>
-              <a:ext uri="{FF2B5EF4-FFF2-40B4-BE49-F238E27FC236}">
-                <a16:creationId xmlns:a16="http://schemas.microsoft.com/office/drawing/2014/main" id="{557B2268-3CCB-4B61-166E-F7A4E086AA6B}"/>
-              </a:ext>
-            </a:extLst>
-          </p:cNvPr>
-          <p:cNvSpPr>
-            <a:spLocks noGrp="1"/>
+            <a:endParaRPr lang="en-US" dirty="0"/>
+          </a:p>
+        </p:txBody>
+      </p:sp>
+      <p:sp>
+        <p:nvSpPr>
+          <p:cNvPr id="3" name="Picture Placeholder 2"/>
+          <p:cNvSpPr>
+            <a:spLocks noGrp="1" noChangeAspect="1"/>
           </p:cNvSpPr>
           <p:nvPr>
             <p:ph type="pic" idx="1"/>
@@ -2525,64 +2218,62 @@
         </p:nvSpPr>
         <p:spPr>
           <a:xfrm>
-            <a:off x="5183188" y="987425"/>
-            <a:ext cx="6172200" cy="4873625"/>
+            <a:off x="5831087" y="1974853"/>
+            <a:ext cx="6943725" cy="9747250"/>
           </a:xfrm>
         </p:spPr>
         <p:txBody>
-          <a:bodyPr/>
+          <a:bodyPr anchor="t"/>
           <a:lstStyle>
             <a:lvl1pPr marL="0" indent="0">
               <a:buNone/>
-              <a:defRPr sz="3200"/>
+              <a:defRPr sz="4800"/>
             </a:lvl1pPr>
-            <a:lvl2pPr marL="457200" indent="0">
-              <a:buNone/>
-              <a:defRPr sz="2800"/>
+            <a:lvl2pPr marL="685800" indent="0">
+              <a:buNone/>
+              <a:defRPr sz="4200"/>
             </a:lvl2pPr>
-            <a:lvl3pPr marL="914400" indent="0">
-              <a:buNone/>
-              <a:defRPr sz="2400"/>
+            <a:lvl3pPr marL="1371600" indent="0">
+              <a:buNone/>
+              <a:defRPr sz="3600"/>
             </a:lvl3pPr>
-            <a:lvl4pPr marL="1371600" indent="0">
-              <a:buNone/>
-              <a:defRPr sz="2000"/>
+            <a:lvl4pPr marL="2057400" indent="0">
+              <a:buNone/>
+              <a:defRPr sz="3000"/>
             </a:lvl4pPr>
-            <a:lvl5pPr marL="1828800" indent="0">
-              <a:buNone/>
-              <a:defRPr sz="2000"/>
+            <a:lvl5pPr marL="2743200" indent="0">
+              <a:buNone/>
+              <a:defRPr sz="3000"/>
             </a:lvl5pPr>
-            <a:lvl6pPr marL="2286000" indent="0">
-              <a:buNone/>
-              <a:defRPr sz="2000"/>
+            <a:lvl6pPr marL="3429000" indent="0">
+              <a:buNone/>
+              <a:defRPr sz="3000"/>
             </a:lvl6pPr>
-            <a:lvl7pPr marL="2743200" indent="0">
-              <a:buNone/>
-              <a:defRPr sz="2000"/>
+            <a:lvl7pPr marL="4114800" indent="0">
+              <a:buNone/>
+              <a:defRPr sz="3000"/>
             </a:lvl7pPr>
-            <a:lvl8pPr marL="3200400" indent="0">
-              <a:buNone/>
-              <a:defRPr sz="2000"/>
+            <a:lvl8pPr marL="4800600" indent="0">
+              <a:buNone/>
+              <a:defRPr sz="3000"/>
             </a:lvl8pPr>
-            <a:lvl9pPr marL="3657600" indent="0">
-              <a:buNone/>
-              <a:defRPr sz="2000"/>
+            <a:lvl9pPr marL="5486400" indent="0">
+              <a:buNone/>
+              <a:defRPr sz="3000"/>
             </a:lvl9pPr>
           </a:lstStyle>
           <a:p>
-            <a:endParaRPr lang="en-US"/>
-          </a:p>
-        </p:txBody>
-      </p:sp>
-      <p:sp>
-        <p:nvSpPr>
-          <p:cNvPr id="4" name="Text Placeholder 3">
-            <a:extLst>
-              <a:ext uri="{FF2B5EF4-FFF2-40B4-BE49-F238E27FC236}">
-                <a16:creationId xmlns:a16="http://schemas.microsoft.com/office/drawing/2014/main" id="{C6668BA4-BE33-0ACC-BCA2-1A87B1DCCBBF}"/>
-              </a:ext>
-            </a:extLst>
-          </p:cNvPr>
+            <a:r>
+              <a:rPr lang="en-US"/>
+              <a:t>Click icon to add picture</a:t>
+            </a:r>
+            <a:endParaRPr lang="en-US" dirty="0"/>
+          </a:p>
+        </p:txBody>
+      </p:sp>
+      <p:sp>
+        <p:nvSpPr>
+          <p:cNvPr id="4" name="Text Placeholder 3"/>
           <p:cNvSpPr>
             <a:spLocks noGrp="1"/>
           </p:cNvSpPr>
@@ -2592,8 +2283,8 @@
         </p:nvSpPr>
         <p:spPr>
           <a:xfrm>
-            <a:off x="839788" y="2057400"/>
-            <a:ext cx="3932237" cy="3811588"/>
+            <a:off x="944762" y="4114800"/>
+            <a:ext cx="4423767" cy="7623176"/>
           </a:xfrm>
         </p:spPr>
         <p:txBody>
@@ -2601,39 +2292,39 @@
           <a:lstStyle>
             <a:lvl1pPr marL="0" indent="0">
               <a:buNone/>
-              <a:defRPr sz="1600"/>
+              <a:defRPr sz="2400"/>
             </a:lvl1pPr>
-            <a:lvl2pPr marL="457200" indent="0">
-              <a:buNone/>
-              <a:defRPr sz="1400"/>
+            <a:lvl2pPr marL="685800" indent="0">
+              <a:buNone/>
+              <a:defRPr sz="2100"/>
             </a:lvl2pPr>
-            <a:lvl3pPr marL="914400" indent="0">
-              <a:buNone/>
-              <a:defRPr sz="1200"/>
+            <a:lvl3pPr marL="1371600" indent="0">
+              <a:buNone/>
+              <a:defRPr sz="1800"/>
             </a:lvl3pPr>
-            <a:lvl4pPr marL="1371600" indent="0">
-              <a:buNone/>
-              <a:defRPr sz="1000"/>
+            <a:lvl4pPr marL="2057400" indent="0">
+              <a:buNone/>
+              <a:defRPr sz="1500"/>
             </a:lvl4pPr>
-            <a:lvl5pPr marL="1828800" indent="0">
-              <a:buNone/>
-              <a:defRPr sz="1000"/>
+            <a:lvl5pPr marL="2743200" indent="0">
+              <a:buNone/>
+              <a:defRPr sz="1500"/>
             </a:lvl5pPr>
-            <a:lvl6pPr marL="2286000" indent="0">
-              <a:buNone/>
-              <a:defRPr sz="1000"/>
+            <a:lvl6pPr marL="3429000" indent="0">
+              <a:buNone/>
+              <a:defRPr sz="1500"/>
             </a:lvl6pPr>
-            <a:lvl7pPr marL="2743200" indent="0">
-              <a:buNone/>
-              <a:defRPr sz="1000"/>
+            <a:lvl7pPr marL="4114800" indent="0">
+              <a:buNone/>
+              <a:defRPr sz="1500"/>
             </a:lvl7pPr>
-            <a:lvl8pPr marL="3200400" indent="0">
-              <a:buNone/>
-              <a:defRPr sz="1000"/>
+            <a:lvl8pPr marL="4800600" indent="0">
+              <a:buNone/>
+              <a:defRPr sz="1500"/>
             </a:lvl8pPr>
-            <a:lvl9pPr marL="3657600" indent="0">
-              <a:buNone/>
-              <a:defRPr sz="1000"/>
+            <a:lvl9pPr marL="5486400" indent="0">
+              <a:buNone/>
+              <a:defRPr sz="1500"/>
             </a:lvl9pPr>
           </a:lstStyle>
           <a:p>
@@ -2647,13 +2338,7 @@
       </p:sp>
       <p:sp>
         <p:nvSpPr>
-          <p:cNvPr id="5" name="Date Placeholder 4">
-            <a:extLst>
-              <a:ext uri="{FF2B5EF4-FFF2-40B4-BE49-F238E27FC236}">
-                <a16:creationId xmlns:a16="http://schemas.microsoft.com/office/drawing/2014/main" id="{B6F54FFF-7B59-927B-CD59-05D273CA734F}"/>
-              </a:ext>
-            </a:extLst>
-          </p:cNvPr>
+          <p:cNvPr id="5" name="Date Placeholder 4"/>
           <p:cNvSpPr>
             <a:spLocks noGrp="1"/>
           </p:cNvSpPr>
@@ -2668,7 +2353,7 @@
           <a:p>
             <a:fld id="{85B3B054-712A-47A7-A562-EFC3154E7950}" type="datetimeFigureOut">
               <a:rPr lang="en-US" smtClean="0"/>
-              <a:t>2/8/2024</a:t>
+              <a:t>2/14/2024</a:t>
             </a:fld>
             <a:endParaRPr lang="en-US"/>
           </a:p>
@@ -2676,13 +2361,7 @@
       </p:sp>
       <p:sp>
         <p:nvSpPr>
-          <p:cNvPr id="6" name="Footer Placeholder 5">
-            <a:extLst>
-              <a:ext uri="{FF2B5EF4-FFF2-40B4-BE49-F238E27FC236}">
-                <a16:creationId xmlns:a16="http://schemas.microsoft.com/office/drawing/2014/main" id="{88943801-4A06-E3B5-2AF0-12551C00B1C8}"/>
-              </a:ext>
-            </a:extLst>
-          </p:cNvPr>
+          <p:cNvPr id="6" name="Footer Placeholder 5"/>
           <p:cNvSpPr>
             <a:spLocks noGrp="1"/>
           </p:cNvSpPr>
@@ -2701,13 +2380,7 @@
       </p:sp>
       <p:sp>
         <p:nvSpPr>
-          <p:cNvPr id="7" name="Slide Number Placeholder 6">
-            <a:extLst>
-              <a:ext uri="{FF2B5EF4-FFF2-40B4-BE49-F238E27FC236}">
-                <a16:creationId xmlns:a16="http://schemas.microsoft.com/office/drawing/2014/main" id="{C7CBBAAC-643A-DFB4-46FD-94C7164F68BA}"/>
-              </a:ext>
-            </a:extLst>
-          </p:cNvPr>
+          <p:cNvPr id="7" name="Slide Number Placeholder 6"/>
           <p:cNvSpPr>
             <a:spLocks noGrp="1"/>
           </p:cNvSpPr>
@@ -2731,7 +2404,7 @@
     </p:spTree>
     <p:extLst>
       <p:ext uri="{BB962C8B-B14F-4D97-AF65-F5344CB8AC3E}">
-        <p14:creationId xmlns:p14="http://schemas.microsoft.com/office/powerpoint/2010/main" val="2586581911"/>
+        <p14:creationId xmlns:p14="http://schemas.microsoft.com/office/powerpoint/2010/main" val="2957668965"/>
       </p:ext>
     </p:extLst>
   </p:cSld>
@@ -2765,13 +2438,7 @@
       </p:grpSpPr>
       <p:sp>
         <p:nvSpPr>
-          <p:cNvPr id="2" name="Title Placeholder 1">
-            <a:extLst>
-              <a:ext uri="{FF2B5EF4-FFF2-40B4-BE49-F238E27FC236}">
-                <a16:creationId xmlns:a16="http://schemas.microsoft.com/office/drawing/2014/main" id="{21D32F9F-F443-2889-1053-EB0D7B83BA36}"/>
-              </a:ext>
-            </a:extLst>
-          </p:cNvPr>
+          <p:cNvPr id="2" name="Title Placeholder 1"/>
           <p:cNvSpPr>
             <a:spLocks noGrp="1"/>
           </p:cNvSpPr>
@@ -2781,8 +2448,8 @@
         </p:nvSpPr>
         <p:spPr>
           <a:xfrm>
-            <a:off x="838200" y="365125"/>
-            <a:ext cx="10515600" cy="1325563"/>
+            <a:off x="942975" y="730253"/>
+            <a:ext cx="11830050" cy="2651126"/>
           </a:xfrm>
           <a:prstGeom prst="rect">
             <a:avLst/>
@@ -2798,18 +2465,13 @@
               <a:rPr lang="en-US"/>
               <a:t>Click to edit Master title style</a:t>
             </a:r>
-          </a:p>
-        </p:txBody>
-      </p:sp>
-      <p:sp>
-        <p:nvSpPr>
-          <p:cNvPr id="3" name="Text Placeholder 2">
-            <a:extLst>
-              <a:ext uri="{FF2B5EF4-FFF2-40B4-BE49-F238E27FC236}">
-                <a16:creationId xmlns:a16="http://schemas.microsoft.com/office/drawing/2014/main" id="{082255C9-183E-0828-19CD-2A5B467C6443}"/>
-              </a:ext>
-            </a:extLst>
-          </p:cNvPr>
+            <a:endParaRPr lang="en-US" dirty="0"/>
+          </a:p>
+        </p:txBody>
+      </p:sp>
+      <p:sp>
+        <p:nvSpPr>
+          <p:cNvPr id="3" name="Text Placeholder 2"/>
           <p:cNvSpPr>
             <a:spLocks noGrp="1"/>
           </p:cNvSpPr>
@@ -2819,8 +2481,8 @@
         </p:nvSpPr>
         <p:spPr>
           <a:xfrm>
-            <a:off x="838200" y="1825625"/>
-            <a:ext cx="10515600" cy="4351338"/>
+            <a:off x="942975" y="3651250"/>
+            <a:ext cx="11830050" cy="8702676"/>
           </a:xfrm>
           <a:prstGeom prst="rect">
             <a:avLst/>
@@ -2865,18 +2527,13 @@
               <a:rPr lang="en-US"/>
               <a:t>Fifth level</a:t>
             </a:r>
-          </a:p>
-        </p:txBody>
-      </p:sp>
-      <p:sp>
-        <p:nvSpPr>
-          <p:cNvPr id="4" name="Date Placeholder 3">
-            <a:extLst>
-              <a:ext uri="{FF2B5EF4-FFF2-40B4-BE49-F238E27FC236}">
-                <a16:creationId xmlns:a16="http://schemas.microsoft.com/office/drawing/2014/main" id="{A663C8E0-F81C-FBB6-0513-3599F6E4EA90}"/>
-              </a:ext>
-            </a:extLst>
-          </p:cNvPr>
+            <a:endParaRPr lang="en-US" dirty="0"/>
+          </a:p>
+        </p:txBody>
+      </p:sp>
+      <p:sp>
+        <p:nvSpPr>
+          <p:cNvPr id="4" name="Date Placeholder 3"/>
           <p:cNvSpPr>
             <a:spLocks noGrp="1"/>
           </p:cNvSpPr>
@@ -2886,8 +2543,8 @@
         </p:nvSpPr>
         <p:spPr>
           <a:xfrm>
-            <a:off x="838200" y="6356350"/>
-            <a:ext cx="2743200" cy="365125"/>
+            <a:off x="942975" y="12712703"/>
+            <a:ext cx="3086100" cy="730250"/>
           </a:xfrm>
           <a:prstGeom prst="rect">
             <a:avLst/>
@@ -2897,7 +2554,7 @@
           <a:bodyPr vert="horz" lIns="91440" tIns="45720" rIns="91440" bIns="45720" rtlCol="0" anchor="ctr"/>
           <a:lstStyle>
             <a:lvl1pPr algn="l">
-              <a:defRPr sz="1200">
+              <a:defRPr sz="1800">
                 <a:solidFill>
                   <a:schemeClr val="tx1">
                     <a:tint val="75000"/>
@@ -2909,7 +2566,7 @@
           <a:p>
             <a:fld id="{85B3B054-712A-47A7-A562-EFC3154E7950}" type="datetimeFigureOut">
               <a:rPr lang="en-US" smtClean="0"/>
-              <a:t>2/8/2024</a:t>
+              <a:t>2/14/2024</a:t>
             </a:fld>
             <a:endParaRPr lang="en-US"/>
           </a:p>
@@ -2917,13 +2574,7 @@
       </p:sp>
       <p:sp>
         <p:nvSpPr>
-          <p:cNvPr id="5" name="Footer Placeholder 4">
-            <a:extLst>
-              <a:ext uri="{FF2B5EF4-FFF2-40B4-BE49-F238E27FC236}">
-                <a16:creationId xmlns:a16="http://schemas.microsoft.com/office/drawing/2014/main" id="{26DB7FB1-102A-0081-8440-A6146B1B6DDD}"/>
-              </a:ext>
-            </a:extLst>
-          </p:cNvPr>
+          <p:cNvPr id="5" name="Footer Placeholder 4"/>
           <p:cNvSpPr>
             <a:spLocks noGrp="1"/>
           </p:cNvSpPr>
@@ -2933,8 +2584,8 @@
         </p:nvSpPr>
         <p:spPr>
           <a:xfrm>
-            <a:off x="4038600" y="6356350"/>
-            <a:ext cx="4114800" cy="365125"/>
+            <a:off x="4543425" y="12712703"/>
+            <a:ext cx="4629150" cy="730250"/>
           </a:xfrm>
           <a:prstGeom prst="rect">
             <a:avLst/>
@@ -2944,7 +2595,7 @@
           <a:bodyPr vert="horz" lIns="91440" tIns="45720" rIns="91440" bIns="45720" rtlCol="0" anchor="ctr"/>
           <a:lstStyle>
             <a:lvl1pPr algn="ctr">
-              <a:defRPr sz="1200">
+              <a:defRPr sz="1800">
                 <a:solidFill>
                   <a:schemeClr val="tx1">
                     <a:tint val="75000"/>
@@ -2960,13 +2611,7 @@
       </p:sp>
       <p:sp>
         <p:nvSpPr>
-          <p:cNvPr id="6" name="Slide Number Placeholder 5">
-            <a:extLst>
-              <a:ext uri="{FF2B5EF4-FFF2-40B4-BE49-F238E27FC236}">
-                <a16:creationId xmlns:a16="http://schemas.microsoft.com/office/drawing/2014/main" id="{7913D083-8D9F-D331-C9A6-FDF044DC8605}"/>
-              </a:ext>
-            </a:extLst>
-          </p:cNvPr>
+          <p:cNvPr id="6" name="Slide Number Placeholder 5"/>
           <p:cNvSpPr>
             <a:spLocks noGrp="1"/>
           </p:cNvSpPr>
@@ -2976,8 +2621,8 @@
         </p:nvSpPr>
         <p:spPr>
           <a:xfrm>
-            <a:off x="8610600" y="6356350"/>
-            <a:ext cx="2743200" cy="365125"/>
+            <a:off x="9686925" y="12712703"/>
+            <a:ext cx="3086100" cy="730250"/>
           </a:xfrm>
           <a:prstGeom prst="rect">
             <a:avLst/>
@@ -2987,7 +2632,7 @@
           <a:bodyPr vert="horz" lIns="91440" tIns="45720" rIns="91440" bIns="45720" rtlCol="0" anchor="ctr"/>
           <a:lstStyle>
             <a:lvl1pPr algn="r">
-              <a:defRPr sz="1200">
+              <a:defRPr sz="1800">
                 <a:solidFill>
                   <a:schemeClr val="tx1">
                     <a:tint val="75000"/>
@@ -3008,27 +2653,27 @@
     </p:spTree>
     <p:extLst>
       <p:ext uri="{BB962C8B-B14F-4D97-AF65-F5344CB8AC3E}">
-        <p14:creationId xmlns:p14="http://schemas.microsoft.com/office/powerpoint/2010/main" val="18203269"/>
+        <p14:creationId xmlns:p14="http://schemas.microsoft.com/office/powerpoint/2010/main" val="595439724"/>
       </p:ext>
     </p:extLst>
   </p:cSld>
   <p:clrMap bg1="lt1" tx1="dk1" bg2="lt2" tx2="dk2" accent1="accent1" accent2="accent2" accent3="accent3" accent4="accent4" accent5="accent5" accent6="accent6" hlink="hlink" folHlink="folHlink"/>
   <p:sldLayoutIdLst>
-    <p:sldLayoutId id="2147483649" r:id="rId1"/>
-    <p:sldLayoutId id="2147483650" r:id="rId2"/>
-    <p:sldLayoutId id="2147483651" r:id="rId3"/>
-    <p:sldLayoutId id="2147483652" r:id="rId4"/>
-    <p:sldLayoutId id="2147483653" r:id="rId5"/>
-    <p:sldLayoutId id="2147483654" r:id="rId6"/>
-    <p:sldLayoutId id="2147483655" r:id="rId7"/>
-    <p:sldLayoutId id="2147483656" r:id="rId8"/>
-    <p:sldLayoutId id="2147483657" r:id="rId9"/>
-    <p:sldLayoutId id="2147483658" r:id="rId10"/>
-    <p:sldLayoutId id="2147483659" r:id="rId11"/>
+    <p:sldLayoutId id="2147483661" r:id="rId1"/>
+    <p:sldLayoutId id="2147483662" r:id="rId2"/>
+    <p:sldLayoutId id="2147483663" r:id="rId3"/>
+    <p:sldLayoutId id="2147483664" r:id="rId4"/>
+    <p:sldLayoutId id="2147483665" r:id="rId5"/>
+    <p:sldLayoutId id="2147483666" r:id="rId6"/>
+    <p:sldLayoutId id="2147483667" r:id="rId7"/>
+    <p:sldLayoutId id="2147483668" r:id="rId8"/>
+    <p:sldLayoutId id="2147483669" r:id="rId9"/>
+    <p:sldLayoutId id="2147483670" r:id="rId10"/>
+    <p:sldLayoutId id="2147483671" r:id="rId11"/>
   </p:sldLayoutIdLst>
   <p:txStyles>
     <p:titleStyle>
-      <a:lvl1pPr algn="l" defTabSz="914400" rtl="0" eaLnBrk="1" latinLnBrk="0" hangingPunct="1">
+      <a:lvl1pPr algn="l" defTabSz="1371600" rtl="0" eaLnBrk="1" latinLnBrk="0" hangingPunct="1">
         <a:lnSpc>
           <a:spcPct val="90000"/>
         </a:lnSpc>
@@ -3036,7 +2681,7 @@
           <a:spcPct val="0"/>
         </a:spcBef>
         <a:buNone/>
-        <a:defRPr sz="4400" kern="1200">
+        <a:defRPr sz="6600" kern="1200">
           <a:solidFill>
             <a:schemeClr val="tx1"/>
           </a:solidFill>
@@ -3047,16 +2692,16 @@
       </a:lvl1pPr>
     </p:titleStyle>
     <p:bodyStyle>
-      <a:lvl1pPr marL="228600" indent="-228600" algn="l" defTabSz="914400" rtl="0" eaLnBrk="1" latinLnBrk="0" hangingPunct="1">
+      <a:lvl1pPr marL="342900" indent="-342900" algn="l" defTabSz="1371600" rtl="0" eaLnBrk="1" latinLnBrk="0" hangingPunct="1">
         <a:lnSpc>
           <a:spcPct val="90000"/>
         </a:lnSpc>
         <a:spcBef>
-          <a:spcPts val="1000"/>
+          <a:spcPts val="1500"/>
         </a:spcBef>
         <a:buFont typeface="Arial" panose="020B0604020202020204" pitchFamily="34" charset="0"/>
         <a:buChar char="•"/>
-        <a:defRPr sz="2800" kern="1200">
+        <a:defRPr sz="4200" kern="1200">
           <a:solidFill>
             <a:schemeClr val="tx1"/>
           </a:solidFill>
@@ -3065,16 +2710,16 @@
           <a:cs typeface="+mn-cs"/>
         </a:defRPr>
       </a:lvl1pPr>
-      <a:lvl2pPr marL="685800" indent="-228600" algn="l" defTabSz="914400" rtl="0" eaLnBrk="1" latinLnBrk="0" hangingPunct="1">
+      <a:lvl2pPr marL="1028700" indent="-342900" algn="l" defTabSz="1371600" rtl="0" eaLnBrk="1" latinLnBrk="0" hangingPunct="1">
         <a:lnSpc>
           <a:spcPct val="90000"/>
         </a:lnSpc>
         <a:spcBef>
-          <a:spcPts val="500"/>
+          <a:spcPts val="750"/>
         </a:spcBef>
         <a:buFont typeface="Arial" panose="020B0604020202020204" pitchFamily="34" charset="0"/>
         <a:buChar char="•"/>
-        <a:defRPr sz="2400" kern="1200">
+        <a:defRPr sz="3600" kern="1200">
           <a:solidFill>
             <a:schemeClr val="tx1"/>
           </a:solidFill>
@@ -3083,16 +2728,16 @@
           <a:cs typeface="+mn-cs"/>
         </a:defRPr>
       </a:lvl2pPr>
-      <a:lvl3pPr marL="1143000" indent="-228600" algn="l" defTabSz="914400" rtl="0" eaLnBrk="1" latinLnBrk="0" hangingPunct="1">
+      <a:lvl3pPr marL="1714500" indent="-342900" algn="l" defTabSz="1371600" rtl="0" eaLnBrk="1" latinLnBrk="0" hangingPunct="1">
         <a:lnSpc>
           <a:spcPct val="90000"/>
         </a:lnSpc>
         <a:spcBef>
-          <a:spcPts val="500"/>
+          <a:spcPts val="750"/>
         </a:spcBef>
         <a:buFont typeface="Arial" panose="020B0604020202020204" pitchFamily="34" charset="0"/>
         <a:buChar char="•"/>
-        <a:defRPr sz="2000" kern="1200">
+        <a:defRPr sz="3000" kern="1200">
           <a:solidFill>
             <a:schemeClr val="tx1"/>
           </a:solidFill>
@@ -3101,16 +2746,16 @@
           <a:cs typeface="+mn-cs"/>
         </a:defRPr>
       </a:lvl3pPr>
-      <a:lvl4pPr marL="1600200" indent="-228600" algn="l" defTabSz="914400" rtl="0" eaLnBrk="1" latinLnBrk="0" hangingPunct="1">
+      <a:lvl4pPr marL="2400300" indent="-342900" algn="l" defTabSz="1371600" rtl="0" eaLnBrk="1" latinLnBrk="0" hangingPunct="1">
         <a:lnSpc>
           <a:spcPct val="90000"/>
         </a:lnSpc>
         <a:spcBef>
-          <a:spcPts val="500"/>
+          <a:spcPts val="750"/>
         </a:spcBef>
         <a:buFont typeface="Arial" panose="020B0604020202020204" pitchFamily="34" charset="0"/>
         <a:buChar char="•"/>
-        <a:defRPr sz="1800" kern="1200">
+        <a:defRPr sz="2700" kern="1200">
           <a:solidFill>
             <a:schemeClr val="tx1"/>
           </a:solidFill>
@@ -3119,16 +2764,16 @@
           <a:cs typeface="+mn-cs"/>
         </a:defRPr>
       </a:lvl4pPr>
-      <a:lvl5pPr marL="2057400" indent="-228600" algn="l" defTabSz="914400" rtl="0" eaLnBrk="1" latinLnBrk="0" hangingPunct="1">
+      <a:lvl5pPr marL="3086100" indent="-342900" algn="l" defTabSz="1371600" rtl="0" eaLnBrk="1" latinLnBrk="0" hangingPunct="1">
         <a:lnSpc>
           <a:spcPct val="90000"/>
         </a:lnSpc>
         <a:spcBef>
-          <a:spcPts val="500"/>
+          <a:spcPts val="750"/>
         </a:spcBef>
         <a:buFont typeface="Arial" panose="020B0604020202020204" pitchFamily="34" charset="0"/>
         <a:buChar char="•"/>
-        <a:defRPr sz="1800" kern="1200">
+        <a:defRPr sz="2700" kern="1200">
           <a:solidFill>
             <a:schemeClr val="tx1"/>
           </a:solidFill>
@@ -3137,16 +2782,16 @@
           <a:cs typeface="+mn-cs"/>
         </a:defRPr>
       </a:lvl5pPr>
-      <a:lvl6pPr marL="2514600" indent="-228600" algn="l" defTabSz="914400" rtl="0" eaLnBrk="1" latinLnBrk="0" hangingPunct="1">
+      <a:lvl6pPr marL="3771900" indent="-342900" algn="l" defTabSz="1371600" rtl="0" eaLnBrk="1" latinLnBrk="0" hangingPunct="1">
         <a:lnSpc>
           <a:spcPct val="90000"/>
         </a:lnSpc>
         <a:spcBef>
-          <a:spcPts val="500"/>
+          <a:spcPts val="750"/>
         </a:spcBef>
         <a:buFont typeface="Arial" panose="020B0604020202020204" pitchFamily="34" charset="0"/>
         <a:buChar char="•"/>
-        <a:defRPr sz="1800" kern="1200">
+        <a:defRPr sz="2700" kern="1200">
           <a:solidFill>
             <a:schemeClr val="tx1"/>
           </a:solidFill>
@@ -3155,16 +2800,16 @@
           <a:cs typeface="+mn-cs"/>
         </a:defRPr>
       </a:lvl6pPr>
-      <a:lvl7pPr marL="2971800" indent="-228600" algn="l" defTabSz="914400" rtl="0" eaLnBrk="1" latinLnBrk="0" hangingPunct="1">
+      <a:lvl7pPr marL="4457700" indent="-342900" algn="l" defTabSz="1371600" rtl="0" eaLnBrk="1" latinLnBrk="0" hangingPunct="1">
         <a:lnSpc>
           <a:spcPct val="90000"/>
         </a:lnSpc>
         <a:spcBef>
-          <a:spcPts val="500"/>
+          <a:spcPts val="750"/>
         </a:spcBef>
         <a:buFont typeface="Arial" panose="020B0604020202020204" pitchFamily="34" charset="0"/>
         <a:buChar char="•"/>
-        <a:defRPr sz="1800" kern="1200">
+        <a:defRPr sz="2700" kern="1200">
           <a:solidFill>
             <a:schemeClr val="tx1"/>
           </a:solidFill>
@@ -3173,16 +2818,16 @@
           <a:cs typeface="+mn-cs"/>
         </a:defRPr>
       </a:lvl7pPr>
-      <a:lvl8pPr marL="3429000" indent="-228600" algn="l" defTabSz="914400" rtl="0" eaLnBrk="1" latinLnBrk="0" hangingPunct="1">
+      <a:lvl8pPr marL="5143500" indent="-342900" algn="l" defTabSz="1371600" rtl="0" eaLnBrk="1" latinLnBrk="0" hangingPunct="1">
         <a:lnSpc>
           <a:spcPct val="90000"/>
         </a:lnSpc>
         <a:spcBef>
-          <a:spcPts val="500"/>
+          <a:spcPts val="750"/>
         </a:spcBef>
         <a:buFont typeface="Arial" panose="020B0604020202020204" pitchFamily="34" charset="0"/>
         <a:buChar char="•"/>
-        <a:defRPr sz="1800" kern="1200">
+        <a:defRPr sz="2700" kern="1200">
           <a:solidFill>
             <a:schemeClr val="tx1"/>
           </a:solidFill>
@@ -3191,16 +2836,16 @@
           <a:cs typeface="+mn-cs"/>
         </a:defRPr>
       </a:lvl8pPr>
-      <a:lvl9pPr marL="3886200" indent="-228600" algn="l" defTabSz="914400" rtl="0" eaLnBrk="1" latinLnBrk="0" hangingPunct="1">
+      <a:lvl9pPr marL="5829300" indent="-342900" algn="l" defTabSz="1371600" rtl="0" eaLnBrk="1" latinLnBrk="0" hangingPunct="1">
         <a:lnSpc>
           <a:spcPct val="90000"/>
         </a:lnSpc>
         <a:spcBef>
-          <a:spcPts val="500"/>
+          <a:spcPts val="750"/>
         </a:spcBef>
         <a:buFont typeface="Arial" panose="020B0604020202020204" pitchFamily="34" charset="0"/>
         <a:buChar char="•"/>
-        <a:defRPr sz="1800" kern="1200">
+        <a:defRPr sz="2700" kern="1200">
           <a:solidFill>
             <a:schemeClr val="tx1"/>
           </a:solidFill>
@@ -3214,8 +2859,8 @@
       <a:defPPr>
         <a:defRPr lang="en-US"/>
       </a:defPPr>
-      <a:lvl1pPr marL="0" algn="l" defTabSz="914400" rtl="0" eaLnBrk="1" latinLnBrk="0" hangingPunct="1">
-        <a:defRPr sz="1800" kern="1200">
+      <a:lvl1pPr marL="0" algn="l" defTabSz="1371600" rtl="0" eaLnBrk="1" latinLnBrk="0" hangingPunct="1">
+        <a:defRPr sz="2700" kern="1200">
           <a:solidFill>
             <a:schemeClr val="tx1"/>
           </a:solidFill>
@@ -3224,8 +2869,8 @@
           <a:cs typeface="+mn-cs"/>
         </a:defRPr>
       </a:lvl1pPr>
-      <a:lvl2pPr marL="457200" algn="l" defTabSz="914400" rtl="0" eaLnBrk="1" latinLnBrk="0" hangingPunct="1">
-        <a:defRPr sz="1800" kern="1200">
+      <a:lvl2pPr marL="685800" algn="l" defTabSz="1371600" rtl="0" eaLnBrk="1" latinLnBrk="0" hangingPunct="1">
+        <a:defRPr sz="2700" kern="1200">
           <a:solidFill>
             <a:schemeClr val="tx1"/>
           </a:solidFill>
@@ -3234,8 +2879,8 @@
           <a:cs typeface="+mn-cs"/>
         </a:defRPr>
       </a:lvl2pPr>
-      <a:lvl3pPr marL="914400" algn="l" defTabSz="914400" rtl="0" eaLnBrk="1" latinLnBrk="0" hangingPunct="1">
-        <a:defRPr sz="1800" kern="1200">
+      <a:lvl3pPr marL="1371600" algn="l" defTabSz="1371600" rtl="0" eaLnBrk="1" latinLnBrk="0" hangingPunct="1">
+        <a:defRPr sz="2700" kern="1200">
           <a:solidFill>
             <a:schemeClr val="tx1"/>
           </a:solidFill>
@@ -3244,8 +2889,8 @@
           <a:cs typeface="+mn-cs"/>
         </a:defRPr>
       </a:lvl3pPr>
-      <a:lvl4pPr marL="1371600" algn="l" defTabSz="914400" rtl="0" eaLnBrk="1" latinLnBrk="0" hangingPunct="1">
-        <a:defRPr sz="1800" kern="1200">
+      <a:lvl4pPr marL="2057400" algn="l" defTabSz="1371600" rtl="0" eaLnBrk="1" latinLnBrk="0" hangingPunct="1">
+        <a:defRPr sz="2700" kern="1200">
           <a:solidFill>
             <a:schemeClr val="tx1"/>
           </a:solidFill>
@@ -3254,8 +2899,8 @@
           <a:cs typeface="+mn-cs"/>
         </a:defRPr>
       </a:lvl4pPr>
-      <a:lvl5pPr marL="1828800" algn="l" defTabSz="914400" rtl="0" eaLnBrk="1" latinLnBrk="0" hangingPunct="1">
-        <a:defRPr sz="1800" kern="1200">
+      <a:lvl5pPr marL="2743200" algn="l" defTabSz="1371600" rtl="0" eaLnBrk="1" latinLnBrk="0" hangingPunct="1">
+        <a:defRPr sz="2700" kern="1200">
           <a:solidFill>
             <a:schemeClr val="tx1"/>
           </a:solidFill>
@@ -3264,8 +2909,8 @@
           <a:cs typeface="+mn-cs"/>
         </a:defRPr>
       </a:lvl5pPr>
-      <a:lvl6pPr marL="2286000" algn="l" defTabSz="914400" rtl="0" eaLnBrk="1" latinLnBrk="0" hangingPunct="1">
-        <a:defRPr sz="1800" kern="1200">
+      <a:lvl6pPr marL="3429000" algn="l" defTabSz="1371600" rtl="0" eaLnBrk="1" latinLnBrk="0" hangingPunct="1">
+        <a:defRPr sz="2700" kern="1200">
           <a:solidFill>
             <a:schemeClr val="tx1"/>
           </a:solidFill>
@@ -3274,8 +2919,8 @@
           <a:cs typeface="+mn-cs"/>
         </a:defRPr>
       </a:lvl6pPr>
-      <a:lvl7pPr marL="2743200" algn="l" defTabSz="914400" rtl="0" eaLnBrk="1" latinLnBrk="0" hangingPunct="1">
-        <a:defRPr sz="1800" kern="1200">
+      <a:lvl7pPr marL="4114800" algn="l" defTabSz="1371600" rtl="0" eaLnBrk="1" latinLnBrk="0" hangingPunct="1">
+        <a:defRPr sz="2700" kern="1200">
           <a:solidFill>
             <a:schemeClr val="tx1"/>
           </a:solidFill>
@@ -3284,8 +2929,8 @@
           <a:cs typeface="+mn-cs"/>
         </a:defRPr>
       </a:lvl7pPr>
-      <a:lvl8pPr marL="3200400" algn="l" defTabSz="914400" rtl="0" eaLnBrk="1" latinLnBrk="0" hangingPunct="1">
-        <a:defRPr sz="1800" kern="1200">
+      <a:lvl8pPr marL="4800600" algn="l" defTabSz="1371600" rtl="0" eaLnBrk="1" latinLnBrk="0" hangingPunct="1">
+        <a:defRPr sz="2700" kern="1200">
           <a:solidFill>
             <a:schemeClr val="tx1"/>
           </a:solidFill>
@@ -3294,8 +2939,8 @@
           <a:cs typeface="+mn-cs"/>
         </a:defRPr>
       </a:lvl8pPr>
-      <a:lvl9pPr marL="3657600" algn="l" defTabSz="914400" rtl="0" eaLnBrk="1" latinLnBrk="0" hangingPunct="1">
-        <a:defRPr sz="1800" kern="1200">
+      <a:lvl9pPr marL="5486400" algn="l" defTabSz="1371600" rtl="0" eaLnBrk="1" latinLnBrk="0" hangingPunct="1">
+        <a:defRPr sz="2700" kern="1200">
           <a:solidFill>
             <a:schemeClr val="tx1"/>
           </a:solidFill>
@@ -3328,10 +2973,10 @@
       </p:grpSpPr>
       <p:grpSp>
         <p:nvGrpSpPr>
-          <p:cNvPr id="16" name="Group 15">
+          <p:cNvPr id="2" name="Group 1">
             <a:extLst>
               <a:ext uri="{FF2B5EF4-FFF2-40B4-BE49-F238E27FC236}">
-                <a16:creationId xmlns:a16="http://schemas.microsoft.com/office/drawing/2014/main" id="{A56AAED1-5BE0-D60C-2A13-02F745997067}"/>
+                <a16:creationId xmlns:a16="http://schemas.microsoft.com/office/drawing/2014/main" id="{60E228F3-293D-8C69-E14C-5F01E0391EA5}"/>
               </a:ext>
             </a:extLst>
           </p:cNvPr>
@@ -3340,318 +2985,306 @@
         </p:nvGrpSpPr>
         <p:grpSpPr>
           <a:xfrm>
-            <a:off x="376044" y="105622"/>
-            <a:ext cx="10846197" cy="6810857"/>
-            <a:chOff x="376044" y="105622"/>
-            <a:chExt cx="10846197" cy="6810857"/>
+            <a:off x="428820" y="3119200"/>
+            <a:ext cx="11523168" cy="9417814"/>
+            <a:chOff x="428820" y="3119200"/>
+            <a:chExt cx="11523168" cy="9417814"/>
           </a:xfrm>
         </p:grpSpPr>
-        <p:grpSp>
-          <p:nvGrpSpPr>
-            <p:cNvPr id="4" name="Group 3">
+        <p:sp>
+          <p:nvSpPr>
+            <p:cNvPr id="8" name="TextBox 7">
               <a:extLst>
                 <a:ext uri="{FF2B5EF4-FFF2-40B4-BE49-F238E27FC236}">
-                  <a16:creationId xmlns:a16="http://schemas.microsoft.com/office/drawing/2014/main" id="{8A8B8E96-564E-D0C6-207A-26B435256ACA}"/>
+                  <a16:creationId xmlns:a16="http://schemas.microsoft.com/office/drawing/2014/main" id="{3B007C91-49C3-BEC5-6F27-A54C036B0AC4}"/>
                 </a:ext>
               </a:extLst>
             </p:cNvPr>
-            <p:cNvGrpSpPr/>
+            <p:cNvSpPr txBox="1"/>
             <p:nvPr/>
-          </p:nvGrpSpPr>
-          <p:grpSpPr>
+          </p:nvSpPr>
+          <p:spPr>
             <a:xfrm>
-              <a:off x="376044" y="105622"/>
-              <a:ext cx="8137866" cy="6810857"/>
-              <a:chOff x="2024090" y="303298"/>
-              <a:chExt cx="8137866" cy="6810857"/>
+              <a:off x="909084" y="3119200"/>
+              <a:ext cx="2715290" cy="369332"/>
             </a:xfrm>
-          </p:grpSpPr>
-          <p:sp>
-            <p:nvSpPr>
-              <p:cNvPr id="8" name="TextBox 7">
-                <a:extLst>
-                  <a:ext uri="{FF2B5EF4-FFF2-40B4-BE49-F238E27FC236}">
-                    <a16:creationId xmlns:a16="http://schemas.microsoft.com/office/drawing/2014/main" id="{3B007C91-49C3-BEC5-6F27-A54C036B0AC4}"/>
-                  </a:ext>
-                </a:extLst>
-              </p:cNvPr>
-              <p:cNvSpPr txBox="1"/>
-              <p:nvPr/>
-            </p:nvSpPr>
-            <p:spPr>
-              <a:xfrm>
-                <a:off x="2456120" y="303298"/>
-                <a:ext cx="2413591" cy="338554"/>
-              </a:xfrm>
-              <a:prstGeom prst="rect">
-                <a:avLst/>
-              </a:prstGeom>
-              <a:noFill/>
-            </p:spPr>
-            <p:txBody>
-              <a:bodyPr wrap="square" rtlCol="0">
-                <a:spAutoFit/>
-              </a:bodyPr>
-              <a:lstStyle/>
-              <a:p>
-                <a:pPr algn="ctr"/>
-                <a:r>
-                  <a:rPr lang="en-US" sz="1600" dirty="0">
-                    <a:highlight>
-                      <a:srgbClr val="FF0000"/>
-                    </a:highlight>
-                    <a:latin typeface="Times New Roman" panose="02020603050405020304" pitchFamily="18" charset="0"/>
-                    <a:cs typeface="Times New Roman" panose="02020603050405020304" pitchFamily="18" charset="0"/>
-                  </a:rPr>
-                  <a:t>Beggars/Provisioners</a:t>
-                </a:r>
-              </a:p>
-            </p:txBody>
-          </p:sp>
-          <p:sp>
-            <p:nvSpPr>
-              <p:cNvPr id="9" name="TextBox 8">
-                <a:extLst>
-                  <a:ext uri="{FF2B5EF4-FFF2-40B4-BE49-F238E27FC236}">
-                    <a16:creationId xmlns:a16="http://schemas.microsoft.com/office/drawing/2014/main" id="{EEA985B2-E1AE-840D-9619-E60CB871C2F3}"/>
-                  </a:ext>
-                </a:extLst>
-              </p:cNvPr>
-              <p:cNvSpPr txBox="1"/>
-              <p:nvPr/>
-            </p:nvSpPr>
-            <p:spPr>
-              <a:xfrm>
-                <a:off x="5040939" y="303298"/>
-                <a:ext cx="2413591" cy="338554"/>
-              </a:xfrm>
-              <a:prstGeom prst="rect">
-                <a:avLst/>
-              </a:prstGeom>
-              <a:noFill/>
-            </p:spPr>
-            <p:txBody>
-              <a:bodyPr wrap="square" rtlCol="0">
-                <a:spAutoFit/>
-              </a:bodyPr>
-              <a:lstStyle/>
-              <a:p>
-                <a:pPr algn="ctr"/>
-                <a:r>
-                  <a:rPr lang="en-US" sz="1600" dirty="0">
-                    <a:highlight>
-                      <a:srgbClr val="00FF00"/>
-                    </a:highlight>
-                    <a:latin typeface="Times New Roman" panose="02020603050405020304" pitchFamily="18" charset="0"/>
-                    <a:cs typeface="Times New Roman" panose="02020603050405020304" pitchFamily="18" charset="0"/>
-                  </a:rPr>
-                  <a:t>Fixed gear foragers</a:t>
-                </a:r>
-              </a:p>
-            </p:txBody>
-          </p:sp>
-          <p:sp>
-            <p:nvSpPr>
-              <p:cNvPr id="10" name="TextBox 9">
-                <a:extLst>
-                  <a:ext uri="{FF2B5EF4-FFF2-40B4-BE49-F238E27FC236}">
-                    <a16:creationId xmlns:a16="http://schemas.microsoft.com/office/drawing/2014/main" id="{9E583236-EA03-F0F8-AA3E-3B31B4C8D25C}"/>
-                  </a:ext>
-                </a:extLst>
-              </p:cNvPr>
-              <p:cNvSpPr txBox="1"/>
-              <p:nvPr/>
-            </p:nvSpPr>
-            <p:spPr>
-              <a:xfrm>
-                <a:off x="7625758" y="303298"/>
-                <a:ext cx="2413591" cy="338554"/>
-              </a:xfrm>
-              <a:prstGeom prst="rect">
-                <a:avLst/>
-              </a:prstGeom>
-              <a:noFill/>
-            </p:spPr>
-            <p:txBody>
-              <a:bodyPr wrap="square" rtlCol="0">
-                <a:spAutoFit/>
-              </a:bodyPr>
-              <a:lstStyle/>
-              <a:p>
-                <a:pPr algn="ctr"/>
-                <a:r>
-                  <a:rPr lang="en-US" sz="1600" dirty="0">
-                    <a:highlight>
-                      <a:srgbClr val="FF00FF"/>
-                    </a:highlight>
-                    <a:latin typeface="Times New Roman" panose="02020603050405020304" pitchFamily="18" charset="0"/>
-                    <a:cs typeface="Times New Roman" panose="02020603050405020304" pitchFamily="18" charset="0"/>
-                  </a:rPr>
-                  <a:t>Scavengers/Depredators</a:t>
-                </a:r>
-              </a:p>
-            </p:txBody>
-          </p:sp>
-          <p:sp>
-            <p:nvSpPr>
-              <p:cNvPr id="11" name="TextBox 10">
-                <a:extLst>
-                  <a:ext uri="{FF2B5EF4-FFF2-40B4-BE49-F238E27FC236}">
-                    <a16:creationId xmlns:a16="http://schemas.microsoft.com/office/drawing/2014/main" id="{7CDB8202-0AD7-D08E-D300-F9C3FB1752AC}"/>
-                  </a:ext>
-                </a:extLst>
-              </p:cNvPr>
-              <p:cNvSpPr txBox="1"/>
-              <p:nvPr/>
-            </p:nvSpPr>
-            <p:spPr>
-              <a:xfrm rot="16200000">
-                <a:off x="994433" y="1510093"/>
-                <a:ext cx="2413591" cy="338554"/>
-              </a:xfrm>
-              <a:prstGeom prst="rect">
-                <a:avLst/>
-              </a:prstGeom>
-              <a:noFill/>
-            </p:spPr>
-            <p:txBody>
-              <a:bodyPr wrap="square" rtlCol="0">
-                <a:spAutoFit/>
-              </a:bodyPr>
-              <a:lstStyle/>
-              <a:p>
-                <a:pPr algn="ctr"/>
-                <a:r>
-                  <a:rPr lang="en-US" sz="1600" dirty="0">
-                    <a:latin typeface="Times New Roman" panose="02020603050405020304" pitchFamily="18" charset="0"/>
-                    <a:cs typeface="Times New Roman" panose="02020603050405020304" pitchFamily="18" charset="0"/>
-                  </a:rPr>
-                  <a:t>Before</a:t>
-                </a:r>
-              </a:p>
-            </p:txBody>
-          </p:sp>
-          <p:sp>
-            <p:nvSpPr>
-              <p:cNvPr id="12" name="TextBox 11">
-                <a:extLst>
-                  <a:ext uri="{FF2B5EF4-FFF2-40B4-BE49-F238E27FC236}">
-                    <a16:creationId xmlns:a16="http://schemas.microsoft.com/office/drawing/2014/main" id="{89BA4407-F049-103E-3C06-1307B2EC1624}"/>
-                  </a:ext>
-                </a:extLst>
-              </p:cNvPr>
-              <p:cNvSpPr txBox="1"/>
-              <p:nvPr/>
-            </p:nvSpPr>
-            <p:spPr>
-              <a:xfrm rot="16200000">
-                <a:off x="986571" y="3580648"/>
-                <a:ext cx="2413591" cy="338554"/>
-              </a:xfrm>
-              <a:prstGeom prst="rect">
-                <a:avLst/>
-              </a:prstGeom>
-              <a:noFill/>
-            </p:spPr>
-            <p:txBody>
-              <a:bodyPr wrap="square" rtlCol="0">
-                <a:spAutoFit/>
-              </a:bodyPr>
-              <a:lstStyle/>
-              <a:p>
-                <a:pPr algn="ctr"/>
-                <a:r>
-                  <a:rPr lang="en-US" sz="1600" dirty="0">
-                    <a:latin typeface="Times New Roman" panose="02020603050405020304" pitchFamily="18" charset="0"/>
-                    <a:cs typeface="Times New Roman" panose="02020603050405020304" pitchFamily="18" charset="0"/>
-                  </a:rPr>
-                  <a:t>During</a:t>
-                </a:r>
-              </a:p>
-            </p:txBody>
-          </p:sp>
-          <p:sp>
-            <p:nvSpPr>
-              <p:cNvPr id="13" name="TextBox 12">
-                <a:extLst>
-                  <a:ext uri="{FF2B5EF4-FFF2-40B4-BE49-F238E27FC236}">
-                    <a16:creationId xmlns:a16="http://schemas.microsoft.com/office/drawing/2014/main" id="{6E42B6E7-0927-96FB-BDDA-7C2340A88769}"/>
-                  </a:ext>
-                </a:extLst>
-              </p:cNvPr>
-              <p:cNvSpPr txBox="1"/>
-              <p:nvPr/>
-            </p:nvSpPr>
-            <p:spPr>
-              <a:xfrm rot="16200000">
-                <a:off x="994433" y="5738083"/>
-                <a:ext cx="2413591" cy="338554"/>
-              </a:xfrm>
-              <a:prstGeom prst="rect">
-                <a:avLst/>
-              </a:prstGeom>
-              <a:noFill/>
-            </p:spPr>
-            <p:txBody>
-              <a:bodyPr wrap="square" rtlCol="0">
-                <a:spAutoFit/>
-              </a:bodyPr>
-              <a:lstStyle/>
-              <a:p>
-                <a:pPr algn="ctr"/>
-                <a:r>
-                  <a:rPr lang="en-US" sz="1600" dirty="0">
-                    <a:latin typeface="Times New Roman" panose="02020603050405020304" pitchFamily="18" charset="0"/>
-                    <a:cs typeface="Times New Roman" panose="02020603050405020304" pitchFamily="18" charset="0"/>
-                  </a:rPr>
-                  <a:t>After</a:t>
-                </a:r>
-              </a:p>
-            </p:txBody>
-          </p:sp>
-          <p:pic>
-            <p:nvPicPr>
-              <p:cNvPr id="3" name="Picture 2" descr="A collage of images of a map&#10;&#10;Description automatically generated">
-                <a:extLst>
-                  <a:ext uri="{FF2B5EF4-FFF2-40B4-BE49-F238E27FC236}">
-                    <a16:creationId xmlns:a16="http://schemas.microsoft.com/office/drawing/2014/main" id="{6D80B9ED-9ACB-6F8B-28B8-213735A48D52}"/>
-                  </a:ext>
-                </a:extLst>
-              </p:cNvPr>
-              <p:cNvPicPr>
-                <a:picLocks noChangeAspect="1"/>
-              </p:cNvPicPr>
-              <p:nvPr/>
-            </p:nvPicPr>
-            <p:blipFill>
-              <a:blip r:embed="rId2">
-                <a:extLst>
-                  <a:ext uri="{28A0092B-C50C-407E-A947-70E740481C1C}">
-                    <a14:useLocalDpi xmlns:a14="http://schemas.microsoft.com/office/drawing/2010/main" val="0"/>
-                  </a:ext>
-                </a:extLst>
-              </a:blip>
-              <a:stretch>
-                <a:fillRect/>
-              </a:stretch>
-            </p:blipFill>
-            <p:spPr>
-              <a:xfrm>
-                <a:off x="2370506" y="624840"/>
-                <a:ext cx="7791450" cy="6233160"/>
-              </a:xfrm>
-              <a:prstGeom prst="rect">
-                <a:avLst/>
-              </a:prstGeom>
-            </p:spPr>
-          </p:pic>
-        </p:grpSp>
+            <a:prstGeom prst="rect">
+              <a:avLst/>
+            </a:prstGeom>
+            <a:noFill/>
+          </p:spPr>
+          <p:txBody>
+            <a:bodyPr wrap="square" rtlCol="0">
+              <a:spAutoFit/>
+            </a:bodyPr>
+            <a:lstStyle/>
+            <a:p>
+              <a:pPr algn="ctr"/>
+              <a:r>
+                <a:rPr lang="en-US" sz="1800" dirty="0">
+                  <a:highlight>
+                    <a:srgbClr val="F6C3C0"/>
+                  </a:highlight>
+                  <a:latin typeface="Times New Roman" panose="02020603050405020304" pitchFamily="18" charset="0"/>
+                  <a:cs typeface="Times New Roman" panose="02020603050405020304" pitchFamily="18" charset="0"/>
+                </a:rPr>
+                <a:t>Beggars/Provisioners</a:t>
+              </a:r>
+            </a:p>
+          </p:txBody>
+        </p:sp>
+        <p:sp>
+          <p:nvSpPr>
+            <p:cNvPr id="9" name="TextBox 8">
+              <a:extLst>
+                <a:ext uri="{FF2B5EF4-FFF2-40B4-BE49-F238E27FC236}">
+                  <a16:creationId xmlns:a16="http://schemas.microsoft.com/office/drawing/2014/main" id="{EEA985B2-E1AE-840D-9619-E60CB871C2F3}"/>
+                </a:ext>
+              </a:extLst>
+            </p:cNvPr>
+            <p:cNvSpPr txBox="1"/>
+            <p:nvPr/>
+          </p:nvSpPr>
+          <p:spPr>
+            <a:xfrm>
+              <a:off x="3817005" y="3119200"/>
+              <a:ext cx="2715290" cy="369332"/>
+            </a:xfrm>
+            <a:prstGeom prst="rect">
+              <a:avLst/>
+            </a:prstGeom>
+            <a:noFill/>
+          </p:spPr>
+          <p:txBody>
+            <a:bodyPr wrap="square" rtlCol="0">
+              <a:spAutoFit/>
+            </a:bodyPr>
+            <a:lstStyle/>
+            <a:p>
+              <a:pPr algn="ctr"/>
+              <a:r>
+                <a:rPr lang="en-US" sz="1800" dirty="0">
+                  <a:highlight>
+                    <a:srgbClr val="99E3AE"/>
+                  </a:highlight>
+                  <a:latin typeface="Times New Roman" panose="02020603050405020304" pitchFamily="18" charset="0"/>
+                  <a:cs typeface="Times New Roman" panose="02020603050405020304" pitchFamily="18" charset="0"/>
+                </a:rPr>
+                <a:t>Fixed gear foragers</a:t>
+              </a:r>
+            </a:p>
+          </p:txBody>
+        </p:sp>
+        <p:sp>
+          <p:nvSpPr>
+            <p:cNvPr id="10" name="TextBox 9">
+              <a:extLst>
+                <a:ext uri="{FF2B5EF4-FFF2-40B4-BE49-F238E27FC236}">
+                  <a16:creationId xmlns:a16="http://schemas.microsoft.com/office/drawing/2014/main" id="{9E583236-EA03-F0F8-AA3E-3B31B4C8D25C}"/>
+                </a:ext>
+              </a:extLst>
+            </p:cNvPr>
+            <p:cNvSpPr txBox="1"/>
+            <p:nvPr/>
+          </p:nvSpPr>
+          <p:spPr>
+            <a:xfrm>
+              <a:off x="6724926" y="3119200"/>
+              <a:ext cx="2715290" cy="369332"/>
+            </a:xfrm>
+            <a:prstGeom prst="rect">
+              <a:avLst/>
+            </a:prstGeom>
+            <a:noFill/>
+          </p:spPr>
+          <p:txBody>
+            <a:bodyPr wrap="square" rtlCol="0">
+              <a:spAutoFit/>
+            </a:bodyPr>
+            <a:lstStyle/>
+            <a:p>
+              <a:pPr algn="ctr"/>
+              <a:r>
+                <a:rPr lang="en-US" sz="1800" dirty="0">
+                  <a:highlight>
+                    <a:srgbClr val="B9D0F8"/>
+                  </a:highlight>
+                  <a:latin typeface="Times New Roman" panose="02020603050405020304" pitchFamily="18" charset="0"/>
+                  <a:cs typeface="Times New Roman" panose="02020603050405020304" pitchFamily="18" charset="0"/>
+                </a:rPr>
+                <a:t>Scavengers/Depredators</a:t>
+              </a:r>
+            </a:p>
+          </p:txBody>
+        </p:sp>
+        <p:sp>
+          <p:nvSpPr>
+            <p:cNvPr id="11" name="TextBox 10">
+              <a:extLst>
+                <a:ext uri="{FF2B5EF4-FFF2-40B4-BE49-F238E27FC236}">
+                  <a16:creationId xmlns:a16="http://schemas.microsoft.com/office/drawing/2014/main" id="{7CDB8202-0AD7-D08E-D300-F9C3FB1752AC}"/>
+                </a:ext>
+              </a:extLst>
+            </p:cNvPr>
+            <p:cNvSpPr txBox="1"/>
+            <p:nvPr/>
+          </p:nvSpPr>
+          <p:spPr>
+            <a:xfrm rot="16200000">
+              <a:off x="-735314" y="4482614"/>
+              <a:ext cx="2715290" cy="369332"/>
+            </a:xfrm>
+            <a:prstGeom prst="rect">
+              <a:avLst/>
+            </a:prstGeom>
+            <a:noFill/>
+          </p:spPr>
+          <p:txBody>
+            <a:bodyPr wrap="square" rtlCol="0">
+              <a:spAutoFit/>
+            </a:bodyPr>
+            <a:lstStyle/>
+            <a:p>
+              <a:pPr algn="ctr"/>
+              <a:r>
+                <a:rPr lang="en-US" sz="1800" dirty="0">
+                  <a:highlight>
+                    <a:srgbClr val="FFEBEC"/>
+                  </a:highlight>
+                  <a:latin typeface="Times New Roman" panose="02020603050405020304" pitchFamily="18" charset="0"/>
+                  <a:cs typeface="Times New Roman" panose="02020603050405020304" pitchFamily="18" charset="0"/>
+                </a:rPr>
+                <a:t>Before</a:t>
+              </a:r>
+            </a:p>
+          </p:txBody>
+        </p:sp>
+        <p:sp>
+          <p:nvSpPr>
+            <p:cNvPr id="12" name="TextBox 11">
+              <a:extLst>
+                <a:ext uri="{FF2B5EF4-FFF2-40B4-BE49-F238E27FC236}">
+                  <a16:creationId xmlns:a16="http://schemas.microsoft.com/office/drawing/2014/main" id="{89BA4407-F049-103E-3C06-1307B2EC1624}"/>
+                </a:ext>
+              </a:extLst>
+            </p:cNvPr>
+            <p:cNvSpPr txBox="1"/>
+            <p:nvPr/>
+          </p:nvSpPr>
+          <p:spPr>
+            <a:xfrm rot="16200000">
+              <a:off x="-744159" y="6811989"/>
+              <a:ext cx="2715290" cy="369332"/>
+            </a:xfrm>
+            <a:prstGeom prst="rect">
+              <a:avLst/>
+            </a:prstGeom>
+            <a:noFill/>
+          </p:spPr>
+          <p:txBody>
+            <a:bodyPr wrap="square" rtlCol="0">
+              <a:spAutoFit/>
+            </a:bodyPr>
+            <a:lstStyle/>
+            <a:p>
+              <a:pPr algn="ctr"/>
+              <a:r>
+                <a:rPr lang="en-US" sz="1800" dirty="0">
+                  <a:highlight>
+                    <a:srgbClr val="FF9899"/>
+                  </a:highlight>
+                  <a:latin typeface="Times New Roman" panose="02020603050405020304" pitchFamily="18" charset="0"/>
+                  <a:cs typeface="Times New Roman" panose="02020603050405020304" pitchFamily="18" charset="0"/>
+                </a:rPr>
+                <a:t>During</a:t>
+              </a:r>
+            </a:p>
+          </p:txBody>
+        </p:sp>
+        <p:sp>
+          <p:nvSpPr>
+            <p:cNvPr id="13" name="TextBox 12">
+              <a:extLst>
+                <a:ext uri="{FF2B5EF4-FFF2-40B4-BE49-F238E27FC236}">
+                  <a16:creationId xmlns:a16="http://schemas.microsoft.com/office/drawing/2014/main" id="{6E42B6E7-0927-96FB-BDDA-7C2340A88769}"/>
+                </a:ext>
+              </a:extLst>
+            </p:cNvPr>
+            <p:cNvSpPr txBox="1"/>
+            <p:nvPr/>
+          </p:nvSpPr>
+          <p:spPr>
+            <a:xfrm rot="16200000">
+              <a:off x="-735314" y="9239103"/>
+              <a:ext cx="2715290" cy="369332"/>
+            </a:xfrm>
+            <a:prstGeom prst="rect">
+              <a:avLst/>
+            </a:prstGeom>
+            <a:noFill/>
+          </p:spPr>
+          <p:txBody>
+            <a:bodyPr wrap="square" rtlCol="0">
+              <a:spAutoFit/>
+            </a:bodyPr>
+            <a:lstStyle/>
+            <a:p>
+              <a:pPr algn="ctr"/>
+              <a:r>
+                <a:rPr lang="en-US" sz="1800" dirty="0">
+                  <a:highlight>
+                    <a:srgbClr val="FEC2C2"/>
+                  </a:highlight>
+                  <a:latin typeface="Times New Roman" panose="02020603050405020304" pitchFamily="18" charset="0"/>
+                  <a:cs typeface="Times New Roman" panose="02020603050405020304" pitchFamily="18" charset="0"/>
+                </a:rPr>
+                <a:t>After</a:t>
+              </a:r>
+            </a:p>
+          </p:txBody>
+        </p:sp>
         <p:pic>
           <p:nvPicPr>
-            <p:cNvPr id="5" name="Picture 4" descr="A graph of a graph showing different colored lines&#10;&#10;Description automatically generated with medium confidence">
+            <p:cNvPr id="6" name="Picture 5" descr="A group of images of different colored dots&#10;&#10;Description automatically generated">
               <a:extLst>
                 <a:ext uri="{FF2B5EF4-FFF2-40B4-BE49-F238E27FC236}">
-                  <a16:creationId xmlns:a16="http://schemas.microsoft.com/office/drawing/2014/main" id="{ADA75573-B364-F3C4-FE31-374AB5D2FFE7}"/>
+                  <a16:creationId xmlns:a16="http://schemas.microsoft.com/office/drawing/2014/main" id="{96AAFA5F-1376-6426-D5C7-DC34CB1D8280}"/>
+                </a:ext>
+              </a:extLst>
+            </p:cNvPr>
+            <p:cNvPicPr>
+              <a:picLocks noChangeAspect="1"/>
+            </p:cNvPicPr>
+            <p:nvPr/>
+          </p:nvPicPr>
+          <p:blipFill>
+            <a:blip r:embed="rId2">
+              <a:extLst>
+                <a:ext uri="{28A0092B-C50C-407E-A947-70E740481C1C}">
+                  <a14:useLocalDpi xmlns:a14="http://schemas.microsoft.com/office/drawing/2010/main" val="0"/>
+                </a:ext>
+              </a:extLst>
+            </a:blip>
+            <a:stretch>
+              <a:fillRect/>
+            </a:stretch>
+          </p:blipFill>
+          <p:spPr>
+            <a:xfrm>
+              <a:off x="798152" y="3488532"/>
+              <a:ext cx="8789527" cy="7031622"/>
+            </a:xfrm>
+            <a:prstGeom prst="rect">
+              <a:avLst/>
+            </a:prstGeom>
+          </p:spPr>
+        </p:pic>
+        <p:pic>
+          <p:nvPicPr>
+            <p:cNvPr id="17" name="Picture 16" descr="A diagram of a graph&#10;&#10;Description automatically generated with medium confidence">
+              <a:extLst>
+                <a:ext uri="{FF2B5EF4-FFF2-40B4-BE49-F238E27FC236}">
+                  <a16:creationId xmlns:a16="http://schemas.microsoft.com/office/drawing/2014/main" id="{E21403FA-1B75-D25B-DC4E-E8F7D1531104}"/>
                 </a:ext>
               </a:extLst>
             </p:cNvPr>
@@ -3668,13 +3301,13 @@
                 </a:ext>
               </a:extLst>
             </a:blip>
-            <a:srcRect l="5101" t="5907" r="5969" b="16731"/>
+            <a:srcRect l="9186" t="6381" r="29504" b="10572"/>
             <a:stretch/>
           </p:blipFill>
           <p:spPr>
-            <a:xfrm>
-              <a:off x="8513910" y="444176"/>
-              <a:ext cx="2622717" cy="1901277"/>
+            <a:xfrm rot="5400000">
+              <a:off x="1420321" y="10267317"/>
+              <a:ext cx="1913467" cy="2419141"/>
             </a:xfrm>
             <a:prstGeom prst="rect">
               <a:avLst/>
@@ -3683,10 +3316,10 @@
         </p:pic>
         <p:pic>
           <p:nvPicPr>
-            <p:cNvPr id="7" name="Picture 6" descr="A graph of different colored lines&#10;&#10;Description automatically generated">
+            <p:cNvPr id="19" name="Picture 18" descr="A diagram of different stages of period&#10;&#10;Description automatically generated">
               <a:extLst>
                 <a:ext uri="{FF2B5EF4-FFF2-40B4-BE49-F238E27FC236}">
-                  <a16:creationId xmlns:a16="http://schemas.microsoft.com/office/drawing/2014/main" id="{426B64AB-E32E-C4F3-285F-6064801A260A}"/>
+                  <a16:creationId xmlns:a16="http://schemas.microsoft.com/office/drawing/2014/main" id="{A1D6D0D3-B12A-0689-E8BA-E09CC8FB9228}"/>
                 </a:ext>
               </a:extLst>
             </p:cNvPr>
@@ -3703,13 +3336,13 @@
                 </a:ext>
               </a:extLst>
             </a:blip>
-            <a:srcRect l="6194" t="5908" r="6194" b="16811"/>
+            <a:srcRect l="7634" t="6533" r="30193" b="18582"/>
             <a:stretch/>
           </p:blipFill>
           <p:spPr>
-            <a:xfrm>
-              <a:off x="8488442" y="2462835"/>
-              <a:ext cx="2733799" cy="2009554"/>
+            <a:xfrm rot="5400000">
+              <a:off x="4312074" y="10267317"/>
+              <a:ext cx="1913467" cy="2419141"/>
             </a:xfrm>
             <a:prstGeom prst="rect">
               <a:avLst/>
@@ -3718,10 +3351,10 @@
         </p:pic>
         <p:pic>
           <p:nvPicPr>
-            <p:cNvPr id="15" name="Picture 14" descr="A graph of a function&#10;&#10;Description automatically generated with medium confidence">
+            <p:cNvPr id="21" name="Picture 20" descr="A diagram of different shapes&#10;&#10;Description automatically generated with medium confidence">
               <a:extLst>
                 <a:ext uri="{FF2B5EF4-FFF2-40B4-BE49-F238E27FC236}">
-                  <a16:creationId xmlns:a16="http://schemas.microsoft.com/office/drawing/2014/main" id="{F22582F8-C8A7-35FB-C13E-8694B75116EC}"/>
+                  <a16:creationId xmlns:a16="http://schemas.microsoft.com/office/drawing/2014/main" id="{B57BFF0E-6503-9871-0A35-83FA325A97FE}"/>
                 </a:ext>
               </a:extLst>
             </p:cNvPr>
@@ -3738,13 +3371,118 @@
                 </a:ext>
               </a:extLst>
             </a:blip>
-            <a:srcRect l="6194" t="6130" r="6194" b="10819"/>
+            <a:srcRect l="8933" t="5003" r="28133" b="11714"/>
+            <a:stretch/>
+          </p:blipFill>
+          <p:spPr>
+            <a:xfrm rot="5400000">
+              <a:off x="7175934" y="10398603"/>
+              <a:ext cx="1913467" cy="2363355"/>
+            </a:xfrm>
+            <a:prstGeom prst="rect">
+              <a:avLst/>
+            </a:prstGeom>
+          </p:spPr>
+        </p:pic>
+        <p:pic>
+          <p:nvPicPr>
+            <p:cNvPr id="23" name="Picture 22" descr="A diagram of a graph&#10;&#10;Description automatically generated with medium confidence">
+              <a:extLst>
+                <a:ext uri="{FF2B5EF4-FFF2-40B4-BE49-F238E27FC236}">
+                  <a16:creationId xmlns:a16="http://schemas.microsoft.com/office/drawing/2014/main" id="{7820E37C-8F24-3E9A-16E1-9B1972ACF3F4}"/>
+                </a:ext>
+              </a:extLst>
+            </p:cNvPr>
+            <p:cNvPicPr>
+              <a:picLocks noChangeAspect="1"/>
+            </p:cNvPicPr>
+            <p:nvPr/>
+          </p:nvPicPr>
+          <p:blipFill rotWithShape="1">
+            <a:blip r:embed="rId6">
+              <a:extLst>
+                <a:ext uri="{28A0092B-C50C-407E-A947-70E740481C1C}">
+                  <a14:useLocalDpi xmlns:a14="http://schemas.microsoft.com/office/drawing/2010/main" val="0"/>
+                </a:ext>
+              </a:extLst>
+            </a:blip>
+            <a:srcRect l="4735" t="7715" r="15616" b="13048"/>
             <a:stretch/>
           </p:blipFill>
           <p:spPr>
             <a:xfrm>
-              <a:off x="8513910" y="4658079"/>
-              <a:ext cx="2543903" cy="2009554"/>
+              <a:off x="9587679" y="3609941"/>
+              <a:ext cx="2277494" cy="2114678"/>
+            </a:xfrm>
+            <a:prstGeom prst="rect">
+              <a:avLst/>
+            </a:prstGeom>
+          </p:spPr>
+        </p:pic>
+        <p:pic>
+          <p:nvPicPr>
+            <p:cNvPr id="25" name="Picture 24" descr="A diagram of a graph&#10;&#10;Description automatically generated with medium confidence">
+              <a:extLst>
+                <a:ext uri="{FF2B5EF4-FFF2-40B4-BE49-F238E27FC236}">
+                  <a16:creationId xmlns:a16="http://schemas.microsoft.com/office/drawing/2014/main" id="{F61E5D77-5AB8-B0BE-B6CB-72CF0FE88A4F}"/>
+                </a:ext>
+              </a:extLst>
+            </p:cNvPr>
+            <p:cNvPicPr>
+              <a:picLocks noChangeAspect="1"/>
+            </p:cNvPicPr>
+            <p:nvPr/>
+          </p:nvPicPr>
+          <p:blipFill rotWithShape="1">
+            <a:blip r:embed="rId7">
+              <a:extLst>
+                <a:ext uri="{28A0092B-C50C-407E-A947-70E740481C1C}">
+                  <a14:useLocalDpi xmlns:a14="http://schemas.microsoft.com/office/drawing/2010/main" val="0"/>
+                </a:ext>
+              </a:extLst>
+            </a:blip>
+            <a:srcRect l="4735" t="5004" r="15616" b="12476"/>
+            <a:stretch/>
+          </p:blipFill>
+          <p:spPr>
+            <a:xfrm>
+              <a:off x="9686220" y="5939316"/>
+              <a:ext cx="2186910" cy="2114678"/>
+            </a:xfrm>
+            <a:prstGeom prst="rect">
+              <a:avLst/>
+            </a:prstGeom>
+          </p:spPr>
+        </p:pic>
+        <p:pic>
+          <p:nvPicPr>
+            <p:cNvPr id="27" name="Picture 26" descr="A diagram of a graph&#10;&#10;Description automatically generated with medium confidence">
+              <a:extLst>
+                <a:ext uri="{FF2B5EF4-FFF2-40B4-BE49-F238E27FC236}">
+                  <a16:creationId xmlns:a16="http://schemas.microsoft.com/office/drawing/2014/main" id="{D3E0CA58-CE3E-6F51-C410-6C8DD8782B83}"/>
+                </a:ext>
+              </a:extLst>
+            </p:cNvPr>
+            <p:cNvPicPr>
+              <a:picLocks noChangeAspect="1"/>
+            </p:cNvPicPr>
+            <p:nvPr/>
+          </p:nvPicPr>
+          <p:blipFill rotWithShape="1">
+            <a:blip r:embed="rId8">
+              <a:extLst>
+                <a:ext uri="{28A0092B-C50C-407E-A947-70E740481C1C}">
+                  <a14:useLocalDpi xmlns:a14="http://schemas.microsoft.com/office/drawing/2010/main" val="0"/>
+                </a:ext>
+              </a:extLst>
+            </a:blip>
+            <a:srcRect l="4735" t="5003" r="15616" b="11143"/>
+            <a:stretch/>
+          </p:blipFill>
+          <p:spPr>
+            <a:xfrm>
+              <a:off x="9686220" y="8268691"/>
+              <a:ext cx="2265768" cy="2226332"/>
             </a:xfrm>
             <a:prstGeom prst="rect">
               <a:avLst/>
@@ -3768,7 +3506,7 @@
 <file path=ppt/theme/theme1.xml><?xml version="1.0" encoding="utf-8"?>
 <a:theme xmlns:a="http://schemas.openxmlformats.org/drawingml/2006/main" name="Office Theme">
   <a:themeElements>
-    <a:clrScheme name="Office">
+    <a:clrScheme name="Office Theme">
       <a:dk1>
         <a:sysClr val="windowText" lastClr="000000"/>
       </a:dk1>
@@ -3806,7 +3544,7 @@
         <a:srgbClr val="954F72"/>
       </a:folHlink>
     </a:clrScheme>
-    <a:fontScheme name="Office">
+    <a:fontScheme name="Office Theme">
       <a:majorFont>
         <a:latin typeface="Calibri Light" panose="020F0302020204030204"/>
         <a:ea typeface=""/>
@@ -3841,23 +3579,6 @@
         <a:font script="Viet" typeface="Times New Roman"/>
         <a:font script="Uigh" typeface="Microsoft Uighur"/>
         <a:font script="Geor" typeface="Sylfaen"/>
-        <a:font script="Armn" typeface="Arial"/>
-        <a:font script="Bugi" typeface="Leelawadee UI"/>
-        <a:font script="Bopo" typeface="Microsoft JhengHei"/>
-        <a:font script="Java" typeface="Javanese Text"/>
-        <a:font script="Lisu" typeface="Segoe UI"/>
-        <a:font script="Mymr" typeface="Myanmar Text"/>
-        <a:font script="Nkoo" typeface="Ebrima"/>
-        <a:font script="Olck" typeface="Nirmala UI"/>
-        <a:font script="Osma" typeface="Ebrima"/>
-        <a:font script="Phag" typeface="Phagspa"/>
-        <a:font script="Syrn" typeface="Estrangelo Edessa"/>
-        <a:font script="Syrj" typeface="Estrangelo Edessa"/>
-        <a:font script="Syre" typeface="Estrangelo Edessa"/>
-        <a:font script="Sora" typeface="Nirmala UI"/>
-        <a:font script="Tale" typeface="Microsoft Tai Le"/>
-        <a:font script="Talu" typeface="Microsoft New Tai Lue"/>
-        <a:font script="Tfng" typeface="Ebrima"/>
       </a:majorFont>
       <a:minorFont>
         <a:latin typeface="Calibri" panose="020F0502020204030204"/>
@@ -3893,26 +3614,9 @@
         <a:font script="Viet" typeface="Arial"/>
         <a:font script="Uigh" typeface="Microsoft Uighur"/>
         <a:font script="Geor" typeface="Sylfaen"/>
-        <a:font script="Armn" typeface="Arial"/>
-        <a:font script="Bugi" typeface="Leelawadee UI"/>
-        <a:font script="Bopo" typeface="Microsoft JhengHei"/>
-        <a:font script="Java" typeface="Javanese Text"/>
-        <a:font script="Lisu" typeface="Segoe UI"/>
-        <a:font script="Mymr" typeface="Myanmar Text"/>
-        <a:font script="Nkoo" typeface="Ebrima"/>
-        <a:font script="Olck" typeface="Nirmala UI"/>
-        <a:font script="Osma" typeface="Ebrima"/>
-        <a:font script="Phag" typeface="Phagspa"/>
-        <a:font script="Syrn" typeface="Estrangelo Edessa"/>
-        <a:font script="Syrj" typeface="Estrangelo Edessa"/>
-        <a:font script="Syre" typeface="Estrangelo Edessa"/>
-        <a:font script="Sora" typeface="Nirmala UI"/>
-        <a:font script="Tale" typeface="Microsoft Tai Le"/>
-        <a:font script="Talu" typeface="Microsoft New Tai Lue"/>
-        <a:font script="Tfng" typeface="Ebrima"/>
       </a:minorFont>
     </a:fontScheme>
-    <a:fmtScheme name="Office">
+    <a:fmtScheme name="Office Theme">
       <a:fillStyleLst>
         <a:solidFill>
           <a:schemeClr val="phClr"/>
@@ -4054,7 +3758,7 @@
   <a:extraClrSchemeLst/>
   <a:extLst>
     <a:ext uri="{05A4C25C-085E-4340-85A3-A5531E510DB2}">
-      <thm15:themeFamily xmlns:thm15="http://schemas.microsoft.com/office/thememl/2012/main" name="Office Theme" id="{62F939B6-93AF-4DB8-9C6B-D6C7DFDC589F}" vid="{4A3C46E8-61CC-4603-A589-7422A47A8E4A}"/>
+      <thm15:themeFamily xmlns:thm15="http://schemas.microsoft.com/office/thememl/2012/main" name="Office 2013 - 2022 Theme" id="{62F939B6-93AF-4DB8-9C6B-D6C7DFDC589F}" vid="{4A3C46E8-61CC-4603-A589-7422A47A8E4A}"/>
     </a:ext>
   </a:extLst>
 </a:theme>

</xml_diff>

<commit_message>
Fix hypothesis one data
</commit_message>
<xml_diff>
--- a/figs/networks.pptx
+++ b/figs/networks.pptx
@@ -6,6 +6,7 @@
   </p:sldMasterIdLst>
   <p:sldIdLst>
     <p:sldId id="256" r:id="rId2"/>
+    <p:sldId id="257" r:id="rId3"/>
   </p:sldIdLst>
   <p:sldSz cx="13716000" cy="13716000"/>
   <p:notesSz cx="6858000" cy="9144000"/>
@@ -243,7 +244,7 @@
           <a:p>
             <a:fld id="{85B3B054-712A-47A7-A562-EFC3154E7950}" type="datetimeFigureOut">
               <a:rPr lang="en-US" smtClean="0"/>
-              <a:t>2/14/2024</a:t>
+              <a:t>2/18/2024</a:t>
             </a:fld>
             <a:endParaRPr lang="en-US"/>
           </a:p>
@@ -413,7 +414,7 @@
           <a:p>
             <a:fld id="{85B3B054-712A-47A7-A562-EFC3154E7950}" type="datetimeFigureOut">
               <a:rPr lang="en-US" smtClean="0"/>
-              <a:t>2/14/2024</a:t>
+              <a:t>2/18/2024</a:t>
             </a:fld>
             <a:endParaRPr lang="en-US"/>
           </a:p>
@@ -593,7 +594,7 @@
           <a:p>
             <a:fld id="{85B3B054-712A-47A7-A562-EFC3154E7950}" type="datetimeFigureOut">
               <a:rPr lang="en-US" smtClean="0"/>
-              <a:t>2/14/2024</a:t>
+              <a:t>2/18/2024</a:t>
             </a:fld>
             <a:endParaRPr lang="en-US"/>
           </a:p>
@@ -763,7 +764,7 @@
           <a:p>
             <a:fld id="{85B3B054-712A-47A7-A562-EFC3154E7950}" type="datetimeFigureOut">
               <a:rPr lang="en-US" smtClean="0"/>
-              <a:t>2/14/2024</a:t>
+              <a:t>2/18/2024</a:t>
             </a:fld>
             <a:endParaRPr lang="en-US"/>
           </a:p>
@@ -1007,7 +1008,7 @@
           <a:p>
             <a:fld id="{85B3B054-712A-47A7-A562-EFC3154E7950}" type="datetimeFigureOut">
               <a:rPr lang="en-US" smtClean="0"/>
-              <a:t>2/14/2024</a:t>
+              <a:t>2/18/2024</a:t>
             </a:fld>
             <a:endParaRPr lang="en-US"/>
           </a:p>
@@ -1239,7 +1240,7 @@
           <a:p>
             <a:fld id="{85B3B054-712A-47A7-A562-EFC3154E7950}" type="datetimeFigureOut">
               <a:rPr lang="en-US" smtClean="0"/>
-              <a:t>2/14/2024</a:t>
+              <a:t>2/18/2024</a:t>
             </a:fld>
             <a:endParaRPr lang="en-US"/>
           </a:p>
@@ -1606,7 +1607,7 @@
           <a:p>
             <a:fld id="{85B3B054-712A-47A7-A562-EFC3154E7950}" type="datetimeFigureOut">
               <a:rPr lang="en-US" smtClean="0"/>
-              <a:t>2/14/2024</a:t>
+              <a:t>2/18/2024</a:t>
             </a:fld>
             <a:endParaRPr lang="en-US"/>
           </a:p>
@@ -1724,7 +1725,7 @@
           <a:p>
             <a:fld id="{85B3B054-712A-47A7-A562-EFC3154E7950}" type="datetimeFigureOut">
               <a:rPr lang="en-US" smtClean="0"/>
-              <a:t>2/14/2024</a:t>
+              <a:t>2/18/2024</a:t>
             </a:fld>
             <a:endParaRPr lang="en-US"/>
           </a:p>
@@ -1819,7 +1820,7 @@
           <a:p>
             <a:fld id="{85B3B054-712A-47A7-A562-EFC3154E7950}" type="datetimeFigureOut">
               <a:rPr lang="en-US" smtClean="0"/>
-              <a:t>2/14/2024</a:t>
+              <a:t>2/18/2024</a:t>
             </a:fld>
             <a:endParaRPr lang="en-US"/>
           </a:p>
@@ -2096,7 +2097,7 @@
           <a:p>
             <a:fld id="{85B3B054-712A-47A7-A562-EFC3154E7950}" type="datetimeFigureOut">
               <a:rPr lang="en-US" smtClean="0"/>
-              <a:t>2/14/2024</a:t>
+              <a:t>2/18/2024</a:t>
             </a:fld>
             <a:endParaRPr lang="en-US"/>
           </a:p>
@@ -2353,7 +2354,7 @@
           <a:p>
             <a:fld id="{85B3B054-712A-47A7-A562-EFC3154E7950}" type="datetimeFigureOut">
               <a:rPr lang="en-US" smtClean="0"/>
-              <a:t>2/14/2024</a:t>
+              <a:t>2/18/2024</a:t>
             </a:fld>
             <a:endParaRPr lang="en-US"/>
           </a:p>
@@ -2566,7 +2567,7 @@
           <a:p>
             <a:fld id="{85B3B054-712A-47A7-A562-EFC3154E7950}" type="datetimeFigureOut">
               <a:rPr lang="en-US" smtClean="0"/>
-              <a:t>2/14/2024</a:t>
+              <a:t>2/18/2024</a:t>
             </a:fld>
             <a:endParaRPr lang="en-US"/>
           </a:p>
@@ -2973,10 +2974,10 @@
       </p:grpSpPr>
       <p:grpSp>
         <p:nvGrpSpPr>
-          <p:cNvPr id="2" name="Group 1">
+          <p:cNvPr id="3" name="Group 2">
             <a:extLst>
               <a:ext uri="{FF2B5EF4-FFF2-40B4-BE49-F238E27FC236}">
-                <a16:creationId xmlns:a16="http://schemas.microsoft.com/office/drawing/2014/main" id="{60E228F3-293D-8C69-E14C-5F01E0391EA5}"/>
+                <a16:creationId xmlns:a16="http://schemas.microsoft.com/office/drawing/2014/main" id="{B182945F-3AC6-6FD4-96BD-17AA37706BB7}"/>
               </a:ext>
             </a:extLst>
           </p:cNvPr>
@@ -2991,264 +2992,582 @@
             <a:chExt cx="11523168" cy="9417814"/>
           </a:xfrm>
         </p:grpSpPr>
-        <p:sp>
-          <p:nvSpPr>
-            <p:cNvPr id="8" name="TextBox 7">
+        <p:grpSp>
+          <p:nvGrpSpPr>
+            <p:cNvPr id="2" name="Group 1">
               <a:extLst>
                 <a:ext uri="{FF2B5EF4-FFF2-40B4-BE49-F238E27FC236}">
-                  <a16:creationId xmlns:a16="http://schemas.microsoft.com/office/drawing/2014/main" id="{3B007C91-49C3-BEC5-6F27-A54C036B0AC4}"/>
+                  <a16:creationId xmlns:a16="http://schemas.microsoft.com/office/drawing/2014/main" id="{60E228F3-293D-8C69-E14C-5F01E0391EA5}"/>
                 </a:ext>
               </a:extLst>
             </p:cNvPr>
-            <p:cNvSpPr txBox="1"/>
+            <p:cNvGrpSpPr/>
             <p:nvPr/>
-          </p:nvSpPr>
+          </p:nvGrpSpPr>
+          <p:grpSpPr>
+            <a:xfrm>
+              <a:off x="428820" y="3119200"/>
+              <a:ext cx="11523168" cy="9417814"/>
+              <a:chOff x="428820" y="3119200"/>
+              <a:chExt cx="11523168" cy="9417814"/>
+            </a:xfrm>
+          </p:grpSpPr>
+          <p:sp>
+            <p:nvSpPr>
+              <p:cNvPr id="8" name="TextBox 7">
+                <a:extLst>
+                  <a:ext uri="{FF2B5EF4-FFF2-40B4-BE49-F238E27FC236}">
+                    <a16:creationId xmlns:a16="http://schemas.microsoft.com/office/drawing/2014/main" id="{3B007C91-49C3-BEC5-6F27-A54C036B0AC4}"/>
+                  </a:ext>
+                </a:extLst>
+              </p:cNvPr>
+              <p:cNvSpPr txBox="1"/>
+              <p:nvPr/>
+            </p:nvSpPr>
+            <p:spPr>
+              <a:xfrm>
+                <a:off x="909084" y="3119200"/>
+                <a:ext cx="2715290" cy="369332"/>
+              </a:xfrm>
+              <a:prstGeom prst="rect">
+                <a:avLst/>
+              </a:prstGeom>
+              <a:noFill/>
+            </p:spPr>
+            <p:txBody>
+              <a:bodyPr wrap="square" rtlCol="0">
+                <a:spAutoFit/>
+              </a:bodyPr>
+              <a:lstStyle/>
+              <a:p>
+                <a:pPr algn="ctr"/>
+                <a:r>
+                  <a:rPr lang="en-US" sz="1800" dirty="0">
+                    <a:highlight>
+                      <a:srgbClr val="F6C3C0"/>
+                    </a:highlight>
+                    <a:latin typeface="Times New Roman" panose="02020603050405020304" pitchFamily="18" charset="0"/>
+                    <a:cs typeface="Times New Roman" panose="02020603050405020304" pitchFamily="18" charset="0"/>
+                  </a:rPr>
+                  <a:t>Beggars/Provisioners</a:t>
+                </a:r>
+              </a:p>
+            </p:txBody>
+          </p:sp>
+          <p:sp>
+            <p:nvSpPr>
+              <p:cNvPr id="9" name="TextBox 8">
+                <a:extLst>
+                  <a:ext uri="{FF2B5EF4-FFF2-40B4-BE49-F238E27FC236}">
+                    <a16:creationId xmlns:a16="http://schemas.microsoft.com/office/drawing/2014/main" id="{EEA985B2-E1AE-840D-9619-E60CB871C2F3}"/>
+                  </a:ext>
+                </a:extLst>
+              </p:cNvPr>
+              <p:cNvSpPr txBox="1"/>
+              <p:nvPr/>
+            </p:nvSpPr>
+            <p:spPr>
+              <a:xfrm>
+                <a:off x="3817005" y="3119200"/>
+                <a:ext cx="2715290" cy="369332"/>
+              </a:xfrm>
+              <a:prstGeom prst="rect">
+                <a:avLst/>
+              </a:prstGeom>
+              <a:noFill/>
+            </p:spPr>
+            <p:txBody>
+              <a:bodyPr wrap="square" rtlCol="0">
+                <a:spAutoFit/>
+              </a:bodyPr>
+              <a:lstStyle/>
+              <a:p>
+                <a:pPr algn="ctr"/>
+                <a:r>
+                  <a:rPr lang="en-US" sz="1800" dirty="0">
+                    <a:highlight>
+                      <a:srgbClr val="99E3AE"/>
+                    </a:highlight>
+                    <a:latin typeface="Times New Roman" panose="02020603050405020304" pitchFamily="18" charset="0"/>
+                    <a:cs typeface="Times New Roman" panose="02020603050405020304" pitchFamily="18" charset="0"/>
+                  </a:rPr>
+                  <a:t>Fixed gear foragers</a:t>
+                </a:r>
+              </a:p>
+            </p:txBody>
+          </p:sp>
+          <p:sp>
+            <p:nvSpPr>
+              <p:cNvPr id="10" name="TextBox 9">
+                <a:extLst>
+                  <a:ext uri="{FF2B5EF4-FFF2-40B4-BE49-F238E27FC236}">
+                    <a16:creationId xmlns:a16="http://schemas.microsoft.com/office/drawing/2014/main" id="{9E583236-EA03-F0F8-AA3E-3B31B4C8D25C}"/>
+                  </a:ext>
+                </a:extLst>
+              </p:cNvPr>
+              <p:cNvSpPr txBox="1"/>
+              <p:nvPr/>
+            </p:nvSpPr>
+            <p:spPr>
+              <a:xfrm>
+                <a:off x="6724926" y="3119200"/>
+                <a:ext cx="2715290" cy="369332"/>
+              </a:xfrm>
+              <a:prstGeom prst="rect">
+                <a:avLst/>
+              </a:prstGeom>
+              <a:noFill/>
+            </p:spPr>
+            <p:txBody>
+              <a:bodyPr wrap="square" rtlCol="0">
+                <a:spAutoFit/>
+              </a:bodyPr>
+              <a:lstStyle/>
+              <a:p>
+                <a:pPr algn="ctr"/>
+                <a:r>
+                  <a:rPr lang="en-US" sz="1800" dirty="0">
+                    <a:highlight>
+                      <a:srgbClr val="B9D0F8"/>
+                    </a:highlight>
+                    <a:latin typeface="Times New Roman" panose="02020603050405020304" pitchFamily="18" charset="0"/>
+                    <a:cs typeface="Times New Roman" panose="02020603050405020304" pitchFamily="18" charset="0"/>
+                  </a:rPr>
+                  <a:t>Scavengers/Depredators</a:t>
+                </a:r>
+              </a:p>
+            </p:txBody>
+          </p:sp>
+          <p:sp>
+            <p:nvSpPr>
+              <p:cNvPr id="11" name="TextBox 10">
+                <a:extLst>
+                  <a:ext uri="{FF2B5EF4-FFF2-40B4-BE49-F238E27FC236}">
+                    <a16:creationId xmlns:a16="http://schemas.microsoft.com/office/drawing/2014/main" id="{7CDB8202-0AD7-D08E-D300-F9C3FB1752AC}"/>
+                  </a:ext>
+                </a:extLst>
+              </p:cNvPr>
+              <p:cNvSpPr txBox="1"/>
+              <p:nvPr/>
+            </p:nvSpPr>
+            <p:spPr>
+              <a:xfrm rot="16200000">
+                <a:off x="-735314" y="4482614"/>
+                <a:ext cx="2715290" cy="369332"/>
+              </a:xfrm>
+              <a:prstGeom prst="rect">
+                <a:avLst/>
+              </a:prstGeom>
+              <a:noFill/>
+            </p:spPr>
+            <p:txBody>
+              <a:bodyPr wrap="square" rtlCol="0">
+                <a:spAutoFit/>
+              </a:bodyPr>
+              <a:lstStyle/>
+              <a:p>
+                <a:pPr algn="ctr"/>
+                <a:r>
+                  <a:rPr lang="en-US" sz="1800" dirty="0">
+                    <a:highlight>
+                      <a:srgbClr val="FFEBEC"/>
+                    </a:highlight>
+                    <a:latin typeface="Times New Roman" panose="02020603050405020304" pitchFamily="18" charset="0"/>
+                    <a:cs typeface="Times New Roman" panose="02020603050405020304" pitchFamily="18" charset="0"/>
+                  </a:rPr>
+                  <a:t>Before</a:t>
+                </a:r>
+              </a:p>
+            </p:txBody>
+          </p:sp>
+          <p:sp>
+            <p:nvSpPr>
+              <p:cNvPr id="12" name="TextBox 11">
+                <a:extLst>
+                  <a:ext uri="{FF2B5EF4-FFF2-40B4-BE49-F238E27FC236}">
+                    <a16:creationId xmlns:a16="http://schemas.microsoft.com/office/drawing/2014/main" id="{89BA4407-F049-103E-3C06-1307B2EC1624}"/>
+                  </a:ext>
+                </a:extLst>
+              </p:cNvPr>
+              <p:cNvSpPr txBox="1"/>
+              <p:nvPr/>
+            </p:nvSpPr>
+            <p:spPr>
+              <a:xfrm rot="16200000">
+                <a:off x="-744159" y="6811989"/>
+                <a:ext cx="2715290" cy="369332"/>
+              </a:xfrm>
+              <a:prstGeom prst="rect">
+                <a:avLst/>
+              </a:prstGeom>
+              <a:noFill/>
+            </p:spPr>
+            <p:txBody>
+              <a:bodyPr wrap="square" rtlCol="0">
+                <a:spAutoFit/>
+              </a:bodyPr>
+              <a:lstStyle/>
+              <a:p>
+                <a:pPr algn="ctr"/>
+                <a:r>
+                  <a:rPr lang="en-US" sz="1800" dirty="0">
+                    <a:highlight>
+                      <a:srgbClr val="FF9899"/>
+                    </a:highlight>
+                    <a:latin typeface="Times New Roman" panose="02020603050405020304" pitchFamily="18" charset="0"/>
+                    <a:cs typeface="Times New Roman" panose="02020603050405020304" pitchFamily="18" charset="0"/>
+                  </a:rPr>
+                  <a:t>During</a:t>
+                </a:r>
+              </a:p>
+            </p:txBody>
+          </p:sp>
+          <p:sp>
+            <p:nvSpPr>
+              <p:cNvPr id="13" name="TextBox 12">
+                <a:extLst>
+                  <a:ext uri="{FF2B5EF4-FFF2-40B4-BE49-F238E27FC236}">
+                    <a16:creationId xmlns:a16="http://schemas.microsoft.com/office/drawing/2014/main" id="{6E42B6E7-0927-96FB-BDDA-7C2340A88769}"/>
+                  </a:ext>
+                </a:extLst>
+              </p:cNvPr>
+              <p:cNvSpPr txBox="1"/>
+              <p:nvPr/>
+            </p:nvSpPr>
+            <p:spPr>
+              <a:xfrm rot="16200000">
+                <a:off x="-735314" y="9239103"/>
+                <a:ext cx="2715290" cy="369332"/>
+              </a:xfrm>
+              <a:prstGeom prst="rect">
+                <a:avLst/>
+              </a:prstGeom>
+              <a:noFill/>
+            </p:spPr>
+            <p:txBody>
+              <a:bodyPr wrap="square" rtlCol="0">
+                <a:spAutoFit/>
+              </a:bodyPr>
+              <a:lstStyle/>
+              <a:p>
+                <a:pPr algn="ctr"/>
+                <a:r>
+                  <a:rPr lang="en-US" sz="1800" dirty="0">
+                    <a:highlight>
+                      <a:srgbClr val="FEC2C2"/>
+                    </a:highlight>
+                    <a:latin typeface="Times New Roman" panose="02020603050405020304" pitchFamily="18" charset="0"/>
+                    <a:cs typeface="Times New Roman" panose="02020603050405020304" pitchFamily="18" charset="0"/>
+                  </a:rPr>
+                  <a:t>After</a:t>
+                </a:r>
+              </a:p>
+            </p:txBody>
+          </p:sp>
+          <p:pic>
+            <p:nvPicPr>
+              <p:cNvPr id="17" name="Picture 16" descr="A diagram of a graph&#10;&#10;Description automatically generated with medium confidence">
+                <a:extLst>
+                  <a:ext uri="{FF2B5EF4-FFF2-40B4-BE49-F238E27FC236}">
+                    <a16:creationId xmlns:a16="http://schemas.microsoft.com/office/drawing/2014/main" id="{E21403FA-1B75-D25B-DC4E-E8F7D1531104}"/>
+                  </a:ext>
+                </a:extLst>
+              </p:cNvPr>
+              <p:cNvPicPr>
+                <a:picLocks noChangeAspect="1"/>
+              </p:cNvPicPr>
+              <p:nvPr/>
+            </p:nvPicPr>
+            <p:blipFill rotWithShape="1">
+              <a:blip r:embed="rId2">
+                <a:extLst>
+                  <a:ext uri="{28A0092B-C50C-407E-A947-70E740481C1C}">
+                    <a14:useLocalDpi xmlns:a14="http://schemas.microsoft.com/office/drawing/2010/main" val="0"/>
+                  </a:ext>
+                </a:extLst>
+              </a:blip>
+              <a:srcRect l="9186" t="6381" r="29504" b="10572"/>
+              <a:stretch/>
+            </p:blipFill>
+            <p:spPr>
+              <a:xfrm rot="5400000">
+                <a:off x="1420321" y="10267317"/>
+                <a:ext cx="1913467" cy="2419141"/>
+              </a:xfrm>
+              <a:prstGeom prst="rect">
+                <a:avLst/>
+              </a:prstGeom>
+            </p:spPr>
+          </p:pic>
+          <p:pic>
+            <p:nvPicPr>
+              <p:cNvPr id="19" name="Picture 18" descr="A diagram of different stages of period&#10;&#10;Description automatically generated">
+                <a:extLst>
+                  <a:ext uri="{FF2B5EF4-FFF2-40B4-BE49-F238E27FC236}">
+                    <a16:creationId xmlns:a16="http://schemas.microsoft.com/office/drawing/2014/main" id="{A1D6D0D3-B12A-0689-E8BA-E09CC8FB9228}"/>
+                  </a:ext>
+                </a:extLst>
+              </p:cNvPr>
+              <p:cNvPicPr>
+                <a:picLocks noChangeAspect="1"/>
+              </p:cNvPicPr>
+              <p:nvPr/>
+            </p:nvPicPr>
+            <p:blipFill rotWithShape="1">
+              <a:blip r:embed="rId3">
+                <a:extLst>
+                  <a:ext uri="{28A0092B-C50C-407E-A947-70E740481C1C}">
+                    <a14:useLocalDpi xmlns:a14="http://schemas.microsoft.com/office/drawing/2010/main" val="0"/>
+                  </a:ext>
+                </a:extLst>
+              </a:blip>
+              <a:srcRect l="7634" t="6533" r="30193" b="18582"/>
+              <a:stretch/>
+            </p:blipFill>
+            <p:spPr>
+              <a:xfrm rot="5400000">
+                <a:off x="4312074" y="10267317"/>
+                <a:ext cx="1913467" cy="2419141"/>
+              </a:xfrm>
+              <a:prstGeom prst="rect">
+                <a:avLst/>
+              </a:prstGeom>
+            </p:spPr>
+          </p:pic>
+          <p:pic>
+            <p:nvPicPr>
+              <p:cNvPr id="21" name="Picture 20" descr="A diagram of different shapes&#10;&#10;Description automatically generated with medium confidence">
+                <a:extLst>
+                  <a:ext uri="{FF2B5EF4-FFF2-40B4-BE49-F238E27FC236}">
+                    <a16:creationId xmlns:a16="http://schemas.microsoft.com/office/drawing/2014/main" id="{B57BFF0E-6503-9871-0A35-83FA325A97FE}"/>
+                  </a:ext>
+                </a:extLst>
+              </p:cNvPr>
+              <p:cNvPicPr>
+                <a:picLocks noChangeAspect="1"/>
+              </p:cNvPicPr>
+              <p:nvPr/>
+            </p:nvPicPr>
+            <p:blipFill rotWithShape="1">
+              <a:blip r:embed="rId4">
+                <a:extLst>
+                  <a:ext uri="{28A0092B-C50C-407E-A947-70E740481C1C}">
+                    <a14:useLocalDpi xmlns:a14="http://schemas.microsoft.com/office/drawing/2010/main" val="0"/>
+                  </a:ext>
+                </a:extLst>
+              </a:blip>
+              <a:srcRect l="8933" t="5003" r="28133" b="11714"/>
+              <a:stretch/>
+            </p:blipFill>
+            <p:spPr>
+              <a:xfrm rot="5400000">
+                <a:off x="7175934" y="10398603"/>
+                <a:ext cx="1913467" cy="2363355"/>
+              </a:xfrm>
+              <a:prstGeom prst="rect">
+                <a:avLst/>
+              </a:prstGeom>
+            </p:spPr>
+          </p:pic>
+          <p:pic>
+            <p:nvPicPr>
+              <p:cNvPr id="23" name="Picture 22" descr="A diagram of a graph&#10;&#10;Description automatically generated with medium confidence">
+                <a:extLst>
+                  <a:ext uri="{FF2B5EF4-FFF2-40B4-BE49-F238E27FC236}">
+                    <a16:creationId xmlns:a16="http://schemas.microsoft.com/office/drawing/2014/main" id="{7820E37C-8F24-3E9A-16E1-9B1972ACF3F4}"/>
+                  </a:ext>
+                </a:extLst>
+              </p:cNvPr>
+              <p:cNvPicPr>
+                <a:picLocks noChangeAspect="1"/>
+              </p:cNvPicPr>
+              <p:nvPr/>
+            </p:nvPicPr>
+            <p:blipFill rotWithShape="1">
+              <a:blip r:embed="rId5">
+                <a:extLst>
+                  <a:ext uri="{28A0092B-C50C-407E-A947-70E740481C1C}">
+                    <a14:useLocalDpi xmlns:a14="http://schemas.microsoft.com/office/drawing/2010/main" val="0"/>
+                  </a:ext>
+                </a:extLst>
+              </a:blip>
+              <a:srcRect l="4735" t="7715" r="15616" b="13048"/>
+              <a:stretch/>
+            </p:blipFill>
+            <p:spPr>
+              <a:xfrm>
+                <a:off x="9587679" y="3609941"/>
+                <a:ext cx="2277494" cy="2114678"/>
+              </a:xfrm>
+              <a:prstGeom prst="rect">
+                <a:avLst/>
+              </a:prstGeom>
+            </p:spPr>
+          </p:pic>
+          <p:pic>
+            <p:nvPicPr>
+              <p:cNvPr id="25" name="Picture 24" descr="A diagram of a graph&#10;&#10;Description automatically generated with medium confidence">
+                <a:extLst>
+                  <a:ext uri="{FF2B5EF4-FFF2-40B4-BE49-F238E27FC236}">
+                    <a16:creationId xmlns:a16="http://schemas.microsoft.com/office/drawing/2014/main" id="{F61E5D77-5AB8-B0BE-B6CB-72CF0FE88A4F}"/>
+                  </a:ext>
+                </a:extLst>
+              </p:cNvPr>
+              <p:cNvPicPr>
+                <a:picLocks noChangeAspect="1"/>
+              </p:cNvPicPr>
+              <p:nvPr/>
+            </p:nvPicPr>
+            <p:blipFill rotWithShape="1">
+              <a:blip r:embed="rId6">
+                <a:extLst>
+                  <a:ext uri="{28A0092B-C50C-407E-A947-70E740481C1C}">
+                    <a14:useLocalDpi xmlns:a14="http://schemas.microsoft.com/office/drawing/2010/main" val="0"/>
+                  </a:ext>
+                </a:extLst>
+              </a:blip>
+              <a:srcRect l="4735" t="5004" r="15616" b="12476"/>
+              <a:stretch/>
+            </p:blipFill>
+            <p:spPr>
+              <a:xfrm>
+                <a:off x="9686220" y="5939316"/>
+                <a:ext cx="2186910" cy="2114678"/>
+              </a:xfrm>
+              <a:prstGeom prst="rect">
+                <a:avLst/>
+              </a:prstGeom>
+            </p:spPr>
+          </p:pic>
+          <p:pic>
+            <p:nvPicPr>
+              <p:cNvPr id="27" name="Picture 26" descr="A diagram of a graph&#10;&#10;Description automatically generated with medium confidence">
+                <a:extLst>
+                  <a:ext uri="{FF2B5EF4-FFF2-40B4-BE49-F238E27FC236}">
+                    <a16:creationId xmlns:a16="http://schemas.microsoft.com/office/drawing/2014/main" id="{D3E0CA58-CE3E-6F51-C410-6C8DD8782B83}"/>
+                  </a:ext>
+                </a:extLst>
+              </p:cNvPr>
+              <p:cNvPicPr>
+                <a:picLocks noChangeAspect="1"/>
+              </p:cNvPicPr>
+              <p:nvPr/>
+            </p:nvPicPr>
+            <p:blipFill rotWithShape="1">
+              <a:blip r:embed="rId7">
+                <a:extLst>
+                  <a:ext uri="{28A0092B-C50C-407E-A947-70E740481C1C}">
+                    <a14:useLocalDpi xmlns:a14="http://schemas.microsoft.com/office/drawing/2010/main" val="0"/>
+                  </a:ext>
+                </a:extLst>
+              </a:blip>
+              <a:srcRect l="4735" t="5003" r="15616" b="11143"/>
+              <a:stretch/>
+            </p:blipFill>
+            <p:spPr>
+              <a:xfrm>
+                <a:off x="9686220" y="8268691"/>
+                <a:ext cx="2265768" cy="2226332"/>
+              </a:xfrm>
+              <a:prstGeom prst="rect">
+                <a:avLst/>
+              </a:prstGeom>
+            </p:spPr>
+          </p:pic>
+        </p:grpSp>
+        <p:pic>
+          <p:nvPicPr>
+            <p:cNvPr id="4" name="Picture 3" descr="A collage of several black dots&#10;&#10;Description automatically generated">
+              <a:extLst>
+                <a:ext uri="{FF2B5EF4-FFF2-40B4-BE49-F238E27FC236}">
+                  <a16:creationId xmlns:a16="http://schemas.microsoft.com/office/drawing/2014/main" id="{5E4F965B-510E-1C97-9B2D-E13A0DB358A1}"/>
+                </a:ext>
+              </a:extLst>
+            </p:cNvPr>
+            <p:cNvPicPr>
+              <a:picLocks noChangeAspect="1"/>
+            </p:cNvPicPr>
+            <p:nvPr/>
+          </p:nvPicPr>
+          <p:blipFill>
+            <a:blip r:embed="rId8">
+              <a:extLst>
+                <a:ext uri="{28A0092B-C50C-407E-A947-70E740481C1C}">
+                  <a14:useLocalDpi xmlns:a14="http://schemas.microsoft.com/office/drawing/2010/main" val="0"/>
+                </a:ext>
+              </a:extLst>
+            </a:blip>
+            <a:stretch>
+              <a:fillRect/>
+            </a:stretch>
+          </p:blipFill>
           <p:spPr>
             <a:xfrm>
-              <a:off x="909084" y="3119200"/>
-              <a:ext cx="2715290" cy="369332"/>
+              <a:off x="770466" y="3484747"/>
+              <a:ext cx="8669750" cy="6935800"/>
             </a:xfrm>
             <a:prstGeom prst="rect">
               <a:avLst/>
             </a:prstGeom>
-            <a:noFill/>
           </p:spPr>
-          <p:txBody>
-            <a:bodyPr wrap="square" rtlCol="0">
-              <a:spAutoFit/>
-            </a:bodyPr>
-            <a:lstStyle/>
-            <a:p>
-              <a:pPr algn="ctr"/>
-              <a:r>
-                <a:rPr lang="en-US" sz="1800" dirty="0">
-                  <a:highlight>
-                    <a:srgbClr val="F6C3C0"/>
-                  </a:highlight>
-                  <a:latin typeface="Times New Roman" panose="02020603050405020304" pitchFamily="18" charset="0"/>
-                  <a:cs typeface="Times New Roman" panose="02020603050405020304" pitchFamily="18" charset="0"/>
-                </a:rPr>
-                <a:t>Beggars/Provisioners</a:t>
-              </a:r>
-            </a:p>
-          </p:txBody>
-        </p:sp>
-        <p:sp>
-          <p:nvSpPr>
-            <p:cNvPr id="9" name="TextBox 8">
+        </p:pic>
+      </p:grpSp>
+    </p:spTree>
+    <p:extLst>
+      <p:ext uri="{BB962C8B-B14F-4D97-AF65-F5344CB8AC3E}">
+        <p14:creationId xmlns:p14="http://schemas.microsoft.com/office/powerpoint/2010/main" val="1510560255"/>
+      </p:ext>
+    </p:extLst>
+  </p:cSld>
+  <p:clrMapOvr>
+    <a:masterClrMapping/>
+  </p:clrMapOvr>
+</p:sld>
+</file>
+
+<file path=ppt/slides/slide2.xml><?xml version="1.0" encoding="utf-8"?>
+<p:sld xmlns:a="http://schemas.openxmlformats.org/drawingml/2006/main" xmlns:r="http://schemas.openxmlformats.org/officeDocument/2006/relationships" xmlns:p="http://schemas.openxmlformats.org/presentationml/2006/main">
+  <p:cSld>
+    <p:spTree>
+      <p:nvGrpSpPr>
+        <p:cNvPr id="1" name=""/>
+        <p:cNvGrpSpPr/>
+        <p:nvPr/>
+      </p:nvGrpSpPr>
+      <p:grpSpPr>
+        <a:xfrm>
+          <a:off x="0" y="0"/>
+          <a:ext cx="0" cy="0"/>
+          <a:chOff x="0" y="0"/>
+          <a:chExt cx="0" cy="0"/>
+        </a:xfrm>
+      </p:grpSpPr>
+      <p:grpSp>
+        <p:nvGrpSpPr>
+          <p:cNvPr id="15" name="Group 14">
+            <a:extLst>
+              <a:ext uri="{FF2B5EF4-FFF2-40B4-BE49-F238E27FC236}">
+                <a16:creationId xmlns:a16="http://schemas.microsoft.com/office/drawing/2014/main" id="{7F8429D1-FFCF-0691-543C-7FB469DF9C99}"/>
+              </a:ext>
+            </a:extLst>
+          </p:cNvPr>
+          <p:cNvGrpSpPr/>
+          <p:nvPr/>
+        </p:nvGrpSpPr>
+        <p:grpSpPr>
+          <a:xfrm>
+            <a:off x="2095499" y="4662713"/>
+            <a:ext cx="9525003" cy="4734950"/>
+            <a:chOff x="2095499" y="4662713"/>
+            <a:chExt cx="9525003" cy="4734950"/>
+          </a:xfrm>
+        </p:grpSpPr>
+        <p:pic>
+          <p:nvPicPr>
+            <p:cNvPr id="7" name="Picture 6" descr="A group of colorful dots&#10;&#10;Description automatically generated">
               <a:extLst>
                 <a:ext uri="{FF2B5EF4-FFF2-40B4-BE49-F238E27FC236}">
-                  <a16:creationId xmlns:a16="http://schemas.microsoft.com/office/drawing/2014/main" id="{EEA985B2-E1AE-840D-9619-E60CB871C2F3}"/>
-                </a:ext>
-              </a:extLst>
-            </p:cNvPr>
-            <p:cNvSpPr txBox="1"/>
-            <p:nvPr/>
-          </p:nvSpPr>
-          <p:spPr>
-            <a:xfrm>
-              <a:off x="3817005" y="3119200"/>
-              <a:ext cx="2715290" cy="369332"/>
-            </a:xfrm>
-            <a:prstGeom prst="rect">
-              <a:avLst/>
-            </a:prstGeom>
-            <a:noFill/>
-          </p:spPr>
-          <p:txBody>
-            <a:bodyPr wrap="square" rtlCol="0">
-              <a:spAutoFit/>
-            </a:bodyPr>
-            <a:lstStyle/>
-            <a:p>
-              <a:pPr algn="ctr"/>
-              <a:r>
-                <a:rPr lang="en-US" sz="1800" dirty="0">
-                  <a:highlight>
-                    <a:srgbClr val="99E3AE"/>
-                  </a:highlight>
-                  <a:latin typeface="Times New Roman" panose="02020603050405020304" pitchFamily="18" charset="0"/>
-                  <a:cs typeface="Times New Roman" panose="02020603050405020304" pitchFamily="18" charset="0"/>
-                </a:rPr>
-                <a:t>Fixed gear foragers</a:t>
-              </a:r>
-            </a:p>
-          </p:txBody>
-        </p:sp>
-        <p:sp>
-          <p:nvSpPr>
-            <p:cNvPr id="10" name="TextBox 9">
-              <a:extLst>
-                <a:ext uri="{FF2B5EF4-FFF2-40B4-BE49-F238E27FC236}">
-                  <a16:creationId xmlns:a16="http://schemas.microsoft.com/office/drawing/2014/main" id="{9E583236-EA03-F0F8-AA3E-3B31B4C8D25C}"/>
-                </a:ext>
-              </a:extLst>
-            </p:cNvPr>
-            <p:cNvSpPr txBox="1"/>
-            <p:nvPr/>
-          </p:nvSpPr>
-          <p:spPr>
-            <a:xfrm>
-              <a:off x="6724926" y="3119200"/>
-              <a:ext cx="2715290" cy="369332"/>
-            </a:xfrm>
-            <a:prstGeom prst="rect">
-              <a:avLst/>
-            </a:prstGeom>
-            <a:noFill/>
-          </p:spPr>
-          <p:txBody>
-            <a:bodyPr wrap="square" rtlCol="0">
-              <a:spAutoFit/>
-            </a:bodyPr>
-            <a:lstStyle/>
-            <a:p>
-              <a:pPr algn="ctr"/>
-              <a:r>
-                <a:rPr lang="en-US" sz="1800" dirty="0">
-                  <a:highlight>
-                    <a:srgbClr val="B9D0F8"/>
-                  </a:highlight>
-                  <a:latin typeface="Times New Roman" panose="02020603050405020304" pitchFamily="18" charset="0"/>
-                  <a:cs typeface="Times New Roman" panose="02020603050405020304" pitchFamily="18" charset="0"/>
-                </a:rPr>
-                <a:t>Scavengers/Depredators</a:t>
-              </a:r>
-            </a:p>
-          </p:txBody>
-        </p:sp>
-        <p:sp>
-          <p:nvSpPr>
-            <p:cNvPr id="11" name="TextBox 10">
-              <a:extLst>
-                <a:ext uri="{FF2B5EF4-FFF2-40B4-BE49-F238E27FC236}">
-                  <a16:creationId xmlns:a16="http://schemas.microsoft.com/office/drawing/2014/main" id="{7CDB8202-0AD7-D08E-D300-F9C3FB1752AC}"/>
-                </a:ext>
-              </a:extLst>
-            </p:cNvPr>
-            <p:cNvSpPr txBox="1"/>
-            <p:nvPr/>
-          </p:nvSpPr>
-          <p:spPr>
-            <a:xfrm rot="16200000">
-              <a:off x="-735314" y="4482614"/>
-              <a:ext cx="2715290" cy="369332"/>
-            </a:xfrm>
-            <a:prstGeom prst="rect">
-              <a:avLst/>
-            </a:prstGeom>
-            <a:noFill/>
-          </p:spPr>
-          <p:txBody>
-            <a:bodyPr wrap="square" rtlCol="0">
-              <a:spAutoFit/>
-            </a:bodyPr>
-            <a:lstStyle/>
-            <a:p>
-              <a:pPr algn="ctr"/>
-              <a:r>
-                <a:rPr lang="en-US" sz="1800" dirty="0">
-                  <a:highlight>
-                    <a:srgbClr val="FFEBEC"/>
-                  </a:highlight>
-                  <a:latin typeface="Times New Roman" panose="02020603050405020304" pitchFamily="18" charset="0"/>
-                  <a:cs typeface="Times New Roman" panose="02020603050405020304" pitchFamily="18" charset="0"/>
-                </a:rPr>
-                <a:t>Before</a:t>
-              </a:r>
-            </a:p>
-          </p:txBody>
-        </p:sp>
-        <p:sp>
-          <p:nvSpPr>
-            <p:cNvPr id="12" name="TextBox 11">
-              <a:extLst>
-                <a:ext uri="{FF2B5EF4-FFF2-40B4-BE49-F238E27FC236}">
-                  <a16:creationId xmlns:a16="http://schemas.microsoft.com/office/drawing/2014/main" id="{89BA4407-F049-103E-3C06-1307B2EC1624}"/>
-                </a:ext>
-              </a:extLst>
-            </p:cNvPr>
-            <p:cNvSpPr txBox="1"/>
-            <p:nvPr/>
-          </p:nvSpPr>
-          <p:spPr>
-            <a:xfrm rot="16200000">
-              <a:off x="-744159" y="6811989"/>
-              <a:ext cx="2715290" cy="369332"/>
-            </a:xfrm>
-            <a:prstGeom prst="rect">
-              <a:avLst/>
-            </a:prstGeom>
-            <a:noFill/>
-          </p:spPr>
-          <p:txBody>
-            <a:bodyPr wrap="square" rtlCol="0">
-              <a:spAutoFit/>
-            </a:bodyPr>
-            <a:lstStyle/>
-            <a:p>
-              <a:pPr algn="ctr"/>
-              <a:r>
-                <a:rPr lang="en-US" sz="1800" dirty="0">
-                  <a:highlight>
-                    <a:srgbClr val="FF9899"/>
-                  </a:highlight>
-                  <a:latin typeface="Times New Roman" panose="02020603050405020304" pitchFamily="18" charset="0"/>
-                  <a:cs typeface="Times New Roman" panose="02020603050405020304" pitchFamily="18" charset="0"/>
-                </a:rPr>
-                <a:t>During</a:t>
-              </a:r>
-            </a:p>
-          </p:txBody>
-        </p:sp>
-        <p:sp>
-          <p:nvSpPr>
-            <p:cNvPr id="13" name="TextBox 12">
-              <a:extLst>
-                <a:ext uri="{FF2B5EF4-FFF2-40B4-BE49-F238E27FC236}">
-                  <a16:creationId xmlns:a16="http://schemas.microsoft.com/office/drawing/2014/main" id="{6E42B6E7-0927-96FB-BDDA-7C2340A88769}"/>
-                </a:ext>
-              </a:extLst>
-            </p:cNvPr>
-            <p:cNvSpPr txBox="1"/>
-            <p:nvPr/>
-          </p:nvSpPr>
-          <p:spPr>
-            <a:xfrm rot="16200000">
-              <a:off x="-735314" y="9239103"/>
-              <a:ext cx="2715290" cy="369332"/>
-            </a:xfrm>
-            <a:prstGeom prst="rect">
-              <a:avLst/>
-            </a:prstGeom>
-            <a:noFill/>
-          </p:spPr>
-          <p:txBody>
-            <a:bodyPr wrap="square" rtlCol="0">
-              <a:spAutoFit/>
-            </a:bodyPr>
-            <a:lstStyle/>
-            <a:p>
-              <a:pPr algn="ctr"/>
-              <a:r>
-                <a:rPr lang="en-US" sz="1800" dirty="0">
-                  <a:highlight>
-                    <a:srgbClr val="FEC2C2"/>
-                  </a:highlight>
-                  <a:latin typeface="Times New Roman" panose="02020603050405020304" pitchFamily="18" charset="0"/>
-                  <a:cs typeface="Times New Roman" panose="02020603050405020304" pitchFamily="18" charset="0"/>
-                </a:rPr>
-                <a:t>After</a:t>
-              </a:r>
-            </a:p>
-          </p:txBody>
-        </p:sp>
-        <p:pic>
-          <p:nvPicPr>
-            <p:cNvPr id="6" name="Picture 5" descr="A group of images of different colored dots&#10;&#10;Description automatically generated">
-              <a:extLst>
-                <a:ext uri="{FF2B5EF4-FFF2-40B4-BE49-F238E27FC236}">
-                  <a16:creationId xmlns:a16="http://schemas.microsoft.com/office/drawing/2014/main" id="{96AAFA5F-1376-6426-D5C7-DC34CB1D8280}"/>
+                  <a16:creationId xmlns:a16="http://schemas.microsoft.com/office/drawing/2014/main" id="{58A20372-584E-0E81-3919-47628BCE7734}"/>
                 </a:ext>
               </a:extLst>
             </p:cNvPr>
@@ -3271,229 +3590,295 @@
           </p:blipFill>
           <p:spPr>
             <a:xfrm>
-              <a:off x="798152" y="3488532"/>
-              <a:ext cx="8789527" cy="7031622"/>
+              <a:off x="2095500" y="4953000"/>
+              <a:ext cx="9525000" cy="3810000"/>
             </a:xfrm>
             <a:prstGeom prst="rect">
               <a:avLst/>
             </a:prstGeom>
           </p:spPr>
         </p:pic>
-        <p:pic>
-          <p:nvPicPr>
-            <p:cNvPr id="17" name="Picture 16" descr="A diagram of a graph&#10;&#10;Description automatically generated with medium confidence">
+        <p:sp>
+          <p:nvSpPr>
+            <p:cNvPr id="9" name="TextBox 8">
               <a:extLst>
                 <a:ext uri="{FF2B5EF4-FFF2-40B4-BE49-F238E27FC236}">
-                  <a16:creationId xmlns:a16="http://schemas.microsoft.com/office/drawing/2014/main" id="{E21403FA-1B75-D25B-DC4E-E8F7D1531104}"/>
+                  <a16:creationId xmlns:a16="http://schemas.microsoft.com/office/drawing/2014/main" id="{40FA060C-B65D-67CB-34FB-15A08A6D8491}"/>
                 </a:ext>
               </a:extLst>
             </p:cNvPr>
-            <p:cNvPicPr>
-              <a:picLocks noChangeAspect="1"/>
-            </p:cNvPicPr>
+            <p:cNvSpPr txBox="1"/>
             <p:nvPr/>
-          </p:nvPicPr>
-          <p:blipFill rotWithShape="1">
-            <a:blip r:embed="rId3">
-              <a:extLst>
-                <a:ext uri="{28A0092B-C50C-407E-A947-70E740481C1C}">
-                  <a14:useLocalDpi xmlns:a14="http://schemas.microsoft.com/office/drawing/2010/main" val="0"/>
-                </a:ext>
-              </a:extLst>
-            </a:blip>
-            <a:srcRect l="9186" t="6381" r="29504" b="10572"/>
-            <a:stretch/>
-          </p:blipFill>
+          </p:nvSpPr>
           <p:spPr>
-            <a:xfrm rot="5400000">
-              <a:off x="1420321" y="10267317"/>
-              <a:ext cx="1913467" cy="2419141"/>
+            <a:xfrm>
+              <a:off x="2332238" y="4662713"/>
+              <a:ext cx="2715290" cy="369332"/>
             </a:xfrm>
             <a:prstGeom prst="rect">
               <a:avLst/>
             </a:prstGeom>
+            <a:noFill/>
           </p:spPr>
-        </p:pic>
-        <p:pic>
-          <p:nvPicPr>
-            <p:cNvPr id="19" name="Picture 18" descr="A diagram of different stages of period&#10;&#10;Description automatically generated">
+          <p:txBody>
+            <a:bodyPr wrap="square" rtlCol="0">
+              <a:spAutoFit/>
+            </a:bodyPr>
+            <a:lstStyle/>
+            <a:p>
+              <a:pPr algn="ctr"/>
+              <a:r>
+                <a:rPr lang="en-US" sz="1800" dirty="0">
+                  <a:latin typeface="Times New Roman" panose="02020603050405020304" pitchFamily="18" charset="0"/>
+                  <a:cs typeface="Times New Roman" panose="02020603050405020304" pitchFamily="18" charset="0"/>
+                </a:rPr>
+                <a:t>Before</a:t>
+              </a:r>
+            </a:p>
+          </p:txBody>
+        </p:sp>
+        <p:sp>
+          <p:nvSpPr>
+            <p:cNvPr id="10" name="TextBox 9">
               <a:extLst>
                 <a:ext uri="{FF2B5EF4-FFF2-40B4-BE49-F238E27FC236}">
-                  <a16:creationId xmlns:a16="http://schemas.microsoft.com/office/drawing/2014/main" id="{A1D6D0D3-B12A-0689-E8BA-E09CC8FB9228}"/>
+                  <a16:creationId xmlns:a16="http://schemas.microsoft.com/office/drawing/2014/main" id="{F811E43F-0DD0-C5BA-4437-612C5B53EB49}"/>
                 </a:ext>
               </a:extLst>
             </p:cNvPr>
-            <p:cNvPicPr>
-              <a:picLocks noChangeAspect="1"/>
-            </p:cNvPicPr>
+            <p:cNvSpPr txBox="1"/>
             <p:nvPr/>
-          </p:nvPicPr>
-          <p:blipFill rotWithShape="1">
-            <a:blip r:embed="rId4">
-              <a:extLst>
-                <a:ext uri="{28A0092B-C50C-407E-A947-70E740481C1C}">
-                  <a14:useLocalDpi xmlns:a14="http://schemas.microsoft.com/office/drawing/2010/main" val="0"/>
-                </a:ext>
-              </a:extLst>
-            </a:blip>
-            <a:srcRect l="7634" t="6533" r="30193" b="18582"/>
-            <a:stretch/>
-          </p:blipFill>
+          </p:nvSpPr>
           <p:spPr>
-            <a:xfrm rot="5400000">
-              <a:off x="4312074" y="10267317"/>
-              <a:ext cx="1913467" cy="2419141"/>
+            <a:xfrm>
+              <a:off x="5500355" y="4662713"/>
+              <a:ext cx="2715290" cy="369332"/>
             </a:xfrm>
             <a:prstGeom prst="rect">
               <a:avLst/>
             </a:prstGeom>
+            <a:noFill/>
           </p:spPr>
-        </p:pic>
-        <p:pic>
-          <p:nvPicPr>
-            <p:cNvPr id="21" name="Picture 20" descr="A diagram of different shapes&#10;&#10;Description automatically generated with medium confidence">
+          <p:txBody>
+            <a:bodyPr wrap="square" rtlCol="0">
+              <a:spAutoFit/>
+            </a:bodyPr>
+            <a:lstStyle/>
+            <a:p>
+              <a:pPr algn="ctr"/>
+              <a:r>
+                <a:rPr lang="en-US" sz="1800" dirty="0">
+                  <a:latin typeface="Times New Roman" panose="02020603050405020304" pitchFamily="18" charset="0"/>
+                  <a:cs typeface="Times New Roman" panose="02020603050405020304" pitchFamily="18" charset="0"/>
+                </a:rPr>
+                <a:t>During</a:t>
+              </a:r>
+            </a:p>
+          </p:txBody>
+        </p:sp>
+        <p:sp>
+          <p:nvSpPr>
+            <p:cNvPr id="11" name="TextBox 10">
               <a:extLst>
                 <a:ext uri="{FF2B5EF4-FFF2-40B4-BE49-F238E27FC236}">
-                  <a16:creationId xmlns:a16="http://schemas.microsoft.com/office/drawing/2014/main" id="{B57BFF0E-6503-9871-0A35-83FA325A97FE}"/>
+                  <a16:creationId xmlns:a16="http://schemas.microsoft.com/office/drawing/2014/main" id="{FED9B69B-4C20-B9DD-78D1-0453E1A24043}"/>
                 </a:ext>
               </a:extLst>
             </p:cNvPr>
-            <p:cNvPicPr>
-              <a:picLocks noChangeAspect="1"/>
-            </p:cNvPicPr>
+            <p:cNvSpPr txBox="1"/>
             <p:nvPr/>
-          </p:nvPicPr>
-          <p:blipFill rotWithShape="1">
-            <a:blip r:embed="rId5">
-              <a:extLst>
-                <a:ext uri="{28A0092B-C50C-407E-A947-70E740481C1C}">
-                  <a14:useLocalDpi xmlns:a14="http://schemas.microsoft.com/office/drawing/2010/main" val="0"/>
-                </a:ext>
-              </a:extLst>
-            </a:blip>
-            <a:srcRect l="8933" t="5003" r="28133" b="11714"/>
-            <a:stretch/>
-          </p:blipFill>
+          </p:nvSpPr>
           <p:spPr>
-            <a:xfrm rot="5400000">
-              <a:off x="7175934" y="10398603"/>
-              <a:ext cx="1913467" cy="2363355"/>
+            <a:xfrm>
+              <a:off x="8695080" y="4662713"/>
+              <a:ext cx="2715290" cy="369332"/>
             </a:xfrm>
             <a:prstGeom prst="rect">
               <a:avLst/>
             </a:prstGeom>
+            <a:noFill/>
           </p:spPr>
-        </p:pic>
-        <p:pic>
-          <p:nvPicPr>
-            <p:cNvPr id="23" name="Picture 22" descr="A diagram of a graph&#10;&#10;Description automatically generated with medium confidence">
+          <p:txBody>
+            <a:bodyPr wrap="square" rtlCol="0">
+              <a:spAutoFit/>
+            </a:bodyPr>
+            <a:lstStyle/>
+            <a:p>
+              <a:pPr algn="ctr"/>
+              <a:r>
+                <a:rPr lang="en-US" sz="1800" dirty="0">
+                  <a:latin typeface="Times New Roman" panose="02020603050405020304" pitchFamily="18" charset="0"/>
+                  <a:cs typeface="Times New Roman" panose="02020603050405020304" pitchFamily="18" charset="0"/>
+                </a:rPr>
+                <a:t>After</a:t>
+              </a:r>
+            </a:p>
+          </p:txBody>
+        </p:sp>
+        <p:sp>
+          <p:nvSpPr>
+            <p:cNvPr id="12" name="TextBox 11">
               <a:extLst>
                 <a:ext uri="{FF2B5EF4-FFF2-40B4-BE49-F238E27FC236}">
-                  <a16:creationId xmlns:a16="http://schemas.microsoft.com/office/drawing/2014/main" id="{7820E37C-8F24-3E9A-16E1-9B1972ACF3F4}"/>
+                  <a16:creationId xmlns:a16="http://schemas.microsoft.com/office/drawing/2014/main" id="{C282E2F9-84E9-F1E3-9231-4393D446CD42}"/>
                 </a:ext>
               </a:extLst>
             </p:cNvPr>
-            <p:cNvPicPr>
-              <a:picLocks noChangeAspect="1"/>
-            </p:cNvPicPr>
+            <p:cNvSpPr txBox="1"/>
             <p:nvPr/>
-          </p:nvPicPr>
-          <p:blipFill rotWithShape="1">
-            <a:blip r:embed="rId6">
-              <a:extLst>
-                <a:ext uri="{28A0092B-C50C-407E-A947-70E740481C1C}">
-                  <a14:useLocalDpi xmlns:a14="http://schemas.microsoft.com/office/drawing/2010/main" val="0"/>
-                </a:ext>
-              </a:extLst>
-            </a:blip>
-            <a:srcRect l="4735" t="7715" r="15616" b="13048"/>
-            <a:stretch/>
-          </p:blipFill>
+          </p:nvSpPr>
           <p:spPr>
             <a:xfrm>
-              <a:off x="9587679" y="3609941"/>
-              <a:ext cx="2277494" cy="2114678"/>
+              <a:off x="2095499" y="8751332"/>
+              <a:ext cx="3188769" cy="646331"/>
             </a:xfrm>
             <a:prstGeom prst="rect">
               <a:avLst/>
             </a:prstGeom>
+            <a:noFill/>
           </p:spPr>
-        </p:pic>
-        <p:pic>
-          <p:nvPicPr>
-            <p:cNvPr id="25" name="Picture 24" descr="A diagram of a graph&#10;&#10;Description automatically generated with medium confidence">
+          <p:txBody>
+            <a:bodyPr wrap="square" rtlCol="0">
+              <a:spAutoFit/>
+            </a:bodyPr>
+            <a:lstStyle/>
+            <a:p>
+              <a:pPr algn="ctr"/>
+              <a:r>
+                <a:rPr lang="en-US" sz="1800" dirty="0">
+                  <a:latin typeface="Times New Roman" panose="02020603050405020304" pitchFamily="18" charset="0"/>
+                  <a:cs typeface="Times New Roman" panose="02020603050405020304" pitchFamily="18" charset="0"/>
+                </a:rPr>
+                <a:t>Number of Total Clusters = 8</a:t>
+              </a:r>
+            </a:p>
+            <a:p>
+              <a:pPr algn="ctr"/>
+              <a:r>
+                <a:rPr lang="en-US" dirty="0">
+                  <a:latin typeface="Times New Roman" panose="02020603050405020304" pitchFamily="18" charset="0"/>
+                  <a:cs typeface="Times New Roman" panose="02020603050405020304" pitchFamily="18" charset="0"/>
+                </a:rPr>
+                <a:t>Number of HC Clusters = 7</a:t>
+              </a:r>
+              <a:endParaRPr lang="en-US" sz="1800" dirty="0">
+                <a:latin typeface="Times New Roman" panose="02020603050405020304" pitchFamily="18" charset="0"/>
+                <a:cs typeface="Times New Roman" panose="02020603050405020304" pitchFamily="18" charset="0"/>
+              </a:endParaRPr>
+            </a:p>
+          </p:txBody>
+        </p:sp>
+        <p:sp>
+          <p:nvSpPr>
+            <p:cNvPr id="13" name="TextBox 12">
               <a:extLst>
                 <a:ext uri="{FF2B5EF4-FFF2-40B4-BE49-F238E27FC236}">
-                  <a16:creationId xmlns:a16="http://schemas.microsoft.com/office/drawing/2014/main" id="{F61E5D77-5AB8-B0BE-B6CB-72CF0FE88A4F}"/>
+                  <a16:creationId xmlns:a16="http://schemas.microsoft.com/office/drawing/2014/main" id="{C2C29A21-085C-BA23-94EF-0E49267AFB60}"/>
                 </a:ext>
               </a:extLst>
             </p:cNvPr>
-            <p:cNvPicPr>
-              <a:picLocks noChangeAspect="1"/>
-            </p:cNvPicPr>
+            <p:cNvSpPr txBox="1"/>
             <p:nvPr/>
-          </p:nvPicPr>
-          <p:blipFill rotWithShape="1">
-            <a:blip r:embed="rId7">
-              <a:extLst>
-                <a:ext uri="{28A0092B-C50C-407E-A947-70E740481C1C}">
-                  <a14:useLocalDpi xmlns:a14="http://schemas.microsoft.com/office/drawing/2010/main" val="0"/>
-                </a:ext>
-              </a:extLst>
-            </a:blip>
-            <a:srcRect l="4735" t="5004" r="15616" b="12476"/>
-            <a:stretch/>
-          </p:blipFill>
+          </p:nvSpPr>
           <p:spPr>
             <a:xfrm>
-              <a:off x="9686220" y="5939316"/>
-              <a:ext cx="2186910" cy="2114678"/>
+              <a:off x="5242965" y="8739664"/>
+              <a:ext cx="3188769" cy="646331"/>
             </a:xfrm>
             <a:prstGeom prst="rect">
               <a:avLst/>
             </a:prstGeom>
+            <a:noFill/>
           </p:spPr>
-        </p:pic>
-        <p:pic>
-          <p:nvPicPr>
-            <p:cNvPr id="27" name="Picture 26" descr="A diagram of a graph&#10;&#10;Description automatically generated with medium confidence">
+          <p:txBody>
+            <a:bodyPr wrap="square" rtlCol="0">
+              <a:spAutoFit/>
+            </a:bodyPr>
+            <a:lstStyle/>
+            <a:p>
+              <a:pPr algn="ctr"/>
+              <a:r>
+                <a:rPr lang="en-US" sz="1800" dirty="0">
+                  <a:latin typeface="Times New Roman" panose="02020603050405020304" pitchFamily="18" charset="0"/>
+                  <a:cs typeface="Times New Roman" panose="02020603050405020304" pitchFamily="18" charset="0"/>
+                </a:rPr>
+                <a:t>Number of Total Clusters = 7</a:t>
+              </a:r>
+            </a:p>
+            <a:p>
+              <a:pPr algn="ctr"/>
+              <a:r>
+                <a:rPr lang="en-US" dirty="0">
+                  <a:latin typeface="Times New Roman" panose="02020603050405020304" pitchFamily="18" charset="0"/>
+                  <a:cs typeface="Times New Roman" panose="02020603050405020304" pitchFamily="18" charset="0"/>
+                </a:rPr>
+                <a:t>Number of HC Clusters = 4</a:t>
+              </a:r>
+              <a:endParaRPr lang="en-US" sz="1800" dirty="0">
+                <a:latin typeface="Times New Roman" panose="02020603050405020304" pitchFamily="18" charset="0"/>
+                <a:cs typeface="Times New Roman" panose="02020603050405020304" pitchFamily="18" charset="0"/>
+              </a:endParaRPr>
+            </a:p>
+          </p:txBody>
+        </p:sp>
+        <p:sp>
+          <p:nvSpPr>
+            <p:cNvPr id="14" name="TextBox 13">
               <a:extLst>
                 <a:ext uri="{FF2B5EF4-FFF2-40B4-BE49-F238E27FC236}">
-                  <a16:creationId xmlns:a16="http://schemas.microsoft.com/office/drawing/2014/main" id="{D3E0CA58-CE3E-6F51-C410-6C8DD8782B83}"/>
+                  <a16:creationId xmlns:a16="http://schemas.microsoft.com/office/drawing/2014/main" id="{08DB0870-99A8-9614-40EF-4CDFD6ADB97B}"/>
                 </a:ext>
               </a:extLst>
             </p:cNvPr>
-            <p:cNvPicPr>
-              <a:picLocks noChangeAspect="1"/>
-            </p:cNvPicPr>
+            <p:cNvSpPr txBox="1"/>
             <p:nvPr/>
-          </p:nvPicPr>
-          <p:blipFill rotWithShape="1">
-            <a:blip r:embed="rId8">
-              <a:extLst>
-                <a:ext uri="{28A0092B-C50C-407E-A947-70E740481C1C}">
-                  <a14:useLocalDpi xmlns:a14="http://schemas.microsoft.com/office/drawing/2010/main" val="0"/>
-                </a:ext>
-              </a:extLst>
-            </a:blip>
-            <a:srcRect l="4735" t="5003" r="15616" b="11143"/>
-            <a:stretch/>
-          </p:blipFill>
+          </p:nvSpPr>
           <p:spPr>
             <a:xfrm>
-              <a:off x="9686220" y="8268691"/>
-              <a:ext cx="2265768" cy="2226332"/>
+              <a:off x="8431733" y="8727996"/>
+              <a:ext cx="3188769" cy="646331"/>
             </a:xfrm>
             <a:prstGeom prst="rect">
               <a:avLst/>
             </a:prstGeom>
+            <a:noFill/>
           </p:spPr>
-        </p:pic>
+          <p:txBody>
+            <a:bodyPr wrap="square" rtlCol="0">
+              <a:spAutoFit/>
+            </a:bodyPr>
+            <a:lstStyle/>
+            <a:p>
+              <a:pPr algn="ctr"/>
+              <a:r>
+                <a:rPr lang="en-US" sz="1800" dirty="0">
+                  <a:latin typeface="Times New Roman" panose="02020603050405020304" pitchFamily="18" charset="0"/>
+                  <a:cs typeface="Times New Roman" panose="02020603050405020304" pitchFamily="18" charset="0"/>
+                </a:rPr>
+                <a:t>Number of Total Clusters = 8</a:t>
+              </a:r>
+            </a:p>
+            <a:p>
+              <a:pPr algn="ctr"/>
+              <a:r>
+                <a:rPr lang="en-US" dirty="0">
+                  <a:latin typeface="Times New Roman" panose="02020603050405020304" pitchFamily="18" charset="0"/>
+                  <a:cs typeface="Times New Roman" panose="02020603050405020304" pitchFamily="18" charset="0"/>
+                </a:rPr>
+                <a:t>Number of HC Clusters = 8</a:t>
+              </a:r>
+              <a:endParaRPr lang="en-US" sz="1800" dirty="0">
+                <a:latin typeface="Times New Roman" panose="02020603050405020304" pitchFamily="18" charset="0"/>
+                <a:cs typeface="Times New Roman" panose="02020603050405020304" pitchFamily="18" charset="0"/>
+              </a:endParaRPr>
+            </a:p>
+          </p:txBody>
+        </p:sp>
       </p:grpSp>
     </p:spTree>
     <p:extLst>
       <p:ext uri="{BB962C8B-B14F-4D97-AF65-F5344CB8AC3E}">
-        <p14:creationId xmlns:p14="http://schemas.microsoft.com/office/powerpoint/2010/main" val="1510560255"/>
+        <p14:creationId xmlns:p14="http://schemas.microsoft.com/office/powerpoint/2010/main" val="3192738081"/>
       </p:ext>
     </p:extLst>
   </p:cSld>

</xml_diff>

<commit_message>
Add weights to brm model for hypothesis 2
</commit_message>
<xml_diff>
--- a/figs/networks.pptx
+++ b/figs/networks.pptx
@@ -244,7 +244,7 @@
           <a:p>
             <a:fld id="{85B3B054-712A-47A7-A562-EFC3154E7950}" type="datetimeFigureOut">
               <a:rPr lang="en-US" smtClean="0"/>
-              <a:t>2/18/2024</a:t>
+              <a:t>3/5/2024</a:t>
             </a:fld>
             <a:endParaRPr lang="en-US"/>
           </a:p>
@@ -414,7 +414,7 @@
           <a:p>
             <a:fld id="{85B3B054-712A-47A7-A562-EFC3154E7950}" type="datetimeFigureOut">
               <a:rPr lang="en-US" smtClean="0"/>
-              <a:t>2/18/2024</a:t>
+              <a:t>3/5/2024</a:t>
             </a:fld>
             <a:endParaRPr lang="en-US"/>
           </a:p>
@@ -594,7 +594,7 @@
           <a:p>
             <a:fld id="{85B3B054-712A-47A7-A562-EFC3154E7950}" type="datetimeFigureOut">
               <a:rPr lang="en-US" smtClean="0"/>
-              <a:t>2/18/2024</a:t>
+              <a:t>3/5/2024</a:t>
             </a:fld>
             <a:endParaRPr lang="en-US"/>
           </a:p>
@@ -764,7 +764,7 @@
           <a:p>
             <a:fld id="{85B3B054-712A-47A7-A562-EFC3154E7950}" type="datetimeFigureOut">
               <a:rPr lang="en-US" smtClean="0"/>
-              <a:t>2/18/2024</a:t>
+              <a:t>3/5/2024</a:t>
             </a:fld>
             <a:endParaRPr lang="en-US"/>
           </a:p>
@@ -1008,7 +1008,7 @@
           <a:p>
             <a:fld id="{85B3B054-712A-47A7-A562-EFC3154E7950}" type="datetimeFigureOut">
               <a:rPr lang="en-US" smtClean="0"/>
-              <a:t>2/18/2024</a:t>
+              <a:t>3/5/2024</a:t>
             </a:fld>
             <a:endParaRPr lang="en-US"/>
           </a:p>
@@ -1240,7 +1240,7 @@
           <a:p>
             <a:fld id="{85B3B054-712A-47A7-A562-EFC3154E7950}" type="datetimeFigureOut">
               <a:rPr lang="en-US" smtClean="0"/>
-              <a:t>2/18/2024</a:t>
+              <a:t>3/5/2024</a:t>
             </a:fld>
             <a:endParaRPr lang="en-US"/>
           </a:p>
@@ -1607,7 +1607,7 @@
           <a:p>
             <a:fld id="{85B3B054-712A-47A7-A562-EFC3154E7950}" type="datetimeFigureOut">
               <a:rPr lang="en-US" smtClean="0"/>
-              <a:t>2/18/2024</a:t>
+              <a:t>3/5/2024</a:t>
             </a:fld>
             <a:endParaRPr lang="en-US"/>
           </a:p>
@@ -1725,7 +1725,7 @@
           <a:p>
             <a:fld id="{85B3B054-712A-47A7-A562-EFC3154E7950}" type="datetimeFigureOut">
               <a:rPr lang="en-US" smtClean="0"/>
-              <a:t>2/18/2024</a:t>
+              <a:t>3/5/2024</a:t>
             </a:fld>
             <a:endParaRPr lang="en-US"/>
           </a:p>
@@ -1820,7 +1820,7 @@
           <a:p>
             <a:fld id="{85B3B054-712A-47A7-A562-EFC3154E7950}" type="datetimeFigureOut">
               <a:rPr lang="en-US" smtClean="0"/>
-              <a:t>2/18/2024</a:t>
+              <a:t>3/5/2024</a:t>
             </a:fld>
             <a:endParaRPr lang="en-US"/>
           </a:p>
@@ -2097,7 +2097,7 @@
           <a:p>
             <a:fld id="{85B3B054-712A-47A7-A562-EFC3154E7950}" type="datetimeFigureOut">
               <a:rPr lang="en-US" smtClean="0"/>
-              <a:t>2/18/2024</a:t>
+              <a:t>3/5/2024</a:t>
             </a:fld>
             <a:endParaRPr lang="en-US"/>
           </a:p>
@@ -2354,7 +2354,7 @@
           <a:p>
             <a:fld id="{85B3B054-712A-47A7-A562-EFC3154E7950}" type="datetimeFigureOut">
               <a:rPr lang="en-US" smtClean="0"/>
-              <a:t>2/18/2024</a:t>
+              <a:t>3/5/2024</a:t>
             </a:fld>
             <a:endParaRPr lang="en-US"/>
           </a:p>
@@ -2567,7 +2567,7 @@
           <a:p>
             <a:fld id="{85B3B054-712A-47A7-A562-EFC3154E7950}" type="datetimeFigureOut">
               <a:rPr lang="en-US" smtClean="0"/>
-              <a:t>2/18/2024</a:t>
+              <a:t>3/5/2024</a:t>
             </a:fld>
             <a:endParaRPr lang="en-US"/>
           </a:p>
@@ -2974,10 +2974,10 @@
       </p:grpSpPr>
       <p:grpSp>
         <p:nvGrpSpPr>
-          <p:cNvPr id="3" name="Group 2">
+          <p:cNvPr id="31" name="Group 30">
             <a:extLst>
               <a:ext uri="{FF2B5EF4-FFF2-40B4-BE49-F238E27FC236}">
-                <a16:creationId xmlns:a16="http://schemas.microsoft.com/office/drawing/2014/main" id="{B182945F-3AC6-6FD4-96BD-17AA37706BB7}"/>
+                <a16:creationId xmlns:a16="http://schemas.microsoft.com/office/drawing/2014/main" id="{94D4B676-9E5D-5225-4235-C29C1D09FC4C}"/>
               </a:ext>
             </a:extLst>
           </p:cNvPr>
@@ -2986,501 +2986,270 @@
         </p:nvGrpSpPr>
         <p:grpSpPr>
           <a:xfrm>
-            <a:off x="428820" y="3119200"/>
-            <a:ext cx="11523168" cy="9417814"/>
-            <a:chOff x="428820" y="3119200"/>
-            <a:chExt cx="11523168" cy="9417814"/>
+            <a:off x="1000990" y="3119200"/>
+            <a:ext cx="10448804" cy="10452259"/>
+            <a:chOff x="1000990" y="3119200"/>
+            <a:chExt cx="10448804" cy="10452259"/>
           </a:xfrm>
         </p:grpSpPr>
-        <p:grpSp>
-          <p:nvGrpSpPr>
-            <p:cNvPr id="2" name="Group 1">
+        <p:sp>
+          <p:nvSpPr>
+            <p:cNvPr id="8" name="TextBox 7">
               <a:extLst>
                 <a:ext uri="{FF2B5EF4-FFF2-40B4-BE49-F238E27FC236}">
-                  <a16:creationId xmlns:a16="http://schemas.microsoft.com/office/drawing/2014/main" id="{60E228F3-293D-8C69-E14C-5F01E0391EA5}"/>
+                  <a16:creationId xmlns:a16="http://schemas.microsoft.com/office/drawing/2014/main" id="{3B007C91-49C3-BEC5-6F27-A54C036B0AC4}"/>
                 </a:ext>
               </a:extLst>
             </p:cNvPr>
-            <p:cNvGrpSpPr/>
+            <p:cNvSpPr txBox="1"/>
             <p:nvPr/>
-          </p:nvGrpSpPr>
-          <p:grpSpPr>
+          </p:nvSpPr>
+          <p:spPr>
             <a:xfrm>
-              <a:off x="428820" y="3119200"/>
-              <a:ext cx="11523168" cy="9417814"/>
-              <a:chOff x="428820" y="3119200"/>
-              <a:chExt cx="11523168" cy="9417814"/>
+              <a:off x="1276959" y="3119200"/>
+              <a:ext cx="2715290" cy="369332"/>
             </a:xfrm>
-          </p:grpSpPr>
-          <p:sp>
-            <p:nvSpPr>
-              <p:cNvPr id="8" name="TextBox 7">
-                <a:extLst>
-                  <a:ext uri="{FF2B5EF4-FFF2-40B4-BE49-F238E27FC236}">
-                    <a16:creationId xmlns:a16="http://schemas.microsoft.com/office/drawing/2014/main" id="{3B007C91-49C3-BEC5-6F27-A54C036B0AC4}"/>
-                  </a:ext>
-                </a:extLst>
-              </p:cNvPr>
-              <p:cNvSpPr txBox="1"/>
-              <p:nvPr/>
-            </p:nvSpPr>
-            <p:spPr>
-              <a:xfrm>
-                <a:off x="909084" y="3119200"/>
-                <a:ext cx="2715290" cy="369332"/>
-              </a:xfrm>
-              <a:prstGeom prst="rect">
-                <a:avLst/>
-              </a:prstGeom>
-              <a:noFill/>
-            </p:spPr>
-            <p:txBody>
-              <a:bodyPr wrap="square" rtlCol="0">
-                <a:spAutoFit/>
-              </a:bodyPr>
-              <a:lstStyle/>
-              <a:p>
-                <a:pPr algn="ctr"/>
-                <a:r>
-                  <a:rPr lang="en-US" sz="1800" dirty="0">
-                    <a:highlight>
-                      <a:srgbClr val="F6C3C0"/>
-                    </a:highlight>
-                    <a:latin typeface="Times New Roman" panose="02020603050405020304" pitchFamily="18" charset="0"/>
-                    <a:cs typeface="Times New Roman" panose="02020603050405020304" pitchFamily="18" charset="0"/>
-                  </a:rPr>
-                  <a:t>Beggars/Provisioners</a:t>
-                </a:r>
-              </a:p>
-            </p:txBody>
-          </p:sp>
-          <p:sp>
-            <p:nvSpPr>
-              <p:cNvPr id="9" name="TextBox 8">
-                <a:extLst>
-                  <a:ext uri="{FF2B5EF4-FFF2-40B4-BE49-F238E27FC236}">
-                    <a16:creationId xmlns:a16="http://schemas.microsoft.com/office/drawing/2014/main" id="{EEA985B2-E1AE-840D-9619-E60CB871C2F3}"/>
-                  </a:ext>
-                </a:extLst>
-              </p:cNvPr>
-              <p:cNvSpPr txBox="1"/>
-              <p:nvPr/>
-            </p:nvSpPr>
-            <p:spPr>
-              <a:xfrm>
-                <a:off x="3817005" y="3119200"/>
-                <a:ext cx="2715290" cy="369332"/>
-              </a:xfrm>
-              <a:prstGeom prst="rect">
-                <a:avLst/>
-              </a:prstGeom>
-              <a:noFill/>
-            </p:spPr>
-            <p:txBody>
-              <a:bodyPr wrap="square" rtlCol="0">
-                <a:spAutoFit/>
-              </a:bodyPr>
-              <a:lstStyle/>
-              <a:p>
-                <a:pPr algn="ctr"/>
-                <a:r>
-                  <a:rPr lang="en-US" sz="1800" dirty="0">
-                    <a:highlight>
-                      <a:srgbClr val="99E3AE"/>
-                    </a:highlight>
-                    <a:latin typeface="Times New Roman" panose="02020603050405020304" pitchFamily="18" charset="0"/>
-                    <a:cs typeface="Times New Roman" panose="02020603050405020304" pitchFamily="18" charset="0"/>
-                  </a:rPr>
-                  <a:t>Fixed gear foragers</a:t>
-                </a:r>
-              </a:p>
-            </p:txBody>
-          </p:sp>
-          <p:sp>
-            <p:nvSpPr>
-              <p:cNvPr id="10" name="TextBox 9">
-                <a:extLst>
-                  <a:ext uri="{FF2B5EF4-FFF2-40B4-BE49-F238E27FC236}">
-                    <a16:creationId xmlns:a16="http://schemas.microsoft.com/office/drawing/2014/main" id="{9E583236-EA03-F0F8-AA3E-3B31B4C8D25C}"/>
-                  </a:ext>
-                </a:extLst>
-              </p:cNvPr>
-              <p:cNvSpPr txBox="1"/>
-              <p:nvPr/>
-            </p:nvSpPr>
-            <p:spPr>
-              <a:xfrm>
-                <a:off x="6724926" y="3119200"/>
-                <a:ext cx="2715290" cy="369332"/>
-              </a:xfrm>
-              <a:prstGeom prst="rect">
-                <a:avLst/>
-              </a:prstGeom>
-              <a:noFill/>
-            </p:spPr>
-            <p:txBody>
-              <a:bodyPr wrap="square" rtlCol="0">
-                <a:spAutoFit/>
-              </a:bodyPr>
-              <a:lstStyle/>
-              <a:p>
-                <a:pPr algn="ctr"/>
-                <a:r>
-                  <a:rPr lang="en-US" sz="1800" dirty="0">
-                    <a:highlight>
-                      <a:srgbClr val="B9D0F8"/>
-                    </a:highlight>
-                    <a:latin typeface="Times New Roman" panose="02020603050405020304" pitchFamily="18" charset="0"/>
-                    <a:cs typeface="Times New Roman" panose="02020603050405020304" pitchFamily="18" charset="0"/>
-                  </a:rPr>
-                  <a:t>Scavengers/Depredators</a:t>
-                </a:r>
-              </a:p>
-            </p:txBody>
-          </p:sp>
-          <p:sp>
-            <p:nvSpPr>
-              <p:cNvPr id="11" name="TextBox 10">
-                <a:extLst>
-                  <a:ext uri="{FF2B5EF4-FFF2-40B4-BE49-F238E27FC236}">
-                    <a16:creationId xmlns:a16="http://schemas.microsoft.com/office/drawing/2014/main" id="{7CDB8202-0AD7-D08E-D300-F9C3FB1752AC}"/>
-                  </a:ext>
-                </a:extLst>
-              </p:cNvPr>
-              <p:cNvSpPr txBox="1"/>
-              <p:nvPr/>
-            </p:nvSpPr>
-            <p:spPr>
-              <a:xfrm rot="16200000">
-                <a:off x="-735314" y="4482614"/>
-                <a:ext cx="2715290" cy="369332"/>
-              </a:xfrm>
-              <a:prstGeom prst="rect">
-                <a:avLst/>
-              </a:prstGeom>
-              <a:noFill/>
-            </p:spPr>
-            <p:txBody>
-              <a:bodyPr wrap="square" rtlCol="0">
-                <a:spAutoFit/>
-              </a:bodyPr>
-              <a:lstStyle/>
-              <a:p>
-                <a:pPr algn="ctr"/>
-                <a:r>
-                  <a:rPr lang="en-US" sz="1800" dirty="0">
-                    <a:highlight>
-                      <a:srgbClr val="FFEBEC"/>
-                    </a:highlight>
-                    <a:latin typeface="Times New Roman" panose="02020603050405020304" pitchFamily="18" charset="0"/>
-                    <a:cs typeface="Times New Roman" panose="02020603050405020304" pitchFamily="18" charset="0"/>
-                  </a:rPr>
-                  <a:t>Before</a:t>
-                </a:r>
-              </a:p>
-            </p:txBody>
-          </p:sp>
-          <p:sp>
-            <p:nvSpPr>
-              <p:cNvPr id="12" name="TextBox 11">
-                <a:extLst>
-                  <a:ext uri="{FF2B5EF4-FFF2-40B4-BE49-F238E27FC236}">
-                    <a16:creationId xmlns:a16="http://schemas.microsoft.com/office/drawing/2014/main" id="{89BA4407-F049-103E-3C06-1307B2EC1624}"/>
-                  </a:ext>
-                </a:extLst>
-              </p:cNvPr>
-              <p:cNvSpPr txBox="1"/>
-              <p:nvPr/>
-            </p:nvSpPr>
-            <p:spPr>
-              <a:xfrm rot="16200000">
-                <a:off x="-744159" y="6811989"/>
-                <a:ext cx="2715290" cy="369332"/>
-              </a:xfrm>
-              <a:prstGeom prst="rect">
-                <a:avLst/>
-              </a:prstGeom>
-              <a:noFill/>
-            </p:spPr>
-            <p:txBody>
-              <a:bodyPr wrap="square" rtlCol="0">
-                <a:spAutoFit/>
-              </a:bodyPr>
-              <a:lstStyle/>
-              <a:p>
-                <a:pPr algn="ctr"/>
-                <a:r>
-                  <a:rPr lang="en-US" sz="1800" dirty="0">
-                    <a:highlight>
-                      <a:srgbClr val="FF9899"/>
-                    </a:highlight>
-                    <a:latin typeface="Times New Roman" panose="02020603050405020304" pitchFamily="18" charset="0"/>
-                    <a:cs typeface="Times New Roman" panose="02020603050405020304" pitchFamily="18" charset="0"/>
-                  </a:rPr>
-                  <a:t>During</a:t>
-                </a:r>
-              </a:p>
-            </p:txBody>
-          </p:sp>
-          <p:sp>
-            <p:nvSpPr>
-              <p:cNvPr id="13" name="TextBox 12">
-                <a:extLst>
-                  <a:ext uri="{FF2B5EF4-FFF2-40B4-BE49-F238E27FC236}">
-                    <a16:creationId xmlns:a16="http://schemas.microsoft.com/office/drawing/2014/main" id="{6E42B6E7-0927-96FB-BDDA-7C2340A88769}"/>
-                  </a:ext>
-                </a:extLst>
-              </p:cNvPr>
-              <p:cNvSpPr txBox="1"/>
-              <p:nvPr/>
-            </p:nvSpPr>
-            <p:spPr>
-              <a:xfrm rot="16200000">
-                <a:off x="-735314" y="9239103"/>
-                <a:ext cx="2715290" cy="369332"/>
-              </a:xfrm>
-              <a:prstGeom prst="rect">
-                <a:avLst/>
-              </a:prstGeom>
-              <a:noFill/>
-            </p:spPr>
-            <p:txBody>
-              <a:bodyPr wrap="square" rtlCol="0">
-                <a:spAutoFit/>
-              </a:bodyPr>
-              <a:lstStyle/>
-              <a:p>
-                <a:pPr algn="ctr"/>
-                <a:r>
-                  <a:rPr lang="en-US" sz="1800" dirty="0">
-                    <a:highlight>
-                      <a:srgbClr val="FEC2C2"/>
-                    </a:highlight>
-                    <a:latin typeface="Times New Roman" panose="02020603050405020304" pitchFamily="18" charset="0"/>
-                    <a:cs typeface="Times New Roman" panose="02020603050405020304" pitchFamily="18" charset="0"/>
-                  </a:rPr>
-                  <a:t>After</a:t>
-                </a:r>
-              </a:p>
-            </p:txBody>
-          </p:sp>
-          <p:pic>
-            <p:nvPicPr>
-              <p:cNvPr id="17" name="Picture 16" descr="A diagram of a graph&#10;&#10;Description automatically generated with medium confidence">
-                <a:extLst>
-                  <a:ext uri="{FF2B5EF4-FFF2-40B4-BE49-F238E27FC236}">
-                    <a16:creationId xmlns:a16="http://schemas.microsoft.com/office/drawing/2014/main" id="{E21403FA-1B75-D25B-DC4E-E8F7D1531104}"/>
-                  </a:ext>
-                </a:extLst>
-              </p:cNvPr>
-              <p:cNvPicPr>
-                <a:picLocks noChangeAspect="1"/>
-              </p:cNvPicPr>
-              <p:nvPr/>
-            </p:nvPicPr>
-            <p:blipFill rotWithShape="1">
-              <a:blip r:embed="rId2">
-                <a:extLst>
-                  <a:ext uri="{28A0092B-C50C-407E-A947-70E740481C1C}">
-                    <a14:useLocalDpi xmlns:a14="http://schemas.microsoft.com/office/drawing/2010/main" val="0"/>
-                  </a:ext>
-                </a:extLst>
-              </a:blip>
-              <a:srcRect l="9186" t="6381" r="29504" b="10572"/>
-              <a:stretch/>
-            </p:blipFill>
-            <p:spPr>
-              <a:xfrm rot="5400000">
-                <a:off x="1420321" y="10267317"/>
-                <a:ext cx="1913467" cy="2419141"/>
-              </a:xfrm>
-              <a:prstGeom prst="rect">
-                <a:avLst/>
-              </a:prstGeom>
-            </p:spPr>
-          </p:pic>
-          <p:pic>
-            <p:nvPicPr>
-              <p:cNvPr id="19" name="Picture 18" descr="A diagram of different stages of period&#10;&#10;Description automatically generated">
-                <a:extLst>
-                  <a:ext uri="{FF2B5EF4-FFF2-40B4-BE49-F238E27FC236}">
-                    <a16:creationId xmlns:a16="http://schemas.microsoft.com/office/drawing/2014/main" id="{A1D6D0D3-B12A-0689-E8BA-E09CC8FB9228}"/>
-                  </a:ext>
-                </a:extLst>
-              </p:cNvPr>
-              <p:cNvPicPr>
-                <a:picLocks noChangeAspect="1"/>
-              </p:cNvPicPr>
-              <p:nvPr/>
-            </p:nvPicPr>
-            <p:blipFill rotWithShape="1">
-              <a:blip r:embed="rId3">
-                <a:extLst>
-                  <a:ext uri="{28A0092B-C50C-407E-A947-70E740481C1C}">
-                    <a14:useLocalDpi xmlns:a14="http://schemas.microsoft.com/office/drawing/2010/main" val="0"/>
-                  </a:ext>
-                </a:extLst>
-              </a:blip>
-              <a:srcRect l="7634" t="6533" r="30193" b="18582"/>
-              <a:stretch/>
-            </p:blipFill>
-            <p:spPr>
-              <a:xfrm rot="5400000">
-                <a:off x="4312074" y="10267317"/>
-                <a:ext cx="1913467" cy="2419141"/>
-              </a:xfrm>
-              <a:prstGeom prst="rect">
-                <a:avLst/>
-              </a:prstGeom>
-            </p:spPr>
-          </p:pic>
-          <p:pic>
-            <p:nvPicPr>
-              <p:cNvPr id="21" name="Picture 20" descr="A diagram of different shapes&#10;&#10;Description automatically generated with medium confidence">
-                <a:extLst>
-                  <a:ext uri="{FF2B5EF4-FFF2-40B4-BE49-F238E27FC236}">
-                    <a16:creationId xmlns:a16="http://schemas.microsoft.com/office/drawing/2014/main" id="{B57BFF0E-6503-9871-0A35-83FA325A97FE}"/>
-                  </a:ext>
-                </a:extLst>
-              </p:cNvPr>
-              <p:cNvPicPr>
-                <a:picLocks noChangeAspect="1"/>
-              </p:cNvPicPr>
-              <p:nvPr/>
-            </p:nvPicPr>
-            <p:blipFill rotWithShape="1">
-              <a:blip r:embed="rId4">
-                <a:extLst>
-                  <a:ext uri="{28A0092B-C50C-407E-A947-70E740481C1C}">
-                    <a14:useLocalDpi xmlns:a14="http://schemas.microsoft.com/office/drawing/2010/main" val="0"/>
-                  </a:ext>
-                </a:extLst>
-              </a:blip>
-              <a:srcRect l="8933" t="5003" r="28133" b="11714"/>
-              <a:stretch/>
-            </p:blipFill>
-            <p:spPr>
-              <a:xfrm rot="5400000">
-                <a:off x="7175934" y="10398603"/>
-                <a:ext cx="1913467" cy="2363355"/>
-              </a:xfrm>
-              <a:prstGeom prst="rect">
-                <a:avLst/>
-              </a:prstGeom>
-            </p:spPr>
-          </p:pic>
-          <p:pic>
-            <p:nvPicPr>
-              <p:cNvPr id="23" name="Picture 22" descr="A diagram of a graph&#10;&#10;Description automatically generated with medium confidence">
-                <a:extLst>
-                  <a:ext uri="{FF2B5EF4-FFF2-40B4-BE49-F238E27FC236}">
-                    <a16:creationId xmlns:a16="http://schemas.microsoft.com/office/drawing/2014/main" id="{7820E37C-8F24-3E9A-16E1-9B1972ACF3F4}"/>
-                  </a:ext>
-                </a:extLst>
-              </p:cNvPr>
-              <p:cNvPicPr>
-                <a:picLocks noChangeAspect="1"/>
-              </p:cNvPicPr>
-              <p:nvPr/>
-            </p:nvPicPr>
-            <p:blipFill rotWithShape="1">
-              <a:blip r:embed="rId5">
-                <a:extLst>
-                  <a:ext uri="{28A0092B-C50C-407E-A947-70E740481C1C}">
-                    <a14:useLocalDpi xmlns:a14="http://schemas.microsoft.com/office/drawing/2010/main" val="0"/>
-                  </a:ext>
-                </a:extLst>
-              </a:blip>
-              <a:srcRect l="4735" t="7715" r="15616" b="13048"/>
-              <a:stretch/>
-            </p:blipFill>
-            <p:spPr>
-              <a:xfrm>
-                <a:off x="9587679" y="3609941"/>
-                <a:ext cx="2277494" cy="2114678"/>
-              </a:xfrm>
-              <a:prstGeom prst="rect">
-                <a:avLst/>
-              </a:prstGeom>
-            </p:spPr>
-          </p:pic>
-          <p:pic>
-            <p:nvPicPr>
-              <p:cNvPr id="25" name="Picture 24" descr="A diagram of a graph&#10;&#10;Description automatically generated with medium confidence">
-                <a:extLst>
-                  <a:ext uri="{FF2B5EF4-FFF2-40B4-BE49-F238E27FC236}">
-                    <a16:creationId xmlns:a16="http://schemas.microsoft.com/office/drawing/2014/main" id="{F61E5D77-5AB8-B0BE-B6CB-72CF0FE88A4F}"/>
-                  </a:ext>
-                </a:extLst>
-              </p:cNvPr>
-              <p:cNvPicPr>
-                <a:picLocks noChangeAspect="1"/>
-              </p:cNvPicPr>
-              <p:nvPr/>
-            </p:nvPicPr>
-            <p:blipFill rotWithShape="1">
-              <a:blip r:embed="rId6">
-                <a:extLst>
-                  <a:ext uri="{28A0092B-C50C-407E-A947-70E740481C1C}">
-                    <a14:useLocalDpi xmlns:a14="http://schemas.microsoft.com/office/drawing/2010/main" val="0"/>
-                  </a:ext>
-                </a:extLst>
-              </a:blip>
-              <a:srcRect l="4735" t="5004" r="15616" b="12476"/>
-              <a:stretch/>
-            </p:blipFill>
-            <p:spPr>
-              <a:xfrm>
-                <a:off x="9686220" y="5939316"/>
-                <a:ext cx="2186910" cy="2114678"/>
-              </a:xfrm>
-              <a:prstGeom prst="rect">
-                <a:avLst/>
-              </a:prstGeom>
-            </p:spPr>
-          </p:pic>
-          <p:pic>
-            <p:nvPicPr>
-              <p:cNvPr id="27" name="Picture 26" descr="A diagram of a graph&#10;&#10;Description automatically generated with medium confidence">
-                <a:extLst>
-                  <a:ext uri="{FF2B5EF4-FFF2-40B4-BE49-F238E27FC236}">
-                    <a16:creationId xmlns:a16="http://schemas.microsoft.com/office/drawing/2014/main" id="{D3E0CA58-CE3E-6F51-C410-6C8DD8782B83}"/>
-                  </a:ext>
-                </a:extLst>
-              </p:cNvPr>
-              <p:cNvPicPr>
-                <a:picLocks noChangeAspect="1"/>
-              </p:cNvPicPr>
-              <p:nvPr/>
-            </p:nvPicPr>
-            <p:blipFill rotWithShape="1">
-              <a:blip r:embed="rId7">
-                <a:extLst>
-                  <a:ext uri="{28A0092B-C50C-407E-A947-70E740481C1C}">
-                    <a14:useLocalDpi xmlns:a14="http://schemas.microsoft.com/office/drawing/2010/main" val="0"/>
-                  </a:ext>
-                </a:extLst>
-              </a:blip>
-              <a:srcRect l="4735" t="5003" r="15616" b="11143"/>
-              <a:stretch/>
-            </p:blipFill>
-            <p:spPr>
-              <a:xfrm>
-                <a:off x="9686220" y="8268691"/>
-                <a:ext cx="2265768" cy="2226332"/>
-              </a:xfrm>
-              <a:prstGeom prst="rect">
-                <a:avLst/>
-              </a:prstGeom>
-            </p:spPr>
-          </p:pic>
-        </p:grpSp>
+            <a:prstGeom prst="rect">
+              <a:avLst/>
+            </a:prstGeom>
+            <a:noFill/>
+          </p:spPr>
+          <p:txBody>
+            <a:bodyPr wrap="square" rtlCol="0">
+              <a:spAutoFit/>
+            </a:bodyPr>
+            <a:lstStyle/>
+            <a:p>
+              <a:pPr algn="ctr"/>
+              <a:r>
+                <a:rPr lang="en-US" sz="1800" dirty="0">
+                  <a:highlight>
+                    <a:srgbClr val="FFA07A"/>
+                  </a:highlight>
+                  <a:latin typeface="Times New Roman" panose="02020603050405020304" pitchFamily="18" charset="0"/>
+                  <a:cs typeface="Times New Roman" panose="02020603050405020304" pitchFamily="18" charset="0"/>
+                </a:rPr>
+                <a:t>Beggars/Provisioners</a:t>
+              </a:r>
+            </a:p>
+          </p:txBody>
+        </p:sp>
+        <p:sp>
+          <p:nvSpPr>
+            <p:cNvPr id="9" name="TextBox 8">
+              <a:extLst>
+                <a:ext uri="{FF2B5EF4-FFF2-40B4-BE49-F238E27FC236}">
+                  <a16:creationId xmlns:a16="http://schemas.microsoft.com/office/drawing/2014/main" id="{EEA985B2-E1AE-840D-9619-E60CB871C2F3}"/>
+                </a:ext>
+              </a:extLst>
+            </p:cNvPr>
+            <p:cNvSpPr txBox="1"/>
+            <p:nvPr/>
+          </p:nvSpPr>
+          <p:spPr>
+            <a:xfrm>
+              <a:off x="3822677" y="3119200"/>
+              <a:ext cx="2715290" cy="369332"/>
+            </a:xfrm>
+            <a:prstGeom prst="rect">
+              <a:avLst/>
+            </a:prstGeom>
+            <a:noFill/>
+          </p:spPr>
+          <p:txBody>
+            <a:bodyPr wrap="square" rtlCol="0">
+              <a:spAutoFit/>
+            </a:bodyPr>
+            <a:lstStyle/>
+            <a:p>
+              <a:pPr algn="ctr"/>
+              <a:r>
+                <a:rPr lang="en-US" sz="1800" dirty="0">
+                  <a:highlight>
+                    <a:srgbClr val="79CEB7"/>
+                  </a:highlight>
+                  <a:latin typeface="Times New Roman" panose="02020603050405020304" pitchFamily="18" charset="0"/>
+                  <a:cs typeface="Times New Roman" panose="02020603050405020304" pitchFamily="18" charset="0"/>
+                </a:rPr>
+                <a:t>Fixed gear foragers</a:t>
+              </a:r>
+            </a:p>
+          </p:txBody>
+        </p:sp>
+        <p:sp>
+          <p:nvSpPr>
+            <p:cNvPr id="10" name="TextBox 9">
+              <a:extLst>
+                <a:ext uri="{FF2B5EF4-FFF2-40B4-BE49-F238E27FC236}">
+                  <a16:creationId xmlns:a16="http://schemas.microsoft.com/office/drawing/2014/main" id="{9E583236-EA03-F0F8-AA3E-3B31B4C8D25C}"/>
+                </a:ext>
+              </a:extLst>
+            </p:cNvPr>
+            <p:cNvSpPr txBox="1"/>
+            <p:nvPr/>
+          </p:nvSpPr>
+          <p:spPr>
+            <a:xfrm>
+              <a:off x="6368394" y="3119200"/>
+              <a:ext cx="2715290" cy="369332"/>
+            </a:xfrm>
+            <a:prstGeom prst="rect">
+              <a:avLst/>
+            </a:prstGeom>
+            <a:noFill/>
+          </p:spPr>
+          <p:txBody>
+            <a:bodyPr wrap="square" rtlCol="0">
+              <a:spAutoFit/>
+            </a:bodyPr>
+            <a:lstStyle/>
+            <a:p>
+              <a:pPr algn="ctr"/>
+              <a:r>
+                <a:rPr lang="en-US" sz="1800" dirty="0">
+                  <a:highlight>
+                    <a:srgbClr val="71CBD1"/>
+                  </a:highlight>
+                  <a:latin typeface="Times New Roman" panose="02020603050405020304" pitchFamily="18" charset="0"/>
+                  <a:cs typeface="Times New Roman" panose="02020603050405020304" pitchFamily="18" charset="0"/>
+                </a:rPr>
+                <a:t>Scavengers/Depredators</a:t>
+              </a:r>
+            </a:p>
+          </p:txBody>
+        </p:sp>
+        <p:sp>
+          <p:nvSpPr>
+            <p:cNvPr id="11" name="TextBox 10">
+              <a:extLst>
+                <a:ext uri="{FF2B5EF4-FFF2-40B4-BE49-F238E27FC236}">
+                  <a16:creationId xmlns:a16="http://schemas.microsoft.com/office/drawing/2014/main" id="{7CDB8202-0AD7-D08E-D300-F9C3FB1752AC}"/>
+                </a:ext>
+              </a:extLst>
+            </p:cNvPr>
+            <p:cNvSpPr txBox="1"/>
+            <p:nvPr/>
+          </p:nvSpPr>
+          <p:spPr>
+            <a:xfrm rot="16200000">
+              <a:off x="-166318" y="4476845"/>
+              <a:ext cx="2715290" cy="369332"/>
+            </a:xfrm>
+            <a:prstGeom prst="rect">
+              <a:avLst/>
+            </a:prstGeom>
+            <a:noFill/>
+          </p:spPr>
+          <p:txBody>
+            <a:bodyPr wrap="square" rtlCol="0">
+              <a:spAutoFit/>
+            </a:bodyPr>
+            <a:lstStyle/>
+            <a:p>
+              <a:pPr algn="ctr"/>
+              <a:r>
+                <a:rPr lang="en-US" sz="1800" dirty="0">
+                  <a:highlight>
+                    <a:srgbClr val="808080"/>
+                  </a:highlight>
+                  <a:latin typeface="Times New Roman" panose="02020603050405020304" pitchFamily="18" charset="0"/>
+                  <a:cs typeface="Times New Roman" panose="02020603050405020304" pitchFamily="18" charset="0"/>
+                </a:rPr>
+                <a:t>Before</a:t>
+              </a:r>
+            </a:p>
+          </p:txBody>
+        </p:sp>
+        <p:sp>
+          <p:nvSpPr>
+            <p:cNvPr id="12" name="TextBox 11">
+              <a:extLst>
+                <a:ext uri="{FF2B5EF4-FFF2-40B4-BE49-F238E27FC236}">
+                  <a16:creationId xmlns:a16="http://schemas.microsoft.com/office/drawing/2014/main" id="{89BA4407-F049-103E-3C06-1307B2EC1624}"/>
+                </a:ext>
+              </a:extLst>
+            </p:cNvPr>
+            <p:cNvSpPr txBox="1"/>
+            <p:nvPr/>
+          </p:nvSpPr>
+          <p:spPr>
+            <a:xfrm rot="16200000">
+              <a:off x="-171989" y="7113866"/>
+              <a:ext cx="2715290" cy="369332"/>
+            </a:xfrm>
+            <a:prstGeom prst="rect">
+              <a:avLst/>
+            </a:prstGeom>
+            <a:noFill/>
+          </p:spPr>
+          <p:txBody>
+            <a:bodyPr wrap="square" rtlCol="0">
+              <a:spAutoFit/>
+            </a:bodyPr>
+            <a:lstStyle/>
+            <a:p>
+              <a:pPr algn="ctr"/>
+              <a:r>
+                <a:rPr lang="en-US" sz="1800" dirty="0">
+                  <a:highlight>
+                    <a:srgbClr val="C4C4C4"/>
+                  </a:highlight>
+                  <a:latin typeface="Times New Roman" panose="02020603050405020304" pitchFamily="18" charset="0"/>
+                  <a:cs typeface="Times New Roman" panose="02020603050405020304" pitchFamily="18" charset="0"/>
+                </a:rPr>
+                <a:t>During</a:t>
+              </a:r>
+            </a:p>
+          </p:txBody>
+        </p:sp>
+        <p:sp>
+          <p:nvSpPr>
+            <p:cNvPr id="13" name="TextBox 12">
+              <a:extLst>
+                <a:ext uri="{FF2B5EF4-FFF2-40B4-BE49-F238E27FC236}">
+                  <a16:creationId xmlns:a16="http://schemas.microsoft.com/office/drawing/2014/main" id="{6E42B6E7-0927-96FB-BDDA-7C2340A88769}"/>
+                </a:ext>
+              </a:extLst>
+            </p:cNvPr>
+            <p:cNvSpPr txBox="1"/>
+            <p:nvPr/>
+          </p:nvSpPr>
+          <p:spPr>
+            <a:xfrm rot="16200000">
+              <a:off x="-166318" y="9566221"/>
+              <a:ext cx="2715290" cy="369332"/>
+            </a:xfrm>
+            <a:prstGeom prst="rect">
+              <a:avLst/>
+            </a:prstGeom>
+            <a:noFill/>
+          </p:spPr>
+          <p:txBody>
+            <a:bodyPr wrap="square" rtlCol="0">
+              <a:spAutoFit/>
+            </a:bodyPr>
+            <a:lstStyle/>
+            <a:p>
+              <a:pPr algn="ctr"/>
+              <a:r>
+                <a:rPr lang="en-US" sz="1800" dirty="0">
+                  <a:highlight>
+                    <a:srgbClr val="FFFFFF"/>
+                  </a:highlight>
+                  <a:latin typeface="Times New Roman" panose="02020603050405020304" pitchFamily="18" charset="0"/>
+                  <a:cs typeface="Times New Roman" panose="02020603050405020304" pitchFamily="18" charset="0"/>
+                </a:rPr>
+                <a:t>After</a:t>
+              </a:r>
+            </a:p>
+          </p:txBody>
+        </p:sp>
         <p:pic>
           <p:nvPicPr>
-            <p:cNvPr id="4" name="Picture 3" descr="A collage of several black dots&#10;&#10;Description automatically generated">
+            <p:cNvPr id="6" name="Picture 5" descr="A group of black dots&#10;&#10;Description automatically generated">
               <a:extLst>
                 <a:ext uri="{FF2B5EF4-FFF2-40B4-BE49-F238E27FC236}">
-                  <a16:creationId xmlns:a16="http://schemas.microsoft.com/office/drawing/2014/main" id="{5E4F965B-510E-1C97-9B2D-E13A0DB358A1}"/>
+                  <a16:creationId xmlns:a16="http://schemas.microsoft.com/office/drawing/2014/main" id="{5DF2CCEC-33FA-54D7-2A0A-494AB737C2A5}"/>
                 </a:ext>
               </a:extLst>
             </p:cNvPr>
@@ -3490,7 +3259,7 @@
             <p:nvPr/>
           </p:nvPicPr>
           <p:blipFill>
-            <a:blip r:embed="rId8">
+            <a:blip r:embed="rId2">
               <a:extLst>
                 <a:ext uri="{28A0092B-C50C-407E-A947-70E740481C1C}">
                   <a14:useLocalDpi xmlns:a14="http://schemas.microsoft.com/office/drawing/2010/main" val="0"/>
@@ -3503,8 +3272,218 @@
           </p:blipFill>
           <p:spPr>
             <a:xfrm>
-              <a:off x="770466" y="3484747"/>
-              <a:ext cx="8669750" cy="6935800"/>
+              <a:off x="1364650" y="3488532"/>
+              <a:ext cx="7620000" cy="7620000"/>
+            </a:xfrm>
+            <a:prstGeom prst="rect">
+              <a:avLst/>
+            </a:prstGeom>
+          </p:spPr>
+        </p:pic>
+        <p:pic>
+          <p:nvPicPr>
+            <p:cNvPr id="14" name="Picture 13" descr="A diagram of a diagram&#10;&#10;Description automatically generated">
+              <a:extLst>
+                <a:ext uri="{FF2B5EF4-FFF2-40B4-BE49-F238E27FC236}">
+                  <a16:creationId xmlns:a16="http://schemas.microsoft.com/office/drawing/2014/main" id="{D93F2916-EFDE-2F45-5819-9A91E6A202C2}"/>
+                </a:ext>
+              </a:extLst>
+            </p:cNvPr>
+            <p:cNvPicPr>
+              <a:picLocks noChangeAspect="1"/>
+            </p:cNvPicPr>
+            <p:nvPr/>
+          </p:nvPicPr>
+          <p:blipFill rotWithShape="1">
+            <a:blip r:embed="rId3">
+              <a:extLst>
+                <a:ext uri="{28A0092B-C50C-407E-A947-70E740481C1C}">
+                  <a14:useLocalDpi xmlns:a14="http://schemas.microsoft.com/office/drawing/2010/main" val="0"/>
+                </a:ext>
+              </a:extLst>
+            </a:blip>
+            <a:srcRect l="6111" t="7334" r="19444" b="15333"/>
+            <a:stretch/>
+          </p:blipFill>
+          <p:spPr>
+            <a:xfrm>
+              <a:off x="8984650" y="3673198"/>
+              <a:ext cx="2465144" cy="2134005"/>
+            </a:xfrm>
+            <a:prstGeom prst="rect">
+              <a:avLst/>
+            </a:prstGeom>
+          </p:spPr>
+        </p:pic>
+        <p:pic>
+          <p:nvPicPr>
+            <p:cNvPr id="16" name="Picture 15" descr="A diagram of different colored shapes&#10;&#10;Description automatically generated">
+              <a:extLst>
+                <a:ext uri="{FF2B5EF4-FFF2-40B4-BE49-F238E27FC236}">
+                  <a16:creationId xmlns:a16="http://schemas.microsoft.com/office/drawing/2014/main" id="{0771E968-5953-695F-3F03-44B235E4564C}"/>
+                </a:ext>
+              </a:extLst>
+            </p:cNvPr>
+            <p:cNvPicPr>
+              <a:picLocks noChangeAspect="1"/>
+            </p:cNvPicPr>
+            <p:nvPr/>
+          </p:nvPicPr>
+          <p:blipFill rotWithShape="1">
+            <a:blip r:embed="rId4">
+              <a:extLst>
+                <a:ext uri="{28A0092B-C50C-407E-A947-70E740481C1C}">
+                  <a14:useLocalDpi xmlns:a14="http://schemas.microsoft.com/office/drawing/2010/main" val="0"/>
+                </a:ext>
+              </a:extLst>
+            </a:blip>
+            <a:srcRect l="6622" t="7333" r="20311" b="15120"/>
+            <a:stretch/>
+          </p:blipFill>
+          <p:spPr>
+            <a:xfrm>
+              <a:off x="8984650" y="6184650"/>
+              <a:ext cx="2465144" cy="2180243"/>
+            </a:xfrm>
+            <a:prstGeom prst="rect">
+              <a:avLst/>
+            </a:prstGeom>
+          </p:spPr>
+        </p:pic>
+        <p:pic>
+          <p:nvPicPr>
+            <p:cNvPr id="20" name="Picture 19" descr="A diagram of a variety of colored shapes&#10;&#10;Description automatically generated with medium confidence">
+              <a:extLst>
+                <a:ext uri="{FF2B5EF4-FFF2-40B4-BE49-F238E27FC236}">
+                  <a16:creationId xmlns:a16="http://schemas.microsoft.com/office/drawing/2014/main" id="{80B6BC1A-EE1F-736F-6324-D6F553E089ED}"/>
+                </a:ext>
+              </a:extLst>
+            </p:cNvPr>
+            <p:cNvPicPr>
+              <a:picLocks noChangeAspect="1"/>
+            </p:cNvPicPr>
+            <p:nvPr/>
+          </p:nvPicPr>
+          <p:blipFill rotWithShape="1">
+            <a:blip r:embed="rId5">
+              <a:extLst>
+                <a:ext uri="{28A0092B-C50C-407E-A947-70E740481C1C}">
+                  <a14:useLocalDpi xmlns:a14="http://schemas.microsoft.com/office/drawing/2010/main" val="0"/>
+                </a:ext>
+              </a:extLst>
+            </a:blip>
+            <a:srcRect l="4889" t="7333" r="18445" b="17764"/>
+            <a:stretch/>
+          </p:blipFill>
+          <p:spPr>
+            <a:xfrm>
+              <a:off x="8972280" y="8742340"/>
+              <a:ext cx="2477514" cy="2017093"/>
+            </a:xfrm>
+            <a:prstGeom prst="rect">
+              <a:avLst/>
+            </a:prstGeom>
+          </p:spPr>
+        </p:pic>
+        <p:pic>
+          <p:nvPicPr>
+            <p:cNvPr id="24" name="Picture 23" descr="A diagram of different stages of hab&#10;&#10;Description automatically generated">
+              <a:extLst>
+                <a:ext uri="{FF2B5EF4-FFF2-40B4-BE49-F238E27FC236}">
+                  <a16:creationId xmlns:a16="http://schemas.microsoft.com/office/drawing/2014/main" id="{A7286C4B-D72A-C098-C31F-DD1C0C2EC9AF}"/>
+                </a:ext>
+              </a:extLst>
+            </p:cNvPr>
+            <p:cNvPicPr>
+              <a:picLocks noChangeAspect="1"/>
+            </p:cNvPicPr>
+            <p:nvPr/>
+          </p:nvPicPr>
+          <p:blipFill rotWithShape="1">
+            <a:blip r:embed="rId6">
+              <a:extLst>
+                <a:ext uri="{28A0092B-C50C-407E-A947-70E740481C1C}">
+                  <a14:useLocalDpi xmlns:a14="http://schemas.microsoft.com/office/drawing/2010/main" val="0"/>
+                </a:ext>
+              </a:extLst>
+            </a:blip>
+            <a:srcRect l="7767" t="6259" r="28976" b="15632"/>
+            <a:stretch/>
+          </p:blipFill>
+          <p:spPr>
+            <a:xfrm rot="5400000">
+              <a:off x="6535523" y="11072815"/>
+              <a:ext cx="2462927" cy="2534361"/>
+            </a:xfrm>
+            <a:prstGeom prst="rect">
+              <a:avLst/>
+            </a:prstGeom>
+          </p:spPr>
+        </p:pic>
+        <p:pic>
+          <p:nvPicPr>
+            <p:cNvPr id="28" name="Picture 27" descr="A diagram of different stages of hab&#10;&#10;Description automatically generated">
+              <a:extLst>
+                <a:ext uri="{FF2B5EF4-FFF2-40B4-BE49-F238E27FC236}">
+                  <a16:creationId xmlns:a16="http://schemas.microsoft.com/office/drawing/2014/main" id="{BF53E2D7-92E1-1E9F-E3C6-2228FF756578}"/>
+                </a:ext>
+              </a:extLst>
+            </p:cNvPr>
+            <p:cNvPicPr>
+              <a:picLocks noChangeAspect="1"/>
+            </p:cNvPicPr>
+            <p:nvPr/>
+          </p:nvPicPr>
+          <p:blipFill rotWithShape="1">
+            <a:blip r:embed="rId7">
+              <a:extLst>
+                <a:ext uri="{28A0092B-C50C-407E-A947-70E740481C1C}">
+                  <a14:useLocalDpi xmlns:a14="http://schemas.microsoft.com/office/drawing/2010/main" val="0"/>
+                </a:ext>
+              </a:extLst>
+            </a:blip>
+            <a:srcRect l="7137" t="9276" r="29032" b="14934"/>
+            <a:stretch/>
+          </p:blipFill>
+          <p:spPr>
+            <a:xfrm rot="5400000">
+              <a:off x="1415813" y="11113338"/>
+              <a:ext cx="2385503" cy="2360327"/>
+            </a:xfrm>
+            <a:prstGeom prst="rect">
+              <a:avLst/>
+            </a:prstGeom>
+          </p:spPr>
+        </p:pic>
+        <p:pic>
+          <p:nvPicPr>
+            <p:cNvPr id="30" name="Picture 29" descr="A diagram of different stages of hab&#10;&#10;Description automatically generated">
+              <a:extLst>
+                <a:ext uri="{FF2B5EF4-FFF2-40B4-BE49-F238E27FC236}">
+                  <a16:creationId xmlns:a16="http://schemas.microsoft.com/office/drawing/2014/main" id="{4AC1BEA2-EDA7-B1CE-0578-0204439A13B0}"/>
+                </a:ext>
+              </a:extLst>
+            </p:cNvPr>
+            <p:cNvPicPr>
+              <a:picLocks noChangeAspect="1"/>
+            </p:cNvPicPr>
+            <p:nvPr/>
+          </p:nvPicPr>
+          <p:blipFill rotWithShape="1">
+            <a:blip r:embed="rId8">
+              <a:extLst>
+                <a:ext uri="{28A0092B-C50C-407E-A947-70E740481C1C}">
+                  <a14:useLocalDpi xmlns:a14="http://schemas.microsoft.com/office/drawing/2010/main" val="0"/>
+                </a:ext>
+              </a:extLst>
+            </a:blip>
+            <a:srcRect l="6631" t="7255" r="29200" b="15339"/>
+            <a:stretch/>
+          </p:blipFill>
+          <p:spPr>
+            <a:xfrm rot="5400000">
+              <a:off x="4063347" y="11132089"/>
+              <a:ext cx="2348002" cy="2360327"/>
             </a:xfrm>
             <a:prstGeom prst="rect">
               <a:avLst/>

</xml_diff>

<commit_message>
Separate chapter 2 models
</commit_message>
<xml_diff>
--- a/figs/networks.pptx
+++ b/figs/networks.pptx
@@ -244,7 +244,7 @@
           <a:p>
             <a:fld id="{85B3B054-712A-47A7-A562-EFC3154E7950}" type="datetimeFigureOut">
               <a:rPr lang="en-US" smtClean="0"/>
-              <a:t>3/5/2024</a:t>
+              <a:t>4/11/2024</a:t>
             </a:fld>
             <a:endParaRPr lang="en-US"/>
           </a:p>
@@ -414,7 +414,7 @@
           <a:p>
             <a:fld id="{85B3B054-712A-47A7-A562-EFC3154E7950}" type="datetimeFigureOut">
               <a:rPr lang="en-US" smtClean="0"/>
-              <a:t>3/5/2024</a:t>
+              <a:t>4/11/2024</a:t>
             </a:fld>
             <a:endParaRPr lang="en-US"/>
           </a:p>
@@ -594,7 +594,7 @@
           <a:p>
             <a:fld id="{85B3B054-712A-47A7-A562-EFC3154E7950}" type="datetimeFigureOut">
               <a:rPr lang="en-US" smtClean="0"/>
-              <a:t>3/5/2024</a:t>
+              <a:t>4/11/2024</a:t>
             </a:fld>
             <a:endParaRPr lang="en-US"/>
           </a:p>
@@ -764,7 +764,7 @@
           <a:p>
             <a:fld id="{85B3B054-712A-47A7-A562-EFC3154E7950}" type="datetimeFigureOut">
               <a:rPr lang="en-US" smtClean="0"/>
-              <a:t>3/5/2024</a:t>
+              <a:t>4/11/2024</a:t>
             </a:fld>
             <a:endParaRPr lang="en-US"/>
           </a:p>
@@ -1008,7 +1008,7 @@
           <a:p>
             <a:fld id="{85B3B054-712A-47A7-A562-EFC3154E7950}" type="datetimeFigureOut">
               <a:rPr lang="en-US" smtClean="0"/>
-              <a:t>3/5/2024</a:t>
+              <a:t>4/11/2024</a:t>
             </a:fld>
             <a:endParaRPr lang="en-US"/>
           </a:p>
@@ -1240,7 +1240,7 @@
           <a:p>
             <a:fld id="{85B3B054-712A-47A7-A562-EFC3154E7950}" type="datetimeFigureOut">
               <a:rPr lang="en-US" smtClean="0"/>
-              <a:t>3/5/2024</a:t>
+              <a:t>4/11/2024</a:t>
             </a:fld>
             <a:endParaRPr lang="en-US"/>
           </a:p>
@@ -1607,7 +1607,7 @@
           <a:p>
             <a:fld id="{85B3B054-712A-47A7-A562-EFC3154E7950}" type="datetimeFigureOut">
               <a:rPr lang="en-US" smtClean="0"/>
-              <a:t>3/5/2024</a:t>
+              <a:t>4/11/2024</a:t>
             </a:fld>
             <a:endParaRPr lang="en-US"/>
           </a:p>
@@ -1725,7 +1725,7 @@
           <a:p>
             <a:fld id="{85B3B054-712A-47A7-A562-EFC3154E7950}" type="datetimeFigureOut">
               <a:rPr lang="en-US" smtClean="0"/>
-              <a:t>3/5/2024</a:t>
+              <a:t>4/11/2024</a:t>
             </a:fld>
             <a:endParaRPr lang="en-US"/>
           </a:p>
@@ -1820,7 +1820,7 @@
           <a:p>
             <a:fld id="{85B3B054-712A-47A7-A562-EFC3154E7950}" type="datetimeFigureOut">
               <a:rPr lang="en-US" smtClean="0"/>
-              <a:t>3/5/2024</a:t>
+              <a:t>4/11/2024</a:t>
             </a:fld>
             <a:endParaRPr lang="en-US"/>
           </a:p>
@@ -2097,7 +2097,7 @@
           <a:p>
             <a:fld id="{85B3B054-712A-47A7-A562-EFC3154E7950}" type="datetimeFigureOut">
               <a:rPr lang="en-US" smtClean="0"/>
-              <a:t>3/5/2024</a:t>
+              <a:t>4/11/2024</a:t>
             </a:fld>
             <a:endParaRPr lang="en-US"/>
           </a:p>
@@ -2354,7 +2354,7 @@
           <a:p>
             <a:fld id="{85B3B054-712A-47A7-A562-EFC3154E7950}" type="datetimeFigureOut">
               <a:rPr lang="en-US" smtClean="0"/>
-              <a:t>3/5/2024</a:t>
+              <a:t>4/11/2024</a:t>
             </a:fld>
             <a:endParaRPr lang="en-US"/>
           </a:p>
@@ -2567,7 +2567,7 @@
           <a:p>
             <a:fld id="{85B3B054-712A-47A7-A562-EFC3154E7950}" type="datetimeFigureOut">
               <a:rPr lang="en-US" smtClean="0"/>
-              <a:t>3/5/2024</a:t>
+              <a:t>4/11/2024</a:t>
             </a:fld>
             <a:endParaRPr lang="en-US"/>
           </a:p>
@@ -3728,7 +3728,7 @@
                   <a:latin typeface="Times New Roman" panose="02020603050405020304" pitchFamily="18" charset="0"/>
                   <a:cs typeface="Times New Roman" panose="02020603050405020304" pitchFamily="18" charset="0"/>
                 </a:rPr>
-                <a:t>Number of Total Clusters = 8</a:t>
+                <a:t>Total Clusters = 8</a:t>
               </a:r>
             </a:p>
             <a:p>
@@ -3738,7 +3738,7 @@
                   <a:latin typeface="Times New Roman" panose="02020603050405020304" pitchFamily="18" charset="0"/>
                   <a:cs typeface="Times New Roman" panose="02020603050405020304" pitchFamily="18" charset="0"/>
                 </a:rPr>
-                <a:t>Number of HC Clusters = 7</a:t>
+                <a:t>Human-centric Clusters = 7</a:t>
               </a:r>
               <a:endParaRPr lang="en-US" sz="1800" dirty="0">
                 <a:latin typeface="Times New Roman" panose="02020603050405020304" pitchFamily="18" charset="0"/>
@@ -3781,7 +3781,7 @@
                   <a:latin typeface="Times New Roman" panose="02020603050405020304" pitchFamily="18" charset="0"/>
                   <a:cs typeface="Times New Roman" panose="02020603050405020304" pitchFamily="18" charset="0"/>
                 </a:rPr>
-                <a:t>Number of Total Clusters = 7</a:t>
+                <a:t>Total Clusters = 7</a:t>
               </a:r>
             </a:p>
             <a:p>
@@ -3791,7 +3791,7 @@
                   <a:latin typeface="Times New Roman" panose="02020603050405020304" pitchFamily="18" charset="0"/>
                   <a:cs typeface="Times New Roman" panose="02020603050405020304" pitchFamily="18" charset="0"/>
                 </a:rPr>
-                <a:t>Number of HC Clusters = 4</a:t>
+                <a:t>Human-centric Clusters = 4</a:t>
               </a:r>
               <a:endParaRPr lang="en-US" sz="1800" dirty="0">
                 <a:latin typeface="Times New Roman" panose="02020603050405020304" pitchFamily="18" charset="0"/>
@@ -3834,7 +3834,7 @@
                   <a:latin typeface="Times New Roman" panose="02020603050405020304" pitchFamily="18" charset="0"/>
                   <a:cs typeface="Times New Roman" panose="02020603050405020304" pitchFamily="18" charset="0"/>
                 </a:rPr>
-                <a:t>Number of Total Clusters = 8</a:t>
+                <a:t>Total Clusters = 8</a:t>
               </a:r>
             </a:p>
             <a:p>
@@ -3844,7 +3844,7 @@
                   <a:latin typeface="Times New Roman" panose="02020603050405020304" pitchFamily="18" charset="0"/>
                   <a:cs typeface="Times New Roman" panose="02020603050405020304" pitchFamily="18" charset="0"/>
                 </a:rPr>
-                <a:t>Number of HC Clusters = 8</a:t>
+                <a:t>Human-centric Clusters = 8</a:t>
               </a:r>
               <a:endParaRPr lang="en-US" sz="1800" dirty="0">
                 <a:latin typeface="Times New Roman" panose="02020603050405020304" pitchFamily="18" charset="0"/>

</xml_diff>

<commit_message>
Adjusting chapter 1 for edits from Katie
</commit_message>
<xml_diff>
--- a/figs/networks.pptx
+++ b/figs/networks.pptx
@@ -247,7 +247,7 @@
           <a:p>
             <a:fld id="{85B3B054-712A-47A7-A562-EFC3154E7950}" type="datetimeFigureOut">
               <a:rPr lang="en-US" smtClean="0"/>
-              <a:t>6/5/2024</a:t>
+              <a:t>7/4/2024</a:t>
             </a:fld>
             <a:endParaRPr lang="en-US"/>
           </a:p>
@@ -417,7 +417,7 @@
           <a:p>
             <a:fld id="{85B3B054-712A-47A7-A562-EFC3154E7950}" type="datetimeFigureOut">
               <a:rPr lang="en-US" smtClean="0"/>
-              <a:t>6/5/2024</a:t>
+              <a:t>7/4/2024</a:t>
             </a:fld>
             <a:endParaRPr lang="en-US"/>
           </a:p>
@@ -597,7 +597,7 @@
           <a:p>
             <a:fld id="{85B3B054-712A-47A7-A562-EFC3154E7950}" type="datetimeFigureOut">
               <a:rPr lang="en-US" smtClean="0"/>
-              <a:t>6/5/2024</a:t>
+              <a:t>7/4/2024</a:t>
             </a:fld>
             <a:endParaRPr lang="en-US"/>
           </a:p>
@@ -767,7 +767,7 @@
           <a:p>
             <a:fld id="{85B3B054-712A-47A7-A562-EFC3154E7950}" type="datetimeFigureOut">
               <a:rPr lang="en-US" smtClean="0"/>
-              <a:t>6/5/2024</a:t>
+              <a:t>7/4/2024</a:t>
             </a:fld>
             <a:endParaRPr lang="en-US"/>
           </a:p>
@@ -1011,7 +1011,7 @@
           <a:p>
             <a:fld id="{85B3B054-712A-47A7-A562-EFC3154E7950}" type="datetimeFigureOut">
               <a:rPr lang="en-US" smtClean="0"/>
-              <a:t>6/5/2024</a:t>
+              <a:t>7/4/2024</a:t>
             </a:fld>
             <a:endParaRPr lang="en-US"/>
           </a:p>
@@ -1243,7 +1243,7 @@
           <a:p>
             <a:fld id="{85B3B054-712A-47A7-A562-EFC3154E7950}" type="datetimeFigureOut">
               <a:rPr lang="en-US" smtClean="0"/>
-              <a:t>6/5/2024</a:t>
+              <a:t>7/4/2024</a:t>
             </a:fld>
             <a:endParaRPr lang="en-US"/>
           </a:p>
@@ -1610,7 +1610,7 @@
           <a:p>
             <a:fld id="{85B3B054-712A-47A7-A562-EFC3154E7950}" type="datetimeFigureOut">
               <a:rPr lang="en-US" smtClean="0"/>
-              <a:t>6/5/2024</a:t>
+              <a:t>7/4/2024</a:t>
             </a:fld>
             <a:endParaRPr lang="en-US"/>
           </a:p>
@@ -1728,7 +1728,7 @@
           <a:p>
             <a:fld id="{85B3B054-712A-47A7-A562-EFC3154E7950}" type="datetimeFigureOut">
               <a:rPr lang="en-US" smtClean="0"/>
-              <a:t>6/5/2024</a:t>
+              <a:t>7/4/2024</a:t>
             </a:fld>
             <a:endParaRPr lang="en-US"/>
           </a:p>
@@ -1823,7 +1823,7 @@
           <a:p>
             <a:fld id="{85B3B054-712A-47A7-A562-EFC3154E7950}" type="datetimeFigureOut">
               <a:rPr lang="en-US" smtClean="0"/>
-              <a:t>6/5/2024</a:t>
+              <a:t>7/4/2024</a:t>
             </a:fld>
             <a:endParaRPr lang="en-US"/>
           </a:p>
@@ -2100,7 +2100,7 @@
           <a:p>
             <a:fld id="{85B3B054-712A-47A7-A562-EFC3154E7950}" type="datetimeFigureOut">
               <a:rPr lang="en-US" smtClean="0"/>
-              <a:t>6/5/2024</a:t>
+              <a:t>7/4/2024</a:t>
             </a:fld>
             <a:endParaRPr lang="en-US"/>
           </a:p>
@@ -2357,7 +2357,7 @@
           <a:p>
             <a:fld id="{85B3B054-712A-47A7-A562-EFC3154E7950}" type="datetimeFigureOut">
               <a:rPr lang="en-US" smtClean="0"/>
-              <a:t>6/5/2024</a:t>
+              <a:t>7/4/2024</a:t>
             </a:fld>
             <a:endParaRPr lang="en-US"/>
           </a:p>
@@ -2570,7 +2570,7 @@
           <a:p>
             <a:fld id="{85B3B054-712A-47A7-A562-EFC3154E7950}" type="datetimeFigureOut">
               <a:rPr lang="en-US" smtClean="0"/>
-              <a:t>6/5/2024</a:t>
+              <a:t>7/4/2024</a:t>
             </a:fld>
             <a:endParaRPr lang="en-US"/>
           </a:p>
@@ -4773,10 +4773,10 @@
           </p:nvGrpSpPr>
           <p:grpSpPr>
             <a:xfrm>
-              <a:off x="640825" y="5587025"/>
-              <a:ext cx="3504103" cy="3931402"/>
-              <a:chOff x="631200" y="5587025"/>
-              <a:chExt cx="3504103" cy="3931402"/>
+              <a:off x="640826" y="5587025"/>
+              <a:ext cx="3504102" cy="3931402"/>
+              <a:chOff x="631201" y="5587025"/>
+              <a:chExt cx="3504102" cy="3931402"/>
             </a:xfrm>
           </p:grpSpPr>
           <p:pic>
@@ -4801,13 +4801,13 @@
                   </a:ext>
                 </a:extLst>
               </a:blip>
-              <a:srcRect l="22932" t="2605" r="24612" b="18097"/>
+              <a:srcRect l="22932" t="2605" r="38811" b="18097"/>
               <a:stretch/>
             </p:blipFill>
             <p:spPr>
               <a:xfrm>
-                <a:off x="631200" y="5591836"/>
-                <a:ext cx="3497491" cy="3776531"/>
+                <a:off x="631201" y="5591836"/>
+                <a:ext cx="3504102" cy="3776531"/>
               </a:xfrm>
               <a:prstGeom prst="rect">
                 <a:avLst/>
@@ -6264,7 +6264,7 @@
           </p:nvSpPr>
           <p:spPr>
             <a:xfrm>
-              <a:off x="2057399" y="6767585"/>
+              <a:off x="2634593" y="6734889"/>
               <a:ext cx="1239331" cy="246221"/>
             </a:xfrm>
             <a:prstGeom prst="rect">
@@ -6305,7 +6305,7 @@
           </p:nvSpPr>
           <p:spPr>
             <a:xfrm>
-              <a:off x="3002608" y="5810379"/>
+              <a:off x="2981863" y="5810379"/>
               <a:ext cx="1239331" cy="307777"/>
             </a:xfrm>
             <a:prstGeom prst="rect">
@@ -6653,6 +6653,2298 @@
           </p:txBody>
         </p:sp>
       </p:grpSp>
+      <p:sp>
+        <p:nvSpPr>
+          <p:cNvPr id="32" name="Freeform: Shape 31">
+            <a:extLst>
+              <a:ext uri="{FF2B5EF4-FFF2-40B4-BE49-F238E27FC236}">
+                <a16:creationId xmlns:a16="http://schemas.microsoft.com/office/drawing/2014/main" id="{6A9FF45F-9C8B-F7E9-3B78-9633B9652029}"/>
+              </a:ext>
+            </a:extLst>
+          </p:cNvPr>
+          <p:cNvSpPr/>
+          <p:nvPr/>
+        </p:nvSpPr>
+        <p:spPr>
+          <a:xfrm>
+            <a:off x="1904936" y="6571952"/>
+            <a:ext cx="1274297" cy="1420581"/>
+          </a:xfrm>
+          <a:custGeom>
+            <a:avLst/>
+            <a:gdLst>
+              <a:gd name="connsiteX0" fmla="*/ 300631 w 1274297"/>
+              <a:gd name="connsiteY0" fmla="*/ 2415 h 1420581"/>
+              <a:gd name="connsiteX1" fmla="*/ 224431 w 1274297"/>
+              <a:gd name="connsiteY1" fmla="*/ 6648 h 1420581"/>
+              <a:gd name="connsiteX2" fmla="*/ 199031 w 1274297"/>
+              <a:gd name="connsiteY2" fmla="*/ 15115 h 1420581"/>
+              <a:gd name="connsiteX3" fmla="*/ 114364 w 1274297"/>
+              <a:gd name="connsiteY3" fmla="*/ 23581 h 1420581"/>
+              <a:gd name="connsiteX4" fmla="*/ 33931 w 1274297"/>
+              <a:gd name="connsiteY4" fmla="*/ 48981 h 1420581"/>
+              <a:gd name="connsiteX5" fmla="*/ 16997 w 1274297"/>
+              <a:gd name="connsiteY5" fmla="*/ 61681 h 1420581"/>
+              <a:gd name="connsiteX6" fmla="*/ 8531 w 1274297"/>
+              <a:gd name="connsiteY6" fmla="*/ 78615 h 1420581"/>
+              <a:gd name="connsiteX7" fmla="*/ 64 w 1274297"/>
+              <a:gd name="connsiteY7" fmla="*/ 91315 h 1420581"/>
+              <a:gd name="connsiteX8" fmla="*/ 21231 w 1274297"/>
+              <a:gd name="connsiteY8" fmla="*/ 159048 h 1420581"/>
+              <a:gd name="connsiteX9" fmla="*/ 38164 w 1274297"/>
+              <a:gd name="connsiteY9" fmla="*/ 175981 h 1420581"/>
+              <a:gd name="connsiteX10" fmla="*/ 63564 w 1274297"/>
+              <a:gd name="connsiteY10" fmla="*/ 209848 h 1420581"/>
+              <a:gd name="connsiteX11" fmla="*/ 97431 w 1274297"/>
+              <a:gd name="connsiteY11" fmla="*/ 256415 h 1420581"/>
+              <a:gd name="connsiteX12" fmla="*/ 122831 w 1274297"/>
+              <a:gd name="connsiteY12" fmla="*/ 277581 h 1420581"/>
+              <a:gd name="connsiteX13" fmla="*/ 165164 w 1274297"/>
+              <a:gd name="connsiteY13" fmla="*/ 294515 h 1420581"/>
+              <a:gd name="connsiteX14" fmla="*/ 182097 w 1274297"/>
+              <a:gd name="connsiteY14" fmla="*/ 311448 h 1420581"/>
+              <a:gd name="connsiteX15" fmla="*/ 199031 w 1274297"/>
+              <a:gd name="connsiteY15" fmla="*/ 319915 h 1420581"/>
+              <a:gd name="connsiteX16" fmla="*/ 207497 w 1274297"/>
+              <a:gd name="connsiteY16" fmla="*/ 332615 h 1420581"/>
+              <a:gd name="connsiteX17" fmla="*/ 220197 w 1274297"/>
+              <a:gd name="connsiteY17" fmla="*/ 349548 h 1420581"/>
+              <a:gd name="connsiteX18" fmla="*/ 237131 w 1274297"/>
+              <a:gd name="connsiteY18" fmla="*/ 362248 h 1420581"/>
+              <a:gd name="connsiteX19" fmla="*/ 270997 w 1274297"/>
+              <a:gd name="connsiteY19" fmla="*/ 391881 h 1420581"/>
+              <a:gd name="connsiteX20" fmla="*/ 296397 w 1274297"/>
+              <a:gd name="connsiteY20" fmla="*/ 400348 h 1420581"/>
+              <a:gd name="connsiteX21" fmla="*/ 313331 w 1274297"/>
+              <a:gd name="connsiteY21" fmla="*/ 417281 h 1420581"/>
+              <a:gd name="connsiteX22" fmla="*/ 334497 w 1274297"/>
+              <a:gd name="connsiteY22" fmla="*/ 425748 h 1420581"/>
+              <a:gd name="connsiteX23" fmla="*/ 351431 w 1274297"/>
+              <a:gd name="connsiteY23" fmla="*/ 434215 h 1420581"/>
+              <a:gd name="connsiteX24" fmla="*/ 389531 w 1274297"/>
+              <a:gd name="connsiteY24" fmla="*/ 463848 h 1420581"/>
+              <a:gd name="connsiteX25" fmla="*/ 402231 w 1274297"/>
+              <a:gd name="connsiteY25" fmla="*/ 472315 h 1420581"/>
+              <a:gd name="connsiteX26" fmla="*/ 410697 w 1274297"/>
+              <a:gd name="connsiteY26" fmla="*/ 485015 h 1420581"/>
+              <a:gd name="connsiteX27" fmla="*/ 423397 w 1274297"/>
+              <a:gd name="connsiteY27" fmla="*/ 497715 h 1420581"/>
+              <a:gd name="connsiteX28" fmla="*/ 431864 w 1274297"/>
+              <a:gd name="connsiteY28" fmla="*/ 514648 h 1420581"/>
+              <a:gd name="connsiteX29" fmla="*/ 448797 w 1274297"/>
+              <a:gd name="connsiteY29" fmla="*/ 527348 h 1420581"/>
+              <a:gd name="connsiteX30" fmla="*/ 461497 w 1274297"/>
+              <a:gd name="connsiteY30" fmla="*/ 544281 h 1420581"/>
+              <a:gd name="connsiteX31" fmla="*/ 486897 w 1274297"/>
+              <a:gd name="connsiteY31" fmla="*/ 578148 h 1420581"/>
+              <a:gd name="connsiteX32" fmla="*/ 499597 w 1274297"/>
+              <a:gd name="connsiteY32" fmla="*/ 586615 h 1420581"/>
+              <a:gd name="connsiteX33" fmla="*/ 529231 w 1274297"/>
+              <a:gd name="connsiteY33" fmla="*/ 616248 h 1420581"/>
+              <a:gd name="connsiteX34" fmla="*/ 541931 w 1274297"/>
+              <a:gd name="connsiteY34" fmla="*/ 633181 h 1420581"/>
+              <a:gd name="connsiteX35" fmla="*/ 558864 w 1274297"/>
+              <a:gd name="connsiteY35" fmla="*/ 645881 h 1420581"/>
+              <a:gd name="connsiteX36" fmla="*/ 567331 w 1274297"/>
+              <a:gd name="connsiteY36" fmla="*/ 662815 h 1420581"/>
+              <a:gd name="connsiteX37" fmla="*/ 601197 w 1274297"/>
+              <a:gd name="connsiteY37" fmla="*/ 696681 h 1420581"/>
+              <a:gd name="connsiteX38" fmla="*/ 609664 w 1274297"/>
+              <a:gd name="connsiteY38" fmla="*/ 717848 h 1420581"/>
+              <a:gd name="connsiteX39" fmla="*/ 618131 w 1274297"/>
+              <a:gd name="connsiteY39" fmla="*/ 764415 h 1420581"/>
+              <a:gd name="connsiteX40" fmla="*/ 635064 w 1274297"/>
+              <a:gd name="connsiteY40" fmla="*/ 781348 h 1420581"/>
+              <a:gd name="connsiteX41" fmla="*/ 647764 w 1274297"/>
+              <a:gd name="connsiteY41" fmla="*/ 798281 h 1420581"/>
+              <a:gd name="connsiteX42" fmla="*/ 668931 w 1274297"/>
+              <a:gd name="connsiteY42" fmla="*/ 806748 h 1420581"/>
+              <a:gd name="connsiteX43" fmla="*/ 694331 w 1274297"/>
+              <a:gd name="connsiteY43" fmla="*/ 819448 h 1420581"/>
+              <a:gd name="connsiteX44" fmla="*/ 719731 w 1274297"/>
+              <a:gd name="connsiteY44" fmla="*/ 853315 h 1420581"/>
+              <a:gd name="connsiteX45" fmla="*/ 732431 w 1274297"/>
+              <a:gd name="connsiteY45" fmla="*/ 878715 h 1420581"/>
+              <a:gd name="connsiteX46" fmla="*/ 745131 w 1274297"/>
+              <a:gd name="connsiteY46" fmla="*/ 887181 h 1420581"/>
+              <a:gd name="connsiteX47" fmla="*/ 762064 w 1274297"/>
+              <a:gd name="connsiteY47" fmla="*/ 899881 h 1420581"/>
+              <a:gd name="connsiteX48" fmla="*/ 787464 w 1274297"/>
+              <a:gd name="connsiteY48" fmla="*/ 921048 h 1420581"/>
+              <a:gd name="connsiteX49" fmla="*/ 808631 w 1274297"/>
+              <a:gd name="connsiteY49" fmla="*/ 937981 h 1420581"/>
+              <a:gd name="connsiteX50" fmla="*/ 829797 w 1274297"/>
+              <a:gd name="connsiteY50" fmla="*/ 950681 h 1420581"/>
+              <a:gd name="connsiteX51" fmla="*/ 842497 w 1274297"/>
+              <a:gd name="connsiteY51" fmla="*/ 959148 h 1420581"/>
+              <a:gd name="connsiteX52" fmla="*/ 863664 w 1274297"/>
+              <a:gd name="connsiteY52" fmla="*/ 967615 h 1420581"/>
+              <a:gd name="connsiteX53" fmla="*/ 872131 w 1274297"/>
+              <a:gd name="connsiteY53" fmla="*/ 984548 h 1420581"/>
+              <a:gd name="connsiteX54" fmla="*/ 901764 w 1274297"/>
+              <a:gd name="connsiteY54" fmla="*/ 1009948 h 1420581"/>
+              <a:gd name="connsiteX55" fmla="*/ 922931 w 1274297"/>
+              <a:gd name="connsiteY55" fmla="*/ 1039581 h 1420581"/>
+              <a:gd name="connsiteX56" fmla="*/ 956797 w 1274297"/>
+              <a:gd name="connsiteY56" fmla="*/ 1077681 h 1420581"/>
+              <a:gd name="connsiteX57" fmla="*/ 990664 w 1274297"/>
+              <a:gd name="connsiteY57" fmla="*/ 1107315 h 1420581"/>
+              <a:gd name="connsiteX58" fmla="*/ 1007597 w 1274297"/>
+              <a:gd name="connsiteY58" fmla="*/ 1111548 h 1420581"/>
+              <a:gd name="connsiteX59" fmla="*/ 1024531 w 1274297"/>
+              <a:gd name="connsiteY59" fmla="*/ 1132715 h 1420581"/>
+              <a:gd name="connsiteX60" fmla="*/ 1037231 w 1274297"/>
+              <a:gd name="connsiteY60" fmla="*/ 1141181 h 1420581"/>
+              <a:gd name="connsiteX61" fmla="*/ 1049931 w 1274297"/>
+              <a:gd name="connsiteY61" fmla="*/ 1153881 h 1420581"/>
+              <a:gd name="connsiteX62" fmla="*/ 1058397 w 1274297"/>
+              <a:gd name="connsiteY62" fmla="*/ 1179281 h 1420581"/>
+              <a:gd name="connsiteX63" fmla="*/ 1062631 w 1274297"/>
+              <a:gd name="connsiteY63" fmla="*/ 1208915 h 1420581"/>
+              <a:gd name="connsiteX64" fmla="*/ 1079564 w 1274297"/>
+              <a:gd name="connsiteY64" fmla="*/ 1259715 h 1420581"/>
+              <a:gd name="connsiteX65" fmla="*/ 1083797 w 1274297"/>
+              <a:gd name="connsiteY65" fmla="*/ 1285115 h 1420581"/>
+              <a:gd name="connsiteX66" fmla="*/ 1096497 w 1274297"/>
+              <a:gd name="connsiteY66" fmla="*/ 1297815 h 1420581"/>
+              <a:gd name="connsiteX67" fmla="*/ 1104964 w 1274297"/>
+              <a:gd name="connsiteY67" fmla="*/ 1310515 h 1420581"/>
+              <a:gd name="connsiteX68" fmla="*/ 1134597 w 1274297"/>
+              <a:gd name="connsiteY68" fmla="*/ 1340148 h 1420581"/>
+              <a:gd name="connsiteX69" fmla="*/ 1151531 w 1274297"/>
+              <a:gd name="connsiteY69" fmla="*/ 1374015 h 1420581"/>
+              <a:gd name="connsiteX70" fmla="*/ 1164231 w 1274297"/>
+              <a:gd name="connsiteY70" fmla="*/ 1382481 h 1420581"/>
+              <a:gd name="connsiteX71" fmla="*/ 1176931 w 1274297"/>
+              <a:gd name="connsiteY71" fmla="*/ 1395181 h 1420581"/>
+              <a:gd name="connsiteX72" fmla="*/ 1193864 w 1274297"/>
+              <a:gd name="connsiteY72" fmla="*/ 1403648 h 1420581"/>
+              <a:gd name="connsiteX73" fmla="*/ 1236197 w 1274297"/>
+              <a:gd name="connsiteY73" fmla="*/ 1420581 h 1420581"/>
+              <a:gd name="connsiteX74" fmla="*/ 1270064 w 1274297"/>
+              <a:gd name="connsiteY74" fmla="*/ 1416348 h 1420581"/>
+              <a:gd name="connsiteX75" fmla="*/ 1274297 w 1274297"/>
+              <a:gd name="connsiteY75" fmla="*/ 1403648 h 1420581"/>
+              <a:gd name="connsiteX76" fmla="*/ 1270064 w 1274297"/>
+              <a:gd name="connsiteY76" fmla="*/ 1289348 h 1420581"/>
+              <a:gd name="connsiteX77" fmla="*/ 1257364 w 1274297"/>
+              <a:gd name="connsiteY77" fmla="*/ 1225848 h 1420581"/>
+              <a:gd name="connsiteX78" fmla="*/ 1253131 w 1274297"/>
+              <a:gd name="connsiteY78" fmla="*/ 1204681 h 1420581"/>
+              <a:gd name="connsiteX79" fmla="*/ 1244664 w 1274297"/>
+              <a:gd name="connsiteY79" fmla="*/ 1187748 h 1420581"/>
+              <a:gd name="connsiteX80" fmla="*/ 1231964 w 1274297"/>
+              <a:gd name="connsiteY80" fmla="*/ 1141181 h 1420581"/>
+              <a:gd name="connsiteX81" fmla="*/ 1206564 w 1274297"/>
+              <a:gd name="connsiteY81" fmla="*/ 976081 h 1420581"/>
+              <a:gd name="connsiteX82" fmla="*/ 1198097 w 1274297"/>
+              <a:gd name="connsiteY82" fmla="*/ 950681 h 1420581"/>
+              <a:gd name="connsiteX83" fmla="*/ 1193864 w 1274297"/>
+              <a:gd name="connsiteY83" fmla="*/ 929515 h 1420581"/>
+              <a:gd name="connsiteX84" fmla="*/ 1181164 w 1274297"/>
+              <a:gd name="connsiteY84" fmla="*/ 925281 h 1420581"/>
+              <a:gd name="connsiteX85" fmla="*/ 1138831 w 1274297"/>
+              <a:gd name="connsiteY85" fmla="*/ 916815 h 1420581"/>
+              <a:gd name="connsiteX86" fmla="*/ 1100731 w 1274297"/>
+              <a:gd name="connsiteY86" fmla="*/ 904115 h 1420581"/>
+              <a:gd name="connsiteX87" fmla="*/ 1096497 w 1274297"/>
+              <a:gd name="connsiteY87" fmla="*/ 891415 h 1420581"/>
+              <a:gd name="connsiteX88" fmla="*/ 1083797 w 1274297"/>
+              <a:gd name="connsiteY88" fmla="*/ 882948 h 1420581"/>
+              <a:gd name="connsiteX89" fmla="*/ 1071097 w 1274297"/>
+              <a:gd name="connsiteY89" fmla="*/ 853315 h 1420581"/>
+              <a:gd name="connsiteX90" fmla="*/ 1066864 w 1274297"/>
+              <a:gd name="connsiteY90" fmla="*/ 836381 h 1420581"/>
+              <a:gd name="connsiteX91" fmla="*/ 1054164 w 1274297"/>
+              <a:gd name="connsiteY91" fmla="*/ 806748 h 1420581"/>
+              <a:gd name="connsiteX92" fmla="*/ 1037231 w 1274297"/>
+              <a:gd name="connsiteY92" fmla="*/ 772881 h 1420581"/>
+              <a:gd name="connsiteX93" fmla="*/ 1020297 w 1274297"/>
+              <a:gd name="connsiteY93" fmla="*/ 734781 h 1420581"/>
+              <a:gd name="connsiteX94" fmla="*/ 994897 w 1274297"/>
+              <a:gd name="connsiteY94" fmla="*/ 722081 h 1420581"/>
+              <a:gd name="connsiteX95" fmla="*/ 977964 w 1274297"/>
+              <a:gd name="connsiteY95" fmla="*/ 717848 h 1420581"/>
+              <a:gd name="connsiteX96" fmla="*/ 834031 w 1274297"/>
+              <a:gd name="connsiteY96" fmla="*/ 709381 h 1420581"/>
+              <a:gd name="connsiteX97" fmla="*/ 825564 w 1274297"/>
+              <a:gd name="connsiteY97" fmla="*/ 679748 h 1420581"/>
+              <a:gd name="connsiteX98" fmla="*/ 812864 w 1274297"/>
+              <a:gd name="connsiteY98" fmla="*/ 662815 h 1420581"/>
+              <a:gd name="connsiteX99" fmla="*/ 808631 w 1274297"/>
+              <a:gd name="connsiteY99" fmla="*/ 633181 h 1420581"/>
+              <a:gd name="connsiteX100" fmla="*/ 791697 w 1274297"/>
+              <a:gd name="connsiteY100" fmla="*/ 578148 h 1420581"/>
+              <a:gd name="connsiteX101" fmla="*/ 787464 w 1274297"/>
+              <a:gd name="connsiteY101" fmla="*/ 561215 h 1420581"/>
+              <a:gd name="connsiteX102" fmla="*/ 770531 w 1274297"/>
+              <a:gd name="connsiteY102" fmla="*/ 552748 h 1420581"/>
+              <a:gd name="connsiteX103" fmla="*/ 762064 w 1274297"/>
+              <a:gd name="connsiteY103" fmla="*/ 540048 h 1420581"/>
+              <a:gd name="connsiteX104" fmla="*/ 736664 w 1274297"/>
+              <a:gd name="connsiteY104" fmla="*/ 506181 h 1420581"/>
+              <a:gd name="connsiteX105" fmla="*/ 719731 w 1274297"/>
+              <a:gd name="connsiteY105" fmla="*/ 476548 h 1420581"/>
+              <a:gd name="connsiteX106" fmla="*/ 707031 w 1274297"/>
+              <a:gd name="connsiteY106" fmla="*/ 451148 h 1420581"/>
+              <a:gd name="connsiteX107" fmla="*/ 690097 w 1274297"/>
+              <a:gd name="connsiteY107" fmla="*/ 429981 h 1420581"/>
+              <a:gd name="connsiteX108" fmla="*/ 685864 w 1274297"/>
+              <a:gd name="connsiteY108" fmla="*/ 413048 h 1420581"/>
+              <a:gd name="connsiteX109" fmla="*/ 605431 w 1274297"/>
+              <a:gd name="connsiteY109" fmla="*/ 311448 h 1420581"/>
+              <a:gd name="connsiteX110" fmla="*/ 596964 w 1274297"/>
+              <a:gd name="connsiteY110" fmla="*/ 286048 h 1420581"/>
+              <a:gd name="connsiteX111" fmla="*/ 580031 w 1274297"/>
+              <a:gd name="connsiteY111" fmla="*/ 260648 h 1420581"/>
+              <a:gd name="connsiteX112" fmla="*/ 567331 w 1274297"/>
+              <a:gd name="connsiteY112" fmla="*/ 239481 h 1420581"/>
+              <a:gd name="connsiteX113" fmla="*/ 541931 w 1274297"/>
+              <a:gd name="connsiteY113" fmla="*/ 192915 h 1420581"/>
+              <a:gd name="connsiteX114" fmla="*/ 520764 w 1274297"/>
+              <a:gd name="connsiteY114" fmla="*/ 167515 h 1420581"/>
+              <a:gd name="connsiteX115" fmla="*/ 503831 w 1274297"/>
+              <a:gd name="connsiteY115" fmla="*/ 154815 h 1420581"/>
+              <a:gd name="connsiteX116" fmla="*/ 486897 w 1274297"/>
+              <a:gd name="connsiteY116" fmla="*/ 129415 h 1420581"/>
+              <a:gd name="connsiteX117" fmla="*/ 469964 w 1274297"/>
+              <a:gd name="connsiteY117" fmla="*/ 108248 h 1420581"/>
+              <a:gd name="connsiteX118" fmla="*/ 461497 w 1274297"/>
+              <a:gd name="connsiteY118" fmla="*/ 82848 h 1420581"/>
+              <a:gd name="connsiteX119" fmla="*/ 436097 w 1274297"/>
+              <a:gd name="connsiteY119" fmla="*/ 53215 h 1420581"/>
+              <a:gd name="connsiteX120" fmla="*/ 427631 w 1274297"/>
+              <a:gd name="connsiteY120" fmla="*/ 40515 h 1420581"/>
+              <a:gd name="connsiteX121" fmla="*/ 397997 w 1274297"/>
+              <a:gd name="connsiteY121" fmla="*/ 27815 h 1420581"/>
+              <a:gd name="connsiteX122" fmla="*/ 359897 w 1274297"/>
+              <a:gd name="connsiteY122" fmla="*/ 10881 h 1420581"/>
+              <a:gd name="connsiteX123" fmla="*/ 347197 w 1274297"/>
+              <a:gd name="connsiteY123" fmla="*/ 2415 h 1420581"/>
+              <a:gd name="connsiteX124" fmla="*/ 300631 w 1274297"/>
+              <a:gd name="connsiteY124" fmla="*/ 2415 h 1420581"/>
+            </a:gdLst>
+            <a:ahLst/>
+            <a:cxnLst>
+              <a:cxn ang="0">
+                <a:pos x="connsiteX0" y="connsiteY0"/>
+              </a:cxn>
+              <a:cxn ang="0">
+                <a:pos x="connsiteX1" y="connsiteY1"/>
+              </a:cxn>
+              <a:cxn ang="0">
+                <a:pos x="connsiteX2" y="connsiteY2"/>
+              </a:cxn>
+              <a:cxn ang="0">
+                <a:pos x="connsiteX3" y="connsiteY3"/>
+              </a:cxn>
+              <a:cxn ang="0">
+                <a:pos x="connsiteX4" y="connsiteY4"/>
+              </a:cxn>
+              <a:cxn ang="0">
+                <a:pos x="connsiteX5" y="connsiteY5"/>
+              </a:cxn>
+              <a:cxn ang="0">
+                <a:pos x="connsiteX6" y="connsiteY6"/>
+              </a:cxn>
+              <a:cxn ang="0">
+                <a:pos x="connsiteX7" y="connsiteY7"/>
+              </a:cxn>
+              <a:cxn ang="0">
+                <a:pos x="connsiteX8" y="connsiteY8"/>
+              </a:cxn>
+              <a:cxn ang="0">
+                <a:pos x="connsiteX9" y="connsiteY9"/>
+              </a:cxn>
+              <a:cxn ang="0">
+                <a:pos x="connsiteX10" y="connsiteY10"/>
+              </a:cxn>
+              <a:cxn ang="0">
+                <a:pos x="connsiteX11" y="connsiteY11"/>
+              </a:cxn>
+              <a:cxn ang="0">
+                <a:pos x="connsiteX12" y="connsiteY12"/>
+              </a:cxn>
+              <a:cxn ang="0">
+                <a:pos x="connsiteX13" y="connsiteY13"/>
+              </a:cxn>
+              <a:cxn ang="0">
+                <a:pos x="connsiteX14" y="connsiteY14"/>
+              </a:cxn>
+              <a:cxn ang="0">
+                <a:pos x="connsiteX15" y="connsiteY15"/>
+              </a:cxn>
+              <a:cxn ang="0">
+                <a:pos x="connsiteX16" y="connsiteY16"/>
+              </a:cxn>
+              <a:cxn ang="0">
+                <a:pos x="connsiteX17" y="connsiteY17"/>
+              </a:cxn>
+              <a:cxn ang="0">
+                <a:pos x="connsiteX18" y="connsiteY18"/>
+              </a:cxn>
+              <a:cxn ang="0">
+                <a:pos x="connsiteX19" y="connsiteY19"/>
+              </a:cxn>
+              <a:cxn ang="0">
+                <a:pos x="connsiteX20" y="connsiteY20"/>
+              </a:cxn>
+              <a:cxn ang="0">
+                <a:pos x="connsiteX21" y="connsiteY21"/>
+              </a:cxn>
+              <a:cxn ang="0">
+                <a:pos x="connsiteX22" y="connsiteY22"/>
+              </a:cxn>
+              <a:cxn ang="0">
+                <a:pos x="connsiteX23" y="connsiteY23"/>
+              </a:cxn>
+              <a:cxn ang="0">
+                <a:pos x="connsiteX24" y="connsiteY24"/>
+              </a:cxn>
+              <a:cxn ang="0">
+                <a:pos x="connsiteX25" y="connsiteY25"/>
+              </a:cxn>
+              <a:cxn ang="0">
+                <a:pos x="connsiteX26" y="connsiteY26"/>
+              </a:cxn>
+              <a:cxn ang="0">
+                <a:pos x="connsiteX27" y="connsiteY27"/>
+              </a:cxn>
+              <a:cxn ang="0">
+                <a:pos x="connsiteX28" y="connsiteY28"/>
+              </a:cxn>
+              <a:cxn ang="0">
+                <a:pos x="connsiteX29" y="connsiteY29"/>
+              </a:cxn>
+              <a:cxn ang="0">
+                <a:pos x="connsiteX30" y="connsiteY30"/>
+              </a:cxn>
+              <a:cxn ang="0">
+                <a:pos x="connsiteX31" y="connsiteY31"/>
+              </a:cxn>
+              <a:cxn ang="0">
+                <a:pos x="connsiteX32" y="connsiteY32"/>
+              </a:cxn>
+              <a:cxn ang="0">
+                <a:pos x="connsiteX33" y="connsiteY33"/>
+              </a:cxn>
+              <a:cxn ang="0">
+                <a:pos x="connsiteX34" y="connsiteY34"/>
+              </a:cxn>
+              <a:cxn ang="0">
+                <a:pos x="connsiteX35" y="connsiteY35"/>
+              </a:cxn>
+              <a:cxn ang="0">
+                <a:pos x="connsiteX36" y="connsiteY36"/>
+              </a:cxn>
+              <a:cxn ang="0">
+                <a:pos x="connsiteX37" y="connsiteY37"/>
+              </a:cxn>
+              <a:cxn ang="0">
+                <a:pos x="connsiteX38" y="connsiteY38"/>
+              </a:cxn>
+              <a:cxn ang="0">
+                <a:pos x="connsiteX39" y="connsiteY39"/>
+              </a:cxn>
+              <a:cxn ang="0">
+                <a:pos x="connsiteX40" y="connsiteY40"/>
+              </a:cxn>
+              <a:cxn ang="0">
+                <a:pos x="connsiteX41" y="connsiteY41"/>
+              </a:cxn>
+              <a:cxn ang="0">
+                <a:pos x="connsiteX42" y="connsiteY42"/>
+              </a:cxn>
+              <a:cxn ang="0">
+                <a:pos x="connsiteX43" y="connsiteY43"/>
+              </a:cxn>
+              <a:cxn ang="0">
+                <a:pos x="connsiteX44" y="connsiteY44"/>
+              </a:cxn>
+              <a:cxn ang="0">
+                <a:pos x="connsiteX45" y="connsiteY45"/>
+              </a:cxn>
+              <a:cxn ang="0">
+                <a:pos x="connsiteX46" y="connsiteY46"/>
+              </a:cxn>
+              <a:cxn ang="0">
+                <a:pos x="connsiteX47" y="connsiteY47"/>
+              </a:cxn>
+              <a:cxn ang="0">
+                <a:pos x="connsiteX48" y="connsiteY48"/>
+              </a:cxn>
+              <a:cxn ang="0">
+                <a:pos x="connsiteX49" y="connsiteY49"/>
+              </a:cxn>
+              <a:cxn ang="0">
+                <a:pos x="connsiteX50" y="connsiteY50"/>
+              </a:cxn>
+              <a:cxn ang="0">
+                <a:pos x="connsiteX51" y="connsiteY51"/>
+              </a:cxn>
+              <a:cxn ang="0">
+                <a:pos x="connsiteX52" y="connsiteY52"/>
+              </a:cxn>
+              <a:cxn ang="0">
+                <a:pos x="connsiteX53" y="connsiteY53"/>
+              </a:cxn>
+              <a:cxn ang="0">
+                <a:pos x="connsiteX54" y="connsiteY54"/>
+              </a:cxn>
+              <a:cxn ang="0">
+                <a:pos x="connsiteX55" y="connsiteY55"/>
+              </a:cxn>
+              <a:cxn ang="0">
+                <a:pos x="connsiteX56" y="connsiteY56"/>
+              </a:cxn>
+              <a:cxn ang="0">
+                <a:pos x="connsiteX57" y="connsiteY57"/>
+              </a:cxn>
+              <a:cxn ang="0">
+                <a:pos x="connsiteX58" y="connsiteY58"/>
+              </a:cxn>
+              <a:cxn ang="0">
+                <a:pos x="connsiteX59" y="connsiteY59"/>
+              </a:cxn>
+              <a:cxn ang="0">
+                <a:pos x="connsiteX60" y="connsiteY60"/>
+              </a:cxn>
+              <a:cxn ang="0">
+                <a:pos x="connsiteX61" y="connsiteY61"/>
+              </a:cxn>
+              <a:cxn ang="0">
+                <a:pos x="connsiteX62" y="connsiteY62"/>
+              </a:cxn>
+              <a:cxn ang="0">
+                <a:pos x="connsiteX63" y="connsiteY63"/>
+              </a:cxn>
+              <a:cxn ang="0">
+                <a:pos x="connsiteX64" y="connsiteY64"/>
+              </a:cxn>
+              <a:cxn ang="0">
+                <a:pos x="connsiteX65" y="connsiteY65"/>
+              </a:cxn>
+              <a:cxn ang="0">
+                <a:pos x="connsiteX66" y="connsiteY66"/>
+              </a:cxn>
+              <a:cxn ang="0">
+                <a:pos x="connsiteX67" y="connsiteY67"/>
+              </a:cxn>
+              <a:cxn ang="0">
+                <a:pos x="connsiteX68" y="connsiteY68"/>
+              </a:cxn>
+              <a:cxn ang="0">
+                <a:pos x="connsiteX69" y="connsiteY69"/>
+              </a:cxn>
+              <a:cxn ang="0">
+                <a:pos x="connsiteX70" y="connsiteY70"/>
+              </a:cxn>
+              <a:cxn ang="0">
+                <a:pos x="connsiteX71" y="connsiteY71"/>
+              </a:cxn>
+              <a:cxn ang="0">
+                <a:pos x="connsiteX72" y="connsiteY72"/>
+              </a:cxn>
+              <a:cxn ang="0">
+                <a:pos x="connsiteX73" y="connsiteY73"/>
+              </a:cxn>
+              <a:cxn ang="0">
+                <a:pos x="connsiteX74" y="connsiteY74"/>
+              </a:cxn>
+              <a:cxn ang="0">
+                <a:pos x="connsiteX75" y="connsiteY75"/>
+              </a:cxn>
+              <a:cxn ang="0">
+                <a:pos x="connsiteX76" y="connsiteY76"/>
+              </a:cxn>
+              <a:cxn ang="0">
+                <a:pos x="connsiteX77" y="connsiteY77"/>
+              </a:cxn>
+              <a:cxn ang="0">
+                <a:pos x="connsiteX78" y="connsiteY78"/>
+              </a:cxn>
+              <a:cxn ang="0">
+                <a:pos x="connsiteX79" y="connsiteY79"/>
+              </a:cxn>
+              <a:cxn ang="0">
+                <a:pos x="connsiteX80" y="connsiteY80"/>
+              </a:cxn>
+              <a:cxn ang="0">
+                <a:pos x="connsiteX81" y="connsiteY81"/>
+              </a:cxn>
+              <a:cxn ang="0">
+                <a:pos x="connsiteX82" y="connsiteY82"/>
+              </a:cxn>
+              <a:cxn ang="0">
+                <a:pos x="connsiteX83" y="connsiteY83"/>
+              </a:cxn>
+              <a:cxn ang="0">
+                <a:pos x="connsiteX84" y="connsiteY84"/>
+              </a:cxn>
+              <a:cxn ang="0">
+                <a:pos x="connsiteX85" y="connsiteY85"/>
+              </a:cxn>
+              <a:cxn ang="0">
+                <a:pos x="connsiteX86" y="connsiteY86"/>
+              </a:cxn>
+              <a:cxn ang="0">
+                <a:pos x="connsiteX87" y="connsiteY87"/>
+              </a:cxn>
+              <a:cxn ang="0">
+                <a:pos x="connsiteX88" y="connsiteY88"/>
+              </a:cxn>
+              <a:cxn ang="0">
+                <a:pos x="connsiteX89" y="connsiteY89"/>
+              </a:cxn>
+              <a:cxn ang="0">
+                <a:pos x="connsiteX90" y="connsiteY90"/>
+              </a:cxn>
+              <a:cxn ang="0">
+                <a:pos x="connsiteX91" y="connsiteY91"/>
+              </a:cxn>
+              <a:cxn ang="0">
+                <a:pos x="connsiteX92" y="connsiteY92"/>
+              </a:cxn>
+              <a:cxn ang="0">
+                <a:pos x="connsiteX93" y="connsiteY93"/>
+              </a:cxn>
+              <a:cxn ang="0">
+                <a:pos x="connsiteX94" y="connsiteY94"/>
+              </a:cxn>
+              <a:cxn ang="0">
+                <a:pos x="connsiteX95" y="connsiteY95"/>
+              </a:cxn>
+              <a:cxn ang="0">
+                <a:pos x="connsiteX96" y="connsiteY96"/>
+              </a:cxn>
+              <a:cxn ang="0">
+                <a:pos x="connsiteX97" y="connsiteY97"/>
+              </a:cxn>
+              <a:cxn ang="0">
+                <a:pos x="connsiteX98" y="connsiteY98"/>
+              </a:cxn>
+              <a:cxn ang="0">
+                <a:pos x="connsiteX99" y="connsiteY99"/>
+              </a:cxn>
+              <a:cxn ang="0">
+                <a:pos x="connsiteX100" y="connsiteY100"/>
+              </a:cxn>
+              <a:cxn ang="0">
+                <a:pos x="connsiteX101" y="connsiteY101"/>
+              </a:cxn>
+              <a:cxn ang="0">
+                <a:pos x="connsiteX102" y="connsiteY102"/>
+              </a:cxn>
+              <a:cxn ang="0">
+                <a:pos x="connsiteX103" y="connsiteY103"/>
+              </a:cxn>
+              <a:cxn ang="0">
+                <a:pos x="connsiteX104" y="connsiteY104"/>
+              </a:cxn>
+              <a:cxn ang="0">
+                <a:pos x="connsiteX105" y="connsiteY105"/>
+              </a:cxn>
+              <a:cxn ang="0">
+                <a:pos x="connsiteX106" y="connsiteY106"/>
+              </a:cxn>
+              <a:cxn ang="0">
+                <a:pos x="connsiteX107" y="connsiteY107"/>
+              </a:cxn>
+              <a:cxn ang="0">
+                <a:pos x="connsiteX108" y="connsiteY108"/>
+              </a:cxn>
+              <a:cxn ang="0">
+                <a:pos x="connsiteX109" y="connsiteY109"/>
+              </a:cxn>
+              <a:cxn ang="0">
+                <a:pos x="connsiteX110" y="connsiteY110"/>
+              </a:cxn>
+              <a:cxn ang="0">
+                <a:pos x="connsiteX111" y="connsiteY111"/>
+              </a:cxn>
+              <a:cxn ang="0">
+                <a:pos x="connsiteX112" y="connsiteY112"/>
+              </a:cxn>
+              <a:cxn ang="0">
+                <a:pos x="connsiteX113" y="connsiteY113"/>
+              </a:cxn>
+              <a:cxn ang="0">
+                <a:pos x="connsiteX114" y="connsiteY114"/>
+              </a:cxn>
+              <a:cxn ang="0">
+                <a:pos x="connsiteX115" y="connsiteY115"/>
+              </a:cxn>
+              <a:cxn ang="0">
+                <a:pos x="connsiteX116" y="connsiteY116"/>
+              </a:cxn>
+              <a:cxn ang="0">
+                <a:pos x="connsiteX117" y="connsiteY117"/>
+              </a:cxn>
+              <a:cxn ang="0">
+                <a:pos x="connsiteX118" y="connsiteY118"/>
+              </a:cxn>
+              <a:cxn ang="0">
+                <a:pos x="connsiteX119" y="connsiteY119"/>
+              </a:cxn>
+              <a:cxn ang="0">
+                <a:pos x="connsiteX120" y="connsiteY120"/>
+              </a:cxn>
+              <a:cxn ang="0">
+                <a:pos x="connsiteX121" y="connsiteY121"/>
+              </a:cxn>
+              <a:cxn ang="0">
+                <a:pos x="connsiteX122" y="connsiteY122"/>
+              </a:cxn>
+              <a:cxn ang="0">
+                <a:pos x="connsiteX123" y="connsiteY123"/>
+              </a:cxn>
+              <a:cxn ang="0">
+                <a:pos x="connsiteX124" y="connsiteY124"/>
+              </a:cxn>
+            </a:cxnLst>
+            <a:rect l="l" t="t" r="r" b="b"/>
+            <a:pathLst>
+              <a:path w="1274297" h="1420581">
+                <a:moveTo>
+                  <a:pt x="300631" y="2415"/>
+                </a:moveTo>
+                <a:cubicBezTo>
+                  <a:pt x="280170" y="3120"/>
+                  <a:pt x="249674" y="3493"/>
+                  <a:pt x="224431" y="6648"/>
+                </a:cubicBezTo>
+                <a:cubicBezTo>
+                  <a:pt x="215575" y="7755"/>
+                  <a:pt x="207689" y="12950"/>
+                  <a:pt x="199031" y="15115"/>
+                </a:cubicBezTo>
+                <a:cubicBezTo>
+                  <a:pt x="175067" y="21106"/>
+                  <a:pt x="133798" y="22193"/>
+                  <a:pt x="114364" y="23581"/>
+                </a:cubicBezTo>
+                <a:cubicBezTo>
+                  <a:pt x="82485" y="31551"/>
+                  <a:pt x="61539" y="33922"/>
+                  <a:pt x="33931" y="48981"/>
+                </a:cubicBezTo>
+                <a:cubicBezTo>
+                  <a:pt x="27737" y="52360"/>
+                  <a:pt x="22642" y="57448"/>
+                  <a:pt x="16997" y="61681"/>
+                </a:cubicBezTo>
+                <a:cubicBezTo>
+                  <a:pt x="14175" y="67326"/>
+                  <a:pt x="11662" y="73136"/>
+                  <a:pt x="8531" y="78615"/>
+                </a:cubicBezTo>
+                <a:cubicBezTo>
+                  <a:pt x="6007" y="83033"/>
+                  <a:pt x="-730" y="86289"/>
+                  <a:pt x="64" y="91315"/>
+                </a:cubicBezTo>
+                <a:cubicBezTo>
+                  <a:pt x="3753" y="114680"/>
+                  <a:pt x="11524" y="137477"/>
+                  <a:pt x="21231" y="159048"/>
+                </a:cubicBezTo>
+                <a:cubicBezTo>
+                  <a:pt x="24507" y="166327"/>
+                  <a:pt x="33054" y="169849"/>
+                  <a:pt x="38164" y="175981"/>
+                </a:cubicBezTo>
+                <a:cubicBezTo>
+                  <a:pt x="47198" y="186822"/>
+                  <a:pt x="55737" y="198107"/>
+                  <a:pt x="63564" y="209848"/>
+                </a:cubicBezTo>
+                <a:cubicBezTo>
+                  <a:pt x="72396" y="223097"/>
+                  <a:pt x="85784" y="244768"/>
+                  <a:pt x="97431" y="256415"/>
+                </a:cubicBezTo>
+                <a:cubicBezTo>
+                  <a:pt x="105224" y="264208"/>
+                  <a:pt x="113802" y="271261"/>
+                  <a:pt x="122831" y="277581"/>
+                </a:cubicBezTo>
+                <a:cubicBezTo>
+                  <a:pt x="134158" y="285510"/>
+                  <a:pt x="152995" y="290458"/>
+                  <a:pt x="165164" y="294515"/>
+                </a:cubicBezTo>
+                <a:cubicBezTo>
+                  <a:pt x="170808" y="300159"/>
+                  <a:pt x="175711" y="306659"/>
+                  <a:pt x="182097" y="311448"/>
+                </a:cubicBezTo>
+                <a:cubicBezTo>
+                  <a:pt x="187146" y="315235"/>
+                  <a:pt x="194183" y="315875"/>
+                  <a:pt x="199031" y="319915"/>
+                </a:cubicBezTo>
+                <a:cubicBezTo>
+                  <a:pt x="202939" y="323172"/>
+                  <a:pt x="204540" y="328475"/>
+                  <a:pt x="207497" y="332615"/>
+                </a:cubicBezTo>
+                <a:cubicBezTo>
+                  <a:pt x="211598" y="338356"/>
+                  <a:pt x="215208" y="344559"/>
+                  <a:pt x="220197" y="349548"/>
+                </a:cubicBezTo>
+                <a:cubicBezTo>
+                  <a:pt x="225186" y="354537"/>
+                  <a:pt x="231821" y="357602"/>
+                  <a:pt x="237131" y="362248"/>
+                </a:cubicBezTo>
+                <a:cubicBezTo>
+                  <a:pt x="248772" y="372434"/>
+                  <a:pt x="256765" y="384765"/>
+                  <a:pt x="270997" y="391881"/>
+                </a:cubicBezTo>
+                <a:cubicBezTo>
+                  <a:pt x="278979" y="395872"/>
+                  <a:pt x="287930" y="397526"/>
+                  <a:pt x="296397" y="400348"/>
+                </a:cubicBezTo>
+                <a:cubicBezTo>
+                  <a:pt x="302042" y="405992"/>
+                  <a:pt x="306689" y="412853"/>
+                  <a:pt x="313331" y="417281"/>
+                </a:cubicBezTo>
+                <a:cubicBezTo>
+                  <a:pt x="319654" y="421496"/>
+                  <a:pt x="327553" y="422662"/>
+                  <a:pt x="334497" y="425748"/>
+                </a:cubicBezTo>
+                <a:cubicBezTo>
+                  <a:pt x="340264" y="428311"/>
+                  <a:pt x="346242" y="430623"/>
+                  <a:pt x="351431" y="434215"/>
+                </a:cubicBezTo>
+                <a:cubicBezTo>
+                  <a:pt x="364659" y="443373"/>
+                  <a:pt x="376144" y="454923"/>
+                  <a:pt x="389531" y="463848"/>
+                </a:cubicBezTo>
+                <a:lnTo>
+                  <a:pt x="402231" y="472315"/>
+                </a:lnTo>
+                <a:cubicBezTo>
+                  <a:pt x="405053" y="476548"/>
+                  <a:pt x="407440" y="481106"/>
+                  <a:pt x="410697" y="485015"/>
+                </a:cubicBezTo>
+                <a:cubicBezTo>
+                  <a:pt x="414530" y="489614"/>
+                  <a:pt x="419917" y="492843"/>
+                  <a:pt x="423397" y="497715"/>
+                </a:cubicBezTo>
+                <a:cubicBezTo>
+                  <a:pt x="427065" y="502850"/>
+                  <a:pt x="427757" y="509857"/>
+                  <a:pt x="431864" y="514648"/>
+                </a:cubicBezTo>
+                <a:cubicBezTo>
+                  <a:pt x="436456" y="520005"/>
+                  <a:pt x="443808" y="522359"/>
+                  <a:pt x="448797" y="527348"/>
+                </a:cubicBezTo>
+                <a:cubicBezTo>
+                  <a:pt x="453786" y="532337"/>
+                  <a:pt x="457396" y="538540"/>
+                  <a:pt x="461497" y="544281"/>
+                </a:cubicBezTo>
+                <a:cubicBezTo>
+                  <a:pt x="471266" y="557958"/>
+                  <a:pt x="473374" y="564624"/>
+                  <a:pt x="486897" y="578148"/>
+                </a:cubicBezTo>
+                <a:cubicBezTo>
+                  <a:pt x="490495" y="581746"/>
+                  <a:pt x="495815" y="583211"/>
+                  <a:pt x="499597" y="586615"/>
+                </a:cubicBezTo>
+                <a:cubicBezTo>
+                  <a:pt x="509980" y="595960"/>
+                  <a:pt x="520849" y="605073"/>
+                  <a:pt x="529231" y="616248"/>
+                </a:cubicBezTo>
+                <a:cubicBezTo>
+                  <a:pt x="533464" y="621892"/>
+                  <a:pt x="536942" y="628192"/>
+                  <a:pt x="541931" y="633181"/>
+                </a:cubicBezTo>
+                <a:cubicBezTo>
+                  <a:pt x="546920" y="638170"/>
+                  <a:pt x="553220" y="641648"/>
+                  <a:pt x="558864" y="645881"/>
+                </a:cubicBezTo>
+                <a:cubicBezTo>
+                  <a:pt x="561686" y="651526"/>
+                  <a:pt x="563291" y="657967"/>
+                  <a:pt x="567331" y="662815"/>
+                </a:cubicBezTo>
+                <a:cubicBezTo>
+                  <a:pt x="577551" y="675079"/>
+                  <a:pt x="601197" y="696681"/>
+                  <a:pt x="601197" y="696681"/>
+                </a:cubicBezTo>
+                <a:cubicBezTo>
+                  <a:pt x="604019" y="703737"/>
+                  <a:pt x="607821" y="710476"/>
+                  <a:pt x="609664" y="717848"/>
+                </a:cubicBezTo>
+                <a:cubicBezTo>
+                  <a:pt x="613491" y="733154"/>
+                  <a:pt x="612272" y="749767"/>
+                  <a:pt x="618131" y="764415"/>
+                </a:cubicBezTo>
+                <a:cubicBezTo>
+                  <a:pt x="621096" y="771826"/>
+                  <a:pt x="629808" y="775341"/>
+                  <a:pt x="635064" y="781348"/>
+                </a:cubicBezTo>
+                <a:cubicBezTo>
+                  <a:pt x="639710" y="786658"/>
+                  <a:pt x="642120" y="794048"/>
+                  <a:pt x="647764" y="798281"/>
+                </a:cubicBezTo>
+                <a:cubicBezTo>
+                  <a:pt x="653843" y="802840"/>
+                  <a:pt x="662013" y="803603"/>
+                  <a:pt x="668931" y="806748"/>
+                </a:cubicBezTo>
+                <a:cubicBezTo>
+                  <a:pt x="677549" y="810665"/>
+                  <a:pt x="685864" y="815215"/>
+                  <a:pt x="694331" y="819448"/>
+                </a:cubicBezTo>
+                <a:cubicBezTo>
+                  <a:pt x="702798" y="830737"/>
+                  <a:pt x="713420" y="840694"/>
+                  <a:pt x="719731" y="853315"/>
+                </a:cubicBezTo>
+                <a:cubicBezTo>
+                  <a:pt x="723964" y="861782"/>
+                  <a:pt x="726751" y="871142"/>
+                  <a:pt x="732431" y="878715"/>
+                </a:cubicBezTo>
+                <a:cubicBezTo>
+                  <a:pt x="735484" y="882785"/>
+                  <a:pt x="740991" y="884224"/>
+                  <a:pt x="745131" y="887181"/>
+                </a:cubicBezTo>
+                <a:cubicBezTo>
+                  <a:pt x="750872" y="891282"/>
+                  <a:pt x="756420" y="895648"/>
+                  <a:pt x="762064" y="899881"/>
+                </a:cubicBezTo>
+                <a:cubicBezTo>
+                  <a:pt x="778423" y="932599"/>
+                  <a:pt x="759531" y="905530"/>
+                  <a:pt x="787464" y="921048"/>
+                </a:cubicBezTo>
+                <a:cubicBezTo>
+                  <a:pt x="795363" y="925436"/>
+                  <a:pt x="801229" y="932799"/>
+                  <a:pt x="808631" y="937981"/>
+                </a:cubicBezTo>
+                <a:cubicBezTo>
+                  <a:pt x="815372" y="942699"/>
+                  <a:pt x="822820" y="946320"/>
+                  <a:pt x="829797" y="950681"/>
+                </a:cubicBezTo>
+                <a:cubicBezTo>
+                  <a:pt x="834111" y="953378"/>
+                  <a:pt x="837946" y="956873"/>
+                  <a:pt x="842497" y="959148"/>
+                </a:cubicBezTo>
+                <a:cubicBezTo>
+                  <a:pt x="849294" y="962547"/>
+                  <a:pt x="856608" y="964793"/>
+                  <a:pt x="863664" y="967615"/>
+                </a:cubicBezTo>
+                <a:cubicBezTo>
+                  <a:pt x="866486" y="973259"/>
+                  <a:pt x="868463" y="979413"/>
+                  <a:pt x="872131" y="984548"/>
+                </a:cubicBezTo>
+                <a:cubicBezTo>
+                  <a:pt x="878935" y="994073"/>
+                  <a:pt x="892870" y="1003277"/>
+                  <a:pt x="901764" y="1009948"/>
+                </a:cubicBezTo>
+                <a:cubicBezTo>
+                  <a:pt x="911113" y="1037996"/>
+                  <a:pt x="898206" y="1005584"/>
+                  <a:pt x="922931" y="1039581"/>
+                </a:cubicBezTo>
+                <a:cubicBezTo>
+                  <a:pt x="951595" y="1078994"/>
+                  <a:pt x="924918" y="1061742"/>
+                  <a:pt x="956797" y="1077681"/>
+                </a:cubicBezTo>
+                <a:cubicBezTo>
+                  <a:pt x="965527" y="1086411"/>
+                  <a:pt x="979005" y="1101486"/>
+                  <a:pt x="990664" y="1107315"/>
+                </a:cubicBezTo>
+                <a:cubicBezTo>
+                  <a:pt x="995868" y="1109917"/>
+                  <a:pt x="1001953" y="1110137"/>
+                  <a:pt x="1007597" y="1111548"/>
+                </a:cubicBezTo>
+                <a:cubicBezTo>
+                  <a:pt x="1013242" y="1118604"/>
+                  <a:pt x="1018142" y="1126326"/>
+                  <a:pt x="1024531" y="1132715"/>
+                </a:cubicBezTo>
+                <a:cubicBezTo>
+                  <a:pt x="1028129" y="1136312"/>
+                  <a:pt x="1033322" y="1137924"/>
+                  <a:pt x="1037231" y="1141181"/>
+                </a:cubicBezTo>
+                <a:cubicBezTo>
+                  <a:pt x="1041830" y="1145014"/>
+                  <a:pt x="1045698" y="1149648"/>
+                  <a:pt x="1049931" y="1153881"/>
+                </a:cubicBezTo>
+                <a:cubicBezTo>
+                  <a:pt x="1052753" y="1162348"/>
+                  <a:pt x="1056390" y="1170585"/>
+                  <a:pt x="1058397" y="1179281"/>
+                </a:cubicBezTo>
+                <a:cubicBezTo>
+                  <a:pt x="1060641" y="1189004"/>
+                  <a:pt x="1060092" y="1199265"/>
+                  <a:pt x="1062631" y="1208915"/>
+                </a:cubicBezTo>
+                <a:cubicBezTo>
+                  <a:pt x="1067174" y="1226177"/>
+                  <a:pt x="1079564" y="1259715"/>
+                  <a:pt x="1079564" y="1259715"/>
+                </a:cubicBezTo>
+                <a:cubicBezTo>
+                  <a:pt x="1080975" y="1268182"/>
+                  <a:pt x="1080311" y="1277271"/>
+                  <a:pt x="1083797" y="1285115"/>
+                </a:cubicBezTo>
+                <a:cubicBezTo>
+                  <a:pt x="1086228" y="1290586"/>
+                  <a:pt x="1092664" y="1293216"/>
+                  <a:pt x="1096497" y="1297815"/>
+                </a:cubicBezTo>
+                <a:cubicBezTo>
+                  <a:pt x="1099754" y="1301724"/>
+                  <a:pt x="1101560" y="1306733"/>
+                  <a:pt x="1104964" y="1310515"/>
+                </a:cubicBezTo>
+                <a:cubicBezTo>
+                  <a:pt x="1114309" y="1320898"/>
+                  <a:pt x="1134597" y="1340148"/>
+                  <a:pt x="1134597" y="1340148"/>
+                </a:cubicBezTo>
+                <a:cubicBezTo>
+                  <a:pt x="1138640" y="1350254"/>
+                  <a:pt x="1143076" y="1365560"/>
+                  <a:pt x="1151531" y="1374015"/>
+                </a:cubicBezTo>
+                <a:cubicBezTo>
+                  <a:pt x="1155129" y="1377612"/>
+                  <a:pt x="1160322" y="1379224"/>
+                  <a:pt x="1164231" y="1382481"/>
+                </a:cubicBezTo>
+                <a:cubicBezTo>
+                  <a:pt x="1168830" y="1386314"/>
+                  <a:pt x="1172059" y="1391701"/>
+                  <a:pt x="1176931" y="1395181"/>
+                </a:cubicBezTo>
+                <a:cubicBezTo>
+                  <a:pt x="1182066" y="1398849"/>
+                  <a:pt x="1188348" y="1400583"/>
+                  <a:pt x="1193864" y="1403648"/>
+                </a:cubicBezTo>
+                <a:cubicBezTo>
+                  <a:pt x="1224616" y="1420733"/>
+                  <a:pt x="1203976" y="1414137"/>
+                  <a:pt x="1236197" y="1420581"/>
+                </a:cubicBezTo>
+                <a:cubicBezTo>
+                  <a:pt x="1247486" y="1419170"/>
+                  <a:pt x="1259668" y="1420968"/>
+                  <a:pt x="1270064" y="1416348"/>
+                </a:cubicBezTo>
+                <a:cubicBezTo>
+                  <a:pt x="1274142" y="1414536"/>
+                  <a:pt x="1274297" y="1408110"/>
+                  <a:pt x="1274297" y="1403648"/>
+                </a:cubicBezTo>
+                <a:cubicBezTo>
+                  <a:pt x="1274297" y="1365522"/>
+                  <a:pt x="1272303" y="1327408"/>
+                  <a:pt x="1270064" y="1289348"/>
+                </a:cubicBezTo>
+                <a:cubicBezTo>
+                  <a:pt x="1268581" y="1264128"/>
+                  <a:pt x="1263125" y="1250814"/>
+                  <a:pt x="1257364" y="1225848"/>
+                </a:cubicBezTo>
+                <a:cubicBezTo>
+                  <a:pt x="1255746" y="1218837"/>
+                  <a:pt x="1255406" y="1211507"/>
+                  <a:pt x="1253131" y="1204681"/>
+                </a:cubicBezTo>
+                <a:cubicBezTo>
+                  <a:pt x="1251135" y="1198694"/>
+                  <a:pt x="1247008" y="1193607"/>
+                  <a:pt x="1244664" y="1187748"/>
+                </a:cubicBezTo>
+                <a:cubicBezTo>
+                  <a:pt x="1236070" y="1166263"/>
+                  <a:pt x="1236215" y="1162440"/>
+                  <a:pt x="1231964" y="1141181"/>
+                </a:cubicBezTo>
+                <a:cubicBezTo>
+                  <a:pt x="1216288" y="979201"/>
+                  <a:pt x="1235193" y="1056241"/>
+                  <a:pt x="1206564" y="976081"/>
+                </a:cubicBezTo>
+                <a:cubicBezTo>
+                  <a:pt x="1203562" y="967676"/>
+                  <a:pt x="1200445" y="959291"/>
+                  <a:pt x="1198097" y="950681"/>
+                </a:cubicBezTo>
+                <a:cubicBezTo>
+                  <a:pt x="1196204" y="943739"/>
+                  <a:pt x="1197855" y="935502"/>
+                  <a:pt x="1193864" y="929515"/>
+                </a:cubicBezTo>
+                <a:cubicBezTo>
+                  <a:pt x="1191389" y="925802"/>
+                  <a:pt x="1185455" y="926507"/>
+                  <a:pt x="1181164" y="925281"/>
+                </a:cubicBezTo>
+                <a:cubicBezTo>
+                  <a:pt x="1163486" y="920230"/>
+                  <a:pt x="1158783" y="920140"/>
+                  <a:pt x="1138831" y="916815"/>
+                </a:cubicBezTo>
+                <a:cubicBezTo>
+                  <a:pt x="1126131" y="912582"/>
+                  <a:pt x="1112210" y="911002"/>
+                  <a:pt x="1100731" y="904115"/>
+                </a:cubicBezTo>
+                <a:cubicBezTo>
+                  <a:pt x="1096905" y="901819"/>
+                  <a:pt x="1099285" y="894900"/>
+                  <a:pt x="1096497" y="891415"/>
+                </a:cubicBezTo>
+                <a:cubicBezTo>
+                  <a:pt x="1093319" y="887442"/>
+                  <a:pt x="1088030" y="885770"/>
+                  <a:pt x="1083797" y="882948"/>
+                </a:cubicBezTo>
+                <a:cubicBezTo>
+                  <a:pt x="1079564" y="873070"/>
+                  <a:pt x="1074769" y="863415"/>
+                  <a:pt x="1071097" y="853315"/>
+                </a:cubicBezTo>
+                <a:cubicBezTo>
+                  <a:pt x="1069109" y="847847"/>
+                  <a:pt x="1068462" y="841976"/>
+                  <a:pt x="1066864" y="836381"/>
+                </a:cubicBezTo>
+                <a:cubicBezTo>
+                  <a:pt x="1062712" y="821846"/>
+                  <a:pt x="1061691" y="821801"/>
+                  <a:pt x="1054164" y="806748"/>
+                </a:cubicBezTo>
+                <a:cubicBezTo>
+                  <a:pt x="1045389" y="771645"/>
+                  <a:pt x="1056855" y="808204"/>
+                  <a:pt x="1037231" y="772881"/>
+                </a:cubicBezTo>
+                <a:cubicBezTo>
+                  <a:pt x="1032860" y="765013"/>
+                  <a:pt x="1026814" y="742602"/>
+                  <a:pt x="1020297" y="734781"/>
+                </a:cubicBezTo>
+                <a:cubicBezTo>
+                  <a:pt x="1014501" y="727826"/>
+                  <a:pt x="1003112" y="724428"/>
+                  <a:pt x="994897" y="722081"/>
+                </a:cubicBezTo>
+                <a:cubicBezTo>
+                  <a:pt x="989303" y="720483"/>
+                  <a:pt x="983764" y="718306"/>
+                  <a:pt x="977964" y="717848"/>
+                </a:cubicBezTo>
+                <a:cubicBezTo>
+                  <a:pt x="930052" y="714065"/>
+                  <a:pt x="882009" y="712203"/>
+                  <a:pt x="834031" y="709381"/>
+                </a:cubicBezTo>
+                <a:cubicBezTo>
+                  <a:pt x="833116" y="705720"/>
+                  <a:pt x="828261" y="684468"/>
+                  <a:pt x="825564" y="679748"/>
+                </a:cubicBezTo>
+                <a:cubicBezTo>
+                  <a:pt x="822064" y="673622"/>
+                  <a:pt x="817097" y="668459"/>
+                  <a:pt x="812864" y="662815"/>
+                </a:cubicBezTo>
+                <a:cubicBezTo>
+                  <a:pt x="811453" y="652937"/>
+                  <a:pt x="810722" y="642938"/>
+                  <a:pt x="808631" y="633181"/>
+                </a:cubicBezTo>
+                <a:cubicBezTo>
+                  <a:pt x="803895" y="611081"/>
+                  <a:pt x="798041" y="599295"/>
+                  <a:pt x="791697" y="578148"/>
+                </a:cubicBezTo>
+                <a:cubicBezTo>
+                  <a:pt x="790025" y="572575"/>
+                  <a:pt x="791189" y="565685"/>
+                  <a:pt x="787464" y="561215"/>
+                </a:cubicBezTo>
+                <a:cubicBezTo>
+                  <a:pt x="783424" y="556367"/>
+                  <a:pt x="776175" y="555570"/>
+                  <a:pt x="770531" y="552748"/>
+                </a:cubicBezTo>
+                <a:cubicBezTo>
+                  <a:pt x="767709" y="548515"/>
+                  <a:pt x="765117" y="544118"/>
+                  <a:pt x="762064" y="540048"/>
+                </a:cubicBezTo>
+                <a:cubicBezTo>
+                  <a:pt x="748899" y="522495"/>
+                  <a:pt x="746232" y="522127"/>
+                  <a:pt x="736664" y="506181"/>
+                </a:cubicBezTo>
+                <a:cubicBezTo>
+                  <a:pt x="730811" y="496426"/>
+                  <a:pt x="725125" y="486565"/>
+                  <a:pt x="719731" y="476548"/>
+                </a:cubicBezTo>
+                <a:cubicBezTo>
+                  <a:pt x="715243" y="468213"/>
+                  <a:pt x="712113" y="459134"/>
+                  <a:pt x="707031" y="451148"/>
+                </a:cubicBezTo>
+                <a:cubicBezTo>
+                  <a:pt x="702180" y="443525"/>
+                  <a:pt x="695742" y="437037"/>
+                  <a:pt x="690097" y="429981"/>
+                </a:cubicBezTo>
+                <a:cubicBezTo>
+                  <a:pt x="688686" y="424337"/>
+                  <a:pt x="688889" y="418018"/>
+                  <a:pt x="685864" y="413048"/>
+                </a:cubicBezTo>
+                <a:cubicBezTo>
+                  <a:pt x="638328" y="334953"/>
+                  <a:pt x="651132" y="349533"/>
+                  <a:pt x="605431" y="311448"/>
+                </a:cubicBezTo>
+                <a:cubicBezTo>
+                  <a:pt x="602609" y="302981"/>
+                  <a:pt x="600955" y="294030"/>
+                  <a:pt x="596964" y="286048"/>
+                </a:cubicBezTo>
+                <a:cubicBezTo>
+                  <a:pt x="592413" y="276947"/>
+                  <a:pt x="585494" y="269233"/>
+                  <a:pt x="580031" y="260648"/>
+                </a:cubicBezTo>
+                <a:cubicBezTo>
+                  <a:pt x="575614" y="253706"/>
+                  <a:pt x="571271" y="246705"/>
+                  <a:pt x="567331" y="239481"/>
+                </a:cubicBezTo>
+                <a:cubicBezTo>
+                  <a:pt x="557858" y="222113"/>
+                  <a:pt x="553498" y="208820"/>
+                  <a:pt x="541931" y="192915"/>
+                </a:cubicBezTo>
+                <a:cubicBezTo>
+                  <a:pt x="535449" y="184002"/>
+                  <a:pt x="528557" y="175308"/>
+                  <a:pt x="520764" y="167515"/>
+                </a:cubicBezTo>
+                <a:cubicBezTo>
+                  <a:pt x="515775" y="162526"/>
+                  <a:pt x="508518" y="160088"/>
+                  <a:pt x="503831" y="154815"/>
+                </a:cubicBezTo>
+                <a:cubicBezTo>
+                  <a:pt x="497071" y="147210"/>
+                  <a:pt x="492882" y="137645"/>
+                  <a:pt x="486897" y="129415"/>
+                </a:cubicBezTo>
+                <a:cubicBezTo>
+                  <a:pt x="481583" y="122108"/>
+                  <a:pt x="475608" y="115304"/>
+                  <a:pt x="469964" y="108248"/>
+                </a:cubicBezTo>
+                <a:cubicBezTo>
+                  <a:pt x="467142" y="99781"/>
+                  <a:pt x="465122" y="91004"/>
+                  <a:pt x="461497" y="82848"/>
+                </a:cubicBezTo>
+                <a:cubicBezTo>
+                  <a:pt x="455515" y="69388"/>
+                  <a:pt x="445785" y="64517"/>
+                  <a:pt x="436097" y="53215"/>
+                </a:cubicBezTo>
+                <a:cubicBezTo>
+                  <a:pt x="432786" y="49352"/>
+                  <a:pt x="431228" y="44113"/>
+                  <a:pt x="427631" y="40515"/>
+                </a:cubicBezTo>
+                <a:cubicBezTo>
+                  <a:pt x="417886" y="30769"/>
+                  <a:pt x="410952" y="31053"/>
+                  <a:pt x="397997" y="27815"/>
+                </a:cubicBezTo>
+                <a:cubicBezTo>
+                  <a:pt x="335153" y="-9892"/>
+                  <a:pt x="410758" y="32678"/>
+                  <a:pt x="359897" y="10881"/>
+                </a:cubicBezTo>
+                <a:cubicBezTo>
+                  <a:pt x="355221" y="8877"/>
+                  <a:pt x="351961" y="4201"/>
+                  <a:pt x="347197" y="2415"/>
+                </a:cubicBezTo>
+                <a:cubicBezTo>
+                  <a:pt x="333692" y="-2649"/>
+                  <a:pt x="321092" y="1710"/>
+                  <a:pt x="300631" y="2415"/>
+                </a:cubicBezTo>
+                <a:close/>
+              </a:path>
+            </a:pathLst>
+          </a:custGeom>
+          <a:solidFill>
+            <a:srgbClr val="92D050">
+              <a:alpha val="25882"/>
+            </a:srgbClr>
+          </a:solidFill>
+          <a:ln>
+            <a:solidFill>
+              <a:schemeClr val="tx1"/>
+            </a:solidFill>
+          </a:ln>
+        </p:spPr>
+        <p:style>
+          <a:lnRef idx="2">
+            <a:schemeClr val="accent1">
+              <a:shade val="15000"/>
+            </a:schemeClr>
+          </a:lnRef>
+          <a:fillRef idx="1">
+            <a:schemeClr val="accent1"/>
+          </a:fillRef>
+          <a:effectRef idx="0">
+            <a:schemeClr val="accent1"/>
+          </a:effectRef>
+          <a:fontRef idx="minor">
+            <a:schemeClr val="lt1"/>
+          </a:fontRef>
+        </p:style>
+        <p:txBody>
+          <a:bodyPr rtlCol="0" anchor="ctr"/>
+          <a:lstStyle/>
+          <a:p>
+            <a:pPr algn="ctr"/>
+            <a:endParaRPr lang="en-US"/>
+          </a:p>
+        </p:txBody>
+      </p:sp>
+      <p:sp>
+        <p:nvSpPr>
+          <p:cNvPr id="24" name="Freeform: Shape 23">
+            <a:extLst>
+              <a:ext uri="{FF2B5EF4-FFF2-40B4-BE49-F238E27FC236}">
+                <a16:creationId xmlns:a16="http://schemas.microsoft.com/office/drawing/2014/main" id="{D8054C67-78FA-432F-987B-6E3F894A7679}"/>
+              </a:ext>
+            </a:extLst>
+          </p:cNvPr>
+          <p:cNvSpPr/>
+          <p:nvPr/>
+        </p:nvSpPr>
+        <p:spPr>
+          <a:xfrm>
+            <a:off x="1992508" y="6751320"/>
+            <a:ext cx="1030092" cy="1183640"/>
+          </a:xfrm>
+          <a:custGeom>
+            <a:avLst/>
+            <a:gdLst>
+              <a:gd name="connsiteX0" fmla="*/ 837052 w 1030092"/>
+              <a:gd name="connsiteY0" fmla="*/ 375920 h 1183640"/>
+              <a:gd name="connsiteX1" fmla="*/ 689732 w 1030092"/>
+              <a:gd name="connsiteY1" fmla="*/ 340360 h 1183640"/>
+              <a:gd name="connsiteX2" fmla="*/ 430652 w 1030092"/>
+              <a:gd name="connsiteY2" fmla="*/ 233680 h 1183640"/>
+              <a:gd name="connsiteX3" fmla="*/ 379852 w 1030092"/>
+              <a:gd name="connsiteY3" fmla="*/ 203200 h 1183640"/>
+              <a:gd name="connsiteX4" fmla="*/ 313812 w 1030092"/>
+              <a:gd name="connsiteY4" fmla="*/ 167640 h 1183640"/>
+              <a:gd name="connsiteX5" fmla="*/ 283332 w 1030092"/>
+              <a:gd name="connsiteY5" fmla="*/ 137160 h 1183640"/>
+              <a:gd name="connsiteX6" fmla="*/ 202052 w 1030092"/>
+              <a:gd name="connsiteY6" fmla="*/ 76200 h 1183640"/>
+              <a:gd name="connsiteX7" fmla="*/ 186812 w 1030092"/>
+              <a:gd name="connsiteY7" fmla="*/ 55880 h 1183640"/>
+              <a:gd name="connsiteX8" fmla="*/ 146172 w 1030092"/>
+              <a:gd name="connsiteY8" fmla="*/ 30480 h 1183640"/>
+              <a:gd name="connsiteX9" fmla="*/ 136012 w 1030092"/>
+              <a:gd name="connsiteY9" fmla="*/ 15240 h 1183640"/>
+              <a:gd name="connsiteX10" fmla="*/ 64892 w 1030092"/>
+              <a:gd name="connsiteY10" fmla="*/ 0 h 1183640"/>
+              <a:gd name="connsiteX11" fmla="*/ 29332 w 1030092"/>
+              <a:gd name="connsiteY11" fmla="*/ 162560 h 1183640"/>
+              <a:gd name="connsiteX12" fmla="*/ 49652 w 1030092"/>
+              <a:gd name="connsiteY12" fmla="*/ 187960 h 1183640"/>
+              <a:gd name="connsiteX13" fmla="*/ 136012 w 1030092"/>
+              <a:gd name="connsiteY13" fmla="*/ 264160 h 1183640"/>
+              <a:gd name="connsiteX14" fmla="*/ 166492 w 1030092"/>
+              <a:gd name="connsiteY14" fmla="*/ 279400 h 1183640"/>
+              <a:gd name="connsiteX15" fmla="*/ 222372 w 1030092"/>
+              <a:gd name="connsiteY15" fmla="*/ 314960 h 1183640"/>
+              <a:gd name="connsiteX16" fmla="*/ 278252 w 1030092"/>
+              <a:gd name="connsiteY16" fmla="*/ 370840 h 1183640"/>
+              <a:gd name="connsiteX17" fmla="*/ 303652 w 1030092"/>
+              <a:gd name="connsiteY17" fmla="*/ 391160 h 1183640"/>
+              <a:gd name="connsiteX18" fmla="*/ 354452 w 1030092"/>
+              <a:gd name="connsiteY18" fmla="*/ 411480 h 1183640"/>
+              <a:gd name="connsiteX19" fmla="*/ 405252 w 1030092"/>
+              <a:gd name="connsiteY19" fmla="*/ 436880 h 1183640"/>
+              <a:gd name="connsiteX20" fmla="*/ 461132 w 1030092"/>
+              <a:gd name="connsiteY20" fmla="*/ 441960 h 1183640"/>
+              <a:gd name="connsiteX21" fmla="*/ 506852 w 1030092"/>
+              <a:gd name="connsiteY21" fmla="*/ 462280 h 1183640"/>
+              <a:gd name="connsiteX22" fmla="*/ 532252 w 1030092"/>
+              <a:gd name="connsiteY22" fmla="*/ 482600 h 1183640"/>
+              <a:gd name="connsiteX23" fmla="*/ 552572 w 1030092"/>
+              <a:gd name="connsiteY23" fmla="*/ 492760 h 1183640"/>
+              <a:gd name="connsiteX24" fmla="*/ 583052 w 1030092"/>
+              <a:gd name="connsiteY24" fmla="*/ 528320 h 1183640"/>
+              <a:gd name="connsiteX25" fmla="*/ 588132 w 1030092"/>
+              <a:gd name="connsiteY25" fmla="*/ 543560 h 1183640"/>
+              <a:gd name="connsiteX26" fmla="*/ 623692 w 1030092"/>
+              <a:gd name="connsiteY26" fmla="*/ 574040 h 1183640"/>
+              <a:gd name="connsiteX27" fmla="*/ 638932 w 1030092"/>
+              <a:gd name="connsiteY27" fmla="*/ 599440 h 1183640"/>
+              <a:gd name="connsiteX28" fmla="*/ 659252 w 1030092"/>
+              <a:gd name="connsiteY28" fmla="*/ 629920 h 1183640"/>
+              <a:gd name="connsiteX29" fmla="*/ 684652 w 1030092"/>
+              <a:gd name="connsiteY29" fmla="*/ 660400 h 1183640"/>
+              <a:gd name="connsiteX30" fmla="*/ 725292 w 1030092"/>
+              <a:gd name="connsiteY30" fmla="*/ 690880 h 1183640"/>
+              <a:gd name="connsiteX31" fmla="*/ 740532 w 1030092"/>
+              <a:gd name="connsiteY31" fmla="*/ 721360 h 1183640"/>
+              <a:gd name="connsiteX32" fmla="*/ 760852 w 1030092"/>
+              <a:gd name="connsiteY32" fmla="*/ 756920 h 1183640"/>
+              <a:gd name="connsiteX33" fmla="*/ 771012 w 1030092"/>
+              <a:gd name="connsiteY33" fmla="*/ 817880 h 1183640"/>
+              <a:gd name="connsiteX34" fmla="*/ 791332 w 1030092"/>
+              <a:gd name="connsiteY34" fmla="*/ 914400 h 1183640"/>
+              <a:gd name="connsiteX35" fmla="*/ 806572 w 1030092"/>
+              <a:gd name="connsiteY35" fmla="*/ 944880 h 1183640"/>
+              <a:gd name="connsiteX36" fmla="*/ 821812 w 1030092"/>
+              <a:gd name="connsiteY36" fmla="*/ 995680 h 1183640"/>
+              <a:gd name="connsiteX37" fmla="*/ 847212 w 1030092"/>
+              <a:gd name="connsiteY37" fmla="*/ 1087120 h 1183640"/>
+              <a:gd name="connsiteX38" fmla="*/ 898012 w 1030092"/>
+              <a:gd name="connsiteY38" fmla="*/ 1183640 h 1183640"/>
+              <a:gd name="connsiteX39" fmla="*/ 999612 w 1030092"/>
+              <a:gd name="connsiteY39" fmla="*/ 1132840 h 1183640"/>
+              <a:gd name="connsiteX40" fmla="*/ 1004692 w 1030092"/>
+              <a:gd name="connsiteY40" fmla="*/ 1056640 h 1183640"/>
+              <a:gd name="connsiteX41" fmla="*/ 1030092 w 1030092"/>
+              <a:gd name="connsiteY41" fmla="*/ 1026160 h 1183640"/>
+              <a:gd name="connsiteX42" fmla="*/ 1025012 w 1030092"/>
+              <a:gd name="connsiteY42" fmla="*/ 675640 h 1183640"/>
+              <a:gd name="connsiteX43" fmla="*/ 1009772 w 1030092"/>
+              <a:gd name="connsiteY43" fmla="*/ 650240 h 1183640"/>
+              <a:gd name="connsiteX44" fmla="*/ 989452 w 1030092"/>
+              <a:gd name="connsiteY44" fmla="*/ 594360 h 1183640"/>
+              <a:gd name="connsiteX45" fmla="*/ 974212 w 1030092"/>
+              <a:gd name="connsiteY45" fmla="*/ 568960 h 1183640"/>
+              <a:gd name="connsiteX46" fmla="*/ 948812 w 1030092"/>
+              <a:gd name="connsiteY46" fmla="*/ 523240 h 1183640"/>
+              <a:gd name="connsiteX47" fmla="*/ 933572 w 1030092"/>
+              <a:gd name="connsiteY47" fmla="*/ 508000 h 1183640"/>
+              <a:gd name="connsiteX48" fmla="*/ 877692 w 1030092"/>
+              <a:gd name="connsiteY48" fmla="*/ 487680 h 1183640"/>
+              <a:gd name="connsiteX49" fmla="*/ 857372 w 1030092"/>
+              <a:gd name="connsiteY49" fmla="*/ 477520 h 1183640"/>
+              <a:gd name="connsiteX50" fmla="*/ 821812 w 1030092"/>
+              <a:gd name="connsiteY50" fmla="*/ 441960 h 1183640"/>
+              <a:gd name="connsiteX51" fmla="*/ 837052 w 1030092"/>
+              <a:gd name="connsiteY51" fmla="*/ 375920 h 1183640"/>
+            </a:gdLst>
+            <a:ahLst/>
+            <a:cxnLst>
+              <a:cxn ang="0">
+                <a:pos x="connsiteX0" y="connsiteY0"/>
+              </a:cxn>
+              <a:cxn ang="0">
+                <a:pos x="connsiteX1" y="connsiteY1"/>
+              </a:cxn>
+              <a:cxn ang="0">
+                <a:pos x="connsiteX2" y="connsiteY2"/>
+              </a:cxn>
+              <a:cxn ang="0">
+                <a:pos x="connsiteX3" y="connsiteY3"/>
+              </a:cxn>
+              <a:cxn ang="0">
+                <a:pos x="connsiteX4" y="connsiteY4"/>
+              </a:cxn>
+              <a:cxn ang="0">
+                <a:pos x="connsiteX5" y="connsiteY5"/>
+              </a:cxn>
+              <a:cxn ang="0">
+                <a:pos x="connsiteX6" y="connsiteY6"/>
+              </a:cxn>
+              <a:cxn ang="0">
+                <a:pos x="connsiteX7" y="connsiteY7"/>
+              </a:cxn>
+              <a:cxn ang="0">
+                <a:pos x="connsiteX8" y="connsiteY8"/>
+              </a:cxn>
+              <a:cxn ang="0">
+                <a:pos x="connsiteX9" y="connsiteY9"/>
+              </a:cxn>
+              <a:cxn ang="0">
+                <a:pos x="connsiteX10" y="connsiteY10"/>
+              </a:cxn>
+              <a:cxn ang="0">
+                <a:pos x="connsiteX11" y="connsiteY11"/>
+              </a:cxn>
+              <a:cxn ang="0">
+                <a:pos x="connsiteX12" y="connsiteY12"/>
+              </a:cxn>
+              <a:cxn ang="0">
+                <a:pos x="connsiteX13" y="connsiteY13"/>
+              </a:cxn>
+              <a:cxn ang="0">
+                <a:pos x="connsiteX14" y="connsiteY14"/>
+              </a:cxn>
+              <a:cxn ang="0">
+                <a:pos x="connsiteX15" y="connsiteY15"/>
+              </a:cxn>
+              <a:cxn ang="0">
+                <a:pos x="connsiteX16" y="connsiteY16"/>
+              </a:cxn>
+              <a:cxn ang="0">
+                <a:pos x="connsiteX17" y="connsiteY17"/>
+              </a:cxn>
+              <a:cxn ang="0">
+                <a:pos x="connsiteX18" y="connsiteY18"/>
+              </a:cxn>
+              <a:cxn ang="0">
+                <a:pos x="connsiteX19" y="connsiteY19"/>
+              </a:cxn>
+              <a:cxn ang="0">
+                <a:pos x="connsiteX20" y="connsiteY20"/>
+              </a:cxn>
+              <a:cxn ang="0">
+                <a:pos x="connsiteX21" y="connsiteY21"/>
+              </a:cxn>
+              <a:cxn ang="0">
+                <a:pos x="connsiteX22" y="connsiteY22"/>
+              </a:cxn>
+              <a:cxn ang="0">
+                <a:pos x="connsiteX23" y="connsiteY23"/>
+              </a:cxn>
+              <a:cxn ang="0">
+                <a:pos x="connsiteX24" y="connsiteY24"/>
+              </a:cxn>
+              <a:cxn ang="0">
+                <a:pos x="connsiteX25" y="connsiteY25"/>
+              </a:cxn>
+              <a:cxn ang="0">
+                <a:pos x="connsiteX26" y="connsiteY26"/>
+              </a:cxn>
+              <a:cxn ang="0">
+                <a:pos x="connsiteX27" y="connsiteY27"/>
+              </a:cxn>
+              <a:cxn ang="0">
+                <a:pos x="connsiteX28" y="connsiteY28"/>
+              </a:cxn>
+              <a:cxn ang="0">
+                <a:pos x="connsiteX29" y="connsiteY29"/>
+              </a:cxn>
+              <a:cxn ang="0">
+                <a:pos x="connsiteX30" y="connsiteY30"/>
+              </a:cxn>
+              <a:cxn ang="0">
+                <a:pos x="connsiteX31" y="connsiteY31"/>
+              </a:cxn>
+              <a:cxn ang="0">
+                <a:pos x="connsiteX32" y="connsiteY32"/>
+              </a:cxn>
+              <a:cxn ang="0">
+                <a:pos x="connsiteX33" y="connsiteY33"/>
+              </a:cxn>
+              <a:cxn ang="0">
+                <a:pos x="connsiteX34" y="connsiteY34"/>
+              </a:cxn>
+              <a:cxn ang="0">
+                <a:pos x="connsiteX35" y="connsiteY35"/>
+              </a:cxn>
+              <a:cxn ang="0">
+                <a:pos x="connsiteX36" y="connsiteY36"/>
+              </a:cxn>
+              <a:cxn ang="0">
+                <a:pos x="connsiteX37" y="connsiteY37"/>
+              </a:cxn>
+              <a:cxn ang="0">
+                <a:pos x="connsiteX38" y="connsiteY38"/>
+              </a:cxn>
+              <a:cxn ang="0">
+                <a:pos x="connsiteX39" y="connsiteY39"/>
+              </a:cxn>
+              <a:cxn ang="0">
+                <a:pos x="connsiteX40" y="connsiteY40"/>
+              </a:cxn>
+              <a:cxn ang="0">
+                <a:pos x="connsiteX41" y="connsiteY41"/>
+              </a:cxn>
+              <a:cxn ang="0">
+                <a:pos x="connsiteX42" y="connsiteY42"/>
+              </a:cxn>
+              <a:cxn ang="0">
+                <a:pos x="connsiteX43" y="connsiteY43"/>
+              </a:cxn>
+              <a:cxn ang="0">
+                <a:pos x="connsiteX44" y="connsiteY44"/>
+              </a:cxn>
+              <a:cxn ang="0">
+                <a:pos x="connsiteX45" y="connsiteY45"/>
+              </a:cxn>
+              <a:cxn ang="0">
+                <a:pos x="connsiteX46" y="connsiteY46"/>
+              </a:cxn>
+              <a:cxn ang="0">
+                <a:pos x="connsiteX47" y="connsiteY47"/>
+              </a:cxn>
+              <a:cxn ang="0">
+                <a:pos x="connsiteX48" y="connsiteY48"/>
+              </a:cxn>
+              <a:cxn ang="0">
+                <a:pos x="connsiteX49" y="connsiteY49"/>
+              </a:cxn>
+              <a:cxn ang="0">
+                <a:pos x="connsiteX50" y="connsiteY50"/>
+              </a:cxn>
+              <a:cxn ang="0">
+                <a:pos x="connsiteX51" y="connsiteY51"/>
+              </a:cxn>
+            </a:cxnLst>
+            <a:rect l="l" t="t" r="r" b="b"/>
+            <a:pathLst>
+              <a:path w="1030092" h="1183640">
+                <a:moveTo>
+                  <a:pt x="837052" y="375920"/>
+                </a:moveTo>
+                <a:cubicBezTo>
+                  <a:pt x="815039" y="358987"/>
+                  <a:pt x="738196" y="354614"/>
+                  <a:pt x="689732" y="340360"/>
+                </a:cubicBezTo>
+                <a:cubicBezTo>
+                  <a:pt x="631333" y="323184"/>
+                  <a:pt x="473040" y="259113"/>
+                  <a:pt x="430652" y="233680"/>
+                </a:cubicBezTo>
+                <a:cubicBezTo>
+                  <a:pt x="413719" y="223520"/>
+                  <a:pt x="397043" y="212917"/>
+                  <a:pt x="379852" y="203200"/>
+                </a:cubicBezTo>
+                <a:cubicBezTo>
+                  <a:pt x="358086" y="190898"/>
+                  <a:pt x="334446" y="181758"/>
+                  <a:pt x="313812" y="167640"/>
+                </a:cubicBezTo>
+                <a:cubicBezTo>
+                  <a:pt x="301954" y="159526"/>
+                  <a:pt x="294071" y="146706"/>
+                  <a:pt x="283332" y="137160"/>
+                </a:cubicBezTo>
+                <a:cubicBezTo>
+                  <a:pt x="226094" y="86282"/>
+                  <a:pt x="243299" y="96824"/>
+                  <a:pt x="202052" y="76200"/>
+                </a:cubicBezTo>
+                <a:cubicBezTo>
+                  <a:pt x="196972" y="69427"/>
+                  <a:pt x="192799" y="61867"/>
+                  <a:pt x="186812" y="55880"/>
+                </a:cubicBezTo>
+                <a:cubicBezTo>
+                  <a:pt x="173623" y="42691"/>
+                  <a:pt x="162268" y="38528"/>
+                  <a:pt x="146172" y="30480"/>
+                </a:cubicBezTo>
+                <a:cubicBezTo>
+                  <a:pt x="142785" y="25400"/>
+                  <a:pt x="140980" y="18789"/>
+                  <a:pt x="136012" y="15240"/>
+                </a:cubicBezTo>
+                <a:cubicBezTo>
+                  <a:pt x="117028" y="1680"/>
+                  <a:pt x="84946" y="2228"/>
+                  <a:pt x="64892" y="0"/>
+                </a:cubicBezTo>
+                <a:cubicBezTo>
+                  <a:pt x="-27498" y="27717"/>
+                  <a:pt x="-3636" y="2428"/>
+                  <a:pt x="29332" y="162560"/>
+                </a:cubicBezTo>
+                <a:cubicBezTo>
+                  <a:pt x="31518" y="173180"/>
+                  <a:pt x="42254" y="180033"/>
+                  <a:pt x="49652" y="187960"/>
+                </a:cubicBezTo>
+                <a:cubicBezTo>
+                  <a:pt x="81557" y="222143"/>
+                  <a:pt x="98724" y="241214"/>
+                  <a:pt x="136012" y="264160"/>
+                </a:cubicBezTo>
+                <a:cubicBezTo>
+                  <a:pt x="145686" y="270113"/>
+                  <a:pt x="157305" y="272719"/>
+                  <a:pt x="166492" y="279400"/>
+                </a:cubicBezTo>
+                <a:cubicBezTo>
+                  <a:pt x="222292" y="319982"/>
+                  <a:pt x="160115" y="294208"/>
+                  <a:pt x="222372" y="314960"/>
+                </a:cubicBezTo>
+                <a:cubicBezTo>
+                  <a:pt x="240999" y="333587"/>
+                  <a:pt x="257682" y="354384"/>
+                  <a:pt x="278252" y="370840"/>
+                </a:cubicBezTo>
+                <a:cubicBezTo>
+                  <a:pt x="286719" y="377613"/>
+                  <a:pt x="294085" y="386058"/>
+                  <a:pt x="303652" y="391160"/>
+                </a:cubicBezTo>
+                <a:cubicBezTo>
+                  <a:pt x="319744" y="399742"/>
+                  <a:pt x="337821" y="403996"/>
+                  <a:pt x="354452" y="411480"/>
+                </a:cubicBezTo>
+                <a:cubicBezTo>
+                  <a:pt x="371717" y="419249"/>
+                  <a:pt x="387048" y="431679"/>
+                  <a:pt x="405252" y="436880"/>
+                </a:cubicBezTo>
+                <a:cubicBezTo>
+                  <a:pt x="423236" y="442018"/>
+                  <a:pt x="442505" y="440267"/>
+                  <a:pt x="461132" y="441960"/>
+                </a:cubicBezTo>
+                <a:cubicBezTo>
+                  <a:pt x="472132" y="446360"/>
+                  <a:pt x="496173" y="455161"/>
+                  <a:pt x="506852" y="462280"/>
+                </a:cubicBezTo>
+                <a:cubicBezTo>
+                  <a:pt x="515874" y="468294"/>
+                  <a:pt x="523230" y="476586"/>
+                  <a:pt x="532252" y="482600"/>
+                </a:cubicBezTo>
+                <a:cubicBezTo>
+                  <a:pt x="538553" y="486801"/>
+                  <a:pt x="546514" y="488216"/>
+                  <a:pt x="552572" y="492760"/>
+                </a:cubicBezTo>
+                <a:cubicBezTo>
+                  <a:pt x="562571" y="500259"/>
+                  <a:pt x="576909" y="516033"/>
+                  <a:pt x="583052" y="528320"/>
+                </a:cubicBezTo>
+                <a:cubicBezTo>
+                  <a:pt x="585447" y="533109"/>
+                  <a:pt x="584574" y="539558"/>
+                  <a:pt x="588132" y="543560"/>
+                </a:cubicBezTo>
+                <a:cubicBezTo>
+                  <a:pt x="598504" y="555228"/>
+                  <a:pt x="613190" y="562488"/>
+                  <a:pt x="623692" y="574040"/>
+                </a:cubicBezTo>
+                <a:cubicBezTo>
+                  <a:pt x="630334" y="581346"/>
+                  <a:pt x="633631" y="591110"/>
+                  <a:pt x="638932" y="599440"/>
+                </a:cubicBezTo>
+                <a:cubicBezTo>
+                  <a:pt x="645488" y="609742"/>
+                  <a:pt x="651926" y="620151"/>
+                  <a:pt x="659252" y="629920"/>
+                </a:cubicBezTo>
+                <a:cubicBezTo>
+                  <a:pt x="667187" y="640500"/>
+                  <a:pt x="674822" y="651553"/>
+                  <a:pt x="684652" y="660400"/>
+                </a:cubicBezTo>
+                <a:cubicBezTo>
+                  <a:pt x="706542" y="680101"/>
+                  <a:pt x="710107" y="668102"/>
+                  <a:pt x="725292" y="690880"/>
+                </a:cubicBezTo>
+                <a:cubicBezTo>
+                  <a:pt x="731593" y="700331"/>
+                  <a:pt x="735147" y="711359"/>
+                  <a:pt x="740532" y="721360"/>
+                </a:cubicBezTo>
+                <a:cubicBezTo>
+                  <a:pt x="747004" y="733380"/>
+                  <a:pt x="754079" y="745067"/>
+                  <a:pt x="760852" y="756920"/>
+                </a:cubicBezTo>
+                <a:cubicBezTo>
+                  <a:pt x="764239" y="777240"/>
+                  <a:pt x="768099" y="797487"/>
+                  <a:pt x="771012" y="817880"/>
+                </a:cubicBezTo>
+                <a:cubicBezTo>
+                  <a:pt x="776461" y="856023"/>
+                  <a:pt x="777724" y="873576"/>
+                  <a:pt x="791332" y="914400"/>
+                </a:cubicBezTo>
+                <a:cubicBezTo>
+                  <a:pt x="794924" y="925176"/>
+                  <a:pt x="802584" y="934244"/>
+                  <a:pt x="806572" y="944880"/>
+                </a:cubicBezTo>
+                <a:cubicBezTo>
+                  <a:pt x="812779" y="961433"/>
+                  <a:pt x="816732" y="978747"/>
+                  <a:pt x="821812" y="995680"/>
+                </a:cubicBezTo>
+                <a:cubicBezTo>
+                  <a:pt x="831706" y="1104515"/>
+                  <a:pt x="815001" y="1006592"/>
+                  <a:pt x="847212" y="1087120"/>
+                </a:cubicBezTo>
+                <a:cubicBezTo>
+                  <a:pt x="884030" y="1179166"/>
+                  <a:pt x="843590" y="1129218"/>
+                  <a:pt x="898012" y="1183640"/>
+                </a:cubicBezTo>
+                <a:cubicBezTo>
+                  <a:pt x="931879" y="1166707"/>
+                  <a:pt x="975258" y="1161833"/>
+                  <a:pt x="999612" y="1132840"/>
+                </a:cubicBezTo>
+                <a:cubicBezTo>
+                  <a:pt x="1015985" y="1113348"/>
+                  <a:pt x="997699" y="1081117"/>
+                  <a:pt x="1004692" y="1056640"/>
+                </a:cubicBezTo>
+                <a:cubicBezTo>
+                  <a:pt x="1008325" y="1043924"/>
+                  <a:pt x="1021625" y="1036320"/>
+                  <a:pt x="1030092" y="1026160"/>
+                </a:cubicBezTo>
+                <a:cubicBezTo>
+                  <a:pt x="1028399" y="909320"/>
+                  <a:pt x="1031319" y="792322"/>
+                  <a:pt x="1025012" y="675640"/>
+                </a:cubicBezTo>
+                <a:cubicBezTo>
+                  <a:pt x="1024479" y="665781"/>
+                  <a:pt x="1014188" y="659071"/>
+                  <a:pt x="1009772" y="650240"/>
+                </a:cubicBezTo>
+                <a:cubicBezTo>
+                  <a:pt x="986553" y="603802"/>
+                  <a:pt x="1013161" y="646520"/>
+                  <a:pt x="989452" y="594360"/>
+                </a:cubicBezTo>
+                <a:cubicBezTo>
+                  <a:pt x="985366" y="585371"/>
+                  <a:pt x="978940" y="577628"/>
+                  <a:pt x="974212" y="568960"/>
+                </a:cubicBezTo>
+                <a:cubicBezTo>
+                  <a:pt x="966020" y="553941"/>
+                  <a:pt x="960017" y="536687"/>
+                  <a:pt x="948812" y="523240"/>
+                </a:cubicBezTo>
+                <a:cubicBezTo>
+                  <a:pt x="944213" y="517721"/>
+                  <a:pt x="939664" y="511808"/>
+                  <a:pt x="933572" y="508000"/>
+                </a:cubicBezTo>
+                <a:cubicBezTo>
+                  <a:pt x="923700" y="501830"/>
+                  <a:pt x="886908" y="491367"/>
+                  <a:pt x="877692" y="487680"/>
+                </a:cubicBezTo>
+                <a:cubicBezTo>
+                  <a:pt x="870661" y="484868"/>
+                  <a:pt x="864145" y="480907"/>
+                  <a:pt x="857372" y="477520"/>
+                </a:cubicBezTo>
+                <a:cubicBezTo>
+                  <a:pt x="843324" y="435376"/>
+                  <a:pt x="868393" y="500186"/>
+                  <a:pt x="821812" y="441960"/>
+                </a:cubicBezTo>
+                <a:cubicBezTo>
+                  <a:pt x="811117" y="428591"/>
+                  <a:pt x="859065" y="392853"/>
+                  <a:pt x="837052" y="375920"/>
+                </a:cubicBezTo>
+                <a:close/>
+              </a:path>
+            </a:pathLst>
+          </a:custGeom>
+          <a:solidFill>
+            <a:srgbClr val="4472C4">
+              <a:alpha val="25098"/>
+            </a:srgbClr>
+          </a:solidFill>
+        </p:spPr>
+        <p:style>
+          <a:lnRef idx="2">
+            <a:schemeClr val="accent1">
+              <a:shade val="15000"/>
+            </a:schemeClr>
+          </a:lnRef>
+          <a:fillRef idx="1">
+            <a:schemeClr val="accent1"/>
+          </a:fillRef>
+          <a:effectRef idx="0">
+            <a:schemeClr val="accent1"/>
+          </a:effectRef>
+          <a:fontRef idx="minor">
+            <a:schemeClr val="lt1"/>
+          </a:fontRef>
+        </p:style>
+        <p:txBody>
+          <a:bodyPr rtlCol="0" anchor="ctr"/>
+          <a:lstStyle/>
+          <a:p>
+            <a:pPr algn="ctr"/>
+            <a:endParaRPr lang="en-US"/>
+          </a:p>
+        </p:txBody>
+      </p:sp>
+      <p:sp>
+        <p:nvSpPr>
+          <p:cNvPr id="33" name="Freeform: Shape 32">
+            <a:extLst>
+              <a:ext uri="{FF2B5EF4-FFF2-40B4-BE49-F238E27FC236}">
+                <a16:creationId xmlns:a16="http://schemas.microsoft.com/office/drawing/2014/main" id="{F9089BE4-2D24-5E6B-B8C5-55DD0B15B465}"/>
+              </a:ext>
+            </a:extLst>
+          </p:cNvPr>
+          <p:cNvSpPr/>
+          <p:nvPr/>
+        </p:nvSpPr>
+        <p:spPr>
+          <a:xfrm>
+            <a:off x="1576226" y="5944788"/>
+            <a:ext cx="643800" cy="690321"/>
+          </a:xfrm>
+          <a:custGeom>
+            <a:avLst/>
+            <a:gdLst>
+              <a:gd name="connsiteX0" fmla="*/ 465934 w 643800"/>
+              <a:gd name="connsiteY0" fmla="*/ 415372 h 690321"/>
+              <a:gd name="connsiteX1" fmla="*/ 394814 w 643800"/>
+              <a:gd name="connsiteY1" fmla="*/ 344252 h 690321"/>
+              <a:gd name="connsiteX2" fmla="*/ 333854 w 643800"/>
+              <a:gd name="connsiteY2" fmla="*/ 283292 h 690321"/>
+              <a:gd name="connsiteX3" fmla="*/ 313534 w 643800"/>
+              <a:gd name="connsiteY3" fmla="*/ 207092 h 690321"/>
+              <a:gd name="connsiteX4" fmla="*/ 308454 w 643800"/>
+              <a:gd name="connsiteY4" fmla="*/ 171532 h 690321"/>
+              <a:gd name="connsiteX5" fmla="*/ 262734 w 643800"/>
+              <a:gd name="connsiteY5" fmla="*/ 115652 h 690321"/>
+              <a:gd name="connsiteX6" fmla="*/ 232254 w 643800"/>
+              <a:gd name="connsiteY6" fmla="*/ 80092 h 690321"/>
+              <a:gd name="connsiteX7" fmla="*/ 211934 w 643800"/>
+              <a:gd name="connsiteY7" fmla="*/ 49612 h 690321"/>
+              <a:gd name="connsiteX8" fmla="*/ 156054 w 643800"/>
+              <a:gd name="connsiteY8" fmla="*/ 8972 h 690321"/>
+              <a:gd name="connsiteX9" fmla="*/ 23974 w 643800"/>
+              <a:gd name="connsiteY9" fmla="*/ 34372 h 690321"/>
+              <a:gd name="connsiteX10" fmla="*/ 18894 w 643800"/>
+              <a:gd name="connsiteY10" fmla="*/ 69932 h 690321"/>
+              <a:gd name="connsiteX11" fmla="*/ 8734 w 643800"/>
+              <a:gd name="connsiteY11" fmla="*/ 90252 h 690321"/>
+              <a:gd name="connsiteX12" fmla="*/ 23974 w 643800"/>
+              <a:gd name="connsiteY12" fmla="*/ 257892 h 690321"/>
+              <a:gd name="connsiteX13" fmla="*/ 59534 w 643800"/>
+              <a:gd name="connsiteY13" fmla="*/ 329012 h 690321"/>
+              <a:gd name="connsiteX14" fmla="*/ 64614 w 643800"/>
+              <a:gd name="connsiteY14" fmla="*/ 364572 h 690321"/>
+              <a:gd name="connsiteX15" fmla="*/ 74774 w 643800"/>
+              <a:gd name="connsiteY15" fmla="*/ 425532 h 690321"/>
+              <a:gd name="connsiteX16" fmla="*/ 79854 w 643800"/>
+              <a:gd name="connsiteY16" fmla="*/ 466172 h 690321"/>
+              <a:gd name="connsiteX17" fmla="*/ 105254 w 643800"/>
+              <a:gd name="connsiteY17" fmla="*/ 501732 h 690321"/>
+              <a:gd name="connsiteX18" fmla="*/ 130654 w 643800"/>
+              <a:gd name="connsiteY18" fmla="*/ 547452 h 690321"/>
+              <a:gd name="connsiteX19" fmla="*/ 161134 w 643800"/>
+              <a:gd name="connsiteY19" fmla="*/ 572852 h 690321"/>
+              <a:gd name="connsiteX20" fmla="*/ 206854 w 643800"/>
+              <a:gd name="connsiteY20" fmla="*/ 633812 h 690321"/>
+              <a:gd name="connsiteX21" fmla="*/ 247494 w 643800"/>
+              <a:gd name="connsiteY21" fmla="*/ 664292 h 690321"/>
+              <a:gd name="connsiteX22" fmla="*/ 420214 w 643800"/>
+              <a:gd name="connsiteY22" fmla="*/ 679532 h 690321"/>
+              <a:gd name="connsiteX23" fmla="*/ 511654 w 643800"/>
+              <a:gd name="connsiteY23" fmla="*/ 689692 h 690321"/>
+              <a:gd name="connsiteX24" fmla="*/ 623414 w 643800"/>
+              <a:gd name="connsiteY24" fmla="*/ 669372 h 690321"/>
+              <a:gd name="connsiteX25" fmla="*/ 638654 w 643800"/>
+              <a:gd name="connsiteY25" fmla="*/ 643972 h 690321"/>
+              <a:gd name="connsiteX26" fmla="*/ 613254 w 643800"/>
+              <a:gd name="connsiteY26" fmla="*/ 461092 h 690321"/>
+              <a:gd name="connsiteX27" fmla="*/ 592934 w 643800"/>
+              <a:gd name="connsiteY27" fmla="*/ 435692 h 690321"/>
+              <a:gd name="connsiteX28" fmla="*/ 567534 w 643800"/>
+              <a:gd name="connsiteY28" fmla="*/ 425532 h 690321"/>
+              <a:gd name="connsiteX29" fmla="*/ 547214 w 643800"/>
+              <a:gd name="connsiteY29" fmla="*/ 415372 h 690321"/>
+              <a:gd name="connsiteX30" fmla="*/ 496414 w 643800"/>
+              <a:gd name="connsiteY30" fmla="*/ 400132 h 690321"/>
+              <a:gd name="connsiteX31" fmla="*/ 460854 w 643800"/>
+              <a:gd name="connsiteY31" fmla="*/ 374732 h 690321"/>
+              <a:gd name="connsiteX32" fmla="*/ 430374 w 643800"/>
+              <a:gd name="connsiteY32" fmla="*/ 349332 h 690321"/>
+              <a:gd name="connsiteX33" fmla="*/ 384654 w 643800"/>
+              <a:gd name="connsiteY33" fmla="*/ 344252 h 690321"/>
+            </a:gdLst>
+            <a:ahLst/>
+            <a:cxnLst>
+              <a:cxn ang="0">
+                <a:pos x="connsiteX0" y="connsiteY0"/>
+              </a:cxn>
+              <a:cxn ang="0">
+                <a:pos x="connsiteX1" y="connsiteY1"/>
+              </a:cxn>
+              <a:cxn ang="0">
+                <a:pos x="connsiteX2" y="connsiteY2"/>
+              </a:cxn>
+              <a:cxn ang="0">
+                <a:pos x="connsiteX3" y="connsiteY3"/>
+              </a:cxn>
+              <a:cxn ang="0">
+                <a:pos x="connsiteX4" y="connsiteY4"/>
+              </a:cxn>
+              <a:cxn ang="0">
+                <a:pos x="connsiteX5" y="connsiteY5"/>
+              </a:cxn>
+              <a:cxn ang="0">
+                <a:pos x="connsiteX6" y="connsiteY6"/>
+              </a:cxn>
+              <a:cxn ang="0">
+                <a:pos x="connsiteX7" y="connsiteY7"/>
+              </a:cxn>
+              <a:cxn ang="0">
+                <a:pos x="connsiteX8" y="connsiteY8"/>
+              </a:cxn>
+              <a:cxn ang="0">
+                <a:pos x="connsiteX9" y="connsiteY9"/>
+              </a:cxn>
+              <a:cxn ang="0">
+                <a:pos x="connsiteX10" y="connsiteY10"/>
+              </a:cxn>
+              <a:cxn ang="0">
+                <a:pos x="connsiteX11" y="connsiteY11"/>
+              </a:cxn>
+              <a:cxn ang="0">
+                <a:pos x="connsiteX12" y="connsiteY12"/>
+              </a:cxn>
+              <a:cxn ang="0">
+                <a:pos x="connsiteX13" y="connsiteY13"/>
+              </a:cxn>
+              <a:cxn ang="0">
+                <a:pos x="connsiteX14" y="connsiteY14"/>
+              </a:cxn>
+              <a:cxn ang="0">
+                <a:pos x="connsiteX15" y="connsiteY15"/>
+              </a:cxn>
+              <a:cxn ang="0">
+                <a:pos x="connsiteX16" y="connsiteY16"/>
+              </a:cxn>
+              <a:cxn ang="0">
+                <a:pos x="connsiteX17" y="connsiteY17"/>
+              </a:cxn>
+              <a:cxn ang="0">
+                <a:pos x="connsiteX18" y="connsiteY18"/>
+              </a:cxn>
+              <a:cxn ang="0">
+                <a:pos x="connsiteX19" y="connsiteY19"/>
+              </a:cxn>
+              <a:cxn ang="0">
+                <a:pos x="connsiteX20" y="connsiteY20"/>
+              </a:cxn>
+              <a:cxn ang="0">
+                <a:pos x="connsiteX21" y="connsiteY21"/>
+              </a:cxn>
+              <a:cxn ang="0">
+                <a:pos x="connsiteX22" y="connsiteY22"/>
+              </a:cxn>
+              <a:cxn ang="0">
+                <a:pos x="connsiteX23" y="connsiteY23"/>
+              </a:cxn>
+              <a:cxn ang="0">
+                <a:pos x="connsiteX24" y="connsiteY24"/>
+              </a:cxn>
+              <a:cxn ang="0">
+                <a:pos x="connsiteX25" y="connsiteY25"/>
+              </a:cxn>
+              <a:cxn ang="0">
+                <a:pos x="connsiteX26" y="connsiteY26"/>
+              </a:cxn>
+              <a:cxn ang="0">
+                <a:pos x="connsiteX27" y="connsiteY27"/>
+              </a:cxn>
+              <a:cxn ang="0">
+                <a:pos x="connsiteX28" y="connsiteY28"/>
+              </a:cxn>
+              <a:cxn ang="0">
+                <a:pos x="connsiteX29" y="connsiteY29"/>
+              </a:cxn>
+              <a:cxn ang="0">
+                <a:pos x="connsiteX30" y="connsiteY30"/>
+              </a:cxn>
+              <a:cxn ang="0">
+                <a:pos x="connsiteX31" y="connsiteY31"/>
+              </a:cxn>
+              <a:cxn ang="0">
+                <a:pos x="connsiteX32" y="connsiteY32"/>
+              </a:cxn>
+              <a:cxn ang="0">
+                <a:pos x="connsiteX33" y="connsiteY33"/>
+              </a:cxn>
+            </a:cxnLst>
+            <a:rect l="l" t="t" r="r" b="b"/>
+            <a:pathLst>
+              <a:path w="643800" h="690321">
+                <a:moveTo>
+                  <a:pt x="465934" y="415372"/>
+                </a:moveTo>
+                <a:cubicBezTo>
+                  <a:pt x="408003" y="376751"/>
+                  <a:pt x="459790" y="415726"/>
+                  <a:pt x="394814" y="344252"/>
+                </a:cubicBezTo>
+                <a:cubicBezTo>
+                  <a:pt x="375484" y="322988"/>
+                  <a:pt x="333854" y="283292"/>
+                  <a:pt x="333854" y="283292"/>
+                </a:cubicBezTo>
+                <a:cubicBezTo>
+                  <a:pt x="327597" y="261394"/>
+                  <a:pt x="317917" y="229008"/>
+                  <a:pt x="313534" y="207092"/>
+                </a:cubicBezTo>
+                <a:cubicBezTo>
+                  <a:pt x="311186" y="195351"/>
+                  <a:pt x="314269" y="181999"/>
+                  <a:pt x="308454" y="171532"/>
+                </a:cubicBezTo>
+                <a:cubicBezTo>
+                  <a:pt x="296766" y="150494"/>
+                  <a:pt x="278141" y="134141"/>
+                  <a:pt x="262734" y="115652"/>
+                </a:cubicBezTo>
+                <a:cubicBezTo>
+                  <a:pt x="252740" y="103659"/>
+                  <a:pt x="240914" y="93082"/>
+                  <a:pt x="232254" y="80092"/>
+                </a:cubicBezTo>
+                <a:cubicBezTo>
+                  <a:pt x="225481" y="69932"/>
+                  <a:pt x="220148" y="58647"/>
+                  <a:pt x="211934" y="49612"/>
+                </a:cubicBezTo>
+                <a:cubicBezTo>
+                  <a:pt x="194170" y="30072"/>
+                  <a:pt x="177638" y="21922"/>
+                  <a:pt x="156054" y="8972"/>
+                </a:cubicBezTo>
+                <a:cubicBezTo>
+                  <a:pt x="47677" y="13307"/>
+                  <a:pt x="35111" y="-26881"/>
+                  <a:pt x="23974" y="34372"/>
+                </a:cubicBezTo>
+                <a:cubicBezTo>
+                  <a:pt x="21832" y="46153"/>
+                  <a:pt x="22044" y="58380"/>
+                  <a:pt x="18894" y="69932"/>
+                </a:cubicBezTo>
+                <a:cubicBezTo>
+                  <a:pt x="16901" y="77238"/>
+                  <a:pt x="12121" y="83479"/>
+                  <a:pt x="8734" y="90252"/>
+                </a:cubicBezTo>
+                <a:cubicBezTo>
+                  <a:pt x="-4338" y="155611"/>
+                  <a:pt x="-5340" y="145967"/>
+                  <a:pt x="23974" y="257892"/>
+                </a:cubicBezTo>
+                <a:cubicBezTo>
+                  <a:pt x="30689" y="283532"/>
+                  <a:pt x="59534" y="329012"/>
+                  <a:pt x="59534" y="329012"/>
+                </a:cubicBezTo>
+                <a:cubicBezTo>
+                  <a:pt x="61227" y="340865"/>
+                  <a:pt x="62747" y="352745"/>
+                  <a:pt x="64614" y="364572"/>
+                </a:cubicBezTo>
+                <a:cubicBezTo>
+                  <a:pt x="67827" y="384920"/>
+                  <a:pt x="72219" y="405091"/>
+                  <a:pt x="74774" y="425532"/>
+                </a:cubicBezTo>
+                <a:cubicBezTo>
+                  <a:pt x="76467" y="439079"/>
+                  <a:pt x="74784" y="453496"/>
+                  <a:pt x="79854" y="466172"/>
+                </a:cubicBezTo>
+                <a:cubicBezTo>
+                  <a:pt x="85264" y="479697"/>
+                  <a:pt x="97534" y="489380"/>
+                  <a:pt x="105254" y="501732"/>
+                </a:cubicBezTo>
+                <a:cubicBezTo>
+                  <a:pt x="114494" y="516516"/>
+                  <a:pt x="119883" y="533743"/>
+                  <a:pt x="130654" y="547452"/>
+                </a:cubicBezTo>
+                <a:cubicBezTo>
+                  <a:pt x="138825" y="557851"/>
+                  <a:pt x="152238" y="563066"/>
+                  <a:pt x="161134" y="572852"/>
+                </a:cubicBezTo>
+                <a:cubicBezTo>
+                  <a:pt x="203313" y="619249"/>
+                  <a:pt x="157907" y="588630"/>
+                  <a:pt x="206854" y="633812"/>
+                </a:cubicBezTo>
+                <a:cubicBezTo>
+                  <a:pt x="219297" y="645298"/>
+                  <a:pt x="230664" y="662422"/>
+                  <a:pt x="247494" y="664292"/>
+                </a:cubicBezTo>
+                <a:cubicBezTo>
+                  <a:pt x="335423" y="674062"/>
+                  <a:pt x="277929" y="668149"/>
+                  <a:pt x="420214" y="679532"/>
+                </a:cubicBezTo>
+                <a:cubicBezTo>
+                  <a:pt x="450646" y="685618"/>
+                  <a:pt x="479498" y="692448"/>
+                  <a:pt x="511654" y="689692"/>
+                </a:cubicBezTo>
+                <a:cubicBezTo>
+                  <a:pt x="549380" y="686458"/>
+                  <a:pt x="586161" y="676145"/>
+                  <a:pt x="623414" y="669372"/>
+                </a:cubicBezTo>
+                <a:cubicBezTo>
+                  <a:pt x="628494" y="660905"/>
+                  <a:pt x="635941" y="653466"/>
+                  <a:pt x="638654" y="643972"/>
+                </a:cubicBezTo>
+                <a:cubicBezTo>
+                  <a:pt x="655174" y="586150"/>
+                  <a:pt x="627914" y="508005"/>
+                  <a:pt x="613254" y="461092"/>
+                </a:cubicBezTo>
+                <a:cubicBezTo>
+                  <a:pt x="610020" y="450743"/>
+                  <a:pt x="601493" y="442349"/>
+                  <a:pt x="592934" y="435692"/>
+                </a:cubicBezTo>
+                <a:cubicBezTo>
+                  <a:pt x="585736" y="430094"/>
+                  <a:pt x="575867" y="429236"/>
+                  <a:pt x="567534" y="425532"/>
+                </a:cubicBezTo>
+                <a:cubicBezTo>
+                  <a:pt x="560614" y="422456"/>
+                  <a:pt x="554305" y="418031"/>
+                  <a:pt x="547214" y="415372"/>
+                </a:cubicBezTo>
+                <a:cubicBezTo>
+                  <a:pt x="499928" y="397640"/>
+                  <a:pt x="558944" y="427923"/>
+                  <a:pt x="496414" y="400132"/>
+                </a:cubicBezTo>
+                <a:cubicBezTo>
+                  <a:pt x="490847" y="397658"/>
+                  <a:pt x="462875" y="376464"/>
+                  <a:pt x="460854" y="374732"/>
+                </a:cubicBezTo>
+                <a:cubicBezTo>
+                  <a:pt x="450605" y="365948"/>
+                  <a:pt x="443681" y="354322"/>
+                  <a:pt x="430374" y="349332"/>
+                </a:cubicBezTo>
+                <a:cubicBezTo>
+                  <a:pt x="413285" y="342924"/>
+                  <a:pt x="401878" y="344252"/>
+                  <a:pt x="384654" y="344252"/>
+                </a:cubicBezTo>
+              </a:path>
+            </a:pathLst>
+          </a:custGeom>
+          <a:solidFill>
+            <a:srgbClr val="FF0000">
+              <a:alpha val="25098"/>
+            </a:srgbClr>
+          </a:solidFill>
+        </p:spPr>
+        <p:style>
+          <a:lnRef idx="2">
+            <a:schemeClr val="accent1">
+              <a:shade val="15000"/>
+            </a:schemeClr>
+          </a:lnRef>
+          <a:fillRef idx="1">
+            <a:schemeClr val="accent1"/>
+          </a:fillRef>
+          <a:effectRef idx="0">
+            <a:schemeClr val="accent1"/>
+          </a:effectRef>
+          <a:fontRef idx="minor">
+            <a:schemeClr val="lt1"/>
+          </a:fontRef>
+        </p:style>
+        <p:txBody>
+          <a:bodyPr rtlCol="0" anchor="ctr"/>
+          <a:lstStyle/>
+          <a:p>
+            <a:pPr algn="ctr"/>
+            <a:endParaRPr lang="en-US"/>
+          </a:p>
+        </p:txBody>
+      </p:sp>
     </p:spTree>
     <p:extLst>
       <p:ext uri="{BB962C8B-B14F-4D97-AF65-F5344CB8AC3E}">

</xml_diff>

<commit_message>
Fix chapter 2 edits from Mauricio
</commit_message>
<xml_diff>
--- a/figs/networks.pptx
+++ b/figs/networks.pptx
@@ -247,7 +247,7 @@
           <a:p>
             <a:fld id="{85B3B054-712A-47A7-A562-EFC3154E7950}" type="datetimeFigureOut">
               <a:rPr lang="en-US" smtClean="0"/>
-              <a:t>7/4/2024</a:t>
+              <a:t>7/5/2024</a:t>
             </a:fld>
             <a:endParaRPr lang="en-US"/>
           </a:p>
@@ -417,7 +417,7 @@
           <a:p>
             <a:fld id="{85B3B054-712A-47A7-A562-EFC3154E7950}" type="datetimeFigureOut">
               <a:rPr lang="en-US" smtClean="0"/>
-              <a:t>7/4/2024</a:t>
+              <a:t>7/5/2024</a:t>
             </a:fld>
             <a:endParaRPr lang="en-US"/>
           </a:p>
@@ -597,7 +597,7 @@
           <a:p>
             <a:fld id="{85B3B054-712A-47A7-A562-EFC3154E7950}" type="datetimeFigureOut">
               <a:rPr lang="en-US" smtClean="0"/>
-              <a:t>7/4/2024</a:t>
+              <a:t>7/5/2024</a:t>
             </a:fld>
             <a:endParaRPr lang="en-US"/>
           </a:p>
@@ -767,7 +767,7 @@
           <a:p>
             <a:fld id="{85B3B054-712A-47A7-A562-EFC3154E7950}" type="datetimeFigureOut">
               <a:rPr lang="en-US" smtClean="0"/>
-              <a:t>7/4/2024</a:t>
+              <a:t>7/5/2024</a:t>
             </a:fld>
             <a:endParaRPr lang="en-US"/>
           </a:p>
@@ -1011,7 +1011,7 @@
           <a:p>
             <a:fld id="{85B3B054-712A-47A7-A562-EFC3154E7950}" type="datetimeFigureOut">
               <a:rPr lang="en-US" smtClean="0"/>
-              <a:t>7/4/2024</a:t>
+              <a:t>7/5/2024</a:t>
             </a:fld>
             <a:endParaRPr lang="en-US"/>
           </a:p>
@@ -1243,7 +1243,7 @@
           <a:p>
             <a:fld id="{85B3B054-712A-47A7-A562-EFC3154E7950}" type="datetimeFigureOut">
               <a:rPr lang="en-US" smtClean="0"/>
-              <a:t>7/4/2024</a:t>
+              <a:t>7/5/2024</a:t>
             </a:fld>
             <a:endParaRPr lang="en-US"/>
           </a:p>
@@ -1610,7 +1610,7 @@
           <a:p>
             <a:fld id="{85B3B054-712A-47A7-A562-EFC3154E7950}" type="datetimeFigureOut">
               <a:rPr lang="en-US" smtClean="0"/>
-              <a:t>7/4/2024</a:t>
+              <a:t>7/5/2024</a:t>
             </a:fld>
             <a:endParaRPr lang="en-US"/>
           </a:p>
@@ -1728,7 +1728,7 @@
           <a:p>
             <a:fld id="{85B3B054-712A-47A7-A562-EFC3154E7950}" type="datetimeFigureOut">
               <a:rPr lang="en-US" smtClean="0"/>
-              <a:t>7/4/2024</a:t>
+              <a:t>7/5/2024</a:t>
             </a:fld>
             <a:endParaRPr lang="en-US"/>
           </a:p>
@@ -1823,7 +1823,7 @@
           <a:p>
             <a:fld id="{85B3B054-712A-47A7-A562-EFC3154E7950}" type="datetimeFigureOut">
               <a:rPr lang="en-US" smtClean="0"/>
-              <a:t>7/4/2024</a:t>
+              <a:t>7/5/2024</a:t>
             </a:fld>
             <a:endParaRPr lang="en-US"/>
           </a:p>
@@ -2100,7 +2100,7 @@
           <a:p>
             <a:fld id="{85B3B054-712A-47A7-A562-EFC3154E7950}" type="datetimeFigureOut">
               <a:rPr lang="en-US" smtClean="0"/>
-              <a:t>7/4/2024</a:t>
+              <a:t>7/5/2024</a:t>
             </a:fld>
             <a:endParaRPr lang="en-US"/>
           </a:p>
@@ -2357,7 +2357,7 @@
           <a:p>
             <a:fld id="{85B3B054-712A-47A7-A562-EFC3154E7950}" type="datetimeFigureOut">
               <a:rPr lang="en-US" smtClean="0"/>
-              <a:t>7/4/2024</a:t>
+              <a:t>7/5/2024</a:t>
             </a:fld>
             <a:endParaRPr lang="en-US"/>
           </a:p>
@@ -2570,7 +2570,7 @@
           <a:p>
             <a:fld id="{85B3B054-712A-47A7-A562-EFC3154E7950}" type="datetimeFigureOut">
               <a:rPr lang="en-US" smtClean="0"/>
-              <a:t>7/4/2024</a:t>
+              <a:t>7/5/2024</a:t>
             </a:fld>
             <a:endParaRPr lang="en-US"/>
           </a:p>
@@ -8977,10 +8977,10 @@
       </p:grpSpPr>
       <p:grpSp>
         <p:nvGrpSpPr>
-          <p:cNvPr id="20" name="Group 19">
+          <p:cNvPr id="27" name="Group 26">
             <a:extLst>
               <a:ext uri="{FF2B5EF4-FFF2-40B4-BE49-F238E27FC236}">
-                <a16:creationId xmlns:a16="http://schemas.microsoft.com/office/drawing/2014/main" id="{459FC939-B855-DE53-D55D-4B5E62AF3D04}"/>
+                <a16:creationId xmlns:a16="http://schemas.microsoft.com/office/drawing/2014/main" id="{193D924F-F68F-70C2-DE6A-4B305CDBFC56}"/>
               </a:ext>
             </a:extLst>
           </p:cNvPr>
@@ -8995,445 +8995,152 @@
             <a:chExt cx="8936376" cy="7950200"/>
           </a:xfrm>
         </p:grpSpPr>
-        <p:grpSp>
-          <p:nvGrpSpPr>
-            <p:cNvPr id="12" name="Group 11">
+        <p:pic>
+          <p:nvPicPr>
+            <p:cNvPr id="22" name="Picture 21" descr="A graph with a line and a line&#10;&#10;Description automatically generated with medium confidence">
               <a:extLst>
                 <a:ext uri="{FF2B5EF4-FFF2-40B4-BE49-F238E27FC236}">
-                  <a16:creationId xmlns:a16="http://schemas.microsoft.com/office/drawing/2014/main" id="{5A931E98-7699-6538-F61C-64E8503C0507}"/>
+                  <a16:creationId xmlns:a16="http://schemas.microsoft.com/office/drawing/2014/main" id="{DD014EC7-34D9-FCE8-9173-801C57B8AB33}"/>
                 </a:ext>
               </a:extLst>
             </p:cNvPr>
-            <p:cNvGrpSpPr/>
+            <p:cNvPicPr>
+              <a:picLocks noChangeAspect="1"/>
+            </p:cNvPicPr>
             <p:nvPr/>
-          </p:nvGrpSpPr>
-          <p:grpSpPr>
+          </p:nvPicPr>
+          <p:blipFill rotWithShape="1">
+            <a:blip r:embed="rId2">
+              <a:extLst>
+                <a:ext uri="{28A0092B-C50C-407E-A947-70E740481C1C}">
+                  <a14:useLocalDpi xmlns:a14="http://schemas.microsoft.com/office/drawing/2010/main" val="0"/>
+                </a:ext>
+              </a:extLst>
+            </a:blip>
+            <a:srcRect t="7474"/>
+            <a:stretch/>
+          </p:blipFill>
+          <p:spPr>
             <a:xfrm>
-              <a:off x="6064777" y="2158268"/>
-              <a:ext cx="4473950" cy="3975100"/>
-              <a:chOff x="228600" y="4368800"/>
-              <a:chExt cx="4462427" cy="3975100"/>
+              <a:off x="1701451" y="6600337"/>
+              <a:ext cx="4258011" cy="3376955"/>
             </a:xfrm>
-          </p:grpSpPr>
-          <p:pic>
-            <p:nvPicPr>
-              <p:cNvPr id="5" name="Picture 4" descr="A diagram of normal distribution&#10;&#10;Description automatically generated">
-                <a:extLst>
-                  <a:ext uri="{FF2B5EF4-FFF2-40B4-BE49-F238E27FC236}">
-                    <a16:creationId xmlns:a16="http://schemas.microsoft.com/office/drawing/2014/main" id="{C4F65161-F823-1148-E85F-0C2E8669A697}"/>
-                  </a:ext>
-                </a:extLst>
-              </p:cNvPr>
-              <p:cNvPicPr>
-                <a:picLocks noChangeAspect="1"/>
-              </p:cNvPicPr>
-              <p:nvPr/>
-            </p:nvPicPr>
-            <p:blipFill rotWithShape="1">
-              <a:blip r:embed="rId2">
-                <a:extLst>
-                  <a:ext uri="{28A0092B-C50C-407E-A947-70E740481C1C}">
-                    <a14:useLocalDpi xmlns:a14="http://schemas.microsoft.com/office/drawing/2010/main" val="0"/>
-                  </a:ext>
-                </a:extLst>
-              </a:blip>
-              <a:srcRect t="9733" r="2965"/>
-              <a:stretch/>
-            </p:blipFill>
-            <p:spPr>
-              <a:xfrm>
-                <a:off x="357081" y="5003800"/>
-                <a:ext cx="4205463" cy="2876550"/>
-              </a:xfrm>
-              <a:prstGeom prst="rect">
-                <a:avLst/>
-              </a:prstGeom>
-            </p:spPr>
-          </p:pic>
-          <p:sp>
-            <p:nvSpPr>
-              <p:cNvPr id="4" name="Rectangle 3">
-                <a:extLst>
-                  <a:ext uri="{FF2B5EF4-FFF2-40B4-BE49-F238E27FC236}">
-                    <a16:creationId xmlns:a16="http://schemas.microsoft.com/office/drawing/2014/main" id="{8D65ECC6-2423-77C1-318C-6C585618853B}"/>
-                  </a:ext>
-                </a:extLst>
-              </p:cNvPr>
-              <p:cNvSpPr/>
-              <p:nvPr/>
-            </p:nvSpPr>
-            <p:spPr>
-              <a:xfrm>
-                <a:off x="228600" y="4368800"/>
-                <a:ext cx="4462427" cy="3975100"/>
-              </a:xfrm>
-              <a:prstGeom prst="rect">
-                <a:avLst/>
-              </a:prstGeom>
-              <a:noFill/>
-              <a:ln w="19050"/>
-            </p:spPr>
-            <p:style>
-              <a:lnRef idx="2">
-                <a:schemeClr val="accent1">
-                  <a:shade val="15000"/>
-                </a:schemeClr>
-              </a:lnRef>
-              <a:fillRef idx="1">
-                <a:schemeClr val="accent1"/>
-              </a:fillRef>
-              <a:effectRef idx="0">
-                <a:schemeClr val="accent1"/>
-              </a:effectRef>
-              <a:fontRef idx="minor">
-                <a:schemeClr val="lt1"/>
-              </a:fontRef>
-            </p:style>
-            <p:txBody>
-              <a:bodyPr rtlCol="0" anchor="ctr"/>
-              <a:lstStyle/>
-              <a:p>
-                <a:pPr algn="ctr"/>
-                <a:endParaRPr lang="en-US"/>
-              </a:p>
-            </p:txBody>
-          </p:sp>
-          <p:sp>
-            <p:nvSpPr>
-              <p:cNvPr id="9" name="TextBox 8">
-                <a:extLst>
-                  <a:ext uri="{FF2B5EF4-FFF2-40B4-BE49-F238E27FC236}">
-                    <a16:creationId xmlns:a16="http://schemas.microsoft.com/office/drawing/2014/main" id="{7A3C712F-A982-2DFC-2B19-2F584ED874BE}"/>
-                  </a:ext>
-                </a:extLst>
-              </p:cNvPr>
-              <p:cNvSpPr txBox="1"/>
-              <p:nvPr/>
-            </p:nvSpPr>
-            <p:spPr>
-              <a:xfrm>
-                <a:off x="304656" y="4466438"/>
-                <a:ext cx="433137" cy="369332"/>
-              </a:xfrm>
-              <a:prstGeom prst="rect">
-                <a:avLst/>
-              </a:prstGeom>
-              <a:noFill/>
-            </p:spPr>
-            <p:txBody>
-              <a:bodyPr wrap="square" rtlCol="0">
-                <a:spAutoFit/>
-              </a:bodyPr>
-              <a:lstStyle/>
-              <a:p>
-                <a:pPr algn="ctr"/>
-                <a:r>
-                  <a:rPr lang="en-US" b="1" dirty="0">
-                    <a:latin typeface="Times New Roman" panose="02020603050405020304" pitchFamily="18" charset="0"/>
-                    <a:cs typeface="Times New Roman" panose="02020603050405020304" pitchFamily="18" charset="0"/>
-                  </a:rPr>
-                  <a:t>B</a:t>
-                </a:r>
-              </a:p>
-            </p:txBody>
-          </p:sp>
-        </p:grpSp>
-        <p:grpSp>
-          <p:nvGrpSpPr>
-            <p:cNvPr id="13" name="Group 12">
+            <a:prstGeom prst="rect">
+              <a:avLst/>
+            </a:prstGeom>
+          </p:spPr>
+        </p:pic>
+        <p:pic>
+          <p:nvPicPr>
+            <p:cNvPr id="26" name="Picture 25" descr="A graph showing the number of individuals in the same direction&#10;&#10;Description automatically generated with medium confidence">
               <a:extLst>
                 <a:ext uri="{FF2B5EF4-FFF2-40B4-BE49-F238E27FC236}">
-                  <a16:creationId xmlns:a16="http://schemas.microsoft.com/office/drawing/2014/main" id="{6F51D156-D989-8568-2976-A816C4D01F62}"/>
+                  <a16:creationId xmlns:a16="http://schemas.microsoft.com/office/drawing/2014/main" id="{AC6B4A00-521C-F33C-007C-5A87551030B8}"/>
                 </a:ext>
               </a:extLst>
             </p:cNvPr>
-            <p:cNvGrpSpPr/>
+            <p:cNvPicPr>
+              <a:picLocks noChangeAspect="1"/>
+            </p:cNvPicPr>
             <p:nvPr/>
-          </p:nvGrpSpPr>
-          <p:grpSpPr>
+          </p:nvPicPr>
+          <p:blipFill rotWithShape="1">
+            <a:blip r:embed="rId3">
+              <a:extLst>
+                <a:ext uri="{28A0092B-C50C-407E-A947-70E740481C1C}">
+                  <a14:useLocalDpi xmlns:a14="http://schemas.microsoft.com/office/drawing/2010/main" val="0"/>
+                </a:ext>
+              </a:extLst>
+            </a:blip>
+            <a:srcRect t="7979"/>
+            <a:stretch/>
+          </p:blipFill>
+          <p:spPr>
             <a:xfrm>
-              <a:off x="1602351" y="6133368"/>
-              <a:ext cx="4462427" cy="3975100"/>
-              <a:chOff x="4691027" y="4368800"/>
-              <a:chExt cx="4462427" cy="3975100"/>
+              <a:off x="6163921" y="6571215"/>
+              <a:ext cx="4328300" cy="3413954"/>
             </a:xfrm>
-          </p:grpSpPr>
-          <p:pic>
-            <p:nvPicPr>
-              <p:cNvPr id="7" name="Picture 6" descr="A diagram of a normal distribution of a patient&#10;&#10;Description automatically generated with medium confidence">
-                <a:extLst>
-                  <a:ext uri="{FF2B5EF4-FFF2-40B4-BE49-F238E27FC236}">
-                    <a16:creationId xmlns:a16="http://schemas.microsoft.com/office/drawing/2014/main" id="{652FEB83-C1D0-B744-630A-8A70032012C9}"/>
-                  </a:ext>
-                </a:extLst>
-              </p:cNvPr>
-              <p:cNvPicPr>
-                <a:picLocks noChangeAspect="1"/>
-              </p:cNvPicPr>
-              <p:nvPr/>
-            </p:nvPicPr>
-            <p:blipFill rotWithShape="1">
-              <a:blip r:embed="rId3">
-                <a:extLst>
-                  <a:ext uri="{28A0092B-C50C-407E-A947-70E740481C1C}">
-                    <a14:useLocalDpi xmlns:a14="http://schemas.microsoft.com/office/drawing/2010/main" val="0"/>
-                  </a:ext>
-                </a:extLst>
-              </a:blip>
-              <a:srcRect t="9733"/>
-              <a:stretch/>
-            </p:blipFill>
-            <p:spPr>
-              <a:xfrm>
-                <a:off x="4819508" y="5003800"/>
-                <a:ext cx="4333945" cy="2876550"/>
-              </a:xfrm>
-              <a:prstGeom prst="rect">
-                <a:avLst/>
-              </a:prstGeom>
-            </p:spPr>
-          </p:pic>
-          <p:sp>
-            <p:nvSpPr>
-              <p:cNvPr id="6" name="Rectangle 5">
-                <a:extLst>
-                  <a:ext uri="{FF2B5EF4-FFF2-40B4-BE49-F238E27FC236}">
-                    <a16:creationId xmlns:a16="http://schemas.microsoft.com/office/drawing/2014/main" id="{29EB7F19-BA93-A5B2-C544-02CB22308415}"/>
-                  </a:ext>
-                </a:extLst>
-              </p:cNvPr>
-              <p:cNvSpPr/>
-              <p:nvPr/>
-            </p:nvSpPr>
-            <p:spPr>
-              <a:xfrm>
-                <a:off x="4691027" y="4368800"/>
-                <a:ext cx="4462427" cy="3975100"/>
-              </a:xfrm>
-              <a:prstGeom prst="rect">
-                <a:avLst/>
-              </a:prstGeom>
-              <a:noFill/>
-              <a:ln w="19050">
-                <a:solidFill>
-                  <a:schemeClr val="tx1"/>
-                </a:solidFill>
-              </a:ln>
-            </p:spPr>
-            <p:style>
-              <a:lnRef idx="2">
-                <a:schemeClr val="accent1">
-                  <a:shade val="15000"/>
-                </a:schemeClr>
-              </a:lnRef>
-              <a:fillRef idx="1">
-                <a:schemeClr val="accent1"/>
-              </a:fillRef>
-              <a:effectRef idx="0">
-                <a:schemeClr val="accent1"/>
-              </a:effectRef>
-              <a:fontRef idx="minor">
-                <a:schemeClr val="lt1"/>
-              </a:fontRef>
-            </p:style>
-            <p:txBody>
-              <a:bodyPr rtlCol="0" anchor="ctr"/>
-              <a:lstStyle/>
-              <a:p>
-                <a:pPr algn="ctr"/>
-                <a:endParaRPr lang="en-US"/>
-              </a:p>
-            </p:txBody>
-          </p:sp>
-          <p:sp>
-            <p:nvSpPr>
-              <p:cNvPr id="10" name="TextBox 9">
-                <a:extLst>
-                  <a:ext uri="{FF2B5EF4-FFF2-40B4-BE49-F238E27FC236}">
-                    <a16:creationId xmlns:a16="http://schemas.microsoft.com/office/drawing/2014/main" id="{C0035989-C1BC-11D3-7334-EA7104016103}"/>
-                  </a:ext>
-                </a:extLst>
-              </p:cNvPr>
-              <p:cNvSpPr txBox="1"/>
-              <p:nvPr/>
-            </p:nvSpPr>
-            <p:spPr>
-              <a:xfrm>
-                <a:off x="4819508" y="4466438"/>
-                <a:ext cx="433137" cy="369332"/>
-              </a:xfrm>
-              <a:prstGeom prst="rect">
-                <a:avLst/>
-              </a:prstGeom>
-              <a:noFill/>
-            </p:spPr>
-            <p:txBody>
-              <a:bodyPr wrap="square" rtlCol="0">
-                <a:spAutoFit/>
-              </a:bodyPr>
-              <a:lstStyle/>
-              <a:p>
-                <a:pPr algn="ctr"/>
-                <a:r>
-                  <a:rPr lang="en-US" b="1" dirty="0">
-                    <a:latin typeface="Times New Roman" panose="02020603050405020304" pitchFamily="18" charset="0"/>
-                    <a:cs typeface="Times New Roman" panose="02020603050405020304" pitchFamily="18" charset="0"/>
-                  </a:rPr>
-                  <a:t>C</a:t>
-                </a:r>
-              </a:p>
-            </p:txBody>
-          </p:sp>
-        </p:grpSp>
-        <p:grpSp>
-          <p:nvGrpSpPr>
-            <p:cNvPr id="14" name="Group 13">
+            <a:prstGeom prst="rect">
+              <a:avLst/>
+            </a:prstGeom>
+          </p:spPr>
+        </p:pic>
+        <p:pic>
+          <p:nvPicPr>
+            <p:cNvPr id="16" name="Picture 15" descr="A graph with blue lines&#10;&#10;Description automatically generated">
               <a:extLst>
                 <a:ext uri="{FF2B5EF4-FFF2-40B4-BE49-F238E27FC236}">
-                  <a16:creationId xmlns:a16="http://schemas.microsoft.com/office/drawing/2014/main" id="{4FAA6B9A-A733-9945-4160-49F50A7E62F4}"/>
+                  <a16:creationId xmlns:a16="http://schemas.microsoft.com/office/drawing/2014/main" id="{4AED9641-DEFB-774A-33BD-784BCEF0487C}"/>
                 </a:ext>
               </a:extLst>
             </p:cNvPr>
-            <p:cNvGrpSpPr/>
+            <p:cNvPicPr>
+              <a:picLocks noChangeAspect="1"/>
+            </p:cNvPicPr>
             <p:nvPr/>
-          </p:nvGrpSpPr>
-          <p:grpSpPr>
+          </p:nvPicPr>
+          <p:blipFill rotWithShape="1">
+            <a:blip r:embed="rId4">
+              <a:extLst>
+                <a:ext uri="{28A0092B-C50C-407E-A947-70E740481C1C}">
+                  <a14:useLocalDpi xmlns:a14="http://schemas.microsoft.com/office/drawing/2010/main" val="0"/>
+                </a:ext>
+              </a:extLst>
+            </a:blip>
+            <a:srcRect t="7810"/>
+            <a:stretch/>
+          </p:blipFill>
+          <p:spPr>
             <a:xfrm>
-              <a:off x="6076300" y="6133368"/>
-              <a:ext cx="4462427" cy="3975100"/>
-              <a:chOff x="9153453" y="4368800"/>
-              <a:chExt cx="4462427" cy="3975100"/>
+              <a:off x="1730832" y="2648310"/>
+              <a:ext cx="4244372" cy="3353883"/>
             </a:xfrm>
-          </p:grpSpPr>
-          <p:pic>
-            <p:nvPicPr>
-              <p:cNvPr id="3" name="Picture 2" descr="A diagram of a normal distribution&#10;&#10;Description automatically generated">
-                <a:extLst>
-                  <a:ext uri="{FF2B5EF4-FFF2-40B4-BE49-F238E27FC236}">
-                    <a16:creationId xmlns:a16="http://schemas.microsoft.com/office/drawing/2014/main" id="{9307C0DA-AF87-9D6D-A151-AA6615886C09}"/>
-                  </a:ext>
-                </a:extLst>
-              </p:cNvPr>
-              <p:cNvPicPr>
-                <a:picLocks noChangeAspect="1"/>
-              </p:cNvPicPr>
-              <p:nvPr/>
-            </p:nvPicPr>
-            <p:blipFill rotWithShape="1">
-              <a:blip r:embed="rId4">
-                <a:extLst>
-                  <a:ext uri="{28A0092B-C50C-407E-A947-70E740481C1C}">
-                    <a14:useLocalDpi xmlns:a14="http://schemas.microsoft.com/office/drawing/2010/main" val="0"/>
-                  </a:ext>
-                </a:extLst>
-              </a:blip>
-              <a:srcRect t="9733"/>
-              <a:stretch/>
-            </p:blipFill>
-            <p:spPr>
-              <a:xfrm>
-                <a:off x="9281935" y="5003800"/>
-                <a:ext cx="4333945" cy="2876550"/>
-              </a:xfrm>
-              <a:prstGeom prst="rect">
-                <a:avLst/>
-              </a:prstGeom>
-            </p:spPr>
-          </p:pic>
-          <p:sp>
-            <p:nvSpPr>
-              <p:cNvPr id="8" name="Rectangle 7">
-                <a:extLst>
-                  <a:ext uri="{FF2B5EF4-FFF2-40B4-BE49-F238E27FC236}">
-                    <a16:creationId xmlns:a16="http://schemas.microsoft.com/office/drawing/2014/main" id="{DEA7F988-0345-68A2-3D66-BDB74A441B8C}"/>
-                  </a:ext>
-                </a:extLst>
-              </p:cNvPr>
-              <p:cNvSpPr/>
-              <p:nvPr/>
-            </p:nvSpPr>
-            <p:spPr>
-              <a:xfrm>
-                <a:off x="9153453" y="4368800"/>
-                <a:ext cx="4462427" cy="3975100"/>
-              </a:xfrm>
-              <a:prstGeom prst="rect">
-                <a:avLst/>
-              </a:prstGeom>
-              <a:noFill/>
-              <a:ln w="19050"/>
-            </p:spPr>
-            <p:style>
-              <a:lnRef idx="2">
-                <a:schemeClr val="accent1">
-                  <a:shade val="15000"/>
-                </a:schemeClr>
-              </a:lnRef>
-              <a:fillRef idx="1">
-                <a:schemeClr val="accent1"/>
-              </a:fillRef>
-              <a:effectRef idx="0">
-                <a:schemeClr val="accent1"/>
-              </a:effectRef>
-              <a:fontRef idx="minor">
-                <a:schemeClr val="lt1"/>
-              </a:fontRef>
-            </p:style>
-            <p:txBody>
-              <a:bodyPr rtlCol="0" anchor="ctr"/>
-              <a:lstStyle/>
-              <a:p>
-                <a:pPr algn="ctr"/>
-                <a:endParaRPr lang="en-US"/>
-              </a:p>
-            </p:txBody>
-          </p:sp>
-          <p:sp>
-            <p:nvSpPr>
-              <p:cNvPr id="11" name="TextBox 10">
-                <a:extLst>
-                  <a:ext uri="{FF2B5EF4-FFF2-40B4-BE49-F238E27FC236}">
-                    <a16:creationId xmlns:a16="http://schemas.microsoft.com/office/drawing/2014/main" id="{C18D2FC8-8B1C-066E-956A-1D470FF0152E}"/>
-                  </a:ext>
-                </a:extLst>
-              </p:cNvPr>
-              <p:cNvSpPr txBox="1"/>
-              <p:nvPr/>
-            </p:nvSpPr>
-            <p:spPr>
-              <a:xfrm>
-                <a:off x="9281935" y="4466438"/>
-                <a:ext cx="433137" cy="369332"/>
-              </a:xfrm>
-              <a:prstGeom prst="rect">
-                <a:avLst/>
-              </a:prstGeom>
-              <a:noFill/>
-            </p:spPr>
-            <p:txBody>
-              <a:bodyPr wrap="square" rtlCol="0">
-                <a:spAutoFit/>
-              </a:bodyPr>
-              <a:lstStyle/>
-              <a:p>
-                <a:pPr algn="ctr"/>
-                <a:r>
-                  <a:rPr lang="en-US" b="1" dirty="0">
-                    <a:latin typeface="Times New Roman" panose="02020603050405020304" pitchFamily="18" charset="0"/>
-                    <a:cs typeface="Times New Roman" panose="02020603050405020304" pitchFamily="18" charset="0"/>
-                  </a:rPr>
-                  <a:t>D</a:t>
-                </a:r>
-              </a:p>
-            </p:txBody>
-          </p:sp>
-        </p:grpSp>
+            <a:prstGeom prst="rect">
+              <a:avLst/>
+            </a:prstGeom>
+          </p:spPr>
+        </p:pic>
+        <p:pic>
+          <p:nvPicPr>
+            <p:cNvPr id="24" name="Picture 23" descr="A graph with blue lines&#10;&#10;Description automatically generated with medium confidence">
+              <a:extLst>
+                <a:ext uri="{FF2B5EF4-FFF2-40B4-BE49-F238E27FC236}">
+                  <a16:creationId xmlns:a16="http://schemas.microsoft.com/office/drawing/2014/main" id="{BB63A171-C72E-5943-5E7C-06E1C7BFC112}"/>
+                </a:ext>
+              </a:extLst>
+            </p:cNvPr>
+            <p:cNvPicPr>
+              <a:picLocks noChangeAspect="1"/>
+            </p:cNvPicPr>
+            <p:nvPr/>
+          </p:nvPicPr>
+          <p:blipFill rotWithShape="1">
+            <a:blip r:embed="rId5">
+              <a:extLst>
+                <a:ext uri="{28A0092B-C50C-407E-A947-70E740481C1C}">
+                  <a14:useLocalDpi xmlns:a14="http://schemas.microsoft.com/office/drawing/2010/main" val="0"/>
+                </a:ext>
+              </a:extLst>
+            </a:blip>
+            <a:srcRect t="7642"/>
+            <a:stretch/>
+          </p:blipFill>
+          <p:spPr>
+            <a:xfrm>
+              <a:off x="6204781" y="2648310"/>
+              <a:ext cx="4246580" cy="3361759"/>
+            </a:xfrm>
+            <a:prstGeom prst="rect">
+              <a:avLst/>
+            </a:prstGeom>
+          </p:spPr>
+        </p:pic>
         <p:grpSp>
           <p:nvGrpSpPr>
-            <p:cNvPr id="19" name="Group 18">
+            <p:cNvPr id="20" name="Group 19">
               <a:extLst>
                 <a:ext uri="{FF2B5EF4-FFF2-40B4-BE49-F238E27FC236}">
-                  <a16:creationId xmlns:a16="http://schemas.microsoft.com/office/drawing/2014/main" id="{2BBC02DA-CABC-8552-C37A-E0EEC7CF30E7}"/>
+                  <a16:creationId xmlns:a16="http://schemas.microsoft.com/office/drawing/2014/main" id="{459FC939-B855-DE53-D55D-4B5E62AF3D04}"/>
                 </a:ext>
               </a:extLst>
             </p:cNvPr>
@@ -9443,133 +9150,447 @@
           <p:grpSpPr>
             <a:xfrm>
               <a:off x="1602351" y="2158268"/>
-              <a:ext cx="4473949" cy="3975100"/>
+              <a:ext cx="8936376" cy="7950200"/>
               <a:chOff x="1602351" y="2158268"/>
-              <a:chExt cx="4473949" cy="3975100"/>
+              <a:chExt cx="8936376" cy="7950200"/>
             </a:xfrm>
           </p:grpSpPr>
-          <p:pic>
-            <p:nvPicPr>
-              <p:cNvPr id="15" name="Picture 14" descr="A diagram of normal distribution&#10;&#10;Description automatically generated">
+          <p:grpSp>
+            <p:nvGrpSpPr>
+              <p:cNvPr id="12" name="Group 11">
                 <a:extLst>
                   <a:ext uri="{FF2B5EF4-FFF2-40B4-BE49-F238E27FC236}">
-                    <a16:creationId xmlns:a16="http://schemas.microsoft.com/office/drawing/2014/main" id="{72185530-9D7D-957C-37D3-EE802ED4FE0D}"/>
+                    <a16:creationId xmlns:a16="http://schemas.microsoft.com/office/drawing/2014/main" id="{5A931E98-7699-6538-F61C-64E8503C0507}"/>
                   </a:ext>
                 </a:extLst>
               </p:cNvPr>
-              <p:cNvPicPr>
-                <a:picLocks noChangeAspect="1"/>
-              </p:cNvPicPr>
+              <p:cNvGrpSpPr/>
               <p:nvPr/>
-            </p:nvPicPr>
-            <p:blipFill rotWithShape="1">
-              <a:blip r:embed="rId5">
-                <a:extLst>
-                  <a:ext uri="{28A0092B-C50C-407E-A947-70E740481C1C}">
-                    <a14:useLocalDpi xmlns:a14="http://schemas.microsoft.com/office/drawing/2010/main" val="0"/>
-                  </a:ext>
-                </a:extLst>
-              </a:blip>
-              <a:srcRect t="9680"/>
-              <a:stretch/>
-            </p:blipFill>
-            <p:spPr>
+            </p:nvGrpSpPr>
+            <p:grpSpPr>
               <a:xfrm>
-                <a:off x="1970445" y="2793269"/>
-                <a:ext cx="3988894" cy="2932010"/>
+                <a:off x="6064777" y="2158268"/>
+                <a:ext cx="4473950" cy="3975100"/>
+                <a:chOff x="228600" y="4368800"/>
+                <a:chExt cx="4462427" cy="3975100"/>
               </a:xfrm>
-              <a:prstGeom prst="rect">
-                <a:avLst/>
-              </a:prstGeom>
-            </p:spPr>
-          </p:pic>
-          <p:sp>
-            <p:nvSpPr>
-              <p:cNvPr id="17" name="Rectangle 16">
+            </p:grpSpPr>
+            <p:sp>
+              <p:nvSpPr>
+                <p:cNvPr id="4" name="Rectangle 3">
+                  <a:extLst>
+                    <a:ext uri="{FF2B5EF4-FFF2-40B4-BE49-F238E27FC236}">
+                      <a16:creationId xmlns:a16="http://schemas.microsoft.com/office/drawing/2014/main" id="{8D65ECC6-2423-77C1-318C-6C585618853B}"/>
+                    </a:ext>
+                  </a:extLst>
+                </p:cNvPr>
+                <p:cNvSpPr/>
+                <p:nvPr/>
+              </p:nvSpPr>
+              <p:spPr>
+                <a:xfrm>
+                  <a:off x="228600" y="4368800"/>
+                  <a:ext cx="4462427" cy="3975100"/>
+                </a:xfrm>
+                <a:prstGeom prst="rect">
+                  <a:avLst/>
+                </a:prstGeom>
+                <a:noFill/>
+                <a:ln w="19050"/>
+              </p:spPr>
+              <p:style>
+                <a:lnRef idx="2">
+                  <a:schemeClr val="accent1">
+                    <a:shade val="15000"/>
+                  </a:schemeClr>
+                </a:lnRef>
+                <a:fillRef idx="1">
+                  <a:schemeClr val="accent1"/>
+                </a:fillRef>
+                <a:effectRef idx="0">
+                  <a:schemeClr val="accent1"/>
+                </a:effectRef>
+                <a:fontRef idx="minor">
+                  <a:schemeClr val="lt1"/>
+                </a:fontRef>
+              </p:style>
+              <p:txBody>
+                <a:bodyPr rtlCol="0" anchor="ctr"/>
+                <a:lstStyle/>
+                <a:p>
+                  <a:pPr algn="ctr"/>
+                  <a:endParaRPr lang="en-US"/>
+                </a:p>
+              </p:txBody>
+            </p:sp>
+            <p:sp>
+              <p:nvSpPr>
+                <p:cNvPr id="9" name="TextBox 8">
+                  <a:extLst>
+                    <a:ext uri="{FF2B5EF4-FFF2-40B4-BE49-F238E27FC236}">
+                      <a16:creationId xmlns:a16="http://schemas.microsoft.com/office/drawing/2014/main" id="{7A3C712F-A982-2DFC-2B19-2F584ED874BE}"/>
+                    </a:ext>
+                  </a:extLst>
+                </p:cNvPr>
+                <p:cNvSpPr txBox="1"/>
+                <p:nvPr/>
+              </p:nvSpPr>
+              <p:spPr>
+                <a:xfrm>
+                  <a:off x="304656" y="4466438"/>
+                  <a:ext cx="433137" cy="369332"/>
+                </a:xfrm>
+                <a:prstGeom prst="rect">
+                  <a:avLst/>
+                </a:prstGeom>
+                <a:noFill/>
+              </p:spPr>
+              <p:txBody>
+                <a:bodyPr wrap="square" rtlCol="0">
+                  <a:spAutoFit/>
+                </a:bodyPr>
+                <a:lstStyle/>
+                <a:p>
+                  <a:pPr algn="ctr"/>
+                  <a:r>
+                    <a:rPr lang="en-US" b="1" dirty="0">
+                      <a:latin typeface="Times New Roman" panose="02020603050405020304" pitchFamily="18" charset="0"/>
+                      <a:cs typeface="Times New Roman" panose="02020603050405020304" pitchFamily="18" charset="0"/>
+                    </a:rPr>
+                    <a:t>B</a:t>
+                  </a:r>
+                </a:p>
+              </p:txBody>
+            </p:sp>
+          </p:grpSp>
+          <p:grpSp>
+            <p:nvGrpSpPr>
+              <p:cNvPr id="13" name="Group 12">
                 <a:extLst>
                   <a:ext uri="{FF2B5EF4-FFF2-40B4-BE49-F238E27FC236}">
-                    <a16:creationId xmlns:a16="http://schemas.microsoft.com/office/drawing/2014/main" id="{0EB87BAB-1BE7-360A-B20D-9DD5BBBD38BE}"/>
+                    <a16:creationId xmlns:a16="http://schemas.microsoft.com/office/drawing/2014/main" id="{6F51D156-D989-8568-2976-A816C4D01F62}"/>
                   </a:ext>
                 </a:extLst>
               </p:cNvPr>
-              <p:cNvSpPr/>
+              <p:cNvGrpSpPr/>
               <p:nvPr/>
-            </p:nvSpPr>
-            <p:spPr>
+            </p:nvGrpSpPr>
+            <p:grpSpPr>
+              <a:xfrm>
+                <a:off x="1602351" y="6133368"/>
+                <a:ext cx="4462427" cy="3975100"/>
+                <a:chOff x="4691027" y="4368800"/>
+                <a:chExt cx="4462427" cy="3975100"/>
+              </a:xfrm>
+            </p:grpSpPr>
+            <p:sp>
+              <p:nvSpPr>
+                <p:cNvPr id="6" name="Rectangle 5">
+                  <a:extLst>
+                    <a:ext uri="{FF2B5EF4-FFF2-40B4-BE49-F238E27FC236}">
+                      <a16:creationId xmlns:a16="http://schemas.microsoft.com/office/drawing/2014/main" id="{29EB7F19-BA93-A5B2-C544-02CB22308415}"/>
+                    </a:ext>
+                  </a:extLst>
+                </p:cNvPr>
+                <p:cNvSpPr/>
+                <p:nvPr/>
+              </p:nvSpPr>
+              <p:spPr>
+                <a:xfrm>
+                  <a:off x="4691027" y="4368800"/>
+                  <a:ext cx="4462427" cy="3975100"/>
+                </a:xfrm>
+                <a:prstGeom prst="rect">
+                  <a:avLst/>
+                </a:prstGeom>
+                <a:noFill/>
+                <a:ln w="19050">
+                  <a:solidFill>
+                    <a:schemeClr val="tx1"/>
+                  </a:solidFill>
+                </a:ln>
+              </p:spPr>
+              <p:style>
+                <a:lnRef idx="2">
+                  <a:schemeClr val="accent1">
+                    <a:shade val="15000"/>
+                  </a:schemeClr>
+                </a:lnRef>
+                <a:fillRef idx="1">
+                  <a:schemeClr val="accent1"/>
+                </a:fillRef>
+                <a:effectRef idx="0">
+                  <a:schemeClr val="accent1"/>
+                </a:effectRef>
+                <a:fontRef idx="minor">
+                  <a:schemeClr val="lt1"/>
+                </a:fontRef>
+              </p:style>
+              <p:txBody>
+                <a:bodyPr rtlCol="0" anchor="ctr"/>
+                <a:lstStyle/>
+                <a:p>
+                  <a:pPr algn="ctr"/>
+                  <a:endParaRPr lang="en-US"/>
+                </a:p>
+              </p:txBody>
+            </p:sp>
+            <p:sp>
+              <p:nvSpPr>
+                <p:cNvPr id="10" name="TextBox 9">
+                  <a:extLst>
+                    <a:ext uri="{FF2B5EF4-FFF2-40B4-BE49-F238E27FC236}">
+                      <a16:creationId xmlns:a16="http://schemas.microsoft.com/office/drawing/2014/main" id="{C0035989-C1BC-11D3-7334-EA7104016103}"/>
+                    </a:ext>
+                  </a:extLst>
+                </p:cNvPr>
+                <p:cNvSpPr txBox="1"/>
+                <p:nvPr/>
+              </p:nvSpPr>
+              <p:spPr>
+                <a:xfrm>
+                  <a:off x="4819508" y="4466438"/>
+                  <a:ext cx="433137" cy="369332"/>
+                </a:xfrm>
+                <a:prstGeom prst="rect">
+                  <a:avLst/>
+                </a:prstGeom>
+                <a:noFill/>
+              </p:spPr>
+              <p:txBody>
+                <a:bodyPr wrap="square" rtlCol="0">
+                  <a:spAutoFit/>
+                </a:bodyPr>
+                <a:lstStyle/>
+                <a:p>
+                  <a:pPr algn="ctr"/>
+                  <a:r>
+                    <a:rPr lang="en-US" b="1" dirty="0">
+                      <a:latin typeface="Times New Roman" panose="02020603050405020304" pitchFamily="18" charset="0"/>
+                      <a:cs typeface="Times New Roman" panose="02020603050405020304" pitchFamily="18" charset="0"/>
+                    </a:rPr>
+                    <a:t>C</a:t>
+                  </a:r>
+                </a:p>
+              </p:txBody>
+            </p:sp>
+          </p:grpSp>
+          <p:grpSp>
+            <p:nvGrpSpPr>
+              <p:cNvPr id="14" name="Group 13">
+                <a:extLst>
+                  <a:ext uri="{FF2B5EF4-FFF2-40B4-BE49-F238E27FC236}">
+                    <a16:creationId xmlns:a16="http://schemas.microsoft.com/office/drawing/2014/main" id="{4FAA6B9A-A733-9945-4160-49F50A7E62F4}"/>
+                  </a:ext>
+                </a:extLst>
+              </p:cNvPr>
+              <p:cNvGrpSpPr/>
+              <p:nvPr/>
+            </p:nvGrpSpPr>
+            <p:grpSpPr>
+              <a:xfrm>
+                <a:off x="6076300" y="6133368"/>
+                <a:ext cx="4462427" cy="3975100"/>
+                <a:chOff x="9153453" y="4368800"/>
+                <a:chExt cx="4462427" cy="3975100"/>
+              </a:xfrm>
+            </p:grpSpPr>
+            <p:sp>
+              <p:nvSpPr>
+                <p:cNvPr id="8" name="Rectangle 7">
+                  <a:extLst>
+                    <a:ext uri="{FF2B5EF4-FFF2-40B4-BE49-F238E27FC236}">
+                      <a16:creationId xmlns:a16="http://schemas.microsoft.com/office/drawing/2014/main" id="{DEA7F988-0345-68A2-3D66-BDB74A441B8C}"/>
+                    </a:ext>
+                  </a:extLst>
+                </p:cNvPr>
+                <p:cNvSpPr/>
+                <p:nvPr/>
+              </p:nvSpPr>
+              <p:spPr>
+                <a:xfrm>
+                  <a:off x="9153453" y="4368800"/>
+                  <a:ext cx="4462427" cy="3975100"/>
+                </a:xfrm>
+                <a:prstGeom prst="rect">
+                  <a:avLst/>
+                </a:prstGeom>
+                <a:noFill/>
+                <a:ln w="19050"/>
+              </p:spPr>
+              <p:style>
+                <a:lnRef idx="2">
+                  <a:schemeClr val="accent1">
+                    <a:shade val="15000"/>
+                  </a:schemeClr>
+                </a:lnRef>
+                <a:fillRef idx="1">
+                  <a:schemeClr val="accent1"/>
+                </a:fillRef>
+                <a:effectRef idx="0">
+                  <a:schemeClr val="accent1"/>
+                </a:effectRef>
+                <a:fontRef idx="minor">
+                  <a:schemeClr val="lt1"/>
+                </a:fontRef>
+              </p:style>
+              <p:txBody>
+                <a:bodyPr rtlCol="0" anchor="ctr"/>
+                <a:lstStyle/>
+                <a:p>
+                  <a:pPr algn="ctr"/>
+                  <a:endParaRPr lang="en-US"/>
+                </a:p>
+              </p:txBody>
+            </p:sp>
+            <p:sp>
+              <p:nvSpPr>
+                <p:cNvPr id="11" name="TextBox 10">
+                  <a:extLst>
+                    <a:ext uri="{FF2B5EF4-FFF2-40B4-BE49-F238E27FC236}">
+                      <a16:creationId xmlns:a16="http://schemas.microsoft.com/office/drawing/2014/main" id="{C18D2FC8-8B1C-066E-956A-1D470FF0152E}"/>
+                    </a:ext>
+                  </a:extLst>
+                </p:cNvPr>
+                <p:cNvSpPr txBox="1"/>
+                <p:nvPr/>
+              </p:nvSpPr>
+              <p:spPr>
+                <a:xfrm>
+                  <a:off x="9281935" y="4466438"/>
+                  <a:ext cx="433137" cy="369332"/>
+                </a:xfrm>
+                <a:prstGeom prst="rect">
+                  <a:avLst/>
+                </a:prstGeom>
+                <a:noFill/>
+              </p:spPr>
+              <p:txBody>
+                <a:bodyPr wrap="square" rtlCol="0">
+                  <a:spAutoFit/>
+                </a:bodyPr>
+                <a:lstStyle/>
+                <a:p>
+                  <a:pPr algn="ctr"/>
+                  <a:r>
+                    <a:rPr lang="en-US" b="1" dirty="0">
+                      <a:latin typeface="Times New Roman" panose="02020603050405020304" pitchFamily="18" charset="0"/>
+                      <a:cs typeface="Times New Roman" panose="02020603050405020304" pitchFamily="18" charset="0"/>
+                    </a:rPr>
+                    <a:t>D</a:t>
+                  </a:r>
+                </a:p>
+              </p:txBody>
+            </p:sp>
+          </p:grpSp>
+          <p:grpSp>
+            <p:nvGrpSpPr>
+              <p:cNvPr id="19" name="Group 18">
+                <a:extLst>
+                  <a:ext uri="{FF2B5EF4-FFF2-40B4-BE49-F238E27FC236}">
+                    <a16:creationId xmlns:a16="http://schemas.microsoft.com/office/drawing/2014/main" id="{2BBC02DA-CABC-8552-C37A-E0EEC7CF30E7}"/>
+                  </a:ext>
+                </a:extLst>
+              </p:cNvPr>
+              <p:cNvGrpSpPr/>
+              <p:nvPr/>
+            </p:nvGrpSpPr>
+            <p:grpSpPr>
               <a:xfrm>
                 <a:off x="1602351" y="2158268"/>
                 <a:ext cx="4473949" cy="3975100"/>
+                <a:chOff x="1602351" y="2158268"/>
+                <a:chExt cx="4473949" cy="3975100"/>
               </a:xfrm>
-              <a:prstGeom prst="rect">
-                <a:avLst/>
-              </a:prstGeom>
-              <a:noFill/>
-              <a:ln w="19050"/>
-            </p:spPr>
-            <p:style>
-              <a:lnRef idx="2">
-                <a:schemeClr val="accent1">
-                  <a:shade val="15000"/>
-                </a:schemeClr>
-              </a:lnRef>
-              <a:fillRef idx="1">
-                <a:schemeClr val="accent1"/>
-              </a:fillRef>
-              <a:effectRef idx="0">
-                <a:schemeClr val="accent1"/>
-              </a:effectRef>
-              <a:fontRef idx="minor">
-                <a:schemeClr val="lt1"/>
-              </a:fontRef>
-            </p:style>
-            <p:txBody>
-              <a:bodyPr rtlCol="0" anchor="ctr"/>
-              <a:lstStyle/>
-              <a:p>
-                <a:pPr algn="ctr"/>
-                <a:endParaRPr lang="en-US"/>
-              </a:p>
-            </p:txBody>
-          </p:sp>
-          <p:sp>
-            <p:nvSpPr>
-              <p:cNvPr id="18" name="TextBox 17">
-                <a:extLst>
-                  <a:ext uri="{FF2B5EF4-FFF2-40B4-BE49-F238E27FC236}">
-                    <a16:creationId xmlns:a16="http://schemas.microsoft.com/office/drawing/2014/main" id="{7E4F8032-6918-CF2A-D504-97F56FFBE1B9}"/>
-                  </a:ext>
-                </a:extLst>
-              </p:cNvPr>
-              <p:cNvSpPr txBox="1"/>
-              <p:nvPr/>
-            </p:nvSpPr>
-            <p:spPr>
-              <a:xfrm>
-                <a:off x="1701451" y="2255906"/>
-                <a:ext cx="433137" cy="369332"/>
-              </a:xfrm>
-              <a:prstGeom prst="rect">
-                <a:avLst/>
-              </a:prstGeom>
-              <a:noFill/>
-            </p:spPr>
-            <p:txBody>
-              <a:bodyPr wrap="square" rtlCol="0">
-                <a:spAutoFit/>
-              </a:bodyPr>
-              <a:lstStyle/>
-              <a:p>
-                <a:pPr algn="ctr"/>
-                <a:r>
-                  <a:rPr lang="en-US" b="1" dirty="0">
-                    <a:latin typeface="Times New Roman" panose="02020603050405020304" pitchFamily="18" charset="0"/>
-                    <a:cs typeface="Times New Roman" panose="02020603050405020304" pitchFamily="18" charset="0"/>
-                  </a:rPr>
-                  <a:t>A</a:t>
-                </a:r>
-              </a:p>
-            </p:txBody>
-          </p:sp>
+            </p:grpSpPr>
+            <p:sp>
+              <p:nvSpPr>
+                <p:cNvPr id="17" name="Rectangle 16">
+                  <a:extLst>
+                    <a:ext uri="{FF2B5EF4-FFF2-40B4-BE49-F238E27FC236}">
+                      <a16:creationId xmlns:a16="http://schemas.microsoft.com/office/drawing/2014/main" id="{0EB87BAB-1BE7-360A-B20D-9DD5BBBD38BE}"/>
+                    </a:ext>
+                  </a:extLst>
+                </p:cNvPr>
+                <p:cNvSpPr/>
+                <p:nvPr/>
+              </p:nvSpPr>
+              <p:spPr>
+                <a:xfrm>
+                  <a:off x="1602351" y="2158268"/>
+                  <a:ext cx="4473949" cy="3975100"/>
+                </a:xfrm>
+                <a:prstGeom prst="rect">
+                  <a:avLst/>
+                </a:prstGeom>
+                <a:noFill/>
+                <a:ln w="19050"/>
+              </p:spPr>
+              <p:style>
+                <a:lnRef idx="2">
+                  <a:schemeClr val="accent1">
+                    <a:shade val="15000"/>
+                  </a:schemeClr>
+                </a:lnRef>
+                <a:fillRef idx="1">
+                  <a:schemeClr val="accent1"/>
+                </a:fillRef>
+                <a:effectRef idx="0">
+                  <a:schemeClr val="accent1"/>
+                </a:effectRef>
+                <a:fontRef idx="minor">
+                  <a:schemeClr val="lt1"/>
+                </a:fontRef>
+              </p:style>
+              <p:txBody>
+                <a:bodyPr rtlCol="0" anchor="ctr"/>
+                <a:lstStyle/>
+                <a:p>
+                  <a:pPr algn="ctr"/>
+                  <a:endParaRPr lang="en-US"/>
+                </a:p>
+              </p:txBody>
+            </p:sp>
+            <p:sp>
+              <p:nvSpPr>
+                <p:cNvPr id="18" name="TextBox 17">
+                  <a:extLst>
+                    <a:ext uri="{FF2B5EF4-FFF2-40B4-BE49-F238E27FC236}">
+                      <a16:creationId xmlns:a16="http://schemas.microsoft.com/office/drawing/2014/main" id="{7E4F8032-6918-CF2A-D504-97F56FFBE1B9}"/>
+                    </a:ext>
+                  </a:extLst>
+                </p:cNvPr>
+                <p:cNvSpPr txBox="1"/>
+                <p:nvPr/>
+              </p:nvSpPr>
+              <p:spPr>
+                <a:xfrm>
+                  <a:off x="1701451" y="2255906"/>
+                  <a:ext cx="433137" cy="369332"/>
+                </a:xfrm>
+                <a:prstGeom prst="rect">
+                  <a:avLst/>
+                </a:prstGeom>
+                <a:noFill/>
+              </p:spPr>
+              <p:txBody>
+                <a:bodyPr wrap="square" rtlCol="0">
+                  <a:spAutoFit/>
+                </a:bodyPr>
+                <a:lstStyle/>
+                <a:p>
+                  <a:pPr algn="ctr"/>
+                  <a:r>
+                    <a:rPr lang="en-US" b="1" dirty="0">
+                      <a:latin typeface="Times New Roman" panose="02020603050405020304" pitchFamily="18" charset="0"/>
+                      <a:cs typeface="Times New Roman" panose="02020603050405020304" pitchFamily="18" charset="0"/>
+                    </a:rPr>
+                    <a:t>A</a:t>
+                  </a:r>
+                </a:p>
+              </p:txBody>
+            </p:sp>
+          </p:grpSp>
         </p:grpSp>
       </p:grpSp>
     </p:spTree>

</xml_diff>